<commit_message>
final versions of my R code & latest ppt
</commit_message>
<xml_diff>
--- a/Trains vs Planes.pptx
+++ b/Trains vs Planes.pptx
@@ -6,12 +6,17 @@
   </p:sldMasterIdLst>
   <p:sldIdLst>
     <p:sldId id="256" r:id="rId2"/>
-    <p:sldId id="257" r:id="rId3"/>
-    <p:sldId id="258" r:id="rId4"/>
-    <p:sldId id="259" r:id="rId5"/>
-    <p:sldId id="260" r:id="rId6"/>
-    <p:sldId id="261" r:id="rId7"/>
-    <p:sldId id="262" r:id="rId8"/>
+    <p:sldId id="270" r:id="rId3"/>
+    <p:sldId id="257" r:id="rId4"/>
+    <p:sldId id="258" r:id="rId5"/>
+    <p:sldId id="259" r:id="rId6"/>
+    <p:sldId id="260" r:id="rId7"/>
+    <p:sldId id="263" r:id="rId8"/>
+    <p:sldId id="264" r:id="rId9"/>
+    <p:sldId id="268" r:id="rId10"/>
+    <p:sldId id="266" r:id="rId11"/>
+    <p:sldId id="261" r:id="rId12"/>
+    <p:sldId id="262" r:id="rId13"/>
   </p:sldIdLst>
   <p:sldSz cx="12192000" cy="6858000"/>
   <p:notesSz cx="6858000" cy="9144000"/>
@@ -3318,6 +3323,21 @@
 <file path=ppt/slides/slide1.xml><?xml version="1.0" encoding="utf-8"?>
 <p:sld xmlns:a="http://schemas.openxmlformats.org/drawingml/2006/main" xmlns:r="http://schemas.openxmlformats.org/officeDocument/2006/relationships" xmlns:p="http://schemas.openxmlformats.org/presentationml/2006/main">
   <p:cSld>
+    <p:bg>
+      <p:bgPr>
+        <a:blipFill dpi="0" rotWithShape="1">
+          <a:blip r:embed="rId3">
+            <a:alphaModFix amt="30000"/>
+            <a:lum/>
+          </a:blip>
+          <a:srcRect/>
+          <a:stretch>
+            <a:fillRect t="-11000" b="-11000"/>
+          </a:stretch>
+        </a:blipFill>
+        <a:effectLst/>
+      </p:bgPr>
+    </p:bg>
     <p:spTree>
       <p:nvGrpSpPr>
         <p:cNvPr id="1" name=""/>
@@ -3356,14 +3376,14 @@
           <a:lstStyle/>
           <a:p>
             <a:r>
-              <a:rPr lang="en-US" dirty="0"/>
+              <a:rPr lang="en-US" b="1" dirty="0"/>
               <a:t>Trains vs Planes:</a:t>
             </a:r>
             <a:br>
-              <a:rPr lang="en-US" dirty="0"/>
+              <a:rPr lang="en-US" b="1" dirty="0"/>
             </a:br>
             <a:r>
-              <a:rPr lang="en-US" dirty="0"/>
+              <a:rPr lang="en-US" b="1" dirty="0"/>
               <a:t>The True Cost of Travel</a:t>
             </a:r>
           </a:p>
@@ -3391,24 +3411,24 @@
           <a:lstStyle/>
           <a:p>
             <a:r>
-              <a:rPr lang="en-US" dirty="0"/>
+              <a:rPr lang="en-US" b="1" dirty="0"/>
               <a:t>Makeover Monday</a:t>
             </a:r>
           </a:p>
           <a:p>
             <a:r>
-              <a:rPr lang="en-US" dirty="0" err="1"/>
+              <a:rPr lang="en-US" b="1" dirty="0" err="1"/>
               <a:t>Suyin</a:t>
             </a:r>
             <a:r>
-              <a:rPr lang="en-US" dirty="0"/>
+              <a:rPr lang="en-US" b="1" dirty="0"/>
               <a:t> Lee &amp; Andreas </a:t>
             </a:r>
             <a:r>
-              <a:rPr lang="en-US" dirty="0" err="1"/>
+              <a:rPr lang="en-US" b="1" dirty="0" err="1"/>
               <a:t>Lezis</a:t>
             </a:r>
-            <a:endParaRPr lang="en-US" dirty="0"/>
+            <a:endParaRPr lang="en-US" b="1" dirty="0"/>
           </a:p>
         </p:txBody>
       </p:sp>
@@ -3420,14 +3440,29 @@
     </p:extLst>
   </p:cSld>
   <p:clrMapOvr>
-    <a:masterClrMapping/>
+    <a:overrideClrMapping bg1="lt1" tx1="dk1" bg2="lt2" tx2="dk2" accent1="accent1" accent2="accent2" accent3="accent3" accent4="accent4" accent5="accent5" accent6="accent6" hlink="hlink" folHlink="folHlink"/>
   </p:clrMapOvr>
 </p:sld>
 </file>
 
-<file path=ppt/slides/slide2.xml><?xml version="1.0" encoding="utf-8"?>
+<file path=ppt/slides/slide10.xml><?xml version="1.0" encoding="utf-8"?>
 <p:sld xmlns:a="http://schemas.openxmlformats.org/drawingml/2006/main" xmlns:r="http://schemas.openxmlformats.org/officeDocument/2006/relationships" xmlns:p="http://schemas.openxmlformats.org/presentationml/2006/main">
   <p:cSld>
+    <p:bg>
+      <p:bgPr>
+        <a:blipFill dpi="0" rotWithShape="1">
+          <a:blip r:embed="rId3">
+            <a:alphaModFix amt="30000"/>
+            <a:lum/>
+          </a:blip>
+          <a:srcRect/>
+          <a:stretch>
+            <a:fillRect t="-11000" b="-11000"/>
+          </a:stretch>
+        </a:blipFill>
+        <a:effectLst/>
+      </p:bgPr>
+    </p:bg>
     <p:spTree>
       <p:nvGrpSpPr>
         <p:cNvPr id="1" name=""/>
@@ -3444,6 +3479,538 @@
       </p:grpSpPr>
       <p:sp>
         <p:nvSpPr>
+          <p:cNvPr id="2" name="Title 1">
+            <a:extLst>
+              <a:ext uri="{FF2B5EF4-FFF2-40B4-BE49-F238E27FC236}">
+                <a16:creationId xmlns:a16="http://schemas.microsoft.com/office/drawing/2014/main" id="{11ACE9FC-7DAF-4A81-907A-EAE862A0C923}"/>
+              </a:ext>
+            </a:extLst>
+          </p:cNvPr>
+          <p:cNvSpPr>
+            <a:spLocks noGrp="1"/>
+          </p:cNvSpPr>
+          <p:nvPr>
+            <p:ph type="title"/>
+          </p:nvPr>
+        </p:nvSpPr>
+        <p:spPr>
+          <a:xfrm>
+            <a:off x="838200" y="365125"/>
+            <a:ext cx="5257800" cy="1325563"/>
+          </a:xfrm>
+        </p:spPr>
+        <p:txBody>
+          <a:bodyPr/>
+          <a:lstStyle/>
+          <a:p>
+            <a:r>
+              <a:rPr lang="en-US" b="1" dirty="0"/>
+              <a:t>Improving the Original Visualization</a:t>
+            </a:r>
+          </a:p>
+        </p:txBody>
+      </p:sp>
+      <p:sp>
+        <p:nvSpPr>
+          <p:cNvPr id="3" name="Content Placeholder 2">
+            <a:extLst>
+              <a:ext uri="{FF2B5EF4-FFF2-40B4-BE49-F238E27FC236}">
+                <a16:creationId xmlns:a16="http://schemas.microsoft.com/office/drawing/2014/main" id="{DDA52849-0140-4570-A1F0-CB0B00611132}"/>
+              </a:ext>
+            </a:extLst>
+          </p:cNvPr>
+          <p:cNvSpPr>
+            <a:spLocks noGrp="1"/>
+          </p:cNvSpPr>
+          <p:nvPr>
+            <p:ph sz="half" idx="1"/>
+          </p:nvPr>
+        </p:nvSpPr>
+        <p:spPr>
+          <a:solidFill>
+            <a:srgbClr val="F2F3F5"/>
+          </a:solidFill>
+        </p:spPr>
+        <p:txBody>
+          <a:bodyPr/>
+          <a:lstStyle/>
+          <a:p>
+            <a:r>
+              <a:rPr lang="en-US" dirty="0"/>
+              <a:t>Let’s face it… the animation makes it harder to understand the data, not easier</a:t>
+            </a:r>
+          </a:p>
+          <a:p>
+            <a:r>
+              <a:rPr lang="en-US" dirty="0"/>
+              <a:t>The assumed delayed applied to all plane trips may not be reasonable, or universally applicable – there are ways of conveying the spread of data</a:t>
+            </a:r>
+          </a:p>
+          <a:p>
+            <a:endParaRPr lang="en-US" dirty="0"/>
+          </a:p>
+        </p:txBody>
+      </p:sp>
+      <p:pic>
+        <p:nvPicPr>
+          <p:cNvPr id="6" name="Content Placeholder 5">
+            <a:extLst>
+              <a:ext uri="{FF2B5EF4-FFF2-40B4-BE49-F238E27FC236}">
+                <a16:creationId xmlns:a16="http://schemas.microsoft.com/office/drawing/2014/main" id="{64CAB0A1-B04C-4AF1-8C61-062543C6F698}"/>
+              </a:ext>
+            </a:extLst>
+          </p:cNvPr>
+          <p:cNvPicPr>
+            <a:picLocks noGrp="1" noChangeAspect="1"/>
+          </p:cNvPicPr>
+          <p:nvPr>
+            <p:ph sz="half" idx="2"/>
+          </p:nvPr>
+        </p:nvPicPr>
+        <p:blipFill>
+          <a:blip r:embed="rId4">
+            <a:extLst>
+              <a:ext uri="{28A0092B-C50C-407E-A947-70E740481C1C}">
+                <a14:useLocalDpi xmlns:a14="http://schemas.microsoft.com/office/drawing/2010/main" val="0"/>
+              </a:ext>
+            </a:extLst>
+          </a:blip>
+          <a:stretch>
+            <a:fillRect/>
+          </a:stretch>
+        </p:blipFill>
+        <p:spPr>
+          <a:xfrm>
+            <a:off x="6096000" y="521208"/>
+            <a:ext cx="5815584" cy="5815584"/>
+          </a:xfrm>
+        </p:spPr>
+      </p:pic>
+    </p:spTree>
+    <p:extLst>
+      <p:ext uri="{BB962C8B-B14F-4D97-AF65-F5344CB8AC3E}">
+        <p14:creationId xmlns:p14="http://schemas.microsoft.com/office/powerpoint/2010/main" val="2675873568"/>
+      </p:ext>
+    </p:extLst>
+  </p:cSld>
+  <p:clrMapOvr>
+    <a:overrideClrMapping bg1="lt1" tx1="dk1" bg2="lt2" tx2="dk2" accent1="accent1" accent2="accent2" accent3="accent3" accent4="accent4" accent5="accent5" accent6="accent6" hlink="hlink" folHlink="folHlink"/>
+  </p:clrMapOvr>
+</p:sld>
+</file>
+
+<file path=ppt/slides/slide11.xml><?xml version="1.0" encoding="utf-8"?>
+<p:sld xmlns:a="http://schemas.openxmlformats.org/drawingml/2006/main" xmlns:r="http://schemas.openxmlformats.org/officeDocument/2006/relationships" xmlns:p="http://schemas.openxmlformats.org/presentationml/2006/main">
+  <p:cSld>
+    <p:bg>
+      <p:bgPr>
+        <a:blipFill dpi="0" rotWithShape="1">
+          <a:blip r:embed="rId3">
+            <a:alphaModFix amt="30000"/>
+            <a:lum/>
+          </a:blip>
+          <a:srcRect/>
+          <a:stretch>
+            <a:fillRect t="-11000" b="-11000"/>
+          </a:stretch>
+        </a:blipFill>
+        <a:effectLst/>
+      </p:bgPr>
+    </p:bg>
+    <p:spTree>
+      <p:nvGrpSpPr>
+        <p:cNvPr id="1" name=""/>
+        <p:cNvGrpSpPr/>
+        <p:nvPr/>
+      </p:nvGrpSpPr>
+      <p:grpSpPr>
+        <a:xfrm>
+          <a:off x="0" y="0"/>
+          <a:ext cx="0" cy="0"/>
+          <a:chOff x="0" y="0"/>
+          <a:chExt cx="0" cy="0"/>
+        </a:xfrm>
+      </p:grpSpPr>
+      <p:sp>
+        <p:nvSpPr>
+          <p:cNvPr id="2" name="Title 1">
+            <a:extLst>
+              <a:ext uri="{FF2B5EF4-FFF2-40B4-BE49-F238E27FC236}">
+                <a16:creationId xmlns:a16="http://schemas.microsoft.com/office/drawing/2014/main" id="{3F14FB01-A1F6-46BE-9810-500284D63B6B}"/>
+              </a:ext>
+            </a:extLst>
+          </p:cNvPr>
+          <p:cNvSpPr>
+            <a:spLocks noGrp="1"/>
+          </p:cNvSpPr>
+          <p:nvPr>
+            <p:ph type="title"/>
+          </p:nvPr>
+        </p:nvSpPr>
+        <p:spPr/>
+        <p:txBody>
+          <a:bodyPr/>
+          <a:lstStyle/>
+          <a:p>
+            <a:r>
+              <a:rPr lang="en-US" b="1" dirty="0"/>
+              <a:t>Challenges</a:t>
+            </a:r>
+          </a:p>
+        </p:txBody>
+      </p:sp>
+      <p:sp>
+        <p:nvSpPr>
+          <p:cNvPr id="3" name="Content Placeholder 2">
+            <a:extLst>
+              <a:ext uri="{FF2B5EF4-FFF2-40B4-BE49-F238E27FC236}">
+                <a16:creationId xmlns:a16="http://schemas.microsoft.com/office/drawing/2014/main" id="{FECAB945-8F13-4CDA-80D9-2B7B6066653A}"/>
+              </a:ext>
+            </a:extLst>
+          </p:cNvPr>
+          <p:cNvSpPr>
+            <a:spLocks noGrp="1"/>
+          </p:cNvSpPr>
+          <p:nvPr>
+            <p:ph sz="half" idx="1"/>
+          </p:nvPr>
+        </p:nvSpPr>
+        <p:spPr/>
+        <p:txBody>
+          <a:bodyPr/>
+          <a:lstStyle/>
+          <a:p>
+            <a:endParaRPr lang="en-US"/>
+          </a:p>
+        </p:txBody>
+      </p:sp>
+      <p:sp>
+        <p:nvSpPr>
+          <p:cNvPr id="4" name="Content Placeholder 3">
+            <a:extLst>
+              <a:ext uri="{FF2B5EF4-FFF2-40B4-BE49-F238E27FC236}">
+                <a16:creationId xmlns:a16="http://schemas.microsoft.com/office/drawing/2014/main" id="{1C173A96-D5B9-4DF6-ABB2-74F3288DBFFD}"/>
+              </a:ext>
+            </a:extLst>
+          </p:cNvPr>
+          <p:cNvSpPr>
+            <a:spLocks noGrp="1"/>
+          </p:cNvSpPr>
+          <p:nvPr>
+            <p:ph sz="half" idx="2"/>
+          </p:nvPr>
+        </p:nvSpPr>
+        <p:spPr/>
+        <p:txBody>
+          <a:bodyPr/>
+          <a:lstStyle/>
+          <a:p>
+            <a:endParaRPr lang="en-US"/>
+          </a:p>
+        </p:txBody>
+      </p:sp>
+    </p:spTree>
+    <p:extLst>
+      <p:ext uri="{BB962C8B-B14F-4D97-AF65-F5344CB8AC3E}">
+        <p14:creationId xmlns:p14="http://schemas.microsoft.com/office/powerpoint/2010/main" val="3676238569"/>
+      </p:ext>
+    </p:extLst>
+  </p:cSld>
+  <p:clrMapOvr>
+    <a:overrideClrMapping bg1="lt1" tx1="dk1" bg2="lt2" tx2="dk2" accent1="accent1" accent2="accent2" accent3="accent3" accent4="accent4" accent5="accent5" accent6="accent6" hlink="hlink" folHlink="folHlink"/>
+  </p:clrMapOvr>
+</p:sld>
+</file>
+
+<file path=ppt/slides/slide12.xml><?xml version="1.0" encoding="utf-8"?>
+<p:sld xmlns:a="http://schemas.openxmlformats.org/drawingml/2006/main" xmlns:r="http://schemas.openxmlformats.org/officeDocument/2006/relationships" xmlns:p="http://schemas.openxmlformats.org/presentationml/2006/main">
+  <p:cSld>
+    <p:bg>
+      <p:bgPr>
+        <a:blipFill dpi="0" rotWithShape="1">
+          <a:blip r:embed="rId3">
+            <a:alphaModFix amt="30000"/>
+            <a:lum/>
+          </a:blip>
+          <a:srcRect/>
+          <a:stretch>
+            <a:fillRect t="-11000" b="-11000"/>
+          </a:stretch>
+        </a:blipFill>
+        <a:effectLst/>
+      </p:bgPr>
+    </p:bg>
+    <p:spTree>
+      <p:nvGrpSpPr>
+        <p:cNvPr id="1" name=""/>
+        <p:cNvGrpSpPr/>
+        <p:nvPr/>
+      </p:nvGrpSpPr>
+      <p:grpSpPr>
+        <a:xfrm>
+          <a:off x="0" y="0"/>
+          <a:ext cx="0" cy="0"/>
+          <a:chOff x="0" y="0"/>
+          <a:chExt cx="0" cy="0"/>
+        </a:xfrm>
+      </p:grpSpPr>
+      <p:sp>
+        <p:nvSpPr>
+          <p:cNvPr id="2" name="Title 1">
+            <a:extLst>
+              <a:ext uri="{FF2B5EF4-FFF2-40B4-BE49-F238E27FC236}">
+                <a16:creationId xmlns:a16="http://schemas.microsoft.com/office/drawing/2014/main" id="{AE91C00E-DA2D-478D-976F-161FABE354B1}"/>
+              </a:ext>
+            </a:extLst>
+          </p:cNvPr>
+          <p:cNvSpPr>
+            <a:spLocks noGrp="1"/>
+          </p:cNvSpPr>
+          <p:nvPr>
+            <p:ph type="title"/>
+          </p:nvPr>
+        </p:nvSpPr>
+        <p:spPr/>
+        <p:txBody>
+          <a:bodyPr/>
+          <a:lstStyle/>
+          <a:p>
+            <a:r>
+              <a:rPr lang="en-US" b="1" dirty="0"/>
+              <a:t>Closing Thoughts</a:t>
+            </a:r>
+          </a:p>
+        </p:txBody>
+      </p:sp>
+      <p:sp>
+        <p:nvSpPr>
+          <p:cNvPr id="3" name="Content Placeholder 2">
+            <a:extLst>
+              <a:ext uri="{FF2B5EF4-FFF2-40B4-BE49-F238E27FC236}">
+                <a16:creationId xmlns:a16="http://schemas.microsoft.com/office/drawing/2014/main" id="{4AAAB96C-DDD5-4720-A7C0-66D77E0282F8}"/>
+              </a:ext>
+            </a:extLst>
+          </p:cNvPr>
+          <p:cNvSpPr>
+            <a:spLocks noGrp="1"/>
+          </p:cNvSpPr>
+          <p:nvPr>
+            <p:ph sz="half" idx="1"/>
+          </p:nvPr>
+        </p:nvSpPr>
+        <p:spPr/>
+        <p:txBody>
+          <a:bodyPr/>
+          <a:lstStyle/>
+          <a:p>
+            <a:endParaRPr lang="en-US"/>
+          </a:p>
+        </p:txBody>
+      </p:sp>
+      <p:sp>
+        <p:nvSpPr>
+          <p:cNvPr id="4" name="Content Placeholder 3">
+            <a:extLst>
+              <a:ext uri="{FF2B5EF4-FFF2-40B4-BE49-F238E27FC236}">
+                <a16:creationId xmlns:a16="http://schemas.microsoft.com/office/drawing/2014/main" id="{669DFBCA-B4DA-404A-96B2-4128478F16B9}"/>
+              </a:ext>
+            </a:extLst>
+          </p:cNvPr>
+          <p:cNvSpPr>
+            <a:spLocks noGrp="1"/>
+          </p:cNvSpPr>
+          <p:nvPr>
+            <p:ph sz="half" idx="2"/>
+          </p:nvPr>
+        </p:nvSpPr>
+        <p:spPr/>
+        <p:txBody>
+          <a:bodyPr/>
+          <a:lstStyle/>
+          <a:p>
+            <a:endParaRPr lang="en-US"/>
+          </a:p>
+        </p:txBody>
+      </p:sp>
+    </p:spTree>
+    <p:extLst>
+      <p:ext uri="{BB962C8B-B14F-4D97-AF65-F5344CB8AC3E}">
+        <p14:creationId xmlns:p14="http://schemas.microsoft.com/office/powerpoint/2010/main" val="2677055334"/>
+      </p:ext>
+    </p:extLst>
+  </p:cSld>
+  <p:clrMapOvr>
+    <a:overrideClrMapping bg1="lt1" tx1="dk1" bg2="lt2" tx2="dk2" accent1="accent1" accent2="accent2" accent3="accent3" accent4="accent4" accent5="accent5" accent6="accent6" hlink="hlink" folHlink="folHlink"/>
+  </p:clrMapOvr>
+</p:sld>
+</file>
+
+<file path=ppt/slides/slide2.xml><?xml version="1.0" encoding="utf-8"?>
+<p:sld xmlns:a="http://schemas.openxmlformats.org/drawingml/2006/main" xmlns:r="http://schemas.openxmlformats.org/officeDocument/2006/relationships" xmlns:p="http://schemas.openxmlformats.org/presentationml/2006/main">
+  <p:cSld>
+    <p:bg>
+      <p:bgPr>
+        <a:blipFill dpi="0" rotWithShape="1">
+          <a:blip r:embed="rId3">
+            <a:alphaModFix amt="30000"/>
+            <a:lum/>
+          </a:blip>
+          <a:srcRect/>
+          <a:stretch>
+            <a:fillRect t="-11000" b="-11000"/>
+          </a:stretch>
+        </a:blipFill>
+        <a:effectLst/>
+      </p:bgPr>
+    </p:bg>
+    <p:spTree>
+      <p:nvGrpSpPr>
+        <p:cNvPr id="1" name=""/>
+        <p:cNvGrpSpPr/>
+        <p:nvPr/>
+      </p:nvGrpSpPr>
+      <p:grpSpPr>
+        <a:xfrm>
+          <a:off x="0" y="0"/>
+          <a:ext cx="0" cy="0"/>
+          <a:chOff x="0" y="0"/>
+          <a:chExt cx="0" cy="0"/>
+        </a:xfrm>
+      </p:grpSpPr>
+      <p:sp>
+        <p:nvSpPr>
+          <p:cNvPr id="2" name="Title 1">
+            <a:extLst>
+              <a:ext uri="{FF2B5EF4-FFF2-40B4-BE49-F238E27FC236}">
+                <a16:creationId xmlns:a16="http://schemas.microsoft.com/office/drawing/2014/main" id="{AE91C00E-DA2D-478D-976F-161FABE354B1}"/>
+              </a:ext>
+            </a:extLst>
+          </p:cNvPr>
+          <p:cNvSpPr>
+            <a:spLocks noGrp="1"/>
+          </p:cNvSpPr>
+          <p:nvPr>
+            <p:ph type="title"/>
+          </p:nvPr>
+        </p:nvSpPr>
+        <p:spPr/>
+        <p:txBody>
+          <a:bodyPr/>
+          <a:lstStyle/>
+          <a:p>
+            <a:r>
+              <a:rPr lang="en-US" b="1" dirty="0"/>
+              <a:t>Context: </a:t>
+            </a:r>
+            <a:r>
+              <a:rPr lang="en-US" b="1" i="1" dirty="0"/>
+              <a:t>Deutsche </a:t>
+            </a:r>
+            <a:r>
+              <a:rPr lang="en-US" b="1" i="1" dirty="0" err="1"/>
+              <a:t>Welle</a:t>
+            </a:r>
+            <a:endParaRPr lang="en-US" b="1" dirty="0"/>
+          </a:p>
+        </p:txBody>
+      </p:sp>
+      <p:sp>
+        <p:nvSpPr>
+          <p:cNvPr id="3" name="Content Placeholder 2">
+            <a:extLst>
+              <a:ext uri="{FF2B5EF4-FFF2-40B4-BE49-F238E27FC236}">
+                <a16:creationId xmlns:a16="http://schemas.microsoft.com/office/drawing/2014/main" id="{4AAAB96C-DDD5-4720-A7C0-66D77E0282F8}"/>
+              </a:ext>
+            </a:extLst>
+          </p:cNvPr>
+          <p:cNvSpPr>
+            <a:spLocks noGrp="1"/>
+          </p:cNvSpPr>
+          <p:nvPr>
+            <p:ph sz="half" idx="1"/>
+          </p:nvPr>
+        </p:nvSpPr>
+        <p:spPr/>
+        <p:txBody>
+          <a:bodyPr/>
+          <a:lstStyle/>
+          <a:p>
+            <a:endParaRPr lang="en-US"/>
+          </a:p>
+        </p:txBody>
+      </p:sp>
+      <p:sp>
+        <p:nvSpPr>
+          <p:cNvPr id="4" name="Content Placeholder 3">
+            <a:extLst>
+              <a:ext uri="{FF2B5EF4-FFF2-40B4-BE49-F238E27FC236}">
+                <a16:creationId xmlns:a16="http://schemas.microsoft.com/office/drawing/2014/main" id="{669DFBCA-B4DA-404A-96B2-4128478F16B9}"/>
+              </a:ext>
+            </a:extLst>
+          </p:cNvPr>
+          <p:cNvSpPr>
+            <a:spLocks noGrp="1"/>
+          </p:cNvSpPr>
+          <p:nvPr>
+            <p:ph sz="half" idx="2"/>
+          </p:nvPr>
+        </p:nvSpPr>
+        <p:spPr/>
+        <p:txBody>
+          <a:bodyPr/>
+          <a:lstStyle/>
+          <a:p>
+            <a:endParaRPr lang="en-US"/>
+          </a:p>
+        </p:txBody>
+      </p:sp>
+    </p:spTree>
+    <p:extLst>
+      <p:ext uri="{BB962C8B-B14F-4D97-AF65-F5344CB8AC3E}">
+        <p14:creationId xmlns:p14="http://schemas.microsoft.com/office/powerpoint/2010/main" val="347150910"/>
+      </p:ext>
+    </p:extLst>
+  </p:cSld>
+  <p:clrMapOvr>
+    <a:overrideClrMapping bg1="lt1" tx1="dk1" bg2="lt2" tx2="dk2" accent1="accent1" accent2="accent2" accent3="accent3" accent4="accent4" accent5="accent5" accent6="accent6" hlink="hlink" folHlink="folHlink"/>
+  </p:clrMapOvr>
+</p:sld>
+</file>
+
+<file path=ppt/slides/slide3.xml><?xml version="1.0" encoding="utf-8"?>
+<p:sld xmlns:a="http://schemas.openxmlformats.org/drawingml/2006/main" xmlns:r="http://schemas.openxmlformats.org/officeDocument/2006/relationships" xmlns:p="http://schemas.openxmlformats.org/presentationml/2006/main">
+  <p:cSld>
+    <p:bg>
+      <p:bgPr>
+        <a:blipFill dpi="0" rotWithShape="1">
+          <a:blip r:embed="rId3">
+            <a:alphaModFix amt="30000"/>
+            <a:lum/>
+          </a:blip>
+          <a:srcRect/>
+          <a:stretch>
+            <a:fillRect t="-11000" b="-11000"/>
+          </a:stretch>
+        </a:blipFill>
+        <a:effectLst/>
+      </p:bgPr>
+    </p:bg>
+    <p:spTree>
+      <p:nvGrpSpPr>
+        <p:cNvPr id="1" name=""/>
+        <p:cNvGrpSpPr/>
+        <p:nvPr/>
+      </p:nvGrpSpPr>
+      <p:grpSpPr>
+        <a:xfrm>
+          <a:off x="0" y="0"/>
+          <a:ext cx="0" cy="0"/>
+          <a:chOff x="0" y="0"/>
+          <a:chExt cx="0" cy="0"/>
+        </a:xfrm>
+      </p:grpSpPr>
+      <p:sp>
+        <p:nvSpPr>
           <p:cNvPr id="5" name="Title 4">
             <a:extLst>
               <a:ext uri="{FF2B5EF4-FFF2-40B4-BE49-F238E27FC236}">
@@ -3469,8 +4036,8 @@
           <a:lstStyle/>
           <a:p>
             <a:r>
-              <a:rPr lang="en-US" dirty="0"/>
-              <a:t>Original Visualization</a:t>
+              <a:rPr lang="en-US" b="1" dirty="0"/>
+              <a:t>Original Visualization: Cost</a:t>
             </a:r>
           </a:p>
         </p:txBody>
@@ -3518,7 +4085,11 @@
             <p:ph sz="half" idx="2"/>
           </p:nvPr>
         </p:nvSpPr>
-        <p:spPr/>
+        <p:spPr>
+          <a:solidFill>
+            <a:srgbClr val="F1F3F5"/>
+          </a:solidFill>
+        </p:spPr>
         <p:txBody>
           <a:bodyPr anchor="ctr">
             <a:normAutofit fontScale="92500" lnSpcReduction="20000"/>
@@ -3605,7 +4176,7 @@
           <p:nvPr/>
         </p:nvPicPr>
         <p:blipFill>
-          <a:blip r:embed="rId2"/>
+          <a:blip r:embed="rId4"/>
           <a:stretch>
             <a:fillRect/>
           </a:stretch>
@@ -3628,14 +4199,29 @@
     </p:extLst>
   </p:cSld>
   <p:clrMapOvr>
-    <a:masterClrMapping/>
+    <a:overrideClrMapping bg1="lt1" tx1="dk1" bg2="lt2" tx2="dk2" accent1="accent1" accent2="accent2" accent3="accent3" accent4="accent4" accent5="accent5" accent6="accent6" hlink="hlink" folHlink="folHlink"/>
   </p:clrMapOvr>
 </p:sld>
 </file>
 
-<file path=ppt/slides/slide3.xml><?xml version="1.0" encoding="utf-8"?>
+<file path=ppt/slides/slide4.xml><?xml version="1.0" encoding="utf-8"?>
 <p:sld xmlns:a="http://schemas.openxmlformats.org/drawingml/2006/main" xmlns:r="http://schemas.openxmlformats.org/officeDocument/2006/relationships" xmlns:p="http://schemas.openxmlformats.org/presentationml/2006/main">
   <p:cSld>
+    <p:bg>
+      <p:bgPr>
+        <a:blipFill dpi="0" rotWithShape="1">
+          <a:blip r:embed="rId3">
+            <a:alphaModFix amt="30000"/>
+            <a:lum/>
+          </a:blip>
+          <a:srcRect/>
+          <a:stretch>
+            <a:fillRect t="-11000" b="-11000"/>
+          </a:stretch>
+        </a:blipFill>
+        <a:effectLst/>
+      </p:bgPr>
+    </p:bg>
     <p:spTree>
       <p:nvGrpSpPr>
         <p:cNvPr id="1" name=""/>
@@ -3677,7 +4263,7 @@
           <a:lstStyle/>
           <a:p>
             <a:r>
-              <a:rPr lang="en-US" dirty="0"/>
+              <a:rPr lang="en-US" b="1" dirty="0"/>
               <a:t>Weaknesses of this visualization?</a:t>
             </a:r>
           </a:p>
@@ -3702,7 +4288,7 @@
         <p:spPr/>
         <p:txBody>
           <a:bodyPr>
-            <a:normAutofit fontScale="92500"/>
+            <a:normAutofit lnSpcReduction="10000"/>
           </a:bodyPr>
           <a:lstStyle/>
           <a:p>
@@ -3726,10 +4312,14 @@
             <p:ph sz="half" idx="2"/>
           </p:nvPr>
         </p:nvSpPr>
-        <p:spPr/>
+        <p:spPr>
+          <a:solidFill>
+            <a:srgbClr val="F1F3F5"/>
+          </a:solidFill>
+        </p:spPr>
         <p:txBody>
           <a:bodyPr anchor="ctr">
-            <a:normAutofit fontScale="92500"/>
+            <a:normAutofit lnSpcReduction="10000"/>
           </a:bodyPr>
           <a:lstStyle/>
           <a:p>
@@ -3741,18 +4331,6 @@
           <a:p>
             <a:r>
               <a:rPr lang="en-US" dirty="0"/>
-              <a:t>The vertical axis guidelines aren’t easy to read</a:t>
-            </a:r>
-          </a:p>
-          <a:p>
-            <a:r>
-              <a:rPr lang="en-US" dirty="0"/>
-              <a:t>The vertical dimension feels too compressed</a:t>
-            </a:r>
-          </a:p>
-          <a:p>
-            <a:r>
-              <a:rPr lang="en-US" dirty="0"/>
               <a:t>Not clear how the facets are sorted (if they’re sorted at all)</a:t>
             </a:r>
           </a:p>
@@ -3760,6 +4338,12 @@
             <a:r>
               <a:rPr lang="en-US" dirty="0"/>
               <a:t>Not clear where the data for the distance (km) represents, unknown source</a:t>
+            </a:r>
+          </a:p>
+          <a:p>
+            <a:r>
+              <a:rPr lang="en-US" dirty="0"/>
+              <a:t>Should we care more about absolute differences in cost (as this graph shows), or relative differences?</a:t>
             </a:r>
           </a:p>
         </p:txBody>
@@ -3779,7 +4363,7 @@
           <p:nvPr/>
         </p:nvPicPr>
         <p:blipFill>
-          <a:blip r:embed="rId2"/>
+          <a:blip r:embed="rId4"/>
           <a:stretch>
             <a:fillRect/>
           </a:stretch>
@@ -3802,14 +4386,29 @@
     </p:extLst>
   </p:cSld>
   <p:clrMapOvr>
-    <a:masterClrMapping/>
+    <a:overrideClrMapping bg1="lt1" tx1="dk1" bg2="lt2" tx2="dk2" accent1="accent1" accent2="accent2" accent3="accent3" accent4="accent4" accent5="accent5" accent6="accent6" hlink="hlink" folHlink="folHlink"/>
   </p:clrMapOvr>
 </p:sld>
 </file>
 
-<file path=ppt/slides/slide4.xml><?xml version="1.0" encoding="utf-8"?>
+<file path=ppt/slides/slide5.xml><?xml version="1.0" encoding="utf-8"?>
 <p:sld xmlns:a="http://schemas.openxmlformats.org/drawingml/2006/main" xmlns:r="http://schemas.openxmlformats.org/officeDocument/2006/relationships" xmlns:p="http://schemas.openxmlformats.org/presentationml/2006/main">
   <p:cSld>
+    <p:bg>
+      <p:bgPr>
+        <a:blipFill dpi="0" rotWithShape="1">
+          <a:blip r:embed="rId3">
+            <a:alphaModFix amt="30000"/>
+            <a:lum/>
+          </a:blip>
+          <a:srcRect/>
+          <a:stretch>
+            <a:fillRect t="-11000" b="-11000"/>
+          </a:stretch>
+        </a:blipFill>
+        <a:effectLst/>
+      </p:bgPr>
+    </p:bg>
     <p:spTree>
       <p:nvGrpSpPr>
         <p:cNvPr id="1" name=""/>
@@ -3846,7 +4445,7 @@
           <a:lstStyle/>
           <a:p>
             <a:r>
-              <a:rPr lang="en-US" dirty="0"/>
+              <a:rPr lang="en-US" b="1" dirty="0"/>
               <a:t>Recreating the Original Visualization</a:t>
             </a:r>
           </a:p>
@@ -3910,14 +4509,29 @@
     </p:extLst>
   </p:cSld>
   <p:clrMapOvr>
-    <a:masterClrMapping/>
+    <a:overrideClrMapping bg1="lt1" tx1="dk1" bg2="lt2" tx2="dk2" accent1="accent1" accent2="accent2" accent3="accent3" accent4="accent4" accent5="accent5" accent6="accent6" hlink="hlink" folHlink="folHlink"/>
   </p:clrMapOvr>
 </p:sld>
 </file>
 
-<file path=ppt/slides/slide5.xml><?xml version="1.0" encoding="utf-8"?>
+<file path=ppt/slides/slide6.xml><?xml version="1.0" encoding="utf-8"?>
 <p:sld xmlns:a="http://schemas.openxmlformats.org/drawingml/2006/main" xmlns:r="http://schemas.openxmlformats.org/officeDocument/2006/relationships" xmlns:p="http://schemas.openxmlformats.org/presentationml/2006/main">
   <p:cSld>
+    <p:bg>
+      <p:bgPr>
+        <a:blipFill dpi="0" rotWithShape="1">
+          <a:blip r:embed="rId3">
+            <a:alphaModFix amt="30000"/>
+            <a:lum/>
+          </a:blip>
+          <a:srcRect/>
+          <a:stretch>
+            <a:fillRect t="-11000" b="-11000"/>
+          </a:stretch>
+        </a:blipFill>
+        <a:effectLst/>
+      </p:bgPr>
+    </p:bg>
     <p:spTree>
       <p:nvGrpSpPr>
         <p:cNvPr id="1" name=""/>
@@ -3954,7 +4568,7 @@
           <a:lstStyle/>
           <a:p>
             <a:r>
-              <a:rPr lang="en-US" dirty="0"/>
+              <a:rPr lang="en-US" b="1" dirty="0"/>
               <a:t>Improving the Original Visualization</a:t>
             </a:r>
           </a:p>
@@ -4018,14 +4632,29 @@
     </p:extLst>
   </p:cSld>
   <p:clrMapOvr>
-    <a:masterClrMapping/>
+    <a:overrideClrMapping bg1="lt1" tx1="dk1" bg2="lt2" tx2="dk2" accent1="accent1" accent2="accent2" accent3="accent3" accent4="accent4" accent5="accent5" accent6="accent6" hlink="hlink" folHlink="folHlink"/>
   </p:clrMapOvr>
 </p:sld>
 </file>
 
-<file path=ppt/slides/slide6.xml><?xml version="1.0" encoding="utf-8"?>
+<file path=ppt/slides/slide7.xml><?xml version="1.0" encoding="utf-8"?>
 <p:sld xmlns:a="http://schemas.openxmlformats.org/drawingml/2006/main" xmlns:r="http://schemas.openxmlformats.org/officeDocument/2006/relationships" xmlns:p="http://schemas.openxmlformats.org/presentationml/2006/main">
   <p:cSld>
+    <p:bg>
+      <p:bgPr>
+        <a:blipFill dpi="0" rotWithShape="1">
+          <a:blip r:embed="rId3">
+            <a:alphaModFix amt="30000"/>
+            <a:lum/>
+          </a:blip>
+          <a:srcRect/>
+          <a:stretch>
+            <a:fillRect t="-11000" b="-11000"/>
+          </a:stretch>
+        </a:blipFill>
+        <a:effectLst/>
+      </p:bgPr>
+    </p:bg>
     <p:spTree>
       <p:nvGrpSpPr>
         <p:cNvPr id="1" name=""/>
@@ -4042,10 +4671,10 @@
       </p:grpSpPr>
       <p:sp>
         <p:nvSpPr>
-          <p:cNvPr id="2" name="Title 1">
-            <a:extLst>
-              <a:ext uri="{FF2B5EF4-FFF2-40B4-BE49-F238E27FC236}">
-                <a16:creationId xmlns:a16="http://schemas.microsoft.com/office/drawing/2014/main" id="{3F14FB01-A1F6-46BE-9810-500284D63B6B}"/>
+          <p:cNvPr id="5" name="Title 4">
+            <a:extLst>
+              <a:ext uri="{FF2B5EF4-FFF2-40B4-BE49-F238E27FC236}">
+                <a16:creationId xmlns:a16="http://schemas.microsoft.com/office/drawing/2014/main" id="{828C46BD-7B85-4610-878A-026E2645A48D}"/>
               </a:ext>
             </a:extLst>
           </p:cNvPr>
@@ -4056,84 +4685,187 @@
             <p:ph type="title"/>
           </p:nvPr>
         </p:nvSpPr>
-        <p:spPr/>
-        <p:txBody>
-          <a:bodyPr/>
+        <p:spPr>
+          <a:xfrm>
+            <a:off x="6172200" y="365125"/>
+            <a:ext cx="5181600" cy="1325563"/>
+          </a:xfrm>
+        </p:spPr>
+        <p:txBody>
+          <a:bodyPr/>
+          <a:lstStyle/>
+          <a:p>
+            <a:r>
+              <a:rPr lang="en-US" b="1" dirty="0"/>
+              <a:t>Original Visualization:</a:t>
+            </a:r>
+            <a:br>
+              <a:rPr lang="en-US" b="1" dirty="0"/>
+            </a:br>
+            <a:r>
+              <a:rPr lang="en-US" b="1" dirty="0"/>
+              <a:t>Time</a:t>
+            </a:r>
+          </a:p>
+        </p:txBody>
+      </p:sp>
+      <p:pic>
+        <p:nvPicPr>
+          <p:cNvPr id="3" name="Content Placeholder 2">
+            <a:extLst>
+              <a:ext uri="{FF2B5EF4-FFF2-40B4-BE49-F238E27FC236}">
+                <a16:creationId xmlns:a16="http://schemas.microsoft.com/office/drawing/2014/main" id="{84E536A0-7DF3-4EAA-8DF7-B9BD83379392}"/>
+              </a:ext>
+            </a:extLst>
+          </p:cNvPr>
+          <p:cNvPicPr>
+            <a:picLocks noGrp="1" noChangeAspect="1"/>
+          </p:cNvPicPr>
+          <p:nvPr>
+            <p:ph sz="half" idx="1"/>
+          </p:nvPr>
+        </p:nvPicPr>
+        <p:blipFill>
+          <a:blip r:embed="rId4">
+            <a:extLst>
+              <a:ext uri="{28A0092B-C50C-407E-A947-70E740481C1C}">
+                <a14:useLocalDpi xmlns:a14="http://schemas.microsoft.com/office/drawing/2010/main" val="0"/>
+              </a:ext>
+            </a:extLst>
+          </a:blip>
+          <a:stretch>
+            <a:fillRect/>
+          </a:stretch>
+        </p:blipFill>
+        <p:spPr>
+          <a:xfrm>
+            <a:off x="838200" y="365124"/>
+            <a:ext cx="4887747" cy="6085917"/>
+          </a:xfrm>
+          <a:prstGeom prst="rect">
+            <a:avLst/>
+          </a:prstGeom>
+        </p:spPr>
+      </p:pic>
+      <p:sp>
+        <p:nvSpPr>
+          <p:cNvPr id="7" name="Content Placeholder 6">
+            <a:extLst>
+              <a:ext uri="{FF2B5EF4-FFF2-40B4-BE49-F238E27FC236}">
+                <a16:creationId xmlns:a16="http://schemas.microsoft.com/office/drawing/2014/main" id="{CC3C6753-C444-49C8-A285-43788753341F}"/>
+              </a:ext>
+            </a:extLst>
+          </p:cNvPr>
+          <p:cNvSpPr>
+            <a:spLocks noGrp="1"/>
+          </p:cNvSpPr>
+          <p:nvPr>
+            <p:ph sz="half" idx="2"/>
+          </p:nvPr>
+        </p:nvSpPr>
+        <p:spPr>
+          <a:solidFill>
+            <a:srgbClr val="F1F3F5"/>
+          </a:solidFill>
+        </p:spPr>
+        <p:txBody>
+          <a:bodyPr anchor="ctr">
+            <a:normAutofit fontScale="92500" lnSpcReduction="20000"/>
+          </a:bodyPr>
           <a:lstStyle/>
           <a:p>
             <a:r>
               <a:rPr lang="en-US" dirty="0"/>
-              <a:t>Challenges</a:t>
-            </a:r>
-          </a:p>
-        </p:txBody>
-      </p:sp>
-      <p:sp>
-        <p:nvSpPr>
-          <p:cNvPr id="3" name="Content Placeholder 2">
-            <a:extLst>
-              <a:ext uri="{FF2B5EF4-FFF2-40B4-BE49-F238E27FC236}">
-                <a16:creationId xmlns:a16="http://schemas.microsoft.com/office/drawing/2014/main" id="{FECAB945-8F13-4CDA-80D9-2B7B6066653A}"/>
-              </a:ext>
-            </a:extLst>
-          </p:cNvPr>
-          <p:cNvSpPr>
-            <a:spLocks noGrp="1"/>
-          </p:cNvSpPr>
-          <p:nvPr>
-            <p:ph sz="half" idx="1"/>
-          </p:nvPr>
-        </p:nvSpPr>
-        <p:spPr/>
-        <p:txBody>
-          <a:bodyPr/>
-          <a:lstStyle/>
-          <a:p>
-            <a:endParaRPr lang="en-US"/>
-          </a:p>
-        </p:txBody>
-      </p:sp>
-      <p:sp>
-        <p:nvSpPr>
-          <p:cNvPr id="4" name="Content Placeholder 3">
-            <a:extLst>
-              <a:ext uri="{FF2B5EF4-FFF2-40B4-BE49-F238E27FC236}">
-                <a16:creationId xmlns:a16="http://schemas.microsoft.com/office/drawing/2014/main" id="{1C173A96-D5B9-4DF6-ABB2-74F3288DBFFD}"/>
-              </a:ext>
-            </a:extLst>
-          </p:cNvPr>
-          <p:cNvSpPr>
-            <a:spLocks noGrp="1"/>
-          </p:cNvSpPr>
-          <p:nvPr>
-            <p:ph sz="half" idx="2"/>
-          </p:nvPr>
-        </p:nvSpPr>
-        <p:spPr/>
-        <p:txBody>
-          <a:bodyPr/>
-          <a:lstStyle/>
-          <a:p>
-            <a:endParaRPr lang="en-US"/>
+              <a:t>Examines time “cost” of travel (horizontal axis) for each of six routes (vertical axis)</a:t>
+            </a:r>
+          </a:p>
+          <a:p>
+            <a:r>
+              <a:rPr lang="en-US" dirty="0"/>
+              <a:t>It’s animated! The animation introduces a new variable: time delay, i.e. the “actual” time cost (applies to planes only)</a:t>
+            </a:r>
+          </a:p>
+          <a:p>
+            <a:r>
+              <a:rPr lang="en-US" i="1" dirty="0"/>
+              <a:t>Colored</a:t>
+            </a:r>
+            <a:r>
+              <a:rPr lang="en-US" dirty="0"/>
+              <a:t> by mode of travel (</a:t>
+            </a:r>
+            <a:r>
+              <a:rPr lang="en-US" dirty="0">
+                <a:solidFill>
+                  <a:srgbClr val="FF0000"/>
+                </a:solidFill>
+              </a:rPr>
+              <a:t>red = plane</a:t>
+            </a:r>
+            <a:r>
+              <a:rPr lang="en-US" dirty="0"/>
+              <a:t> and </a:t>
+            </a:r>
+            <a:r>
+              <a:rPr lang="en-US" dirty="0">
+                <a:solidFill>
+                  <a:schemeClr val="accent5">
+                    <a:lumMod val="50000"/>
+                  </a:schemeClr>
+                </a:solidFill>
+              </a:rPr>
+              <a:t>train = blue</a:t>
+            </a:r>
+            <a:r>
+              <a:rPr lang="en-US" dirty="0"/>
+              <a:t>) </a:t>
+            </a:r>
+          </a:p>
+          <a:p>
+            <a:r>
+              <a:rPr lang="en-US" dirty="0"/>
+              <a:t>Note that the time axis is labelled in 30 minute increments</a:t>
+            </a:r>
+          </a:p>
+          <a:p>
+            <a:r>
+              <a:rPr lang="en-US" dirty="0"/>
+              <a:t>Note the legend</a:t>
+            </a:r>
           </a:p>
         </p:txBody>
       </p:sp>
     </p:spTree>
     <p:extLst>
       <p:ext uri="{BB962C8B-B14F-4D97-AF65-F5344CB8AC3E}">
-        <p14:creationId xmlns:p14="http://schemas.microsoft.com/office/powerpoint/2010/main" val="3676238569"/>
+        <p14:creationId xmlns:p14="http://schemas.microsoft.com/office/powerpoint/2010/main" val="3227944546"/>
       </p:ext>
     </p:extLst>
   </p:cSld>
   <p:clrMapOvr>
-    <a:masterClrMapping/>
+    <a:overrideClrMapping bg1="lt1" tx1="dk1" bg2="lt2" tx2="dk2" accent1="accent1" accent2="accent2" accent3="accent3" accent4="accent4" accent5="accent5" accent6="accent6" hlink="hlink" folHlink="folHlink"/>
   </p:clrMapOvr>
 </p:sld>
 </file>
 
-<file path=ppt/slides/slide7.xml><?xml version="1.0" encoding="utf-8"?>
+<file path=ppt/slides/slide8.xml><?xml version="1.0" encoding="utf-8"?>
 <p:sld xmlns:a="http://schemas.openxmlformats.org/drawingml/2006/main" xmlns:r="http://schemas.openxmlformats.org/officeDocument/2006/relationships" xmlns:p="http://schemas.openxmlformats.org/presentationml/2006/main">
   <p:cSld>
+    <p:bg>
+      <p:bgPr>
+        <a:blipFill dpi="0" rotWithShape="1">
+          <a:blip r:embed="rId3">
+            <a:alphaModFix amt="30000"/>
+            <a:lum/>
+          </a:blip>
+          <a:srcRect/>
+          <a:stretch>
+            <a:fillRect t="-11000" b="-11000"/>
+          </a:stretch>
+        </a:blipFill>
+        <a:effectLst/>
+      </p:bgPr>
+    </p:bg>
     <p:spTree>
       <p:nvGrpSpPr>
         <p:cNvPr id="1" name=""/>
@@ -4150,10 +4882,10 @@
       </p:grpSpPr>
       <p:sp>
         <p:nvSpPr>
-          <p:cNvPr id="2" name="Title 1">
-            <a:extLst>
-              <a:ext uri="{FF2B5EF4-FFF2-40B4-BE49-F238E27FC236}">
-                <a16:creationId xmlns:a16="http://schemas.microsoft.com/office/drawing/2014/main" id="{AE91C00E-DA2D-478D-976F-161FABE354B1}"/>
+          <p:cNvPr id="5" name="Title 4">
+            <a:extLst>
+              <a:ext uri="{FF2B5EF4-FFF2-40B4-BE49-F238E27FC236}">
+                <a16:creationId xmlns:a16="http://schemas.microsoft.com/office/drawing/2014/main" id="{828C46BD-7B85-4610-878A-026E2645A48D}"/>
               </a:ext>
             </a:extLst>
           </p:cNvPr>
@@ -4164,77 +4896,383 @@
             <p:ph type="title"/>
           </p:nvPr>
         </p:nvSpPr>
+        <p:spPr>
+          <a:xfrm>
+            <a:off x="6172200" y="365125"/>
+            <a:ext cx="5181600" cy="1325563"/>
+          </a:xfrm>
+        </p:spPr>
+        <p:txBody>
+          <a:bodyPr/>
+          <a:lstStyle/>
+          <a:p>
+            <a:r>
+              <a:rPr lang="en-US" b="1" dirty="0"/>
+              <a:t>Weaknesses of this visualization?</a:t>
+            </a:r>
+          </a:p>
+        </p:txBody>
+      </p:sp>
+      <p:sp>
+        <p:nvSpPr>
+          <p:cNvPr id="6" name="Content Placeholder 5">
+            <a:extLst>
+              <a:ext uri="{FF2B5EF4-FFF2-40B4-BE49-F238E27FC236}">
+                <a16:creationId xmlns:a16="http://schemas.microsoft.com/office/drawing/2014/main" id="{61C264B5-B08F-4510-A247-AEFB264E9EF5}"/>
+              </a:ext>
+            </a:extLst>
+          </p:cNvPr>
+          <p:cNvSpPr>
+            <a:spLocks noGrp="1"/>
+          </p:cNvSpPr>
+          <p:nvPr>
+            <p:ph sz="half" idx="1"/>
+          </p:nvPr>
+        </p:nvSpPr>
         <p:spPr/>
         <p:txBody>
-          <a:bodyPr/>
+          <a:bodyPr>
+            <a:normAutofit lnSpcReduction="10000"/>
+          </a:bodyPr>
+          <a:lstStyle/>
+          <a:p>
+            <a:endParaRPr lang="en-US"/>
+          </a:p>
+        </p:txBody>
+      </p:sp>
+      <p:sp>
+        <p:nvSpPr>
+          <p:cNvPr id="7" name="Content Placeholder 6">
+            <a:extLst>
+              <a:ext uri="{FF2B5EF4-FFF2-40B4-BE49-F238E27FC236}">
+                <a16:creationId xmlns:a16="http://schemas.microsoft.com/office/drawing/2014/main" id="{CC3C6753-C444-49C8-A285-43788753341F}"/>
+              </a:ext>
+            </a:extLst>
+          </p:cNvPr>
+          <p:cNvSpPr>
+            <a:spLocks noGrp="1"/>
+          </p:cNvSpPr>
+          <p:nvPr>
+            <p:ph sz="half" idx="2"/>
+          </p:nvPr>
+        </p:nvSpPr>
+        <p:spPr>
+          <a:solidFill>
+            <a:srgbClr val="F1F3F5"/>
+          </a:solidFill>
+        </p:spPr>
+        <p:txBody>
+          <a:bodyPr anchor="ctr">
+            <a:normAutofit lnSpcReduction="10000"/>
+          </a:bodyPr>
           <a:lstStyle/>
           <a:p>
             <a:r>
               <a:rPr lang="en-US" dirty="0"/>
-              <a:t>Closing Thoughts</a:t>
-            </a:r>
-          </a:p>
-        </p:txBody>
-      </p:sp>
-      <p:sp>
-        <p:nvSpPr>
-          <p:cNvPr id="3" name="Content Placeholder 2">
-            <a:extLst>
-              <a:ext uri="{FF2B5EF4-FFF2-40B4-BE49-F238E27FC236}">
-                <a16:creationId xmlns:a16="http://schemas.microsoft.com/office/drawing/2014/main" id="{4AAAB96C-DDD5-4720-A7C0-66D77E0282F8}"/>
-              </a:ext>
-            </a:extLst>
-          </p:cNvPr>
-          <p:cNvSpPr>
-            <a:spLocks noGrp="1"/>
-          </p:cNvSpPr>
-          <p:nvPr>
-            <p:ph sz="half" idx="1"/>
-          </p:nvPr>
-        </p:nvSpPr>
-        <p:spPr/>
-        <p:txBody>
-          <a:bodyPr/>
-          <a:lstStyle/>
-          <a:p>
-            <a:endParaRPr lang="en-US"/>
-          </a:p>
-        </p:txBody>
-      </p:sp>
-      <p:sp>
-        <p:nvSpPr>
-          <p:cNvPr id="4" name="Content Placeholder 3">
-            <a:extLst>
-              <a:ext uri="{FF2B5EF4-FFF2-40B4-BE49-F238E27FC236}">
-                <a16:creationId xmlns:a16="http://schemas.microsoft.com/office/drawing/2014/main" id="{669DFBCA-B4DA-404A-96B2-4128478F16B9}"/>
-              </a:ext>
-            </a:extLst>
-          </p:cNvPr>
-          <p:cNvSpPr>
-            <a:spLocks noGrp="1"/>
-          </p:cNvSpPr>
-          <p:nvPr>
-            <p:ph sz="half" idx="2"/>
-          </p:nvPr>
-        </p:nvSpPr>
-        <p:spPr/>
-        <p:txBody>
-          <a:bodyPr/>
-          <a:lstStyle/>
-          <a:p>
-            <a:endParaRPr lang="en-US"/>
-          </a:p>
-        </p:txBody>
-      </p:sp>
+              <a:t>When were these data collected?</a:t>
+            </a:r>
+          </a:p>
+          <a:p>
+            <a:r>
+              <a:rPr lang="en-US" dirty="0"/>
+              <a:t>Questionable assumptions underlying the “actual” time</a:t>
+            </a:r>
+          </a:p>
+          <a:p>
+            <a:r>
+              <a:rPr lang="en-US" dirty="0"/>
+              <a:t>Does the dotted vertical line really convey any additional information?</a:t>
+            </a:r>
+          </a:p>
+          <a:p>
+            <a:r>
+              <a:rPr lang="en-US" dirty="0"/>
+              <a:t>The frame changes are frustrating and do not enhance our ability to understand the data!</a:t>
+            </a:r>
+          </a:p>
+        </p:txBody>
+      </p:sp>
+      <p:pic>
+        <p:nvPicPr>
+          <p:cNvPr id="8" name="Content Placeholder 2">
+            <a:extLst>
+              <a:ext uri="{FF2B5EF4-FFF2-40B4-BE49-F238E27FC236}">
+                <a16:creationId xmlns:a16="http://schemas.microsoft.com/office/drawing/2014/main" id="{EDDE9A40-5A1D-45B7-A535-8B0BA7A59A3D}"/>
+              </a:ext>
+            </a:extLst>
+          </p:cNvPr>
+          <p:cNvPicPr>
+            <a:picLocks noChangeAspect="1"/>
+          </p:cNvPicPr>
+          <p:nvPr/>
+        </p:nvPicPr>
+        <p:blipFill>
+          <a:blip r:embed="rId4">
+            <a:extLst>
+              <a:ext uri="{28A0092B-C50C-407E-A947-70E740481C1C}">
+                <a14:useLocalDpi xmlns:a14="http://schemas.microsoft.com/office/drawing/2010/main" val="0"/>
+              </a:ext>
+            </a:extLst>
+          </a:blip>
+          <a:stretch>
+            <a:fillRect/>
+          </a:stretch>
+        </p:blipFill>
+        <p:spPr>
+          <a:xfrm>
+            <a:off x="838200" y="365124"/>
+            <a:ext cx="4887747" cy="6085917"/>
+          </a:xfrm>
+          <a:prstGeom prst="rect">
+            <a:avLst/>
+          </a:prstGeom>
+        </p:spPr>
+      </p:pic>
     </p:spTree>
     <p:extLst>
       <p:ext uri="{BB962C8B-B14F-4D97-AF65-F5344CB8AC3E}">
-        <p14:creationId xmlns:p14="http://schemas.microsoft.com/office/powerpoint/2010/main" val="2677055334"/>
+        <p14:creationId xmlns:p14="http://schemas.microsoft.com/office/powerpoint/2010/main" val="1226828684"/>
       </p:ext>
     </p:extLst>
   </p:cSld>
   <p:clrMapOvr>
-    <a:masterClrMapping/>
+    <a:overrideClrMapping bg1="lt1" tx1="dk1" bg2="lt2" tx2="dk2" accent1="accent1" accent2="accent2" accent3="accent3" accent4="accent4" accent5="accent5" accent6="accent6" hlink="hlink" folHlink="folHlink"/>
+  </p:clrMapOvr>
+</p:sld>
+</file>
+
+<file path=ppt/slides/slide9.xml><?xml version="1.0" encoding="utf-8"?>
+<p:sld xmlns:a="http://schemas.openxmlformats.org/drawingml/2006/main" xmlns:r="http://schemas.openxmlformats.org/officeDocument/2006/relationships" xmlns:p="http://schemas.openxmlformats.org/presentationml/2006/main">
+  <p:cSld>
+    <p:bg>
+      <p:bgPr>
+        <a:blipFill dpi="0" rotWithShape="1">
+          <a:blip r:embed="rId3">
+            <a:alphaModFix amt="30000"/>
+            <a:lum/>
+          </a:blip>
+          <a:srcRect/>
+          <a:stretch>
+            <a:fillRect t="-11000" b="-11000"/>
+          </a:stretch>
+        </a:blipFill>
+        <a:effectLst/>
+      </p:bgPr>
+    </p:bg>
+    <p:spTree>
+      <p:nvGrpSpPr>
+        <p:cNvPr id="1" name=""/>
+        <p:cNvGrpSpPr/>
+        <p:nvPr/>
+      </p:nvGrpSpPr>
+      <p:grpSpPr>
+        <a:xfrm>
+          <a:off x="0" y="0"/>
+          <a:ext cx="0" cy="0"/>
+          <a:chOff x="0" y="0"/>
+          <a:chExt cx="0" cy="0"/>
+        </a:xfrm>
+      </p:grpSpPr>
+      <p:sp>
+        <p:nvSpPr>
+          <p:cNvPr id="2" name="Title 1">
+            <a:extLst>
+              <a:ext uri="{FF2B5EF4-FFF2-40B4-BE49-F238E27FC236}">
+                <a16:creationId xmlns:a16="http://schemas.microsoft.com/office/drawing/2014/main" id="{F342C771-8A79-4EDD-B850-CD0D4E135C1D}"/>
+              </a:ext>
+            </a:extLst>
+          </p:cNvPr>
+          <p:cNvSpPr>
+            <a:spLocks noGrp="1"/>
+          </p:cNvSpPr>
+          <p:nvPr>
+            <p:ph type="title"/>
+          </p:nvPr>
+        </p:nvSpPr>
+        <p:spPr>
+          <a:xfrm>
+            <a:off x="654213" y="342105"/>
+            <a:ext cx="5334000" cy="1325563"/>
+          </a:xfrm>
+        </p:spPr>
+        <p:txBody>
+          <a:bodyPr/>
+          <a:lstStyle/>
+          <a:p>
+            <a:r>
+              <a:rPr lang="en-US" b="1" dirty="0"/>
+              <a:t>Recreating the Original Visualization</a:t>
+            </a:r>
+          </a:p>
+        </p:txBody>
+      </p:sp>
+      <p:sp>
+        <p:nvSpPr>
+          <p:cNvPr id="3" name="Content Placeholder 2">
+            <a:extLst>
+              <a:ext uri="{FF2B5EF4-FFF2-40B4-BE49-F238E27FC236}">
+                <a16:creationId xmlns:a16="http://schemas.microsoft.com/office/drawing/2014/main" id="{6E5D2DBC-9BC9-4FBB-8EC1-73B6689261A5}"/>
+              </a:ext>
+            </a:extLst>
+          </p:cNvPr>
+          <p:cNvSpPr>
+            <a:spLocks noGrp="1"/>
+          </p:cNvSpPr>
+          <p:nvPr>
+            <p:ph sz="half" idx="1"/>
+          </p:nvPr>
+        </p:nvSpPr>
+        <p:spPr>
+          <a:xfrm>
+            <a:off x="838200" y="1825625"/>
+            <a:ext cx="5150013" cy="4351338"/>
+          </a:xfrm>
+          <a:solidFill>
+            <a:srgbClr val="F2F3F5"/>
+          </a:solidFill>
+        </p:spPr>
+        <p:txBody>
+          <a:bodyPr/>
+          <a:lstStyle/>
+          <a:p>
+            <a:r>
+              <a:rPr lang="en-US" dirty="0"/>
+              <a:t>Required three </a:t>
+            </a:r>
+            <a:r>
+              <a:rPr lang="en-US" dirty="0" err="1"/>
+              <a:t>geoms</a:t>
+            </a:r>
+            <a:r>
+              <a:rPr lang="en-US" dirty="0"/>
+              <a:t> to plot:</a:t>
+            </a:r>
+          </a:p>
+          <a:p>
+            <a:pPr lvl="1"/>
+            <a:r>
+              <a:rPr lang="en-US" dirty="0"/>
+              <a:t>“Displayed time” </a:t>
+            </a:r>
+            <a:r>
+              <a:rPr lang="en-US" dirty="0" err="1"/>
+              <a:t>geom_point</a:t>
+            </a:r>
+            <a:endParaRPr lang="en-US" dirty="0"/>
+          </a:p>
+          <a:p>
+            <a:pPr lvl="1"/>
+            <a:r>
+              <a:rPr lang="en-US" dirty="0"/>
+              <a:t>“Actual time” </a:t>
+            </a:r>
+            <a:r>
+              <a:rPr lang="en-US" dirty="0" err="1"/>
+              <a:t>geom_point</a:t>
+            </a:r>
+            <a:endParaRPr lang="en-US" dirty="0"/>
+          </a:p>
+          <a:p>
+            <a:pPr lvl="1"/>
+            <a:r>
+              <a:rPr lang="en-US" dirty="0" err="1"/>
+              <a:t>geom_segment</a:t>
+            </a:r>
+            <a:endParaRPr lang="en-US" dirty="0"/>
+          </a:p>
+          <a:p>
+            <a:r>
+              <a:rPr lang="en-US" dirty="0" err="1"/>
+              <a:t>gganimate</a:t>
+            </a:r>
+            <a:r>
+              <a:rPr lang="en-US" dirty="0"/>
+              <a:t> (not yet available on CRAN). Requires a dedicated variable to map to each “frame” of the animation (only 2 here)</a:t>
+            </a:r>
+          </a:p>
+          <a:p>
+            <a:r>
+              <a:rPr lang="en-US" i="1" dirty="0"/>
+              <a:t>A lot </a:t>
+            </a:r>
+            <a:r>
+              <a:rPr lang="en-US" dirty="0"/>
+              <a:t>of data wrangling was required to prepare the dataset</a:t>
+            </a:r>
+            <a:endParaRPr lang="en-US" i="1" dirty="0"/>
+          </a:p>
+        </p:txBody>
+      </p:sp>
+      <p:sp>
+        <p:nvSpPr>
+          <p:cNvPr id="4" name="Content Placeholder 3">
+            <a:extLst>
+              <a:ext uri="{FF2B5EF4-FFF2-40B4-BE49-F238E27FC236}">
+                <a16:creationId xmlns:a16="http://schemas.microsoft.com/office/drawing/2014/main" id="{B3FBE695-2FD2-4F04-8E67-45E759F25084}"/>
+              </a:ext>
+            </a:extLst>
+          </p:cNvPr>
+          <p:cNvSpPr>
+            <a:spLocks noGrp="1"/>
+          </p:cNvSpPr>
+          <p:nvPr>
+            <p:ph sz="half" idx="2"/>
+          </p:nvPr>
+        </p:nvSpPr>
+        <p:spPr/>
+        <p:txBody>
+          <a:bodyPr/>
+          <a:lstStyle/>
+          <a:p>
+            <a:endParaRPr lang="en-US"/>
+          </a:p>
+        </p:txBody>
+      </p:sp>
+      <p:pic>
+        <p:nvPicPr>
+          <p:cNvPr id="6" name="Content Placeholder 8">
+            <a:extLst>
+              <a:ext uri="{FF2B5EF4-FFF2-40B4-BE49-F238E27FC236}">
+                <a16:creationId xmlns:a16="http://schemas.microsoft.com/office/drawing/2014/main" id="{84C5E007-CAF2-4FA7-BDCC-44A613DE3C81}"/>
+              </a:ext>
+            </a:extLst>
+          </p:cNvPr>
+          <p:cNvPicPr>
+            <a:picLocks noChangeAspect="1"/>
+          </p:cNvPicPr>
+          <p:nvPr/>
+        </p:nvPicPr>
+        <p:blipFill>
+          <a:blip r:embed="rId4">
+            <a:extLst>
+              <a:ext uri="{28A0092B-C50C-407E-A947-70E740481C1C}">
+                <a14:useLocalDpi xmlns:a14="http://schemas.microsoft.com/office/drawing/2010/main" val="0"/>
+              </a:ext>
+            </a:extLst>
+          </a:blip>
+          <a:stretch>
+            <a:fillRect/>
+          </a:stretch>
+        </p:blipFill>
+        <p:spPr>
+          <a:xfrm>
+            <a:off x="5872959" y="523080"/>
+            <a:ext cx="5780082" cy="5811840"/>
+          </a:xfrm>
+          <a:prstGeom prst="rect">
+            <a:avLst/>
+          </a:prstGeom>
+        </p:spPr>
+      </p:pic>
+    </p:spTree>
+    <p:extLst>
+      <p:ext uri="{BB962C8B-B14F-4D97-AF65-F5344CB8AC3E}">
+        <p14:creationId xmlns:p14="http://schemas.microsoft.com/office/powerpoint/2010/main" val="2257586544"/>
+      </p:ext>
+    </p:extLst>
+  </p:cSld>
+  <p:clrMapOvr>
+    <a:overrideClrMapping bg1="lt1" tx1="dk1" bg2="lt2" tx2="dk2" accent1="accent1" accent2="accent2" accent3="accent3" accent4="accent4" accent5="accent5" accent6="accent6" hlink="hlink" folHlink="folHlink"/>
   </p:clrMapOvr>
 </p:sld>
 </file>
@@ -4532,4 +5570,520 @@
     </a:ext>
   </a:extLst>
 </a:theme>
+</file>
+
+<file path=ppt/theme/themeOverride1.xml><?xml version="1.0" encoding="utf-8"?>
+<a:themeOverride xmlns:a="http://schemas.openxmlformats.org/drawingml/2006/main">
+  <a:clrScheme name="Office">
+    <a:dk1>
+      <a:sysClr val="windowText" lastClr="000000"/>
+    </a:dk1>
+    <a:lt1>
+      <a:sysClr val="window" lastClr="FFFFFF"/>
+    </a:lt1>
+    <a:dk2>
+      <a:srgbClr val="44546A"/>
+    </a:dk2>
+    <a:lt2>
+      <a:srgbClr val="E7E6E6"/>
+    </a:lt2>
+    <a:accent1>
+      <a:srgbClr val="4472C4"/>
+    </a:accent1>
+    <a:accent2>
+      <a:srgbClr val="ED7D31"/>
+    </a:accent2>
+    <a:accent3>
+      <a:srgbClr val="A5A5A5"/>
+    </a:accent3>
+    <a:accent4>
+      <a:srgbClr val="FFC000"/>
+    </a:accent4>
+    <a:accent5>
+      <a:srgbClr val="5B9BD5"/>
+    </a:accent5>
+    <a:accent6>
+      <a:srgbClr val="70AD47"/>
+    </a:accent6>
+    <a:hlink>
+      <a:srgbClr val="0563C1"/>
+    </a:hlink>
+    <a:folHlink>
+      <a:srgbClr val="954F72"/>
+    </a:folHlink>
+  </a:clrScheme>
+</a:themeOverride>
+</file>
+
+<file path=ppt/theme/themeOverride10.xml><?xml version="1.0" encoding="utf-8"?>
+<a:themeOverride xmlns:a="http://schemas.openxmlformats.org/drawingml/2006/main">
+  <a:clrScheme name="Office">
+    <a:dk1>
+      <a:sysClr val="windowText" lastClr="000000"/>
+    </a:dk1>
+    <a:lt1>
+      <a:sysClr val="window" lastClr="FFFFFF"/>
+    </a:lt1>
+    <a:dk2>
+      <a:srgbClr val="44546A"/>
+    </a:dk2>
+    <a:lt2>
+      <a:srgbClr val="E7E6E6"/>
+    </a:lt2>
+    <a:accent1>
+      <a:srgbClr val="4472C4"/>
+    </a:accent1>
+    <a:accent2>
+      <a:srgbClr val="ED7D31"/>
+    </a:accent2>
+    <a:accent3>
+      <a:srgbClr val="A5A5A5"/>
+    </a:accent3>
+    <a:accent4>
+      <a:srgbClr val="FFC000"/>
+    </a:accent4>
+    <a:accent5>
+      <a:srgbClr val="5B9BD5"/>
+    </a:accent5>
+    <a:accent6>
+      <a:srgbClr val="70AD47"/>
+    </a:accent6>
+    <a:hlink>
+      <a:srgbClr val="0563C1"/>
+    </a:hlink>
+    <a:folHlink>
+      <a:srgbClr val="954F72"/>
+    </a:folHlink>
+  </a:clrScheme>
+</a:themeOverride>
+</file>
+
+<file path=ppt/theme/themeOverride11.xml><?xml version="1.0" encoding="utf-8"?>
+<a:themeOverride xmlns:a="http://schemas.openxmlformats.org/drawingml/2006/main">
+  <a:clrScheme name="Office">
+    <a:dk1>
+      <a:sysClr val="windowText" lastClr="000000"/>
+    </a:dk1>
+    <a:lt1>
+      <a:sysClr val="window" lastClr="FFFFFF"/>
+    </a:lt1>
+    <a:dk2>
+      <a:srgbClr val="44546A"/>
+    </a:dk2>
+    <a:lt2>
+      <a:srgbClr val="E7E6E6"/>
+    </a:lt2>
+    <a:accent1>
+      <a:srgbClr val="4472C4"/>
+    </a:accent1>
+    <a:accent2>
+      <a:srgbClr val="ED7D31"/>
+    </a:accent2>
+    <a:accent3>
+      <a:srgbClr val="A5A5A5"/>
+    </a:accent3>
+    <a:accent4>
+      <a:srgbClr val="FFC000"/>
+    </a:accent4>
+    <a:accent5>
+      <a:srgbClr val="5B9BD5"/>
+    </a:accent5>
+    <a:accent6>
+      <a:srgbClr val="70AD47"/>
+    </a:accent6>
+    <a:hlink>
+      <a:srgbClr val="0563C1"/>
+    </a:hlink>
+    <a:folHlink>
+      <a:srgbClr val="954F72"/>
+    </a:folHlink>
+  </a:clrScheme>
+</a:themeOverride>
+</file>
+
+<file path=ppt/theme/themeOverride12.xml><?xml version="1.0" encoding="utf-8"?>
+<a:themeOverride xmlns:a="http://schemas.openxmlformats.org/drawingml/2006/main">
+  <a:clrScheme name="Office">
+    <a:dk1>
+      <a:sysClr val="windowText" lastClr="000000"/>
+    </a:dk1>
+    <a:lt1>
+      <a:sysClr val="window" lastClr="FFFFFF"/>
+    </a:lt1>
+    <a:dk2>
+      <a:srgbClr val="44546A"/>
+    </a:dk2>
+    <a:lt2>
+      <a:srgbClr val="E7E6E6"/>
+    </a:lt2>
+    <a:accent1>
+      <a:srgbClr val="4472C4"/>
+    </a:accent1>
+    <a:accent2>
+      <a:srgbClr val="ED7D31"/>
+    </a:accent2>
+    <a:accent3>
+      <a:srgbClr val="A5A5A5"/>
+    </a:accent3>
+    <a:accent4>
+      <a:srgbClr val="FFC000"/>
+    </a:accent4>
+    <a:accent5>
+      <a:srgbClr val="5B9BD5"/>
+    </a:accent5>
+    <a:accent6>
+      <a:srgbClr val="70AD47"/>
+    </a:accent6>
+    <a:hlink>
+      <a:srgbClr val="0563C1"/>
+    </a:hlink>
+    <a:folHlink>
+      <a:srgbClr val="954F72"/>
+    </a:folHlink>
+  </a:clrScheme>
+</a:themeOverride>
+</file>
+
+<file path=ppt/theme/themeOverride2.xml><?xml version="1.0" encoding="utf-8"?>
+<a:themeOverride xmlns:a="http://schemas.openxmlformats.org/drawingml/2006/main">
+  <a:clrScheme name="Office">
+    <a:dk1>
+      <a:sysClr val="windowText" lastClr="000000"/>
+    </a:dk1>
+    <a:lt1>
+      <a:sysClr val="window" lastClr="FFFFFF"/>
+    </a:lt1>
+    <a:dk2>
+      <a:srgbClr val="44546A"/>
+    </a:dk2>
+    <a:lt2>
+      <a:srgbClr val="E7E6E6"/>
+    </a:lt2>
+    <a:accent1>
+      <a:srgbClr val="4472C4"/>
+    </a:accent1>
+    <a:accent2>
+      <a:srgbClr val="ED7D31"/>
+    </a:accent2>
+    <a:accent3>
+      <a:srgbClr val="A5A5A5"/>
+    </a:accent3>
+    <a:accent4>
+      <a:srgbClr val="FFC000"/>
+    </a:accent4>
+    <a:accent5>
+      <a:srgbClr val="5B9BD5"/>
+    </a:accent5>
+    <a:accent6>
+      <a:srgbClr val="70AD47"/>
+    </a:accent6>
+    <a:hlink>
+      <a:srgbClr val="0563C1"/>
+    </a:hlink>
+    <a:folHlink>
+      <a:srgbClr val="954F72"/>
+    </a:folHlink>
+  </a:clrScheme>
+</a:themeOverride>
+</file>
+
+<file path=ppt/theme/themeOverride3.xml><?xml version="1.0" encoding="utf-8"?>
+<a:themeOverride xmlns:a="http://schemas.openxmlformats.org/drawingml/2006/main">
+  <a:clrScheme name="Office">
+    <a:dk1>
+      <a:sysClr val="windowText" lastClr="000000"/>
+    </a:dk1>
+    <a:lt1>
+      <a:sysClr val="window" lastClr="FFFFFF"/>
+    </a:lt1>
+    <a:dk2>
+      <a:srgbClr val="44546A"/>
+    </a:dk2>
+    <a:lt2>
+      <a:srgbClr val="E7E6E6"/>
+    </a:lt2>
+    <a:accent1>
+      <a:srgbClr val="4472C4"/>
+    </a:accent1>
+    <a:accent2>
+      <a:srgbClr val="ED7D31"/>
+    </a:accent2>
+    <a:accent3>
+      <a:srgbClr val="A5A5A5"/>
+    </a:accent3>
+    <a:accent4>
+      <a:srgbClr val="FFC000"/>
+    </a:accent4>
+    <a:accent5>
+      <a:srgbClr val="5B9BD5"/>
+    </a:accent5>
+    <a:accent6>
+      <a:srgbClr val="70AD47"/>
+    </a:accent6>
+    <a:hlink>
+      <a:srgbClr val="0563C1"/>
+    </a:hlink>
+    <a:folHlink>
+      <a:srgbClr val="954F72"/>
+    </a:folHlink>
+  </a:clrScheme>
+</a:themeOverride>
+</file>
+
+<file path=ppt/theme/themeOverride4.xml><?xml version="1.0" encoding="utf-8"?>
+<a:themeOverride xmlns:a="http://schemas.openxmlformats.org/drawingml/2006/main">
+  <a:clrScheme name="Office">
+    <a:dk1>
+      <a:sysClr val="windowText" lastClr="000000"/>
+    </a:dk1>
+    <a:lt1>
+      <a:sysClr val="window" lastClr="FFFFFF"/>
+    </a:lt1>
+    <a:dk2>
+      <a:srgbClr val="44546A"/>
+    </a:dk2>
+    <a:lt2>
+      <a:srgbClr val="E7E6E6"/>
+    </a:lt2>
+    <a:accent1>
+      <a:srgbClr val="4472C4"/>
+    </a:accent1>
+    <a:accent2>
+      <a:srgbClr val="ED7D31"/>
+    </a:accent2>
+    <a:accent3>
+      <a:srgbClr val="A5A5A5"/>
+    </a:accent3>
+    <a:accent4>
+      <a:srgbClr val="FFC000"/>
+    </a:accent4>
+    <a:accent5>
+      <a:srgbClr val="5B9BD5"/>
+    </a:accent5>
+    <a:accent6>
+      <a:srgbClr val="70AD47"/>
+    </a:accent6>
+    <a:hlink>
+      <a:srgbClr val="0563C1"/>
+    </a:hlink>
+    <a:folHlink>
+      <a:srgbClr val="954F72"/>
+    </a:folHlink>
+  </a:clrScheme>
+</a:themeOverride>
+</file>
+
+<file path=ppt/theme/themeOverride5.xml><?xml version="1.0" encoding="utf-8"?>
+<a:themeOverride xmlns:a="http://schemas.openxmlformats.org/drawingml/2006/main">
+  <a:clrScheme name="Office">
+    <a:dk1>
+      <a:sysClr val="windowText" lastClr="000000"/>
+    </a:dk1>
+    <a:lt1>
+      <a:sysClr val="window" lastClr="FFFFFF"/>
+    </a:lt1>
+    <a:dk2>
+      <a:srgbClr val="44546A"/>
+    </a:dk2>
+    <a:lt2>
+      <a:srgbClr val="E7E6E6"/>
+    </a:lt2>
+    <a:accent1>
+      <a:srgbClr val="4472C4"/>
+    </a:accent1>
+    <a:accent2>
+      <a:srgbClr val="ED7D31"/>
+    </a:accent2>
+    <a:accent3>
+      <a:srgbClr val="A5A5A5"/>
+    </a:accent3>
+    <a:accent4>
+      <a:srgbClr val="FFC000"/>
+    </a:accent4>
+    <a:accent5>
+      <a:srgbClr val="5B9BD5"/>
+    </a:accent5>
+    <a:accent6>
+      <a:srgbClr val="70AD47"/>
+    </a:accent6>
+    <a:hlink>
+      <a:srgbClr val="0563C1"/>
+    </a:hlink>
+    <a:folHlink>
+      <a:srgbClr val="954F72"/>
+    </a:folHlink>
+  </a:clrScheme>
+</a:themeOverride>
+</file>
+
+<file path=ppt/theme/themeOverride6.xml><?xml version="1.0" encoding="utf-8"?>
+<a:themeOverride xmlns:a="http://schemas.openxmlformats.org/drawingml/2006/main">
+  <a:clrScheme name="Office">
+    <a:dk1>
+      <a:sysClr val="windowText" lastClr="000000"/>
+    </a:dk1>
+    <a:lt1>
+      <a:sysClr val="window" lastClr="FFFFFF"/>
+    </a:lt1>
+    <a:dk2>
+      <a:srgbClr val="44546A"/>
+    </a:dk2>
+    <a:lt2>
+      <a:srgbClr val="E7E6E6"/>
+    </a:lt2>
+    <a:accent1>
+      <a:srgbClr val="4472C4"/>
+    </a:accent1>
+    <a:accent2>
+      <a:srgbClr val="ED7D31"/>
+    </a:accent2>
+    <a:accent3>
+      <a:srgbClr val="A5A5A5"/>
+    </a:accent3>
+    <a:accent4>
+      <a:srgbClr val="FFC000"/>
+    </a:accent4>
+    <a:accent5>
+      <a:srgbClr val="5B9BD5"/>
+    </a:accent5>
+    <a:accent6>
+      <a:srgbClr val="70AD47"/>
+    </a:accent6>
+    <a:hlink>
+      <a:srgbClr val="0563C1"/>
+    </a:hlink>
+    <a:folHlink>
+      <a:srgbClr val="954F72"/>
+    </a:folHlink>
+  </a:clrScheme>
+</a:themeOverride>
+</file>
+
+<file path=ppt/theme/themeOverride7.xml><?xml version="1.0" encoding="utf-8"?>
+<a:themeOverride xmlns:a="http://schemas.openxmlformats.org/drawingml/2006/main">
+  <a:clrScheme name="Office">
+    <a:dk1>
+      <a:sysClr val="windowText" lastClr="000000"/>
+    </a:dk1>
+    <a:lt1>
+      <a:sysClr val="window" lastClr="FFFFFF"/>
+    </a:lt1>
+    <a:dk2>
+      <a:srgbClr val="44546A"/>
+    </a:dk2>
+    <a:lt2>
+      <a:srgbClr val="E7E6E6"/>
+    </a:lt2>
+    <a:accent1>
+      <a:srgbClr val="4472C4"/>
+    </a:accent1>
+    <a:accent2>
+      <a:srgbClr val="ED7D31"/>
+    </a:accent2>
+    <a:accent3>
+      <a:srgbClr val="A5A5A5"/>
+    </a:accent3>
+    <a:accent4>
+      <a:srgbClr val="FFC000"/>
+    </a:accent4>
+    <a:accent5>
+      <a:srgbClr val="5B9BD5"/>
+    </a:accent5>
+    <a:accent6>
+      <a:srgbClr val="70AD47"/>
+    </a:accent6>
+    <a:hlink>
+      <a:srgbClr val="0563C1"/>
+    </a:hlink>
+    <a:folHlink>
+      <a:srgbClr val="954F72"/>
+    </a:folHlink>
+  </a:clrScheme>
+</a:themeOverride>
+</file>
+
+<file path=ppt/theme/themeOverride8.xml><?xml version="1.0" encoding="utf-8"?>
+<a:themeOverride xmlns:a="http://schemas.openxmlformats.org/drawingml/2006/main">
+  <a:clrScheme name="Office">
+    <a:dk1>
+      <a:sysClr val="windowText" lastClr="000000"/>
+    </a:dk1>
+    <a:lt1>
+      <a:sysClr val="window" lastClr="FFFFFF"/>
+    </a:lt1>
+    <a:dk2>
+      <a:srgbClr val="44546A"/>
+    </a:dk2>
+    <a:lt2>
+      <a:srgbClr val="E7E6E6"/>
+    </a:lt2>
+    <a:accent1>
+      <a:srgbClr val="4472C4"/>
+    </a:accent1>
+    <a:accent2>
+      <a:srgbClr val="ED7D31"/>
+    </a:accent2>
+    <a:accent3>
+      <a:srgbClr val="A5A5A5"/>
+    </a:accent3>
+    <a:accent4>
+      <a:srgbClr val="FFC000"/>
+    </a:accent4>
+    <a:accent5>
+      <a:srgbClr val="5B9BD5"/>
+    </a:accent5>
+    <a:accent6>
+      <a:srgbClr val="70AD47"/>
+    </a:accent6>
+    <a:hlink>
+      <a:srgbClr val="0563C1"/>
+    </a:hlink>
+    <a:folHlink>
+      <a:srgbClr val="954F72"/>
+    </a:folHlink>
+  </a:clrScheme>
+</a:themeOverride>
+</file>
+
+<file path=ppt/theme/themeOverride9.xml><?xml version="1.0" encoding="utf-8"?>
+<a:themeOverride xmlns:a="http://schemas.openxmlformats.org/drawingml/2006/main">
+  <a:clrScheme name="Office">
+    <a:dk1>
+      <a:sysClr val="windowText" lastClr="000000"/>
+    </a:dk1>
+    <a:lt1>
+      <a:sysClr val="window" lastClr="FFFFFF"/>
+    </a:lt1>
+    <a:dk2>
+      <a:srgbClr val="44546A"/>
+    </a:dk2>
+    <a:lt2>
+      <a:srgbClr val="E7E6E6"/>
+    </a:lt2>
+    <a:accent1>
+      <a:srgbClr val="4472C4"/>
+    </a:accent1>
+    <a:accent2>
+      <a:srgbClr val="ED7D31"/>
+    </a:accent2>
+    <a:accent3>
+      <a:srgbClr val="A5A5A5"/>
+    </a:accent3>
+    <a:accent4>
+      <a:srgbClr val="FFC000"/>
+    </a:accent4>
+    <a:accent5>
+      <a:srgbClr val="5B9BD5"/>
+    </a:accent5>
+    <a:accent6>
+      <a:srgbClr val="70AD47"/>
+    </a:accent6>
+    <a:hlink>
+      <a:srgbClr val="0563C1"/>
+    </a:hlink>
+    <a:folHlink>
+      <a:srgbClr val="954F72"/>
+    </a:folHlink>
+  </a:clrScheme>
+</a:themeOverride>
 </file>
</xml_diff>

<commit_message>
Trains vs Planes v2 SLEdits
</commit_message>
<xml_diff>
--- a/Trains vs Planes.pptx
+++ b/Trains vs Planes.pptx
@@ -11,12 +11,13 @@
     <p:sldId id="258" r:id="rId5"/>
     <p:sldId id="259" r:id="rId6"/>
     <p:sldId id="260" r:id="rId7"/>
-    <p:sldId id="263" r:id="rId8"/>
-    <p:sldId id="264" r:id="rId9"/>
-    <p:sldId id="268" r:id="rId10"/>
-    <p:sldId id="266" r:id="rId11"/>
-    <p:sldId id="261" r:id="rId12"/>
-    <p:sldId id="262" r:id="rId13"/>
+    <p:sldId id="271" r:id="rId8"/>
+    <p:sldId id="263" r:id="rId9"/>
+    <p:sldId id="264" r:id="rId10"/>
+    <p:sldId id="268" r:id="rId11"/>
+    <p:sldId id="266" r:id="rId12"/>
+    <p:sldId id="261" r:id="rId13"/>
+    <p:sldId id="262" r:id="rId14"/>
   </p:sldIdLst>
   <p:sldSz cx="12192000" cy="6858000"/>
   <p:notesSz cx="6858000" cy="9144000"/>
@@ -123,6 +124,32 @@
 </p:presentation>
 </file>
 
+<file path=ppt/commentAuthors.xml><?xml version="1.0" encoding="utf-8"?>
+<p:cmAuthorLst xmlns:a="http://schemas.openxmlformats.org/drawingml/2006/main" xmlns:r="http://schemas.openxmlformats.org/officeDocument/2006/relationships" xmlns:p="http://schemas.openxmlformats.org/presentationml/2006/main">
+  <p:cmAuthor id="1" name="Suyin Lee" initials="SL" lastIdx="1" clrIdx="0">
+    <p:extLst>
+      <p:ext uri="{19B8F6BF-5375-455C-9EA6-DF929625EA0E}">
+        <p15:presenceInfo xmlns:p15="http://schemas.microsoft.com/office/powerpoint/2012/main" userId="0538e2d3b32b5056" providerId="Windows Live"/>
+      </p:ext>
+    </p:extLst>
+  </p:cmAuthor>
+</p:cmAuthorLst>
+</file>
+
+<file path=ppt/comments/comment1.xml><?xml version="1.0" encoding="utf-8"?>
+<p:cmLst xmlns:a="http://schemas.openxmlformats.org/drawingml/2006/main" xmlns:r="http://schemas.openxmlformats.org/officeDocument/2006/relationships" xmlns:p="http://schemas.openxmlformats.org/presentationml/2006/main">
+  <p:cm authorId="1" dt="2018-10-30T14:09:34.706" idx="1">
+    <p:pos x="7063" y="1294"/>
+    <p:text>Should we say this in reference to the visual? We found out that the data was calculated in August 2018 based on the author's code?</p:text>
+    <p:extLst>
+      <p:ext uri="{C676402C-5697-4E1C-873F-D02D1690AC5C}">
+        <p15:threadingInfo xmlns:p15="http://schemas.microsoft.com/office/powerpoint/2012/main" timeZoneBias="240"/>
+      </p:ext>
+    </p:extLst>
+  </p:cm>
+</p:cmLst>
+</file>
+
 <file path=ppt/slideLayouts/slideLayout1.xml><?xml version="1.0" encoding="utf-8"?>
 <p:sldLayout xmlns:a="http://schemas.openxmlformats.org/drawingml/2006/main" xmlns:r="http://schemas.openxmlformats.org/officeDocument/2006/relationships" xmlns:p="http://schemas.openxmlformats.org/presentationml/2006/main" type="title" preserve="1">
   <p:cSld name="Title Slide">
@@ -270,7 +297,7 @@
           <a:p>
             <a:fld id="{F7ECD0A6-BF4F-4486-B406-C70457919718}" type="datetimeFigureOut">
               <a:rPr lang="en-US" smtClean="0"/>
-              <a:t>10/27/2018</a:t>
+              <a:t>10/30/2018</a:t>
             </a:fld>
             <a:endParaRPr lang="en-US"/>
           </a:p>
@@ -468,7 +495,7 @@
           <a:p>
             <a:fld id="{F7ECD0A6-BF4F-4486-B406-C70457919718}" type="datetimeFigureOut">
               <a:rPr lang="en-US" smtClean="0"/>
-              <a:t>10/27/2018</a:t>
+              <a:t>10/30/2018</a:t>
             </a:fld>
             <a:endParaRPr lang="en-US"/>
           </a:p>
@@ -676,7 +703,7 @@
           <a:p>
             <a:fld id="{F7ECD0A6-BF4F-4486-B406-C70457919718}" type="datetimeFigureOut">
               <a:rPr lang="en-US" smtClean="0"/>
-              <a:t>10/27/2018</a:t>
+              <a:t>10/30/2018</a:t>
             </a:fld>
             <a:endParaRPr lang="en-US"/>
           </a:p>
@@ -874,7 +901,7 @@
           <a:p>
             <a:fld id="{F7ECD0A6-BF4F-4486-B406-C70457919718}" type="datetimeFigureOut">
               <a:rPr lang="en-US" smtClean="0"/>
-              <a:t>10/27/2018</a:t>
+              <a:t>10/30/2018</a:t>
             </a:fld>
             <a:endParaRPr lang="en-US"/>
           </a:p>
@@ -1149,7 +1176,7 @@
           <a:p>
             <a:fld id="{F7ECD0A6-BF4F-4486-B406-C70457919718}" type="datetimeFigureOut">
               <a:rPr lang="en-US" smtClean="0"/>
-              <a:t>10/27/2018</a:t>
+              <a:t>10/30/2018</a:t>
             </a:fld>
             <a:endParaRPr lang="en-US"/>
           </a:p>
@@ -1414,7 +1441,7 @@
           <a:p>
             <a:fld id="{F7ECD0A6-BF4F-4486-B406-C70457919718}" type="datetimeFigureOut">
               <a:rPr lang="en-US" smtClean="0"/>
-              <a:t>10/27/2018</a:t>
+              <a:t>10/30/2018</a:t>
             </a:fld>
             <a:endParaRPr lang="en-US"/>
           </a:p>
@@ -1826,7 +1853,7 @@
           <a:p>
             <a:fld id="{F7ECD0A6-BF4F-4486-B406-C70457919718}" type="datetimeFigureOut">
               <a:rPr lang="en-US" smtClean="0"/>
-              <a:t>10/27/2018</a:t>
+              <a:t>10/30/2018</a:t>
             </a:fld>
             <a:endParaRPr lang="en-US"/>
           </a:p>
@@ -1967,7 +1994,7 @@
           <a:p>
             <a:fld id="{F7ECD0A6-BF4F-4486-B406-C70457919718}" type="datetimeFigureOut">
               <a:rPr lang="en-US" smtClean="0"/>
-              <a:t>10/27/2018</a:t>
+              <a:t>10/30/2018</a:t>
             </a:fld>
             <a:endParaRPr lang="en-US"/>
           </a:p>
@@ -2080,7 +2107,7 @@
           <a:p>
             <a:fld id="{F7ECD0A6-BF4F-4486-B406-C70457919718}" type="datetimeFigureOut">
               <a:rPr lang="en-US" smtClean="0"/>
-              <a:t>10/27/2018</a:t>
+              <a:t>10/30/2018</a:t>
             </a:fld>
             <a:endParaRPr lang="en-US"/>
           </a:p>
@@ -2391,7 +2418,7 @@
           <a:p>
             <a:fld id="{F7ECD0A6-BF4F-4486-B406-C70457919718}" type="datetimeFigureOut">
               <a:rPr lang="en-US" smtClean="0"/>
-              <a:t>10/27/2018</a:t>
+              <a:t>10/30/2018</a:t>
             </a:fld>
             <a:endParaRPr lang="en-US"/>
           </a:p>
@@ -2679,7 +2706,7 @@
           <a:p>
             <a:fld id="{F7ECD0A6-BF4F-4486-B406-C70457919718}" type="datetimeFigureOut">
               <a:rPr lang="en-US" smtClean="0"/>
-              <a:t>10/27/2018</a:t>
+              <a:t>10/30/2018</a:t>
             </a:fld>
             <a:endParaRPr lang="en-US"/>
           </a:p>
@@ -2756,9 +2783,38 @@
 <p:sldMaster xmlns:a="http://schemas.openxmlformats.org/drawingml/2006/main" xmlns:r="http://schemas.openxmlformats.org/officeDocument/2006/relationships" xmlns:p="http://schemas.openxmlformats.org/presentationml/2006/main">
   <p:cSld>
     <p:bg>
-      <p:bgRef idx="1001">
-        <a:schemeClr val="bg1"/>
-      </p:bgRef>
+      <p:bgPr>
+        <a:blipFill dpi="0" rotWithShape="1">
+          <a:blip r:embed="rId13">
+            <a:alphaModFix amt="30000"/>
+            <a:extLst>
+              <a:ext uri="{BEBA8EAE-BF5A-486C-A8C5-ECC9F3942E4B}">
+                <a14:imgProps xmlns:a14="http://schemas.microsoft.com/office/drawing/2010/main">
+                  <a14:imgLayer r:embed="rId14">
+                    <a14:imgEffect>
+                      <a14:sharpenSoften amount="-12000"/>
+                    </a14:imgEffect>
+                    <a14:imgEffect>
+                      <a14:colorTemperature colorTemp="9956"/>
+                    </a14:imgEffect>
+                    <a14:imgEffect>
+                      <a14:saturation sat="80000"/>
+                    </a14:imgEffect>
+                    <a14:imgEffect>
+                      <a14:brightnessContrast contrast="4000"/>
+                    </a14:imgEffect>
+                  </a14:imgLayer>
+                </a14:imgProps>
+              </a:ext>
+            </a:extLst>
+          </a:blip>
+          <a:srcRect/>
+          <a:stretch>
+            <a:fillRect t="-11000" b="-11000"/>
+          </a:stretch>
+        </a:blipFill>
+        <a:effectLst/>
+      </p:bgPr>
     </p:bg>
     <p:spTree>
       <p:nvGrpSpPr>
@@ -2920,7 +2976,7 @@
           <a:p>
             <a:fld id="{F7ECD0A6-BF4F-4486-B406-C70457919718}" type="datetimeFigureOut">
               <a:rPr lang="en-US" smtClean="0"/>
-              <a:t>10/27/2018</a:t>
+              <a:t>10/30/2018</a:t>
             </a:fld>
             <a:endParaRPr lang="en-US"/>
           </a:p>
@@ -3323,12 +3379,2084 @@
 <file path=ppt/slides/slide1.xml><?xml version="1.0" encoding="utf-8"?>
 <p:sld xmlns:a="http://schemas.openxmlformats.org/drawingml/2006/main" xmlns:r="http://schemas.openxmlformats.org/officeDocument/2006/relationships" xmlns:p="http://schemas.openxmlformats.org/presentationml/2006/main">
   <p:cSld>
+    <p:spTree>
+      <p:nvGrpSpPr>
+        <p:cNvPr id="1" name=""/>
+        <p:cNvGrpSpPr/>
+        <p:nvPr/>
+      </p:nvGrpSpPr>
+      <p:grpSpPr>
+        <a:xfrm>
+          <a:off x="0" y="0"/>
+          <a:ext cx="0" cy="0"/>
+          <a:chOff x="0" y="0"/>
+          <a:chExt cx="0" cy="0"/>
+        </a:xfrm>
+      </p:grpSpPr>
+      <p:sp>
+        <p:nvSpPr>
+          <p:cNvPr id="2" name="Title 1">
+            <a:extLst>
+              <a:ext uri="{FF2B5EF4-FFF2-40B4-BE49-F238E27FC236}">
+                <a16:creationId xmlns:a16="http://schemas.microsoft.com/office/drawing/2014/main" id="{252F0A08-81C2-46B3-8E80-BFA23C4B292A}"/>
+              </a:ext>
+            </a:extLst>
+          </p:cNvPr>
+          <p:cNvSpPr>
+            <a:spLocks noGrp="1"/>
+          </p:cNvSpPr>
+          <p:nvPr>
+            <p:ph type="ctrTitle"/>
+          </p:nvPr>
+        </p:nvSpPr>
+        <p:spPr>
+          <a:xfrm>
+            <a:off x="1524000" y="1098541"/>
+            <a:ext cx="9144000" cy="2944821"/>
+          </a:xfrm>
+          <a:prstGeom prst="plaque">
+            <a:avLst>
+              <a:gd name="adj" fmla="val 15129"/>
+            </a:avLst>
+          </a:prstGeom>
+          <a:solidFill>
+            <a:schemeClr val="bg1">
+              <a:alpha val="82000"/>
+            </a:schemeClr>
+          </a:solidFill>
+        </p:spPr>
+        <p:txBody>
+          <a:bodyPr anchor="t">
+            <a:normAutofit/>
+          </a:bodyPr>
+          <a:lstStyle/>
+          <a:p>
+            <a:r>
+              <a:rPr lang="en-US" dirty="0">
+                <a:latin typeface="Britannic Bold" panose="020B0604020202020204" pitchFamily="34" charset="0"/>
+              </a:rPr>
+              <a:t>Trains vs Planes:</a:t>
+            </a:r>
+            <a:br>
+              <a:rPr lang="en-US" dirty="0">
+                <a:latin typeface="Britannic Bold" panose="020B0604020202020204" pitchFamily="34" charset="0"/>
+              </a:rPr>
+            </a:br>
+            <a:r>
+              <a:rPr lang="en-US" dirty="0">
+                <a:latin typeface="Britannic Bold" panose="020B0604020202020204" pitchFamily="34" charset="0"/>
+              </a:rPr>
+              <a:t>The True Cost of Travel</a:t>
+            </a:r>
+          </a:p>
+        </p:txBody>
+      </p:sp>
+      <p:sp>
+        <p:nvSpPr>
+          <p:cNvPr id="3" name="Subtitle 2">
+            <a:extLst>
+              <a:ext uri="{FF2B5EF4-FFF2-40B4-BE49-F238E27FC236}">
+                <a16:creationId xmlns:a16="http://schemas.microsoft.com/office/drawing/2014/main" id="{E72E280E-1F09-4B49-A4EB-DCA8BB202F48}"/>
+              </a:ext>
+            </a:extLst>
+          </p:cNvPr>
+          <p:cNvSpPr>
+            <a:spLocks noGrp="1"/>
+          </p:cNvSpPr>
+          <p:nvPr>
+            <p:ph type="subTitle" idx="1"/>
+          </p:nvPr>
+        </p:nvSpPr>
+        <p:spPr>
+          <a:xfrm>
+            <a:off x="1524000" y="4277518"/>
+            <a:ext cx="9144000" cy="1655762"/>
+          </a:xfrm>
+        </p:spPr>
+        <p:txBody>
+          <a:bodyPr/>
+          <a:lstStyle/>
+          <a:p>
+            <a:r>
+              <a:rPr lang="en-US" b="1" i="1" dirty="0"/>
+              <a:t>Makeover Monday 2018</a:t>
+            </a:r>
+          </a:p>
+          <a:p>
+            <a:r>
+              <a:rPr lang="en-US" b="1" dirty="0" err="1"/>
+              <a:t>Suyin</a:t>
+            </a:r>
+            <a:r>
+              <a:rPr lang="en-US" b="1" dirty="0"/>
+              <a:t> Lee &amp; Andreas </a:t>
+            </a:r>
+            <a:r>
+              <a:rPr lang="en-US" b="1" dirty="0" err="1"/>
+              <a:t>Lezis</a:t>
+            </a:r>
+            <a:endParaRPr lang="en-US" b="1" dirty="0"/>
+          </a:p>
+        </p:txBody>
+      </p:sp>
+      <p:pic>
+        <p:nvPicPr>
+          <p:cNvPr id="5" name="Graphic 4" descr="Train">
+            <a:extLst>
+              <a:ext uri="{FF2B5EF4-FFF2-40B4-BE49-F238E27FC236}">
+                <a16:creationId xmlns:a16="http://schemas.microsoft.com/office/drawing/2014/main" id="{0D2342C0-3E51-4DC8-8010-AF2C8E1A243F}"/>
+              </a:ext>
+            </a:extLst>
+          </p:cNvPr>
+          <p:cNvPicPr>
+            <a:picLocks noChangeAspect="1"/>
+          </p:cNvPicPr>
+          <p:nvPr/>
+        </p:nvPicPr>
+        <p:blipFill>
+          <a:blip r:embed="rId3">
+            <a:extLst>
+              <a:ext uri="{28A0092B-C50C-407E-A947-70E740481C1C}">
+                <a14:useLocalDpi xmlns:a14="http://schemas.microsoft.com/office/drawing/2010/main" val="0"/>
+              </a:ext>
+              <a:ext uri="{96DAC541-7B7A-43D3-8B79-37D633B846F1}">
+                <asvg:svgBlip xmlns:asvg="http://schemas.microsoft.com/office/drawing/2016/SVG/main" r:embed="rId4"/>
+              </a:ext>
+            </a:extLst>
+          </a:blip>
+          <a:stretch>
+            <a:fillRect/>
+          </a:stretch>
+        </p:blipFill>
+        <p:spPr>
+          <a:xfrm>
+            <a:off x="4075556" y="3021041"/>
+            <a:ext cx="752437" cy="752437"/>
+          </a:xfrm>
+          <a:prstGeom prst="rect">
+            <a:avLst/>
+          </a:prstGeom>
+        </p:spPr>
+      </p:pic>
+      <p:pic>
+        <p:nvPicPr>
+          <p:cNvPr id="7" name="Graphic 6" descr="Airplane">
+            <a:extLst>
+              <a:ext uri="{FF2B5EF4-FFF2-40B4-BE49-F238E27FC236}">
+                <a16:creationId xmlns:a16="http://schemas.microsoft.com/office/drawing/2014/main" id="{CFB47AF8-EFC7-4344-8518-8CDB85B127AC}"/>
+              </a:ext>
+            </a:extLst>
+          </p:cNvPr>
+          <p:cNvPicPr>
+            <a:picLocks noChangeAspect="1"/>
+          </p:cNvPicPr>
+          <p:nvPr/>
+        </p:nvPicPr>
+        <p:blipFill>
+          <a:blip r:embed="rId5">
+            <a:extLst>
+              <a:ext uri="{28A0092B-C50C-407E-A947-70E740481C1C}">
+                <a14:useLocalDpi xmlns:a14="http://schemas.microsoft.com/office/drawing/2010/main" val="0"/>
+              </a:ext>
+              <a:ext uri="{96DAC541-7B7A-43D3-8B79-37D633B846F1}">
+                <asvg:svgBlip xmlns:asvg="http://schemas.microsoft.com/office/drawing/2016/SVG/main" r:embed="rId6"/>
+              </a:ext>
+            </a:extLst>
+          </a:blip>
+          <a:stretch>
+            <a:fillRect/>
+          </a:stretch>
+        </p:blipFill>
+        <p:spPr>
+          <a:xfrm>
+            <a:off x="5719781" y="3021041"/>
+            <a:ext cx="752437" cy="752437"/>
+          </a:xfrm>
+          <a:prstGeom prst="rect">
+            <a:avLst/>
+          </a:prstGeom>
+        </p:spPr>
+      </p:pic>
+      <p:pic>
+        <p:nvPicPr>
+          <p:cNvPr id="9" name="Graphic 8" descr="Rocket">
+            <a:extLst>
+              <a:ext uri="{FF2B5EF4-FFF2-40B4-BE49-F238E27FC236}">
+                <a16:creationId xmlns:a16="http://schemas.microsoft.com/office/drawing/2014/main" id="{75B44A3F-9233-4432-B42F-4975A74A4F06}"/>
+              </a:ext>
+            </a:extLst>
+          </p:cNvPr>
+          <p:cNvPicPr>
+            <a:picLocks noChangeAspect="1"/>
+          </p:cNvPicPr>
+          <p:nvPr/>
+        </p:nvPicPr>
+        <p:blipFill>
+          <a:blip r:embed="rId7">
+            <a:extLst>
+              <a:ext uri="{28A0092B-C50C-407E-A947-70E740481C1C}">
+                <a14:useLocalDpi xmlns:a14="http://schemas.microsoft.com/office/drawing/2010/main" val="0"/>
+              </a:ext>
+              <a:ext uri="{96DAC541-7B7A-43D3-8B79-37D633B846F1}">
+                <asvg:svgBlip xmlns:asvg="http://schemas.microsoft.com/office/drawing/2016/SVG/main" r:embed="rId8"/>
+              </a:ext>
+            </a:extLst>
+          </a:blip>
+          <a:stretch>
+            <a:fillRect/>
+          </a:stretch>
+        </p:blipFill>
+        <p:spPr>
+          <a:xfrm>
+            <a:off x="7347993" y="3042528"/>
+            <a:ext cx="752437" cy="752437"/>
+          </a:xfrm>
+          <a:prstGeom prst="rect">
+            <a:avLst/>
+          </a:prstGeom>
+        </p:spPr>
+      </p:pic>
+      <p:sp>
+        <p:nvSpPr>
+          <p:cNvPr id="10" name="Title 1">
+            <a:extLst>
+              <a:ext uri="{FF2B5EF4-FFF2-40B4-BE49-F238E27FC236}">
+                <a16:creationId xmlns:a16="http://schemas.microsoft.com/office/drawing/2014/main" id="{B411C07A-19A8-4212-B2D4-0318DB2D10B1}"/>
+              </a:ext>
+            </a:extLst>
+          </p:cNvPr>
+          <p:cNvSpPr txBox="1">
+            <a:spLocks/>
+          </p:cNvSpPr>
+          <p:nvPr/>
+        </p:nvSpPr>
+        <p:spPr>
+          <a:xfrm>
+            <a:off x="1743075" y="1285875"/>
+            <a:ext cx="8758238" cy="2543175"/>
+          </a:xfrm>
+          <a:prstGeom prst="plaque">
+            <a:avLst>
+              <a:gd name="adj" fmla="val 15129"/>
+            </a:avLst>
+          </a:prstGeom>
+          <a:noFill/>
+          <a:ln w="76200">
+            <a:solidFill>
+              <a:schemeClr val="tx1"/>
+            </a:solidFill>
+          </a:ln>
+        </p:spPr>
+        <p:txBody>
+          <a:bodyPr vert="horz" lIns="91440" tIns="45720" rIns="91440" bIns="45720" rtlCol="0" anchor="t">
+            <a:normAutofit/>
+          </a:bodyPr>
+          <a:lstStyle>
+            <a:lvl1pPr algn="ctr" defTabSz="914400" rtl="0" eaLnBrk="1" latinLnBrk="0" hangingPunct="1">
+              <a:lnSpc>
+                <a:spcPct val="90000"/>
+              </a:lnSpc>
+              <a:spcBef>
+                <a:spcPct val="0"/>
+              </a:spcBef>
+              <a:buNone/>
+              <a:defRPr sz="6000" kern="1200">
+                <a:solidFill>
+                  <a:schemeClr val="tx1"/>
+                </a:solidFill>
+                <a:latin typeface="+mj-lt"/>
+                <a:ea typeface="+mj-ea"/>
+                <a:cs typeface="+mj-cs"/>
+              </a:defRPr>
+            </a:lvl1pPr>
+          </a:lstStyle>
+          <a:p>
+            <a:endParaRPr lang="en-US" b="1" dirty="0">
+              <a:latin typeface="Britannic Bold" panose="020B0604020202020204" pitchFamily="34" charset="0"/>
+            </a:endParaRPr>
+          </a:p>
+        </p:txBody>
+      </p:sp>
+    </p:spTree>
+    <p:extLst>
+      <p:ext uri="{BB962C8B-B14F-4D97-AF65-F5344CB8AC3E}">
+        <p14:creationId xmlns:p14="http://schemas.microsoft.com/office/powerpoint/2010/main" val="3611971250"/>
+      </p:ext>
+    </p:extLst>
+  </p:cSld>
+  <p:clrMapOvr>
+    <a:overrideClrMapping bg1="lt1" tx1="dk1" bg2="lt2" tx2="dk2" accent1="accent1" accent2="accent2" accent3="accent3" accent4="accent4" accent5="accent5" accent6="accent6" hlink="hlink" folHlink="folHlink"/>
+  </p:clrMapOvr>
+</p:sld>
+</file>
+
+<file path=ppt/slides/slide10.xml><?xml version="1.0" encoding="utf-8"?>
+<p:sld xmlns:a="http://schemas.openxmlformats.org/drawingml/2006/main" xmlns:r="http://schemas.openxmlformats.org/officeDocument/2006/relationships" xmlns:p="http://schemas.openxmlformats.org/presentationml/2006/main">
+  <p:cSld>
+    <p:spTree>
+      <p:nvGrpSpPr>
+        <p:cNvPr id="1" name=""/>
+        <p:cNvGrpSpPr/>
+        <p:nvPr/>
+      </p:nvGrpSpPr>
+      <p:grpSpPr>
+        <a:xfrm>
+          <a:off x="0" y="0"/>
+          <a:ext cx="0" cy="0"/>
+          <a:chOff x="0" y="0"/>
+          <a:chExt cx="0" cy="0"/>
+        </a:xfrm>
+      </p:grpSpPr>
+      <p:sp>
+        <p:nvSpPr>
+          <p:cNvPr id="3" name="Content Placeholder 2">
+            <a:extLst>
+              <a:ext uri="{FF2B5EF4-FFF2-40B4-BE49-F238E27FC236}">
+                <a16:creationId xmlns:a16="http://schemas.microsoft.com/office/drawing/2014/main" id="{6E5D2DBC-9BC9-4FBB-8EC1-73B6689261A5}"/>
+              </a:ext>
+            </a:extLst>
+          </p:cNvPr>
+          <p:cNvSpPr>
+            <a:spLocks noGrp="1"/>
+          </p:cNvSpPr>
+          <p:nvPr>
+            <p:ph sz="half" idx="1"/>
+          </p:nvPr>
+        </p:nvSpPr>
+        <p:spPr>
+          <a:xfrm>
+            <a:off x="838200" y="1825625"/>
+            <a:ext cx="5150013" cy="4351338"/>
+          </a:xfrm>
+          <a:solidFill>
+            <a:srgbClr val="F2F3F5"/>
+          </a:solidFill>
+        </p:spPr>
+        <p:txBody>
+          <a:bodyPr/>
+          <a:lstStyle/>
+          <a:p>
+            <a:r>
+              <a:rPr lang="en-US" dirty="0"/>
+              <a:t>Required three </a:t>
+            </a:r>
+            <a:r>
+              <a:rPr lang="en-US" dirty="0" err="1"/>
+              <a:t>geoms</a:t>
+            </a:r>
+            <a:r>
+              <a:rPr lang="en-US" dirty="0"/>
+              <a:t> to plot:</a:t>
+            </a:r>
+          </a:p>
+          <a:p>
+            <a:pPr lvl="1"/>
+            <a:r>
+              <a:rPr lang="en-US" dirty="0"/>
+              <a:t>“Displayed time” </a:t>
+            </a:r>
+            <a:r>
+              <a:rPr lang="en-US" dirty="0" err="1"/>
+              <a:t>geom_point</a:t>
+            </a:r>
+            <a:endParaRPr lang="en-US" dirty="0"/>
+          </a:p>
+          <a:p>
+            <a:pPr lvl="1"/>
+            <a:r>
+              <a:rPr lang="en-US" dirty="0"/>
+              <a:t>“Actual time” </a:t>
+            </a:r>
+            <a:r>
+              <a:rPr lang="en-US" dirty="0" err="1"/>
+              <a:t>geom_point</a:t>
+            </a:r>
+            <a:endParaRPr lang="en-US" dirty="0"/>
+          </a:p>
+          <a:p>
+            <a:pPr lvl="1"/>
+            <a:r>
+              <a:rPr lang="en-US" dirty="0" err="1"/>
+              <a:t>geom_segment</a:t>
+            </a:r>
+            <a:endParaRPr lang="en-US" dirty="0"/>
+          </a:p>
+          <a:p>
+            <a:r>
+              <a:rPr lang="en-US" dirty="0" err="1"/>
+              <a:t>gganimate</a:t>
+            </a:r>
+            <a:r>
+              <a:rPr lang="en-US" dirty="0"/>
+              <a:t> (not yet available on CRAN). Requires a dedicated variable to map to each “frame” of the animation (only 2 here)</a:t>
+            </a:r>
+          </a:p>
+          <a:p>
+            <a:r>
+              <a:rPr lang="en-US" i="1" dirty="0"/>
+              <a:t>A lot </a:t>
+            </a:r>
+            <a:r>
+              <a:rPr lang="en-US" dirty="0"/>
+              <a:t>of data wrangling was required to prepare the dataset</a:t>
+            </a:r>
+            <a:endParaRPr lang="en-US" i="1" dirty="0"/>
+          </a:p>
+        </p:txBody>
+      </p:sp>
+      <p:sp>
+        <p:nvSpPr>
+          <p:cNvPr id="4" name="Content Placeholder 3">
+            <a:extLst>
+              <a:ext uri="{FF2B5EF4-FFF2-40B4-BE49-F238E27FC236}">
+                <a16:creationId xmlns:a16="http://schemas.microsoft.com/office/drawing/2014/main" id="{B3FBE695-2FD2-4F04-8E67-45E759F25084}"/>
+              </a:ext>
+            </a:extLst>
+          </p:cNvPr>
+          <p:cNvSpPr>
+            <a:spLocks noGrp="1"/>
+          </p:cNvSpPr>
+          <p:nvPr>
+            <p:ph sz="half" idx="2"/>
+          </p:nvPr>
+        </p:nvSpPr>
+        <p:spPr/>
+        <p:txBody>
+          <a:bodyPr/>
+          <a:lstStyle/>
+          <a:p>
+            <a:endParaRPr lang="en-US"/>
+          </a:p>
+        </p:txBody>
+      </p:sp>
+      <p:pic>
+        <p:nvPicPr>
+          <p:cNvPr id="6" name="Content Placeholder 8">
+            <a:extLst>
+              <a:ext uri="{FF2B5EF4-FFF2-40B4-BE49-F238E27FC236}">
+                <a16:creationId xmlns:a16="http://schemas.microsoft.com/office/drawing/2014/main" id="{84C5E007-CAF2-4FA7-BDCC-44A613DE3C81}"/>
+              </a:ext>
+            </a:extLst>
+          </p:cNvPr>
+          <p:cNvPicPr>
+            <a:picLocks noChangeAspect="1"/>
+          </p:cNvPicPr>
+          <p:nvPr/>
+        </p:nvPicPr>
+        <p:blipFill>
+          <a:blip r:embed="rId3">
+            <a:extLst>
+              <a:ext uri="{28A0092B-C50C-407E-A947-70E740481C1C}">
+                <a14:useLocalDpi xmlns:a14="http://schemas.microsoft.com/office/drawing/2010/main" val="0"/>
+              </a:ext>
+            </a:extLst>
+          </a:blip>
+          <a:stretch>
+            <a:fillRect/>
+          </a:stretch>
+        </p:blipFill>
+        <p:spPr>
+          <a:xfrm>
+            <a:off x="5872959" y="523080"/>
+            <a:ext cx="5780082" cy="5811840"/>
+          </a:xfrm>
+          <a:prstGeom prst="rect">
+            <a:avLst/>
+          </a:prstGeom>
+        </p:spPr>
+      </p:pic>
+      <p:sp>
+        <p:nvSpPr>
+          <p:cNvPr id="10" name="Title 4">
+            <a:extLst>
+              <a:ext uri="{FF2B5EF4-FFF2-40B4-BE49-F238E27FC236}">
+                <a16:creationId xmlns:a16="http://schemas.microsoft.com/office/drawing/2014/main" id="{CEFC904E-F77F-45B0-81CC-0876651A7258}"/>
+              </a:ext>
+            </a:extLst>
+          </p:cNvPr>
+          <p:cNvSpPr txBox="1">
+            <a:spLocks/>
+          </p:cNvSpPr>
+          <p:nvPr/>
+        </p:nvSpPr>
+        <p:spPr>
+          <a:xfrm>
+            <a:off x="327185" y="342105"/>
+            <a:ext cx="5181599" cy="1325563"/>
+          </a:xfrm>
+          <a:prstGeom prst="plaque">
+            <a:avLst/>
+          </a:prstGeom>
+          <a:solidFill>
+            <a:schemeClr val="bg1">
+              <a:alpha val="82000"/>
+            </a:schemeClr>
+          </a:solidFill>
+        </p:spPr>
+        <p:txBody>
+          <a:bodyPr vert="horz" lIns="91440" tIns="45720" rIns="91440" bIns="45720" rtlCol="0" anchor="ctr">
+            <a:normAutofit fontScale="90000" lnSpcReduction="10000"/>
+          </a:bodyPr>
+          <a:lstStyle>
+            <a:lvl1pPr algn="l" defTabSz="914400" rtl="0" eaLnBrk="1" latinLnBrk="0" hangingPunct="1">
+              <a:lnSpc>
+                <a:spcPct val="90000"/>
+              </a:lnSpc>
+              <a:spcBef>
+                <a:spcPct val="0"/>
+              </a:spcBef>
+              <a:buNone/>
+              <a:defRPr sz="4400" kern="1200">
+                <a:solidFill>
+                  <a:schemeClr val="tx1"/>
+                </a:solidFill>
+                <a:latin typeface="+mj-lt"/>
+                <a:ea typeface="+mj-ea"/>
+                <a:cs typeface="+mj-cs"/>
+              </a:defRPr>
+            </a:lvl1pPr>
+          </a:lstStyle>
+          <a:p>
+            <a:pPr algn="ctr"/>
+            <a:r>
+              <a:rPr lang="en-US" sz="4000" dirty="0">
+                <a:latin typeface="Britannic Bold" panose="020B0903060703020204" pitchFamily="34" charset="0"/>
+              </a:rPr>
+              <a:t>Recreate Original Visualization</a:t>
+            </a:r>
+          </a:p>
+        </p:txBody>
+      </p:sp>
+      <p:sp>
+        <p:nvSpPr>
+          <p:cNvPr id="11" name="Title 4">
+            <a:extLst>
+              <a:ext uri="{FF2B5EF4-FFF2-40B4-BE49-F238E27FC236}">
+                <a16:creationId xmlns:a16="http://schemas.microsoft.com/office/drawing/2014/main" id="{27A4F897-9371-4FF5-80D6-BACA8BD10996}"/>
+              </a:ext>
+            </a:extLst>
+          </p:cNvPr>
+          <p:cNvSpPr txBox="1">
+            <a:spLocks/>
+          </p:cNvSpPr>
+          <p:nvPr/>
+        </p:nvSpPr>
+        <p:spPr>
+          <a:xfrm>
+            <a:off x="501016" y="492125"/>
+            <a:ext cx="4833938" cy="1025525"/>
+          </a:xfrm>
+          <a:prstGeom prst="plaque">
+            <a:avLst/>
+          </a:prstGeom>
+          <a:noFill/>
+          <a:ln w="38100">
+            <a:solidFill>
+              <a:schemeClr val="tx1"/>
+            </a:solidFill>
+          </a:ln>
+        </p:spPr>
+        <p:txBody>
+          <a:bodyPr vert="horz" lIns="91440" tIns="45720" rIns="91440" bIns="45720" rtlCol="0" anchor="ctr">
+            <a:normAutofit fontScale="97500"/>
+          </a:bodyPr>
+          <a:lstStyle>
+            <a:lvl1pPr algn="l" defTabSz="914400" rtl="0" eaLnBrk="1" latinLnBrk="0" hangingPunct="1">
+              <a:lnSpc>
+                <a:spcPct val="90000"/>
+              </a:lnSpc>
+              <a:spcBef>
+                <a:spcPct val="0"/>
+              </a:spcBef>
+              <a:buNone/>
+              <a:defRPr sz="4400" kern="1200">
+                <a:solidFill>
+                  <a:schemeClr val="tx1"/>
+                </a:solidFill>
+                <a:latin typeface="+mj-lt"/>
+                <a:ea typeface="+mj-ea"/>
+                <a:cs typeface="+mj-cs"/>
+              </a:defRPr>
+            </a:lvl1pPr>
+          </a:lstStyle>
+          <a:p>
+            <a:pPr algn="ctr"/>
+            <a:endParaRPr lang="en-US" sz="4000" dirty="0">
+              <a:latin typeface="Britannic Bold" panose="020B0903060703020204" pitchFamily="34" charset="0"/>
+            </a:endParaRPr>
+          </a:p>
+        </p:txBody>
+      </p:sp>
+    </p:spTree>
+    <p:extLst>
+      <p:ext uri="{BB962C8B-B14F-4D97-AF65-F5344CB8AC3E}">
+        <p14:creationId xmlns:p14="http://schemas.microsoft.com/office/powerpoint/2010/main" val="2257586544"/>
+      </p:ext>
+    </p:extLst>
+  </p:cSld>
+  <p:clrMapOvr>
+    <a:overrideClrMapping bg1="lt1" tx1="dk1" bg2="lt2" tx2="dk2" accent1="accent1" accent2="accent2" accent3="accent3" accent4="accent4" accent5="accent5" accent6="accent6" hlink="hlink" folHlink="folHlink"/>
+  </p:clrMapOvr>
+</p:sld>
+</file>
+
+<file path=ppt/slides/slide11.xml><?xml version="1.0" encoding="utf-8"?>
+<p:sld xmlns:a="http://schemas.openxmlformats.org/drawingml/2006/main" xmlns:r="http://schemas.openxmlformats.org/officeDocument/2006/relationships" xmlns:p="http://schemas.openxmlformats.org/presentationml/2006/main">
+  <p:cSld>
+    <p:spTree>
+      <p:nvGrpSpPr>
+        <p:cNvPr id="1" name=""/>
+        <p:cNvGrpSpPr/>
+        <p:nvPr/>
+      </p:nvGrpSpPr>
+      <p:grpSpPr>
+        <a:xfrm>
+          <a:off x="0" y="0"/>
+          <a:ext cx="0" cy="0"/>
+          <a:chOff x="0" y="0"/>
+          <a:chExt cx="0" cy="0"/>
+        </a:xfrm>
+      </p:grpSpPr>
+      <p:sp>
+        <p:nvSpPr>
+          <p:cNvPr id="3" name="Content Placeholder 2">
+            <a:extLst>
+              <a:ext uri="{FF2B5EF4-FFF2-40B4-BE49-F238E27FC236}">
+                <a16:creationId xmlns:a16="http://schemas.microsoft.com/office/drawing/2014/main" id="{DDA52849-0140-4570-A1F0-CB0B00611132}"/>
+              </a:ext>
+            </a:extLst>
+          </p:cNvPr>
+          <p:cNvSpPr>
+            <a:spLocks noGrp="1"/>
+          </p:cNvSpPr>
+          <p:nvPr>
+            <p:ph sz="half" idx="1"/>
+          </p:nvPr>
+        </p:nvSpPr>
+        <p:spPr>
+          <a:solidFill>
+            <a:srgbClr val="F2F3F5"/>
+          </a:solidFill>
+        </p:spPr>
+        <p:txBody>
+          <a:bodyPr/>
+          <a:lstStyle/>
+          <a:p>
+            <a:r>
+              <a:rPr lang="en-US" dirty="0"/>
+              <a:t>Let’s face it… the animation makes it harder to understand the data, not easier</a:t>
+            </a:r>
+          </a:p>
+          <a:p>
+            <a:r>
+              <a:rPr lang="en-US" dirty="0"/>
+              <a:t>The assumed delayed applied to all plane trips may not be reasonable, or universally applicable – there are ways of conveying the spread of data</a:t>
+            </a:r>
+          </a:p>
+          <a:p>
+            <a:endParaRPr lang="en-US" dirty="0"/>
+          </a:p>
+        </p:txBody>
+      </p:sp>
+      <p:pic>
+        <p:nvPicPr>
+          <p:cNvPr id="6" name="Content Placeholder 5">
+            <a:extLst>
+              <a:ext uri="{FF2B5EF4-FFF2-40B4-BE49-F238E27FC236}">
+                <a16:creationId xmlns:a16="http://schemas.microsoft.com/office/drawing/2014/main" id="{64CAB0A1-B04C-4AF1-8C61-062543C6F698}"/>
+              </a:ext>
+            </a:extLst>
+          </p:cNvPr>
+          <p:cNvPicPr>
+            <a:picLocks noGrp="1" noChangeAspect="1"/>
+          </p:cNvPicPr>
+          <p:nvPr>
+            <p:ph sz="half" idx="2"/>
+          </p:nvPr>
+        </p:nvPicPr>
+        <p:blipFill>
+          <a:blip r:embed="rId3">
+            <a:extLst>
+              <a:ext uri="{28A0092B-C50C-407E-A947-70E740481C1C}">
+                <a14:useLocalDpi xmlns:a14="http://schemas.microsoft.com/office/drawing/2010/main" val="0"/>
+              </a:ext>
+            </a:extLst>
+          </a:blip>
+          <a:stretch>
+            <a:fillRect/>
+          </a:stretch>
+        </p:blipFill>
+        <p:spPr>
+          <a:xfrm>
+            <a:off x="6096000" y="521208"/>
+            <a:ext cx="5815584" cy="5815584"/>
+          </a:xfrm>
+        </p:spPr>
+      </p:pic>
+      <p:sp>
+        <p:nvSpPr>
+          <p:cNvPr id="9" name="Title 4">
+            <a:extLst>
+              <a:ext uri="{FF2B5EF4-FFF2-40B4-BE49-F238E27FC236}">
+                <a16:creationId xmlns:a16="http://schemas.microsoft.com/office/drawing/2014/main" id="{1C70DD14-7D63-40CF-9E22-07E093649B64}"/>
+              </a:ext>
+            </a:extLst>
+          </p:cNvPr>
+          <p:cNvSpPr txBox="1">
+            <a:spLocks/>
+          </p:cNvSpPr>
+          <p:nvPr/>
+        </p:nvSpPr>
+        <p:spPr>
+          <a:xfrm>
+            <a:off x="838200" y="395860"/>
+            <a:ext cx="5181599" cy="1325563"/>
+          </a:xfrm>
+          <a:prstGeom prst="plaque">
+            <a:avLst/>
+          </a:prstGeom>
+          <a:solidFill>
+            <a:schemeClr val="bg1">
+              <a:alpha val="82000"/>
+            </a:schemeClr>
+          </a:solidFill>
+        </p:spPr>
+        <p:txBody>
+          <a:bodyPr vert="horz" lIns="91440" tIns="45720" rIns="91440" bIns="45720" rtlCol="0" anchor="ctr">
+            <a:normAutofit fontScale="90000" lnSpcReduction="10000"/>
+          </a:bodyPr>
+          <a:lstStyle>
+            <a:lvl1pPr algn="l" defTabSz="914400" rtl="0" eaLnBrk="1" latinLnBrk="0" hangingPunct="1">
+              <a:lnSpc>
+                <a:spcPct val="90000"/>
+              </a:lnSpc>
+              <a:spcBef>
+                <a:spcPct val="0"/>
+              </a:spcBef>
+              <a:buNone/>
+              <a:defRPr sz="4400" kern="1200">
+                <a:solidFill>
+                  <a:schemeClr val="tx1"/>
+                </a:solidFill>
+                <a:latin typeface="+mj-lt"/>
+                <a:ea typeface="+mj-ea"/>
+                <a:cs typeface="+mj-cs"/>
+              </a:defRPr>
+            </a:lvl1pPr>
+          </a:lstStyle>
+          <a:p>
+            <a:pPr algn="ctr"/>
+            <a:r>
+              <a:rPr lang="en-US" sz="4000" dirty="0">
+                <a:latin typeface="Britannic Bold" panose="020B0903060703020204" pitchFamily="34" charset="0"/>
+              </a:rPr>
+              <a:t>Improving the Original Visualization</a:t>
+            </a:r>
+          </a:p>
+        </p:txBody>
+      </p:sp>
+      <p:sp>
+        <p:nvSpPr>
+          <p:cNvPr id="10" name="Title 4">
+            <a:extLst>
+              <a:ext uri="{FF2B5EF4-FFF2-40B4-BE49-F238E27FC236}">
+                <a16:creationId xmlns:a16="http://schemas.microsoft.com/office/drawing/2014/main" id="{134F17A5-8BB0-4C0A-B66A-AE9E73A63E10}"/>
+              </a:ext>
+            </a:extLst>
+          </p:cNvPr>
+          <p:cNvSpPr txBox="1">
+            <a:spLocks/>
+          </p:cNvSpPr>
+          <p:nvPr/>
+        </p:nvSpPr>
+        <p:spPr>
+          <a:xfrm>
+            <a:off x="1012031" y="545880"/>
+            <a:ext cx="4833938" cy="1025525"/>
+          </a:xfrm>
+          <a:prstGeom prst="plaque">
+            <a:avLst/>
+          </a:prstGeom>
+          <a:noFill/>
+          <a:ln w="38100">
+            <a:solidFill>
+              <a:schemeClr val="tx1"/>
+            </a:solidFill>
+          </a:ln>
+        </p:spPr>
+        <p:txBody>
+          <a:bodyPr vert="horz" lIns="91440" tIns="45720" rIns="91440" bIns="45720" rtlCol="0" anchor="ctr">
+            <a:normAutofit fontScale="97500"/>
+          </a:bodyPr>
+          <a:lstStyle>
+            <a:lvl1pPr algn="l" defTabSz="914400" rtl="0" eaLnBrk="1" latinLnBrk="0" hangingPunct="1">
+              <a:lnSpc>
+                <a:spcPct val="90000"/>
+              </a:lnSpc>
+              <a:spcBef>
+                <a:spcPct val="0"/>
+              </a:spcBef>
+              <a:buNone/>
+              <a:defRPr sz="4400" kern="1200">
+                <a:solidFill>
+                  <a:schemeClr val="tx1"/>
+                </a:solidFill>
+                <a:latin typeface="+mj-lt"/>
+                <a:ea typeface="+mj-ea"/>
+                <a:cs typeface="+mj-cs"/>
+              </a:defRPr>
+            </a:lvl1pPr>
+          </a:lstStyle>
+          <a:p>
+            <a:pPr algn="ctr"/>
+            <a:endParaRPr lang="en-US" sz="4000" dirty="0">
+              <a:latin typeface="Britannic Bold" panose="020B0903060703020204" pitchFamily="34" charset="0"/>
+            </a:endParaRPr>
+          </a:p>
+        </p:txBody>
+      </p:sp>
+    </p:spTree>
+    <p:extLst>
+      <p:ext uri="{BB962C8B-B14F-4D97-AF65-F5344CB8AC3E}">
+        <p14:creationId xmlns:p14="http://schemas.microsoft.com/office/powerpoint/2010/main" val="2675873568"/>
+      </p:ext>
+    </p:extLst>
+  </p:cSld>
+  <p:clrMapOvr>
+    <a:overrideClrMapping bg1="lt1" tx1="dk1" bg2="lt2" tx2="dk2" accent1="accent1" accent2="accent2" accent3="accent3" accent4="accent4" accent5="accent5" accent6="accent6" hlink="hlink" folHlink="folHlink"/>
+  </p:clrMapOvr>
+</p:sld>
+</file>
+
+<file path=ppt/slides/slide12.xml><?xml version="1.0" encoding="utf-8"?>
+<p:sld xmlns:a="http://schemas.openxmlformats.org/drawingml/2006/main" xmlns:r="http://schemas.openxmlformats.org/officeDocument/2006/relationships" xmlns:p="http://schemas.openxmlformats.org/presentationml/2006/main">
+  <p:cSld>
+    <p:spTree>
+      <p:nvGrpSpPr>
+        <p:cNvPr id="1" name=""/>
+        <p:cNvGrpSpPr/>
+        <p:nvPr/>
+      </p:nvGrpSpPr>
+      <p:grpSpPr>
+        <a:xfrm>
+          <a:off x="0" y="0"/>
+          <a:ext cx="0" cy="0"/>
+          <a:chOff x="0" y="0"/>
+          <a:chExt cx="0" cy="0"/>
+        </a:xfrm>
+      </p:grpSpPr>
+      <p:sp>
+        <p:nvSpPr>
+          <p:cNvPr id="3" name="Content Placeholder 2">
+            <a:extLst>
+              <a:ext uri="{FF2B5EF4-FFF2-40B4-BE49-F238E27FC236}">
+                <a16:creationId xmlns:a16="http://schemas.microsoft.com/office/drawing/2014/main" id="{FECAB945-8F13-4CDA-80D9-2B7B6066653A}"/>
+              </a:ext>
+            </a:extLst>
+          </p:cNvPr>
+          <p:cNvSpPr>
+            <a:spLocks noGrp="1"/>
+          </p:cNvSpPr>
+          <p:nvPr>
+            <p:ph sz="half" idx="1"/>
+          </p:nvPr>
+        </p:nvSpPr>
+        <p:spPr/>
+        <p:txBody>
+          <a:bodyPr/>
+          <a:lstStyle/>
+          <a:p>
+            <a:r>
+              <a:rPr lang="en-US" dirty="0"/>
+              <a:t>Recreating the visual – cost</a:t>
+            </a:r>
+          </a:p>
+          <a:p>
+            <a:pPr lvl="1"/>
+            <a:r>
+              <a:rPr lang="en-US" dirty="0"/>
+              <a:t>Underlining planes vs. trains as the legend</a:t>
+            </a:r>
+          </a:p>
+          <a:p>
+            <a:pPr lvl="1"/>
+            <a:endParaRPr lang="en-US" dirty="0"/>
+          </a:p>
+        </p:txBody>
+      </p:sp>
+      <p:sp>
+        <p:nvSpPr>
+          <p:cNvPr id="4" name="Content Placeholder 3">
+            <a:extLst>
+              <a:ext uri="{FF2B5EF4-FFF2-40B4-BE49-F238E27FC236}">
+                <a16:creationId xmlns:a16="http://schemas.microsoft.com/office/drawing/2014/main" id="{1C173A96-D5B9-4DF6-ABB2-74F3288DBFFD}"/>
+              </a:ext>
+            </a:extLst>
+          </p:cNvPr>
+          <p:cNvSpPr>
+            <a:spLocks noGrp="1"/>
+          </p:cNvSpPr>
+          <p:nvPr>
+            <p:ph sz="half" idx="2"/>
+          </p:nvPr>
+        </p:nvSpPr>
+        <p:spPr/>
+        <p:txBody>
+          <a:bodyPr/>
+          <a:lstStyle/>
+          <a:p>
+            <a:endParaRPr lang="en-US"/>
+          </a:p>
+        </p:txBody>
+      </p:sp>
+      <p:sp>
+        <p:nvSpPr>
+          <p:cNvPr id="7" name="Title 4">
+            <a:extLst>
+              <a:ext uri="{FF2B5EF4-FFF2-40B4-BE49-F238E27FC236}">
+                <a16:creationId xmlns:a16="http://schemas.microsoft.com/office/drawing/2014/main" id="{3ACD32CA-430E-417A-82E1-BF06DF62E694}"/>
+              </a:ext>
+            </a:extLst>
+          </p:cNvPr>
+          <p:cNvSpPr txBox="1">
+            <a:spLocks/>
+          </p:cNvSpPr>
+          <p:nvPr/>
+        </p:nvSpPr>
+        <p:spPr>
+          <a:xfrm>
+            <a:off x="990601" y="367725"/>
+            <a:ext cx="5181599" cy="1325563"/>
+          </a:xfrm>
+          <a:prstGeom prst="plaque">
+            <a:avLst/>
+          </a:prstGeom>
+          <a:solidFill>
+            <a:schemeClr val="bg1">
+              <a:alpha val="82000"/>
+            </a:schemeClr>
+          </a:solidFill>
+        </p:spPr>
+        <p:txBody>
+          <a:bodyPr vert="horz" lIns="91440" tIns="45720" rIns="91440" bIns="45720" rtlCol="0" anchor="ctr">
+            <a:normAutofit fontScale="97500"/>
+          </a:bodyPr>
+          <a:lstStyle>
+            <a:lvl1pPr algn="l" defTabSz="914400" rtl="0" eaLnBrk="1" latinLnBrk="0" hangingPunct="1">
+              <a:lnSpc>
+                <a:spcPct val="90000"/>
+              </a:lnSpc>
+              <a:spcBef>
+                <a:spcPct val="0"/>
+              </a:spcBef>
+              <a:buNone/>
+              <a:defRPr sz="4400" kern="1200">
+                <a:solidFill>
+                  <a:schemeClr val="tx1"/>
+                </a:solidFill>
+                <a:latin typeface="+mj-lt"/>
+                <a:ea typeface="+mj-ea"/>
+                <a:cs typeface="+mj-cs"/>
+              </a:defRPr>
+            </a:lvl1pPr>
+          </a:lstStyle>
+          <a:p>
+            <a:pPr algn="ctr"/>
+            <a:r>
+              <a:rPr lang="en-US" sz="4000" dirty="0">
+                <a:latin typeface="Britannic Bold" panose="020B0903060703020204" pitchFamily="34" charset="0"/>
+              </a:rPr>
+              <a:t>Challenges</a:t>
+            </a:r>
+          </a:p>
+        </p:txBody>
+      </p:sp>
+      <p:sp>
+        <p:nvSpPr>
+          <p:cNvPr id="8" name="Title 4">
+            <a:extLst>
+              <a:ext uri="{FF2B5EF4-FFF2-40B4-BE49-F238E27FC236}">
+                <a16:creationId xmlns:a16="http://schemas.microsoft.com/office/drawing/2014/main" id="{045256A9-2839-492F-8E0A-DEC7FB8679F3}"/>
+              </a:ext>
+            </a:extLst>
+          </p:cNvPr>
+          <p:cNvSpPr txBox="1">
+            <a:spLocks/>
+          </p:cNvSpPr>
+          <p:nvPr/>
+        </p:nvSpPr>
+        <p:spPr>
+          <a:xfrm>
+            <a:off x="1164432" y="517745"/>
+            <a:ext cx="4833938" cy="1025525"/>
+          </a:xfrm>
+          <a:prstGeom prst="plaque">
+            <a:avLst/>
+          </a:prstGeom>
+          <a:noFill/>
+          <a:ln w="38100">
+            <a:solidFill>
+              <a:schemeClr val="tx1"/>
+            </a:solidFill>
+          </a:ln>
+        </p:spPr>
+        <p:txBody>
+          <a:bodyPr vert="horz" lIns="91440" tIns="45720" rIns="91440" bIns="45720" rtlCol="0" anchor="ctr">
+            <a:normAutofit fontScale="97500"/>
+          </a:bodyPr>
+          <a:lstStyle>
+            <a:lvl1pPr algn="l" defTabSz="914400" rtl="0" eaLnBrk="1" latinLnBrk="0" hangingPunct="1">
+              <a:lnSpc>
+                <a:spcPct val="90000"/>
+              </a:lnSpc>
+              <a:spcBef>
+                <a:spcPct val="0"/>
+              </a:spcBef>
+              <a:buNone/>
+              <a:defRPr sz="4400" kern="1200">
+                <a:solidFill>
+                  <a:schemeClr val="tx1"/>
+                </a:solidFill>
+                <a:latin typeface="+mj-lt"/>
+                <a:ea typeface="+mj-ea"/>
+                <a:cs typeface="+mj-cs"/>
+              </a:defRPr>
+            </a:lvl1pPr>
+          </a:lstStyle>
+          <a:p>
+            <a:pPr algn="ctr"/>
+            <a:endParaRPr lang="en-US" sz="4000" dirty="0">
+              <a:latin typeface="Britannic Bold" panose="020B0903060703020204" pitchFamily="34" charset="0"/>
+            </a:endParaRPr>
+          </a:p>
+        </p:txBody>
+      </p:sp>
+    </p:spTree>
+    <p:extLst>
+      <p:ext uri="{BB962C8B-B14F-4D97-AF65-F5344CB8AC3E}">
+        <p14:creationId xmlns:p14="http://schemas.microsoft.com/office/powerpoint/2010/main" val="3676238569"/>
+      </p:ext>
+    </p:extLst>
+  </p:cSld>
+  <p:clrMapOvr>
+    <a:overrideClrMapping bg1="lt1" tx1="dk1" bg2="lt2" tx2="dk2" accent1="accent1" accent2="accent2" accent3="accent3" accent4="accent4" accent5="accent5" accent6="accent6" hlink="hlink" folHlink="folHlink"/>
+  </p:clrMapOvr>
+</p:sld>
+</file>
+
+<file path=ppt/slides/slide13.xml><?xml version="1.0" encoding="utf-8"?>
+<p:sld xmlns:a="http://schemas.openxmlformats.org/drawingml/2006/main" xmlns:r="http://schemas.openxmlformats.org/officeDocument/2006/relationships" xmlns:p="http://schemas.openxmlformats.org/presentationml/2006/main">
+  <p:cSld>
+    <p:spTree>
+      <p:nvGrpSpPr>
+        <p:cNvPr id="1" name=""/>
+        <p:cNvGrpSpPr/>
+        <p:nvPr/>
+      </p:nvGrpSpPr>
+      <p:grpSpPr>
+        <a:xfrm>
+          <a:off x="0" y="0"/>
+          <a:ext cx="0" cy="0"/>
+          <a:chOff x="0" y="0"/>
+          <a:chExt cx="0" cy="0"/>
+        </a:xfrm>
+      </p:grpSpPr>
+      <p:sp>
+        <p:nvSpPr>
+          <p:cNvPr id="3" name="Content Placeholder 2">
+            <a:extLst>
+              <a:ext uri="{FF2B5EF4-FFF2-40B4-BE49-F238E27FC236}">
+                <a16:creationId xmlns:a16="http://schemas.microsoft.com/office/drawing/2014/main" id="{4AAAB96C-DDD5-4720-A7C0-66D77E0282F8}"/>
+              </a:ext>
+            </a:extLst>
+          </p:cNvPr>
+          <p:cNvSpPr>
+            <a:spLocks noGrp="1"/>
+          </p:cNvSpPr>
+          <p:nvPr>
+            <p:ph sz="half" idx="1"/>
+          </p:nvPr>
+        </p:nvSpPr>
+        <p:spPr>
+          <a:xfrm>
+            <a:off x="838200" y="1825625"/>
+            <a:ext cx="9839178" cy="4351338"/>
+          </a:xfrm>
+        </p:spPr>
+        <p:txBody>
+          <a:bodyPr/>
+          <a:lstStyle/>
+          <a:p>
+            <a:r>
+              <a:rPr lang="en-US" dirty="0"/>
+              <a:t>Understanding how travel seasons impact the cost of tickets</a:t>
+            </a:r>
+          </a:p>
+          <a:p>
+            <a:endParaRPr lang="en-US" dirty="0"/>
+          </a:p>
+          <a:p>
+            <a:endParaRPr lang="en-US" dirty="0"/>
+          </a:p>
+        </p:txBody>
+      </p:sp>
+      <p:sp>
+        <p:nvSpPr>
+          <p:cNvPr id="7" name="Title 4">
+            <a:extLst>
+              <a:ext uri="{FF2B5EF4-FFF2-40B4-BE49-F238E27FC236}">
+                <a16:creationId xmlns:a16="http://schemas.microsoft.com/office/drawing/2014/main" id="{C7CF56BD-EEBB-449B-BD8A-23CF66B8B2AC}"/>
+              </a:ext>
+            </a:extLst>
+          </p:cNvPr>
+          <p:cNvSpPr txBox="1">
+            <a:spLocks/>
+          </p:cNvSpPr>
+          <p:nvPr/>
+        </p:nvSpPr>
+        <p:spPr>
+          <a:xfrm>
+            <a:off x="838200" y="297386"/>
+            <a:ext cx="5181599" cy="1325563"/>
+          </a:xfrm>
+          <a:prstGeom prst="plaque">
+            <a:avLst/>
+          </a:prstGeom>
+          <a:solidFill>
+            <a:schemeClr val="bg1">
+              <a:alpha val="82000"/>
+            </a:schemeClr>
+          </a:solidFill>
+        </p:spPr>
+        <p:txBody>
+          <a:bodyPr vert="horz" lIns="91440" tIns="45720" rIns="91440" bIns="45720" rtlCol="0" anchor="ctr">
+            <a:normAutofit fontScale="90000"/>
+          </a:bodyPr>
+          <a:lstStyle>
+            <a:lvl1pPr algn="l" defTabSz="914400" rtl="0" eaLnBrk="1" latinLnBrk="0" hangingPunct="1">
+              <a:lnSpc>
+                <a:spcPct val="90000"/>
+              </a:lnSpc>
+              <a:spcBef>
+                <a:spcPct val="0"/>
+              </a:spcBef>
+              <a:buNone/>
+              <a:defRPr sz="4400" kern="1200">
+                <a:solidFill>
+                  <a:schemeClr val="tx1"/>
+                </a:solidFill>
+                <a:latin typeface="+mj-lt"/>
+                <a:ea typeface="+mj-ea"/>
+                <a:cs typeface="+mj-cs"/>
+              </a:defRPr>
+            </a:lvl1pPr>
+          </a:lstStyle>
+          <a:p>
+            <a:pPr algn="ctr"/>
+            <a:r>
+              <a:rPr lang="en-US" sz="4000" dirty="0">
+                <a:latin typeface="Britannic Bold" panose="020B0903060703020204" pitchFamily="34" charset="0"/>
+              </a:rPr>
+              <a:t>Further Developments</a:t>
+            </a:r>
+          </a:p>
+        </p:txBody>
+      </p:sp>
+      <p:sp>
+        <p:nvSpPr>
+          <p:cNvPr id="8" name="Title 4">
+            <a:extLst>
+              <a:ext uri="{FF2B5EF4-FFF2-40B4-BE49-F238E27FC236}">
+                <a16:creationId xmlns:a16="http://schemas.microsoft.com/office/drawing/2014/main" id="{324E41EE-AB3B-464E-86FB-41DC37812A93}"/>
+              </a:ext>
+            </a:extLst>
+          </p:cNvPr>
+          <p:cNvSpPr txBox="1">
+            <a:spLocks/>
+          </p:cNvSpPr>
+          <p:nvPr/>
+        </p:nvSpPr>
+        <p:spPr>
+          <a:xfrm>
+            <a:off x="1012031" y="447406"/>
+            <a:ext cx="4833938" cy="1025525"/>
+          </a:xfrm>
+          <a:prstGeom prst="plaque">
+            <a:avLst/>
+          </a:prstGeom>
+          <a:noFill/>
+          <a:ln w="38100">
+            <a:solidFill>
+              <a:schemeClr val="tx1"/>
+            </a:solidFill>
+          </a:ln>
+        </p:spPr>
+        <p:txBody>
+          <a:bodyPr vert="horz" lIns="91440" tIns="45720" rIns="91440" bIns="45720" rtlCol="0" anchor="ctr">
+            <a:normAutofit fontScale="97500"/>
+          </a:bodyPr>
+          <a:lstStyle>
+            <a:lvl1pPr algn="l" defTabSz="914400" rtl="0" eaLnBrk="1" latinLnBrk="0" hangingPunct="1">
+              <a:lnSpc>
+                <a:spcPct val="90000"/>
+              </a:lnSpc>
+              <a:spcBef>
+                <a:spcPct val="0"/>
+              </a:spcBef>
+              <a:buNone/>
+              <a:defRPr sz="4400" kern="1200">
+                <a:solidFill>
+                  <a:schemeClr val="tx1"/>
+                </a:solidFill>
+                <a:latin typeface="+mj-lt"/>
+                <a:ea typeface="+mj-ea"/>
+                <a:cs typeface="+mj-cs"/>
+              </a:defRPr>
+            </a:lvl1pPr>
+          </a:lstStyle>
+          <a:p>
+            <a:pPr algn="ctr"/>
+            <a:endParaRPr lang="en-US" sz="4000" dirty="0">
+              <a:latin typeface="Britannic Bold" panose="020B0903060703020204" pitchFamily="34" charset="0"/>
+            </a:endParaRPr>
+          </a:p>
+        </p:txBody>
+      </p:sp>
+      <p:pic>
+        <p:nvPicPr>
+          <p:cNvPr id="10" name="Picture 9">
+            <a:extLst>
+              <a:ext uri="{FF2B5EF4-FFF2-40B4-BE49-F238E27FC236}">
+                <a16:creationId xmlns:a16="http://schemas.microsoft.com/office/drawing/2014/main" id="{8504A0C4-CBF3-418F-9B8C-4B426C59EE97}"/>
+              </a:ext>
+            </a:extLst>
+          </p:cNvPr>
+          <p:cNvPicPr>
+            <a:picLocks noChangeAspect="1"/>
+          </p:cNvPicPr>
+          <p:nvPr/>
+        </p:nvPicPr>
+        <p:blipFill>
+          <a:blip r:embed="rId3">
+            <a:extLst>
+              <a:ext uri="{28A0092B-C50C-407E-A947-70E740481C1C}">
+                <a14:useLocalDpi xmlns:a14="http://schemas.microsoft.com/office/drawing/2010/main" val="0"/>
+              </a:ext>
+              <a:ext uri="{837473B0-CC2E-450A-ABE3-18F120FF3D39}">
+                <a1611:picAttrSrcUrl xmlns:a1611="http://schemas.microsoft.com/office/drawing/2016/11/main" r:id="rId4"/>
+              </a:ext>
+            </a:extLst>
+          </a:blip>
+          <a:stretch>
+            <a:fillRect/>
+          </a:stretch>
+        </p:blipFill>
+        <p:spPr>
+          <a:xfrm>
+            <a:off x="4057751" y="3515243"/>
+            <a:ext cx="3924095" cy="2748508"/>
+          </a:xfrm>
+          <a:prstGeom prst="rect">
+            <a:avLst/>
+          </a:prstGeom>
+        </p:spPr>
+      </p:pic>
+      <p:sp>
+        <p:nvSpPr>
+          <p:cNvPr id="11" name="TextBox 10">
+            <a:extLst>
+              <a:ext uri="{FF2B5EF4-FFF2-40B4-BE49-F238E27FC236}">
+                <a16:creationId xmlns:a16="http://schemas.microsoft.com/office/drawing/2014/main" id="{D2A6CA58-49FA-4023-AF64-C8074F970164}"/>
+              </a:ext>
+            </a:extLst>
+          </p:cNvPr>
+          <p:cNvSpPr txBox="1"/>
+          <p:nvPr/>
+        </p:nvSpPr>
+        <p:spPr>
+          <a:xfrm>
+            <a:off x="4057751" y="6421485"/>
+            <a:ext cx="3924095" cy="230832"/>
+          </a:xfrm>
+          <a:prstGeom prst="rect">
+            <a:avLst/>
+          </a:prstGeom>
+          <a:noFill/>
+        </p:spPr>
+        <p:txBody>
+          <a:bodyPr wrap="square" rtlCol="0">
+            <a:spAutoFit/>
+          </a:bodyPr>
+          <a:lstStyle/>
+          <a:p>
+            <a:r>
+              <a:rPr lang="en-US" sz="900">
+                <a:hlinkClick r:id="rId4" tooltip="http://boozedancing.wordpress.com/2013/10/24/booze-news-halloween-cocktail-recipes-from-beluga-vodka-and-captain-morgan-spiced-rum/"/>
+              </a:rPr>
+              <a:t>This Photo</a:t>
+            </a:r>
+            <a:r>
+              <a:rPr lang="en-US" sz="900"/>
+              <a:t> by Unknown Author is licensed under </a:t>
+            </a:r>
+            <a:r>
+              <a:rPr lang="en-US" sz="900">
+                <a:hlinkClick r:id="rId5" tooltip="https://creativecommons.org/licenses/by-nc-nd/3.0/"/>
+              </a:rPr>
+              <a:t>CC BY-NC-ND</a:t>
+            </a:r>
+            <a:endParaRPr lang="en-US" sz="900"/>
+          </a:p>
+        </p:txBody>
+      </p:sp>
+    </p:spTree>
+    <p:extLst>
+      <p:ext uri="{BB962C8B-B14F-4D97-AF65-F5344CB8AC3E}">
+        <p14:creationId xmlns:p14="http://schemas.microsoft.com/office/powerpoint/2010/main" val="2677055334"/>
+      </p:ext>
+    </p:extLst>
+  </p:cSld>
+  <p:clrMapOvr>
+    <a:overrideClrMapping bg1="lt1" tx1="dk1" bg2="lt2" tx2="dk2" accent1="accent1" accent2="accent2" accent3="accent3" accent4="accent4" accent5="accent5" accent6="accent6" hlink="hlink" folHlink="folHlink"/>
+  </p:clrMapOvr>
+</p:sld>
+</file>
+
+<file path=ppt/slides/slide2.xml><?xml version="1.0" encoding="utf-8"?>
+<p:sld xmlns:a="http://schemas.openxmlformats.org/drawingml/2006/main" xmlns:r="http://schemas.openxmlformats.org/officeDocument/2006/relationships" xmlns:p="http://schemas.openxmlformats.org/presentationml/2006/main">
+  <p:cSld>
+    <p:spTree>
+      <p:nvGrpSpPr>
+        <p:cNvPr id="1" name=""/>
+        <p:cNvGrpSpPr/>
+        <p:nvPr/>
+      </p:nvGrpSpPr>
+      <p:grpSpPr>
+        <a:xfrm>
+          <a:off x="0" y="0"/>
+          <a:ext cx="0" cy="0"/>
+          <a:chOff x="0" y="0"/>
+          <a:chExt cx="0" cy="0"/>
+        </a:xfrm>
+      </p:grpSpPr>
+      <p:sp>
+        <p:nvSpPr>
+          <p:cNvPr id="3" name="Content Placeholder 2">
+            <a:extLst>
+              <a:ext uri="{FF2B5EF4-FFF2-40B4-BE49-F238E27FC236}">
+                <a16:creationId xmlns:a16="http://schemas.microsoft.com/office/drawing/2014/main" id="{4AAAB96C-DDD5-4720-A7C0-66D77E0282F8}"/>
+              </a:ext>
+            </a:extLst>
+          </p:cNvPr>
+          <p:cNvSpPr>
+            <a:spLocks noGrp="1"/>
+          </p:cNvSpPr>
+          <p:nvPr>
+            <p:ph sz="half" idx="1"/>
+          </p:nvPr>
+        </p:nvSpPr>
+        <p:spPr/>
+        <p:txBody>
+          <a:bodyPr/>
+          <a:lstStyle/>
+          <a:p>
+            <a:endParaRPr lang="en-US" dirty="0"/>
+          </a:p>
+        </p:txBody>
+      </p:sp>
+      <p:sp>
+        <p:nvSpPr>
+          <p:cNvPr id="4" name="Content Placeholder 3">
+            <a:extLst>
+              <a:ext uri="{FF2B5EF4-FFF2-40B4-BE49-F238E27FC236}">
+                <a16:creationId xmlns:a16="http://schemas.microsoft.com/office/drawing/2014/main" id="{669DFBCA-B4DA-404A-96B2-4128478F16B9}"/>
+              </a:ext>
+            </a:extLst>
+          </p:cNvPr>
+          <p:cNvSpPr>
+            <a:spLocks noGrp="1"/>
+          </p:cNvSpPr>
+          <p:nvPr>
+            <p:ph sz="half" idx="2"/>
+          </p:nvPr>
+        </p:nvSpPr>
+        <p:spPr/>
+        <p:txBody>
+          <a:bodyPr/>
+          <a:lstStyle/>
+          <a:p>
+            <a:endParaRPr lang="en-US"/>
+          </a:p>
+        </p:txBody>
+      </p:sp>
+      <p:sp>
+        <p:nvSpPr>
+          <p:cNvPr id="7" name="Title 4">
+            <a:extLst>
+              <a:ext uri="{FF2B5EF4-FFF2-40B4-BE49-F238E27FC236}">
+                <a16:creationId xmlns:a16="http://schemas.microsoft.com/office/drawing/2014/main" id="{AAB40256-E684-4D98-B88F-940265F96941}"/>
+              </a:ext>
+            </a:extLst>
+          </p:cNvPr>
+          <p:cNvSpPr txBox="1">
+            <a:spLocks/>
+          </p:cNvSpPr>
+          <p:nvPr/>
+        </p:nvSpPr>
+        <p:spPr>
+          <a:xfrm>
+            <a:off x="657224" y="353656"/>
+            <a:ext cx="5181599" cy="1325563"/>
+          </a:xfrm>
+          <a:prstGeom prst="plaque">
+            <a:avLst/>
+          </a:prstGeom>
+          <a:solidFill>
+            <a:schemeClr val="bg1">
+              <a:alpha val="82000"/>
+            </a:schemeClr>
+          </a:solidFill>
+        </p:spPr>
+        <p:txBody>
+          <a:bodyPr vert="horz" lIns="91440" tIns="45720" rIns="91440" bIns="45720" rtlCol="0" anchor="ctr">
+            <a:normAutofit fontScale="90000" lnSpcReduction="10000"/>
+          </a:bodyPr>
+          <a:lstStyle>
+            <a:lvl1pPr algn="l" defTabSz="914400" rtl="0" eaLnBrk="1" latinLnBrk="0" hangingPunct="1">
+              <a:lnSpc>
+                <a:spcPct val="90000"/>
+              </a:lnSpc>
+              <a:spcBef>
+                <a:spcPct val="0"/>
+              </a:spcBef>
+              <a:buNone/>
+              <a:defRPr sz="4400" kern="1200">
+                <a:solidFill>
+                  <a:schemeClr val="tx1"/>
+                </a:solidFill>
+                <a:latin typeface="+mj-lt"/>
+                <a:ea typeface="+mj-ea"/>
+                <a:cs typeface="+mj-cs"/>
+              </a:defRPr>
+            </a:lvl1pPr>
+          </a:lstStyle>
+          <a:p>
+            <a:pPr algn="ctr"/>
+            <a:r>
+              <a:rPr lang="en-US" sz="4000" dirty="0">
+                <a:latin typeface="Britannic Bold" panose="020B0903060703020204" pitchFamily="34" charset="0"/>
+              </a:rPr>
+              <a:t>Context: </a:t>
+            </a:r>
+            <a:r>
+              <a:rPr lang="en-US" sz="4000" dirty="0" err="1">
+                <a:latin typeface="Britannic Bold" panose="020B0903060703020204" pitchFamily="34" charset="0"/>
+              </a:rPr>
+              <a:t>Deutche</a:t>
+            </a:r>
+            <a:r>
+              <a:rPr lang="en-US" sz="4000" dirty="0">
+                <a:latin typeface="Britannic Bold" panose="020B0903060703020204" pitchFamily="34" charset="0"/>
+              </a:rPr>
+              <a:t> Welles</a:t>
+            </a:r>
+          </a:p>
+        </p:txBody>
+      </p:sp>
+      <p:sp>
+        <p:nvSpPr>
+          <p:cNvPr id="8" name="Title 4">
+            <a:extLst>
+              <a:ext uri="{FF2B5EF4-FFF2-40B4-BE49-F238E27FC236}">
+                <a16:creationId xmlns:a16="http://schemas.microsoft.com/office/drawing/2014/main" id="{0FC5CE5A-1BAE-44E8-A50C-8D8942309B6B}"/>
+              </a:ext>
+            </a:extLst>
+          </p:cNvPr>
+          <p:cNvSpPr txBox="1">
+            <a:spLocks/>
+          </p:cNvSpPr>
+          <p:nvPr/>
+        </p:nvSpPr>
+        <p:spPr>
+          <a:xfrm>
+            <a:off x="838200" y="503676"/>
+            <a:ext cx="4833938" cy="1025525"/>
+          </a:xfrm>
+          <a:prstGeom prst="plaque">
+            <a:avLst/>
+          </a:prstGeom>
+          <a:noFill/>
+          <a:ln w="38100">
+            <a:solidFill>
+              <a:schemeClr val="tx1"/>
+            </a:solidFill>
+          </a:ln>
+        </p:spPr>
+        <p:txBody>
+          <a:bodyPr vert="horz" lIns="91440" tIns="45720" rIns="91440" bIns="45720" rtlCol="0" anchor="ctr">
+            <a:normAutofit fontScale="97500"/>
+          </a:bodyPr>
+          <a:lstStyle>
+            <a:lvl1pPr algn="l" defTabSz="914400" rtl="0" eaLnBrk="1" latinLnBrk="0" hangingPunct="1">
+              <a:lnSpc>
+                <a:spcPct val="90000"/>
+              </a:lnSpc>
+              <a:spcBef>
+                <a:spcPct val="0"/>
+              </a:spcBef>
+              <a:buNone/>
+              <a:defRPr sz="4400" kern="1200">
+                <a:solidFill>
+                  <a:schemeClr val="tx1"/>
+                </a:solidFill>
+                <a:latin typeface="+mj-lt"/>
+                <a:ea typeface="+mj-ea"/>
+                <a:cs typeface="+mj-cs"/>
+              </a:defRPr>
+            </a:lvl1pPr>
+          </a:lstStyle>
+          <a:p>
+            <a:pPr algn="ctr"/>
+            <a:endParaRPr lang="en-US" sz="4000" dirty="0">
+              <a:latin typeface="Britannic Bold" panose="020B0903060703020204" pitchFamily="34" charset="0"/>
+            </a:endParaRPr>
+          </a:p>
+        </p:txBody>
+      </p:sp>
+    </p:spTree>
+    <p:extLst>
+      <p:ext uri="{BB962C8B-B14F-4D97-AF65-F5344CB8AC3E}">
+        <p14:creationId xmlns:p14="http://schemas.microsoft.com/office/powerpoint/2010/main" val="347150910"/>
+      </p:ext>
+    </p:extLst>
+  </p:cSld>
+  <p:clrMapOvr>
+    <a:overrideClrMapping bg1="lt1" tx1="dk1" bg2="lt2" tx2="dk2" accent1="accent1" accent2="accent2" accent3="accent3" accent4="accent4" accent5="accent5" accent6="accent6" hlink="hlink" folHlink="folHlink"/>
+  </p:clrMapOvr>
+</p:sld>
+</file>
+
+<file path=ppt/slides/slide3.xml><?xml version="1.0" encoding="utf-8"?>
+<p:sld xmlns:a="http://schemas.openxmlformats.org/drawingml/2006/main" xmlns:r="http://schemas.openxmlformats.org/officeDocument/2006/relationships" xmlns:p="http://schemas.openxmlformats.org/presentationml/2006/main">
+  <p:cSld>
+    <p:spTree>
+      <p:nvGrpSpPr>
+        <p:cNvPr id="1" name=""/>
+        <p:cNvGrpSpPr/>
+        <p:nvPr/>
+      </p:nvGrpSpPr>
+      <p:grpSpPr>
+        <a:xfrm>
+          <a:off x="0" y="0"/>
+          <a:ext cx="0" cy="0"/>
+          <a:chOff x="0" y="0"/>
+          <a:chExt cx="0" cy="0"/>
+        </a:xfrm>
+      </p:grpSpPr>
+      <p:sp>
+        <p:nvSpPr>
+          <p:cNvPr id="7" name="Content Placeholder 6">
+            <a:extLst>
+              <a:ext uri="{FF2B5EF4-FFF2-40B4-BE49-F238E27FC236}">
+                <a16:creationId xmlns:a16="http://schemas.microsoft.com/office/drawing/2014/main" id="{CC3C6753-C444-49C8-A285-43788753341F}"/>
+              </a:ext>
+            </a:extLst>
+          </p:cNvPr>
+          <p:cNvSpPr>
+            <a:spLocks noGrp="1"/>
+          </p:cNvSpPr>
+          <p:nvPr>
+            <p:ph sz="half" idx="2"/>
+          </p:nvPr>
+        </p:nvSpPr>
+        <p:spPr>
+          <a:solidFill>
+            <a:srgbClr val="F1F3F5"/>
+          </a:solidFill>
+        </p:spPr>
+        <p:txBody>
+          <a:bodyPr anchor="ctr">
+            <a:normAutofit fontScale="92500" lnSpcReduction="10000"/>
+          </a:bodyPr>
+          <a:lstStyle/>
+          <a:p>
+            <a:r>
+              <a:rPr lang="en-US" dirty="0"/>
+              <a:t>Examines monetary cost of travel (vertical axis) as a function of number of weeks booked ahead (horizontal axis)</a:t>
+            </a:r>
+          </a:p>
+          <a:p>
+            <a:r>
+              <a:rPr lang="en-US" i="1" dirty="0"/>
+              <a:t>Faceted</a:t>
+            </a:r>
+            <a:r>
+              <a:rPr lang="en-US" dirty="0"/>
+              <a:t> by six Origin-Destination </a:t>
+            </a:r>
+          </a:p>
+          <a:p>
+            <a:r>
+              <a:rPr lang="en-US" i="1" dirty="0"/>
+              <a:t>Colored</a:t>
+            </a:r>
+            <a:r>
+              <a:rPr lang="en-US" dirty="0"/>
+              <a:t> by mode of travel (</a:t>
+            </a:r>
+            <a:r>
+              <a:rPr lang="en-US" dirty="0">
+                <a:solidFill>
+                  <a:srgbClr val="FF0000"/>
+                </a:solidFill>
+              </a:rPr>
+              <a:t>red = plane</a:t>
+            </a:r>
+            <a:r>
+              <a:rPr lang="en-US" dirty="0"/>
+              <a:t> and </a:t>
+            </a:r>
+            <a:r>
+              <a:rPr lang="en-US" dirty="0">
+                <a:solidFill>
+                  <a:schemeClr val="accent5">
+                    <a:lumMod val="50000"/>
+                  </a:schemeClr>
+                </a:solidFill>
+              </a:rPr>
+              <a:t>train = blue</a:t>
+            </a:r>
+            <a:r>
+              <a:rPr lang="en-US" dirty="0"/>
+              <a:t>) </a:t>
+            </a:r>
+          </a:p>
+          <a:p>
+            <a:r>
+              <a:rPr lang="en-US" dirty="0"/>
+              <a:t>Note the fifth variable: distance (km) between each Origin &amp; Destination</a:t>
+            </a:r>
+          </a:p>
+          <a:p>
+            <a:r>
+              <a:rPr lang="en-US" dirty="0"/>
+              <a:t>Note the legend</a:t>
+            </a:r>
+          </a:p>
+        </p:txBody>
+      </p:sp>
+      <p:pic>
+        <p:nvPicPr>
+          <p:cNvPr id="4" name="Picture 3">
+            <a:extLst>
+              <a:ext uri="{FF2B5EF4-FFF2-40B4-BE49-F238E27FC236}">
+                <a16:creationId xmlns:a16="http://schemas.microsoft.com/office/drawing/2014/main" id="{B16C7AF9-AF33-4854-B423-BF755ECE8C7C}"/>
+              </a:ext>
+            </a:extLst>
+          </p:cNvPr>
+          <p:cNvPicPr>
+            <a:picLocks noChangeAspect="1"/>
+          </p:cNvPicPr>
+          <p:nvPr/>
+        </p:nvPicPr>
+        <p:blipFill>
+          <a:blip r:embed="rId3"/>
+          <a:stretch>
+            <a:fillRect/>
+          </a:stretch>
+        </p:blipFill>
+        <p:spPr>
+          <a:xfrm>
+            <a:off x="838200" y="308838"/>
+            <a:ext cx="4970170" cy="6240324"/>
+          </a:xfrm>
+          <a:prstGeom prst="rect">
+            <a:avLst/>
+          </a:prstGeom>
+        </p:spPr>
+      </p:pic>
+      <p:sp>
+        <p:nvSpPr>
+          <p:cNvPr id="12" name="Title 4">
+            <a:extLst>
+              <a:ext uri="{FF2B5EF4-FFF2-40B4-BE49-F238E27FC236}">
+                <a16:creationId xmlns:a16="http://schemas.microsoft.com/office/drawing/2014/main" id="{4E8010EC-8516-4CF7-BF65-6A01A780A0AC}"/>
+              </a:ext>
+            </a:extLst>
+          </p:cNvPr>
+          <p:cNvSpPr txBox="1">
+            <a:spLocks/>
+          </p:cNvSpPr>
+          <p:nvPr/>
+        </p:nvSpPr>
+        <p:spPr>
+          <a:xfrm>
+            <a:off x="6172200" y="381792"/>
+            <a:ext cx="5181599" cy="1325563"/>
+          </a:xfrm>
+          <a:prstGeom prst="plaque">
+            <a:avLst/>
+          </a:prstGeom>
+          <a:solidFill>
+            <a:schemeClr val="bg1">
+              <a:alpha val="82000"/>
+            </a:schemeClr>
+          </a:solidFill>
+        </p:spPr>
+        <p:txBody>
+          <a:bodyPr vert="horz" lIns="91440" tIns="45720" rIns="91440" bIns="45720" rtlCol="0" anchor="ctr">
+            <a:normAutofit fontScale="97500"/>
+          </a:bodyPr>
+          <a:lstStyle>
+            <a:lvl1pPr algn="l" defTabSz="914400" rtl="0" eaLnBrk="1" latinLnBrk="0" hangingPunct="1">
+              <a:lnSpc>
+                <a:spcPct val="90000"/>
+              </a:lnSpc>
+              <a:spcBef>
+                <a:spcPct val="0"/>
+              </a:spcBef>
+              <a:buNone/>
+              <a:defRPr sz="4400" kern="1200">
+                <a:solidFill>
+                  <a:schemeClr val="tx1"/>
+                </a:solidFill>
+                <a:latin typeface="+mj-lt"/>
+                <a:ea typeface="+mj-ea"/>
+                <a:cs typeface="+mj-cs"/>
+              </a:defRPr>
+            </a:lvl1pPr>
+          </a:lstStyle>
+          <a:p>
+            <a:pPr algn="ctr"/>
+            <a:r>
+              <a:rPr lang="en-US" sz="4000" dirty="0">
+                <a:latin typeface="Britannic Bold" panose="020B0903060703020204" pitchFamily="34" charset="0"/>
+              </a:rPr>
+              <a:t>Original Visualization</a:t>
+            </a:r>
+          </a:p>
+        </p:txBody>
+      </p:sp>
+      <p:sp>
+        <p:nvSpPr>
+          <p:cNvPr id="13" name="Title 4">
+            <a:extLst>
+              <a:ext uri="{FF2B5EF4-FFF2-40B4-BE49-F238E27FC236}">
+                <a16:creationId xmlns:a16="http://schemas.microsoft.com/office/drawing/2014/main" id="{8B91EBF1-F3B2-44A5-8DE4-BCAF40CF75B0}"/>
+              </a:ext>
+            </a:extLst>
+          </p:cNvPr>
+          <p:cNvSpPr txBox="1">
+            <a:spLocks/>
+          </p:cNvSpPr>
+          <p:nvPr/>
+        </p:nvSpPr>
+        <p:spPr>
+          <a:xfrm>
+            <a:off x="6353176" y="531812"/>
+            <a:ext cx="4833938" cy="1025525"/>
+          </a:xfrm>
+          <a:prstGeom prst="plaque">
+            <a:avLst/>
+          </a:prstGeom>
+          <a:noFill/>
+          <a:ln w="38100">
+            <a:solidFill>
+              <a:schemeClr val="tx1"/>
+            </a:solidFill>
+          </a:ln>
+        </p:spPr>
+        <p:txBody>
+          <a:bodyPr vert="horz" lIns="91440" tIns="45720" rIns="91440" bIns="45720" rtlCol="0" anchor="ctr">
+            <a:normAutofit fontScale="97500"/>
+          </a:bodyPr>
+          <a:lstStyle>
+            <a:lvl1pPr algn="l" defTabSz="914400" rtl="0" eaLnBrk="1" latinLnBrk="0" hangingPunct="1">
+              <a:lnSpc>
+                <a:spcPct val="90000"/>
+              </a:lnSpc>
+              <a:spcBef>
+                <a:spcPct val="0"/>
+              </a:spcBef>
+              <a:buNone/>
+              <a:defRPr sz="4400" kern="1200">
+                <a:solidFill>
+                  <a:schemeClr val="tx1"/>
+                </a:solidFill>
+                <a:latin typeface="+mj-lt"/>
+                <a:ea typeface="+mj-ea"/>
+                <a:cs typeface="+mj-cs"/>
+              </a:defRPr>
+            </a:lvl1pPr>
+          </a:lstStyle>
+          <a:p>
+            <a:pPr algn="ctr"/>
+            <a:endParaRPr lang="en-US" sz="4000" dirty="0">
+              <a:latin typeface="Britannic Bold" panose="020B0903060703020204" pitchFamily="34" charset="0"/>
+            </a:endParaRPr>
+          </a:p>
+        </p:txBody>
+      </p:sp>
+    </p:spTree>
+    <p:extLst>
+      <p:ext uri="{BB962C8B-B14F-4D97-AF65-F5344CB8AC3E}">
+        <p14:creationId xmlns:p14="http://schemas.microsoft.com/office/powerpoint/2010/main" val="2581448155"/>
+      </p:ext>
+    </p:extLst>
+  </p:cSld>
+  <p:clrMapOvr>
+    <a:overrideClrMapping bg1="lt1" tx1="dk1" bg2="lt2" tx2="dk2" accent1="accent1" accent2="accent2" accent3="accent3" accent4="accent4" accent5="accent5" accent6="accent6" hlink="hlink" folHlink="folHlink"/>
+  </p:clrMapOvr>
+</p:sld>
+</file>
+
+<file path=ppt/slides/slide4.xml><?xml version="1.0" encoding="utf-8"?>
+<p:sld xmlns:a="http://schemas.openxmlformats.org/drawingml/2006/main" xmlns:r="http://schemas.openxmlformats.org/officeDocument/2006/relationships" xmlns:p="http://schemas.openxmlformats.org/presentationml/2006/main">
+  <p:cSld>
+    <p:spTree>
+      <p:nvGrpSpPr>
+        <p:cNvPr id="1" name=""/>
+        <p:cNvGrpSpPr/>
+        <p:nvPr/>
+      </p:nvGrpSpPr>
+      <p:grpSpPr>
+        <a:xfrm>
+          <a:off x="0" y="0"/>
+          <a:ext cx="0" cy="0"/>
+          <a:chOff x="0" y="0"/>
+          <a:chExt cx="0" cy="0"/>
+        </a:xfrm>
+      </p:grpSpPr>
+      <p:sp>
+        <p:nvSpPr>
+          <p:cNvPr id="5" name="Title 4">
+            <a:extLst>
+              <a:ext uri="{FF2B5EF4-FFF2-40B4-BE49-F238E27FC236}">
+                <a16:creationId xmlns:a16="http://schemas.microsoft.com/office/drawing/2014/main" id="{828C46BD-7B85-4610-878A-026E2645A48D}"/>
+              </a:ext>
+            </a:extLst>
+          </p:cNvPr>
+          <p:cNvSpPr>
+            <a:spLocks noGrp="1"/>
+          </p:cNvSpPr>
+          <p:nvPr>
+            <p:ph type="title"/>
+          </p:nvPr>
+        </p:nvSpPr>
+        <p:spPr>
+          <a:xfrm>
+            <a:off x="6172200" y="365125"/>
+            <a:ext cx="5181599" cy="1325563"/>
+          </a:xfrm>
+          <a:prstGeom prst="plaque">
+            <a:avLst/>
+          </a:prstGeom>
+          <a:solidFill>
+            <a:schemeClr val="bg1">
+              <a:alpha val="82000"/>
+            </a:schemeClr>
+          </a:solidFill>
+        </p:spPr>
+        <p:txBody>
+          <a:bodyPr>
+            <a:normAutofit fontScale="90000"/>
+          </a:bodyPr>
+          <a:lstStyle/>
+          <a:p>
+            <a:pPr algn="ctr"/>
+            <a:r>
+              <a:rPr lang="en-US" sz="4000" dirty="0">
+                <a:latin typeface="Britannic Bold" panose="020B0903060703020204" pitchFamily="34" charset="0"/>
+              </a:rPr>
+              <a:t>Weaknesses of this visualization?</a:t>
+            </a:r>
+          </a:p>
+        </p:txBody>
+      </p:sp>
+      <p:sp>
+        <p:nvSpPr>
+          <p:cNvPr id="7" name="Content Placeholder 6">
+            <a:extLst>
+              <a:ext uri="{FF2B5EF4-FFF2-40B4-BE49-F238E27FC236}">
+                <a16:creationId xmlns:a16="http://schemas.microsoft.com/office/drawing/2014/main" id="{CC3C6753-C444-49C8-A285-43788753341F}"/>
+              </a:ext>
+            </a:extLst>
+          </p:cNvPr>
+          <p:cNvSpPr>
+            <a:spLocks noGrp="1"/>
+          </p:cNvSpPr>
+          <p:nvPr>
+            <p:ph sz="half" idx="2"/>
+          </p:nvPr>
+        </p:nvSpPr>
+        <p:spPr>
+          <a:solidFill>
+            <a:srgbClr val="F1F3F5"/>
+          </a:solidFill>
+        </p:spPr>
+        <p:txBody>
+          <a:bodyPr anchor="ctr">
+            <a:normAutofit fontScale="92500" lnSpcReduction="10000"/>
+          </a:bodyPr>
+          <a:lstStyle/>
+          <a:p>
+            <a:r>
+              <a:rPr lang="en-US" dirty="0"/>
+              <a:t>No information stated on graph on when the data was collected</a:t>
+            </a:r>
+          </a:p>
+          <a:p>
+            <a:r>
+              <a:rPr lang="en-US" dirty="0"/>
+              <a:t>Not clear how the facets are sorted (if they’re sorted at all)</a:t>
+            </a:r>
+          </a:p>
+          <a:p>
+            <a:r>
+              <a:rPr lang="en-US" dirty="0"/>
+              <a:t>Not clear where the data for the distance (km) represents, unknown source</a:t>
+            </a:r>
+          </a:p>
+          <a:p>
+            <a:r>
+              <a:rPr lang="en-US" dirty="0"/>
+              <a:t>Should we care more about absolute differences in cost (as this graph shows), or relative differences?</a:t>
+            </a:r>
+          </a:p>
+        </p:txBody>
+      </p:sp>
+      <p:pic>
+        <p:nvPicPr>
+          <p:cNvPr id="4" name="Picture 3">
+            <a:extLst>
+              <a:ext uri="{FF2B5EF4-FFF2-40B4-BE49-F238E27FC236}">
+                <a16:creationId xmlns:a16="http://schemas.microsoft.com/office/drawing/2014/main" id="{B16C7AF9-AF33-4854-B423-BF755ECE8C7C}"/>
+              </a:ext>
+            </a:extLst>
+          </p:cNvPr>
+          <p:cNvPicPr>
+            <a:picLocks noChangeAspect="1"/>
+          </p:cNvPicPr>
+          <p:nvPr/>
+        </p:nvPicPr>
+        <p:blipFill>
+          <a:blip r:embed="rId3"/>
+          <a:stretch>
+            <a:fillRect/>
+          </a:stretch>
+        </p:blipFill>
+        <p:spPr>
+          <a:xfrm>
+            <a:off x="355307" y="176107"/>
+            <a:ext cx="5181600" cy="6505786"/>
+          </a:xfrm>
+          <a:prstGeom prst="rect">
+            <a:avLst/>
+          </a:prstGeom>
+        </p:spPr>
+      </p:pic>
+      <p:sp>
+        <p:nvSpPr>
+          <p:cNvPr id="8" name="Title 4">
+            <a:extLst>
+              <a:ext uri="{FF2B5EF4-FFF2-40B4-BE49-F238E27FC236}">
+                <a16:creationId xmlns:a16="http://schemas.microsoft.com/office/drawing/2014/main" id="{A228EEE5-0541-445C-9224-6F0901026F97}"/>
+              </a:ext>
+            </a:extLst>
+          </p:cNvPr>
+          <p:cNvSpPr txBox="1">
+            <a:spLocks/>
+          </p:cNvSpPr>
+          <p:nvPr/>
+        </p:nvSpPr>
+        <p:spPr>
+          <a:xfrm>
+            <a:off x="6353176" y="531812"/>
+            <a:ext cx="4833938" cy="1025525"/>
+          </a:xfrm>
+          <a:prstGeom prst="plaque">
+            <a:avLst/>
+          </a:prstGeom>
+          <a:noFill/>
+          <a:ln w="38100">
+            <a:solidFill>
+              <a:schemeClr val="tx1"/>
+            </a:solidFill>
+          </a:ln>
+        </p:spPr>
+        <p:txBody>
+          <a:bodyPr vert="horz" lIns="91440" tIns="45720" rIns="91440" bIns="45720" rtlCol="0" anchor="ctr">
+            <a:normAutofit fontScale="97500"/>
+          </a:bodyPr>
+          <a:lstStyle>
+            <a:lvl1pPr algn="l" defTabSz="914400" rtl="0" eaLnBrk="1" latinLnBrk="0" hangingPunct="1">
+              <a:lnSpc>
+                <a:spcPct val="90000"/>
+              </a:lnSpc>
+              <a:spcBef>
+                <a:spcPct val="0"/>
+              </a:spcBef>
+              <a:buNone/>
+              <a:defRPr sz="4400" kern="1200">
+                <a:solidFill>
+                  <a:schemeClr val="tx1"/>
+                </a:solidFill>
+                <a:latin typeface="+mj-lt"/>
+                <a:ea typeface="+mj-ea"/>
+                <a:cs typeface="+mj-cs"/>
+              </a:defRPr>
+            </a:lvl1pPr>
+          </a:lstStyle>
+          <a:p>
+            <a:pPr algn="ctr"/>
+            <a:endParaRPr lang="en-US" sz="4000" dirty="0">
+              <a:latin typeface="Britannic Bold" panose="020B0903060703020204" pitchFamily="34" charset="0"/>
+            </a:endParaRPr>
+          </a:p>
+        </p:txBody>
+      </p:sp>
+    </p:spTree>
+    <p:extLst>
+      <p:ext uri="{BB962C8B-B14F-4D97-AF65-F5344CB8AC3E}">
+        <p14:creationId xmlns:p14="http://schemas.microsoft.com/office/powerpoint/2010/main" val="2136486388"/>
+      </p:ext>
+    </p:extLst>
+  </p:cSld>
+  <p:clrMapOvr>
+    <a:overrideClrMapping bg1="lt1" tx1="dk1" bg2="lt2" tx2="dk2" accent1="accent1" accent2="accent2" accent3="accent3" accent4="accent4" accent5="accent5" accent6="accent6" hlink="hlink" folHlink="folHlink"/>
+  </p:clrMapOvr>
+</p:sld>
+</file>
+
+<file path=ppt/slides/slide5.xml><?xml version="1.0" encoding="utf-8"?>
+<p:sld xmlns:a="http://schemas.openxmlformats.org/drawingml/2006/main" xmlns:r="http://schemas.openxmlformats.org/officeDocument/2006/relationships" xmlns:p="http://schemas.openxmlformats.org/presentationml/2006/main">
+  <p:cSld>
     <p:bg>
       <p:bgPr>
         <a:blipFill dpi="0" rotWithShape="1">
           <a:blip r:embed="rId3">
-            <a:alphaModFix amt="30000"/>
+            <a:alphaModFix amt="16000"/>
             <a:lum/>
+            <a:extLst>
+              <a:ext uri="{BEBA8EAE-BF5A-486C-A8C5-ECC9F3942E4B}">
+                <a14:imgProps xmlns:a14="http://schemas.microsoft.com/office/drawing/2010/main">
+                  <a14:imgLayer r:embed="rId4">
+                    <a14:imgEffect>
+                      <a14:sharpenSoften amount="-12000"/>
+                    </a14:imgEffect>
+                    <a14:imgEffect>
+                      <a14:colorTemperature colorTemp="9956"/>
+                    </a14:imgEffect>
+                    <a14:imgEffect>
+                      <a14:saturation sat="80000"/>
+                    </a14:imgEffect>
+                    <a14:imgEffect>
+                      <a14:brightnessContrast contrast="4000"/>
+                    </a14:imgEffect>
+                  </a14:imgLayer>
+                </a14:imgProps>
+              </a:ext>
+            </a:extLst>
           </a:blip>
           <a:srcRect/>
           <a:stretch>
@@ -3352,211 +5480,12 @@
           <a:chExt cx="0" cy="0"/>
         </a:xfrm>
       </p:grpSpPr>
-      <p:sp>
-        <p:nvSpPr>
-          <p:cNvPr id="2" name="Title 1">
-            <a:extLst>
-              <a:ext uri="{FF2B5EF4-FFF2-40B4-BE49-F238E27FC236}">
-                <a16:creationId xmlns:a16="http://schemas.microsoft.com/office/drawing/2014/main" id="{252F0A08-81C2-46B3-8E80-BFA23C4B292A}"/>
-              </a:ext>
-            </a:extLst>
-          </p:cNvPr>
-          <p:cNvSpPr>
-            <a:spLocks noGrp="1"/>
-          </p:cNvSpPr>
-          <p:nvPr>
-            <p:ph type="ctrTitle"/>
-          </p:nvPr>
-        </p:nvSpPr>
-        <p:spPr/>
-        <p:txBody>
-          <a:bodyPr>
-            <a:normAutofit/>
-          </a:bodyPr>
-          <a:lstStyle/>
-          <a:p>
-            <a:r>
-              <a:rPr lang="en-US" b="1" dirty="0"/>
-              <a:t>Trains vs Planes:</a:t>
-            </a:r>
-            <a:br>
-              <a:rPr lang="en-US" b="1" dirty="0"/>
-            </a:br>
-            <a:r>
-              <a:rPr lang="en-US" b="1" dirty="0"/>
-              <a:t>The True Cost of Travel</a:t>
-            </a:r>
-          </a:p>
-        </p:txBody>
-      </p:sp>
-      <p:sp>
-        <p:nvSpPr>
-          <p:cNvPr id="3" name="Subtitle 2">
-            <a:extLst>
-              <a:ext uri="{FF2B5EF4-FFF2-40B4-BE49-F238E27FC236}">
-                <a16:creationId xmlns:a16="http://schemas.microsoft.com/office/drawing/2014/main" id="{E72E280E-1F09-4B49-A4EB-DCA8BB202F48}"/>
-              </a:ext>
-            </a:extLst>
-          </p:cNvPr>
-          <p:cNvSpPr>
-            <a:spLocks noGrp="1"/>
-          </p:cNvSpPr>
-          <p:nvPr>
-            <p:ph type="subTitle" idx="1"/>
-          </p:nvPr>
-        </p:nvSpPr>
-        <p:spPr/>
-        <p:txBody>
-          <a:bodyPr/>
-          <a:lstStyle/>
-          <a:p>
-            <a:r>
-              <a:rPr lang="en-US" b="1" dirty="0"/>
-              <a:t>Makeover Monday</a:t>
-            </a:r>
-          </a:p>
-          <a:p>
-            <a:r>
-              <a:rPr lang="en-US" b="1" dirty="0" err="1"/>
-              <a:t>Suyin</a:t>
-            </a:r>
-            <a:r>
-              <a:rPr lang="en-US" b="1" dirty="0"/>
-              <a:t> Lee &amp; Andreas </a:t>
-            </a:r>
-            <a:r>
-              <a:rPr lang="en-US" b="1" dirty="0" err="1"/>
-              <a:t>Lezis</a:t>
-            </a:r>
-            <a:endParaRPr lang="en-US" b="1" dirty="0"/>
-          </a:p>
-        </p:txBody>
-      </p:sp>
-    </p:spTree>
-    <p:extLst>
-      <p:ext uri="{BB962C8B-B14F-4D97-AF65-F5344CB8AC3E}">
-        <p14:creationId xmlns:p14="http://schemas.microsoft.com/office/powerpoint/2010/main" val="3611971250"/>
-      </p:ext>
-    </p:extLst>
-  </p:cSld>
-  <p:clrMapOvr>
-    <a:overrideClrMapping bg1="lt1" tx1="dk1" bg2="lt2" tx2="dk2" accent1="accent1" accent2="accent2" accent3="accent3" accent4="accent4" accent5="accent5" accent6="accent6" hlink="hlink" folHlink="folHlink"/>
-  </p:clrMapOvr>
-</p:sld>
-</file>
-
-<file path=ppt/slides/slide10.xml><?xml version="1.0" encoding="utf-8"?>
-<p:sld xmlns:a="http://schemas.openxmlformats.org/drawingml/2006/main" xmlns:r="http://schemas.openxmlformats.org/officeDocument/2006/relationships" xmlns:p="http://schemas.openxmlformats.org/presentationml/2006/main">
-  <p:cSld>
-    <p:bg>
-      <p:bgPr>
-        <a:blipFill dpi="0" rotWithShape="1">
-          <a:blip r:embed="rId3">
-            <a:alphaModFix amt="30000"/>
-            <a:lum/>
-          </a:blip>
-          <a:srcRect/>
-          <a:stretch>
-            <a:fillRect t="-11000" b="-11000"/>
-          </a:stretch>
-        </a:blipFill>
-        <a:effectLst/>
-      </p:bgPr>
-    </p:bg>
-    <p:spTree>
-      <p:nvGrpSpPr>
-        <p:cNvPr id="1" name=""/>
-        <p:cNvGrpSpPr/>
-        <p:nvPr/>
-      </p:nvGrpSpPr>
-      <p:grpSpPr>
-        <a:xfrm>
-          <a:off x="0" y="0"/>
-          <a:ext cx="0" cy="0"/>
-          <a:chOff x="0" y="0"/>
-          <a:chExt cx="0" cy="0"/>
-        </a:xfrm>
-      </p:grpSpPr>
-      <p:sp>
-        <p:nvSpPr>
-          <p:cNvPr id="2" name="Title 1">
-            <a:extLst>
-              <a:ext uri="{FF2B5EF4-FFF2-40B4-BE49-F238E27FC236}">
-                <a16:creationId xmlns:a16="http://schemas.microsoft.com/office/drawing/2014/main" id="{11ACE9FC-7DAF-4A81-907A-EAE862A0C923}"/>
-              </a:ext>
-            </a:extLst>
-          </p:cNvPr>
-          <p:cNvSpPr>
-            <a:spLocks noGrp="1"/>
-          </p:cNvSpPr>
-          <p:nvPr>
-            <p:ph type="title"/>
-          </p:nvPr>
-        </p:nvSpPr>
-        <p:spPr>
-          <a:xfrm>
-            <a:off x="838200" y="365125"/>
-            <a:ext cx="5257800" cy="1325563"/>
-          </a:xfrm>
-        </p:spPr>
-        <p:txBody>
-          <a:bodyPr/>
-          <a:lstStyle/>
-          <a:p>
-            <a:r>
-              <a:rPr lang="en-US" b="1" dirty="0"/>
-              <a:t>Improving the Original Visualization</a:t>
-            </a:r>
-          </a:p>
-        </p:txBody>
-      </p:sp>
-      <p:sp>
-        <p:nvSpPr>
-          <p:cNvPr id="3" name="Content Placeholder 2">
-            <a:extLst>
-              <a:ext uri="{FF2B5EF4-FFF2-40B4-BE49-F238E27FC236}">
-                <a16:creationId xmlns:a16="http://schemas.microsoft.com/office/drawing/2014/main" id="{DDA52849-0140-4570-A1F0-CB0B00611132}"/>
-              </a:ext>
-            </a:extLst>
-          </p:cNvPr>
-          <p:cNvSpPr>
-            <a:spLocks noGrp="1"/>
-          </p:cNvSpPr>
-          <p:nvPr>
-            <p:ph sz="half" idx="1"/>
-          </p:nvPr>
-        </p:nvSpPr>
-        <p:spPr>
-          <a:solidFill>
-            <a:srgbClr val="F2F3F5"/>
-          </a:solidFill>
-        </p:spPr>
-        <p:txBody>
-          <a:bodyPr/>
-          <a:lstStyle/>
-          <a:p>
-            <a:r>
-              <a:rPr lang="en-US" dirty="0"/>
-              <a:t>Let’s face it… the animation makes it harder to understand the data, not easier</a:t>
-            </a:r>
-          </a:p>
-          <a:p>
-            <a:r>
-              <a:rPr lang="en-US" dirty="0"/>
-              <a:t>The assumed delayed applied to all plane trips may not be reasonable, or universally applicable – there are ways of conveying the spread of data</a:t>
-            </a:r>
-          </a:p>
-          <a:p>
-            <a:endParaRPr lang="en-US" dirty="0"/>
-          </a:p>
-        </p:txBody>
-      </p:sp>
       <p:pic>
         <p:nvPicPr>
           <p:cNvPr id="6" name="Content Placeholder 5">
             <a:extLst>
               <a:ext uri="{FF2B5EF4-FFF2-40B4-BE49-F238E27FC236}">
-                <a16:creationId xmlns:a16="http://schemas.microsoft.com/office/drawing/2014/main" id="{64CAB0A1-B04C-4AF1-8C61-062543C6F698}"/>
+                <a16:creationId xmlns:a16="http://schemas.microsoft.com/office/drawing/2014/main" id="{670F061B-0A3E-4BF9-87E8-79A7E08DF507}"/>
               </a:ext>
             </a:extLst>
           </p:cNvPr>
@@ -3564,11 +5493,11 @@
             <a:picLocks noGrp="1" noChangeAspect="1"/>
           </p:cNvPicPr>
           <p:nvPr>
-            <p:ph sz="half" idx="2"/>
+            <p:ph sz="half" idx="1"/>
           </p:nvPr>
         </p:nvPicPr>
         <p:blipFill>
-          <a:blip r:embed="rId4">
+          <a:blip r:embed="rId5">
             <a:extLst>
               <a:ext uri="{28A0092B-C50C-407E-A947-70E740481C1C}">
                 <a14:useLocalDpi xmlns:a14="http://schemas.microsoft.com/office/drawing/2010/main" val="0"/>
@@ -3581,500 +5510,79 @@
         </p:blipFill>
         <p:spPr>
           <a:xfrm>
-            <a:off x="6096000" y="521208"/>
-            <a:ext cx="5815584" cy="5815584"/>
+            <a:off x="431762" y="248747"/>
+            <a:ext cx="5284409" cy="6360506"/>
           </a:xfrm>
         </p:spPr>
       </p:pic>
-    </p:spTree>
-    <p:extLst>
-      <p:ext uri="{BB962C8B-B14F-4D97-AF65-F5344CB8AC3E}">
-        <p14:creationId xmlns:p14="http://schemas.microsoft.com/office/powerpoint/2010/main" val="2675873568"/>
-      </p:ext>
-    </p:extLst>
-  </p:cSld>
-  <p:clrMapOvr>
-    <a:overrideClrMapping bg1="lt1" tx1="dk1" bg2="lt2" tx2="dk2" accent1="accent1" accent2="accent2" accent3="accent3" accent4="accent4" accent5="accent5" accent6="accent6" hlink="hlink" folHlink="folHlink"/>
-  </p:clrMapOvr>
-</p:sld>
-</file>
-
-<file path=ppt/slides/slide11.xml><?xml version="1.0" encoding="utf-8"?>
-<p:sld xmlns:a="http://schemas.openxmlformats.org/drawingml/2006/main" xmlns:r="http://schemas.openxmlformats.org/officeDocument/2006/relationships" xmlns:p="http://schemas.openxmlformats.org/presentationml/2006/main">
-  <p:cSld>
-    <p:bg>
-      <p:bgPr>
-        <a:blipFill dpi="0" rotWithShape="1">
-          <a:blip r:embed="rId3">
-            <a:alphaModFix amt="30000"/>
-            <a:lum/>
-          </a:blip>
-          <a:srcRect/>
-          <a:stretch>
-            <a:fillRect t="-11000" b="-11000"/>
-          </a:stretch>
-        </a:blipFill>
-        <a:effectLst/>
-      </p:bgPr>
-    </p:bg>
-    <p:spTree>
-      <p:nvGrpSpPr>
-        <p:cNvPr id="1" name=""/>
-        <p:cNvGrpSpPr/>
-        <p:nvPr/>
-      </p:nvGrpSpPr>
-      <p:grpSpPr>
-        <a:xfrm>
-          <a:off x="0" y="0"/>
-          <a:ext cx="0" cy="0"/>
-          <a:chOff x="0" y="0"/>
-          <a:chExt cx="0" cy="0"/>
-        </a:xfrm>
-      </p:grpSpPr>
-      <p:sp>
-        <p:nvSpPr>
-          <p:cNvPr id="2" name="Title 1">
-            <a:extLst>
-              <a:ext uri="{FF2B5EF4-FFF2-40B4-BE49-F238E27FC236}">
-                <a16:creationId xmlns:a16="http://schemas.microsoft.com/office/drawing/2014/main" id="{3F14FB01-A1F6-46BE-9810-500284D63B6B}"/>
-              </a:ext>
-            </a:extLst>
-          </p:cNvPr>
-          <p:cNvSpPr>
-            <a:spLocks noGrp="1"/>
-          </p:cNvSpPr>
-          <p:nvPr>
-            <p:ph type="title"/>
-          </p:nvPr>
-        </p:nvSpPr>
-        <p:spPr/>
-        <p:txBody>
-          <a:bodyPr/>
-          <a:lstStyle/>
-          <a:p>
-            <a:r>
-              <a:rPr lang="en-US" b="1" dirty="0"/>
-              <a:t>Challenges</a:t>
-            </a:r>
-          </a:p>
-        </p:txBody>
-      </p:sp>
-      <p:sp>
-        <p:nvSpPr>
-          <p:cNvPr id="3" name="Content Placeholder 2">
-            <a:extLst>
-              <a:ext uri="{FF2B5EF4-FFF2-40B4-BE49-F238E27FC236}">
-                <a16:creationId xmlns:a16="http://schemas.microsoft.com/office/drawing/2014/main" id="{FECAB945-8F13-4CDA-80D9-2B7B6066653A}"/>
-              </a:ext>
-            </a:extLst>
-          </p:cNvPr>
-          <p:cNvSpPr>
-            <a:spLocks noGrp="1"/>
-          </p:cNvSpPr>
-          <p:nvPr>
-            <p:ph sz="half" idx="1"/>
-          </p:nvPr>
-        </p:nvSpPr>
-        <p:spPr/>
-        <p:txBody>
-          <a:bodyPr/>
-          <a:lstStyle/>
-          <a:p>
-            <a:endParaRPr lang="en-US"/>
-          </a:p>
-        </p:txBody>
-      </p:sp>
-      <p:sp>
-        <p:nvSpPr>
-          <p:cNvPr id="4" name="Content Placeholder 3">
-            <a:extLst>
-              <a:ext uri="{FF2B5EF4-FFF2-40B4-BE49-F238E27FC236}">
-                <a16:creationId xmlns:a16="http://schemas.microsoft.com/office/drawing/2014/main" id="{1C173A96-D5B9-4DF6-ABB2-74F3288DBFFD}"/>
-              </a:ext>
-            </a:extLst>
-          </p:cNvPr>
-          <p:cNvSpPr>
-            <a:spLocks noGrp="1"/>
-          </p:cNvSpPr>
-          <p:nvPr>
-            <p:ph sz="half" idx="2"/>
-          </p:nvPr>
-        </p:nvSpPr>
-        <p:spPr/>
-        <p:txBody>
-          <a:bodyPr/>
-          <a:lstStyle/>
-          <a:p>
-            <a:endParaRPr lang="en-US"/>
-          </a:p>
-        </p:txBody>
-      </p:sp>
-    </p:spTree>
-    <p:extLst>
-      <p:ext uri="{BB962C8B-B14F-4D97-AF65-F5344CB8AC3E}">
-        <p14:creationId xmlns:p14="http://schemas.microsoft.com/office/powerpoint/2010/main" val="3676238569"/>
-      </p:ext>
-    </p:extLst>
-  </p:cSld>
-  <p:clrMapOvr>
-    <a:overrideClrMapping bg1="lt1" tx1="dk1" bg2="lt2" tx2="dk2" accent1="accent1" accent2="accent2" accent3="accent3" accent4="accent4" accent5="accent5" accent6="accent6" hlink="hlink" folHlink="folHlink"/>
-  </p:clrMapOvr>
-</p:sld>
-</file>
-
-<file path=ppt/slides/slide12.xml><?xml version="1.0" encoding="utf-8"?>
-<p:sld xmlns:a="http://schemas.openxmlformats.org/drawingml/2006/main" xmlns:r="http://schemas.openxmlformats.org/officeDocument/2006/relationships" xmlns:p="http://schemas.openxmlformats.org/presentationml/2006/main">
-  <p:cSld>
-    <p:bg>
-      <p:bgPr>
-        <a:blipFill dpi="0" rotWithShape="1">
-          <a:blip r:embed="rId3">
-            <a:alphaModFix amt="30000"/>
-            <a:lum/>
-          </a:blip>
-          <a:srcRect/>
-          <a:stretch>
-            <a:fillRect t="-11000" b="-11000"/>
-          </a:stretch>
-        </a:blipFill>
-        <a:effectLst/>
-      </p:bgPr>
-    </p:bg>
-    <p:spTree>
-      <p:nvGrpSpPr>
-        <p:cNvPr id="1" name=""/>
-        <p:cNvGrpSpPr/>
-        <p:nvPr/>
-      </p:nvGrpSpPr>
-      <p:grpSpPr>
-        <a:xfrm>
-          <a:off x="0" y="0"/>
-          <a:ext cx="0" cy="0"/>
-          <a:chOff x="0" y="0"/>
-          <a:chExt cx="0" cy="0"/>
-        </a:xfrm>
-      </p:grpSpPr>
-      <p:sp>
-        <p:nvSpPr>
-          <p:cNvPr id="2" name="Title 1">
-            <a:extLst>
-              <a:ext uri="{FF2B5EF4-FFF2-40B4-BE49-F238E27FC236}">
-                <a16:creationId xmlns:a16="http://schemas.microsoft.com/office/drawing/2014/main" id="{AE91C00E-DA2D-478D-976F-161FABE354B1}"/>
-              </a:ext>
-            </a:extLst>
-          </p:cNvPr>
-          <p:cNvSpPr>
-            <a:spLocks noGrp="1"/>
-          </p:cNvSpPr>
-          <p:nvPr>
-            <p:ph type="title"/>
-          </p:nvPr>
-        </p:nvSpPr>
-        <p:spPr/>
-        <p:txBody>
-          <a:bodyPr/>
-          <a:lstStyle/>
-          <a:p>
-            <a:r>
-              <a:rPr lang="en-US" b="1" dirty="0"/>
-              <a:t>Closing Thoughts</a:t>
-            </a:r>
-          </a:p>
-        </p:txBody>
-      </p:sp>
-      <p:sp>
-        <p:nvSpPr>
-          <p:cNvPr id="3" name="Content Placeholder 2">
-            <a:extLst>
-              <a:ext uri="{FF2B5EF4-FFF2-40B4-BE49-F238E27FC236}">
-                <a16:creationId xmlns:a16="http://schemas.microsoft.com/office/drawing/2014/main" id="{4AAAB96C-DDD5-4720-A7C0-66D77E0282F8}"/>
-              </a:ext>
-            </a:extLst>
-          </p:cNvPr>
-          <p:cNvSpPr>
-            <a:spLocks noGrp="1"/>
-          </p:cNvSpPr>
-          <p:nvPr>
-            <p:ph sz="half" idx="1"/>
-          </p:nvPr>
-        </p:nvSpPr>
-        <p:spPr/>
-        <p:txBody>
-          <a:bodyPr/>
-          <a:lstStyle/>
-          <a:p>
-            <a:endParaRPr lang="en-US"/>
-          </a:p>
-        </p:txBody>
-      </p:sp>
-      <p:sp>
-        <p:nvSpPr>
-          <p:cNvPr id="4" name="Content Placeholder 3">
-            <a:extLst>
-              <a:ext uri="{FF2B5EF4-FFF2-40B4-BE49-F238E27FC236}">
-                <a16:creationId xmlns:a16="http://schemas.microsoft.com/office/drawing/2014/main" id="{669DFBCA-B4DA-404A-96B2-4128478F16B9}"/>
-              </a:ext>
-            </a:extLst>
-          </p:cNvPr>
-          <p:cNvSpPr>
-            <a:spLocks noGrp="1"/>
-          </p:cNvSpPr>
-          <p:nvPr>
-            <p:ph sz="half" idx="2"/>
-          </p:nvPr>
-        </p:nvSpPr>
-        <p:spPr/>
-        <p:txBody>
-          <a:bodyPr/>
-          <a:lstStyle/>
-          <a:p>
-            <a:endParaRPr lang="en-US"/>
-          </a:p>
-        </p:txBody>
-      </p:sp>
-    </p:spTree>
-    <p:extLst>
-      <p:ext uri="{BB962C8B-B14F-4D97-AF65-F5344CB8AC3E}">
-        <p14:creationId xmlns:p14="http://schemas.microsoft.com/office/powerpoint/2010/main" val="2677055334"/>
-      </p:ext>
-    </p:extLst>
-  </p:cSld>
-  <p:clrMapOvr>
-    <a:overrideClrMapping bg1="lt1" tx1="dk1" bg2="lt2" tx2="dk2" accent1="accent1" accent2="accent2" accent3="accent3" accent4="accent4" accent5="accent5" accent6="accent6" hlink="hlink" folHlink="folHlink"/>
-  </p:clrMapOvr>
-</p:sld>
-</file>
-
-<file path=ppt/slides/slide2.xml><?xml version="1.0" encoding="utf-8"?>
-<p:sld xmlns:a="http://schemas.openxmlformats.org/drawingml/2006/main" xmlns:r="http://schemas.openxmlformats.org/officeDocument/2006/relationships" xmlns:p="http://schemas.openxmlformats.org/presentationml/2006/main">
-  <p:cSld>
-    <p:bg>
-      <p:bgPr>
-        <a:blipFill dpi="0" rotWithShape="1">
-          <a:blip r:embed="rId3">
-            <a:alphaModFix amt="30000"/>
-            <a:lum/>
-          </a:blip>
-          <a:srcRect/>
-          <a:stretch>
-            <a:fillRect t="-11000" b="-11000"/>
-          </a:stretch>
-        </a:blipFill>
-        <a:effectLst/>
-      </p:bgPr>
-    </p:bg>
-    <p:spTree>
-      <p:nvGrpSpPr>
-        <p:cNvPr id="1" name=""/>
-        <p:cNvGrpSpPr/>
-        <p:nvPr/>
-      </p:nvGrpSpPr>
-      <p:grpSpPr>
-        <a:xfrm>
-          <a:off x="0" y="0"/>
-          <a:ext cx="0" cy="0"/>
-          <a:chOff x="0" y="0"/>
-          <a:chExt cx="0" cy="0"/>
-        </a:xfrm>
-      </p:grpSpPr>
-      <p:sp>
-        <p:nvSpPr>
-          <p:cNvPr id="2" name="Title 1">
-            <a:extLst>
-              <a:ext uri="{FF2B5EF4-FFF2-40B4-BE49-F238E27FC236}">
-                <a16:creationId xmlns:a16="http://schemas.microsoft.com/office/drawing/2014/main" id="{AE91C00E-DA2D-478D-976F-161FABE354B1}"/>
-              </a:ext>
-            </a:extLst>
-          </p:cNvPr>
-          <p:cNvSpPr>
-            <a:spLocks noGrp="1"/>
-          </p:cNvSpPr>
-          <p:nvPr>
-            <p:ph type="title"/>
-          </p:nvPr>
-        </p:nvSpPr>
-        <p:spPr/>
-        <p:txBody>
-          <a:bodyPr/>
-          <a:lstStyle/>
-          <a:p>
-            <a:r>
-              <a:rPr lang="en-US" b="1" dirty="0"/>
-              <a:t>Context: </a:t>
-            </a:r>
-            <a:r>
-              <a:rPr lang="en-US" b="1" i="1" dirty="0"/>
-              <a:t>Deutsche </a:t>
-            </a:r>
-            <a:r>
-              <a:rPr lang="en-US" b="1" i="1" dirty="0" err="1"/>
-              <a:t>Welle</a:t>
-            </a:r>
-            <a:endParaRPr lang="en-US" b="1" dirty="0"/>
-          </a:p>
-        </p:txBody>
-      </p:sp>
-      <p:sp>
-        <p:nvSpPr>
-          <p:cNvPr id="3" name="Content Placeholder 2">
-            <a:extLst>
-              <a:ext uri="{FF2B5EF4-FFF2-40B4-BE49-F238E27FC236}">
-                <a16:creationId xmlns:a16="http://schemas.microsoft.com/office/drawing/2014/main" id="{4AAAB96C-DDD5-4720-A7C0-66D77E0282F8}"/>
-              </a:ext>
-            </a:extLst>
-          </p:cNvPr>
-          <p:cNvSpPr>
-            <a:spLocks noGrp="1"/>
-          </p:cNvSpPr>
-          <p:nvPr>
-            <p:ph sz="half" idx="1"/>
-          </p:nvPr>
-        </p:nvSpPr>
-        <p:spPr/>
-        <p:txBody>
-          <a:bodyPr/>
-          <a:lstStyle/>
-          <a:p>
-            <a:endParaRPr lang="en-US"/>
-          </a:p>
-        </p:txBody>
-      </p:sp>
-      <p:sp>
-        <p:nvSpPr>
-          <p:cNvPr id="4" name="Content Placeholder 3">
-            <a:extLst>
-              <a:ext uri="{FF2B5EF4-FFF2-40B4-BE49-F238E27FC236}">
-                <a16:creationId xmlns:a16="http://schemas.microsoft.com/office/drawing/2014/main" id="{669DFBCA-B4DA-404A-96B2-4128478F16B9}"/>
-              </a:ext>
-            </a:extLst>
-          </p:cNvPr>
-          <p:cNvSpPr>
-            <a:spLocks noGrp="1"/>
-          </p:cNvSpPr>
-          <p:nvPr>
-            <p:ph sz="half" idx="2"/>
-          </p:nvPr>
-        </p:nvSpPr>
-        <p:spPr/>
-        <p:txBody>
-          <a:bodyPr/>
-          <a:lstStyle/>
-          <a:p>
-            <a:endParaRPr lang="en-US"/>
-          </a:p>
-        </p:txBody>
-      </p:sp>
-    </p:spTree>
-    <p:extLst>
-      <p:ext uri="{BB962C8B-B14F-4D97-AF65-F5344CB8AC3E}">
-        <p14:creationId xmlns:p14="http://schemas.microsoft.com/office/powerpoint/2010/main" val="347150910"/>
-      </p:ext>
-    </p:extLst>
-  </p:cSld>
-  <p:clrMapOvr>
-    <a:overrideClrMapping bg1="lt1" tx1="dk1" bg2="lt2" tx2="dk2" accent1="accent1" accent2="accent2" accent3="accent3" accent4="accent4" accent5="accent5" accent6="accent6" hlink="hlink" folHlink="folHlink"/>
-  </p:clrMapOvr>
-</p:sld>
-</file>
-
-<file path=ppt/slides/slide3.xml><?xml version="1.0" encoding="utf-8"?>
-<p:sld xmlns:a="http://schemas.openxmlformats.org/drawingml/2006/main" xmlns:r="http://schemas.openxmlformats.org/officeDocument/2006/relationships" xmlns:p="http://schemas.openxmlformats.org/presentationml/2006/main">
-  <p:cSld>
-    <p:bg>
-      <p:bgPr>
-        <a:blipFill dpi="0" rotWithShape="1">
-          <a:blip r:embed="rId3">
-            <a:alphaModFix amt="30000"/>
-            <a:lum/>
-          </a:blip>
-          <a:srcRect/>
-          <a:stretch>
-            <a:fillRect t="-11000" b="-11000"/>
-          </a:stretch>
-        </a:blipFill>
-        <a:effectLst/>
-      </p:bgPr>
-    </p:bg>
-    <p:spTree>
-      <p:nvGrpSpPr>
-        <p:cNvPr id="1" name=""/>
-        <p:cNvGrpSpPr/>
-        <p:nvPr/>
-      </p:nvGrpSpPr>
-      <p:grpSpPr>
-        <a:xfrm>
-          <a:off x="0" y="0"/>
-          <a:ext cx="0" cy="0"/>
-          <a:chOff x="0" y="0"/>
-          <a:chExt cx="0" cy="0"/>
-        </a:xfrm>
-      </p:grpSpPr>
-      <p:sp>
-        <p:nvSpPr>
-          <p:cNvPr id="5" name="Title 4">
-            <a:extLst>
-              <a:ext uri="{FF2B5EF4-FFF2-40B4-BE49-F238E27FC236}">
-                <a16:creationId xmlns:a16="http://schemas.microsoft.com/office/drawing/2014/main" id="{828C46BD-7B85-4610-878A-026E2645A48D}"/>
-              </a:ext>
-            </a:extLst>
-          </p:cNvPr>
-          <p:cNvSpPr>
-            <a:spLocks noGrp="1"/>
-          </p:cNvSpPr>
-          <p:nvPr>
-            <p:ph type="title"/>
-          </p:nvPr>
+      <p:sp>
+        <p:nvSpPr>
+          <p:cNvPr id="7" name="Title 4">
+            <a:extLst>
+              <a:ext uri="{FF2B5EF4-FFF2-40B4-BE49-F238E27FC236}">
+                <a16:creationId xmlns:a16="http://schemas.microsoft.com/office/drawing/2014/main" id="{8D0CE611-6544-4C82-ABF3-7BCBE56844AE}"/>
+              </a:ext>
+            </a:extLst>
+          </p:cNvPr>
+          <p:cNvSpPr txBox="1">
+            <a:spLocks/>
+          </p:cNvSpPr>
+          <p:nvPr/>
         </p:nvSpPr>
         <p:spPr>
           <a:xfrm>
-            <a:off x="6172200" y="365125"/>
-            <a:ext cx="5181600" cy="1325563"/>
+            <a:off x="6179345" y="381792"/>
+            <a:ext cx="5181599" cy="1325563"/>
           </a:xfrm>
+          <a:prstGeom prst="plaque">
+            <a:avLst/>
+          </a:prstGeom>
+          <a:solidFill>
+            <a:schemeClr val="bg1">
+              <a:alpha val="82000"/>
+            </a:schemeClr>
+          </a:solidFill>
         </p:spPr>
         <p:txBody>
-          <a:bodyPr/>
-          <a:lstStyle/>
-          <a:p>
-            <a:r>
-              <a:rPr lang="en-US" b="1" dirty="0"/>
-              <a:t>Original Visualization: Cost</a:t>
-            </a:r>
-          </a:p>
-        </p:txBody>
-      </p:sp>
-      <p:sp>
-        <p:nvSpPr>
-          <p:cNvPr id="6" name="Content Placeholder 5">
-            <a:extLst>
-              <a:ext uri="{FF2B5EF4-FFF2-40B4-BE49-F238E27FC236}">
-                <a16:creationId xmlns:a16="http://schemas.microsoft.com/office/drawing/2014/main" id="{61C264B5-B08F-4510-A247-AEFB264E9EF5}"/>
-              </a:ext>
-            </a:extLst>
-          </p:cNvPr>
-          <p:cNvSpPr>
-            <a:spLocks noGrp="1"/>
-          </p:cNvSpPr>
-          <p:nvPr>
-            <p:ph sz="half" idx="1"/>
-          </p:nvPr>
-        </p:nvSpPr>
-        <p:spPr/>
-        <p:txBody>
-          <a:bodyPr>
-            <a:normAutofit fontScale="92500" lnSpcReduction="20000"/>
+          <a:bodyPr vert="horz" lIns="91440" tIns="45720" rIns="91440" bIns="45720" rtlCol="0" anchor="ctr">
+            <a:normAutofit fontScale="90000" lnSpcReduction="10000"/>
           </a:bodyPr>
-          <a:lstStyle/>
-          <a:p>
-            <a:endParaRPr lang="en-US"/>
-          </a:p>
-        </p:txBody>
-      </p:sp>
-      <p:sp>
-        <p:nvSpPr>
-          <p:cNvPr id="7" name="Content Placeholder 6">
-            <a:extLst>
-              <a:ext uri="{FF2B5EF4-FFF2-40B4-BE49-F238E27FC236}">
-                <a16:creationId xmlns:a16="http://schemas.microsoft.com/office/drawing/2014/main" id="{CC3C6753-C444-49C8-A285-43788753341F}"/>
+          <a:lstStyle>
+            <a:lvl1pPr algn="l" defTabSz="914400" rtl="0" eaLnBrk="1" latinLnBrk="0" hangingPunct="1">
+              <a:lnSpc>
+                <a:spcPct val="90000"/>
+              </a:lnSpc>
+              <a:spcBef>
+                <a:spcPct val="0"/>
+              </a:spcBef>
+              <a:buNone/>
+              <a:defRPr sz="4400" kern="1200">
+                <a:solidFill>
+                  <a:schemeClr val="tx1"/>
+                </a:solidFill>
+                <a:latin typeface="+mj-lt"/>
+                <a:ea typeface="+mj-ea"/>
+                <a:cs typeface="+mj-cs"/>
+              </a:defRPr>
+            </a:lvl1pPr>
+          </a:lstStyle>
+          <a:p>
+            <a:pPr algn="ctr"/>
+            <a:r>
+              <a:rPr lang="en-US" sz="4000" dirty="0">
+                <a:latin typeface="Britannic Bold" panose="020B0903060703020204" pitchFamily="34" charset="0"/>
+              </a:rPr>
+              <a:t>Recreate Original Visualization</a:t>
+            </a:r>
+          </a:p>
+        </p:txBody>
+      </p:sp>
+      <p:sp>
+        <p:nvSpPr>
+          <p:cNvPr id="8" name="Content Placeholder 6">
+            <a:extLst>
+              <a:ext uri="{FF2B5EF4-FFF2-40B4-BE49-F238E27FC236}">
+                <a16:creationId xmlns:a16="http://schemas.microsoft.com/office/drawing/2014/main" id="{4E804098-EA1C-44AC-BD0E-FBA0375A590B}"/>
               </a:ext>
             </a:extLst>
           </p:cNvPr>
@@ -4086,418 +5594,89 @@
           </p:nvPr>
         </p:nvSpPr>
         <p:spPr>
+          <a:xfrm>
+            <a:off x="6172200" y="1825625"/>
+            <a:ext cx="5181600" cy="4351338"/>
+          </a:xfrm>
           <a:solidFill>
             <a:srgbClr val="F1F3F5"/>
           </a:solidFill>
         </p:spPr>
         <p:txBody>
           <a:bodyPr anchor="ctr">
-            <a:normAutofit fontScale="92500" lnSpcReduction="20000"/>
+            <a:normAutofit/>
           </a:bodyPr>
           <a:lstStyle/>
           <a:p>
             <a:r>
               <a:rPr lang="en-US" dirty="0"/>
-              <a:t>Examines monetary cost of travel (vertical axis) as a function of number of weeks booked ahead (horizontal axis)</a:t>
-            </a:r>
-          </a:p>
-          <a:p>
-            <a:r>
-              <a:rPr lang="en-US" i="1" dirty="0"/>
-              <a:t>Faceted</a:t>
-            </a:r>
-            <a:r>
-              <a:rPr lang="en-US" dirty="0"/>
-              <a:t> by six Origin-Destination dyads</a:t>
-            </a:r>
-          </a:p>
-          <a:p>
-            <a:r>
-              <a:rPr lang="en-US" i="1" dirty="0"/>
-              <a:t>Colored</a:t>
-            </a:r>
-            <a:r>
-              <a:rPr lang="en-US" dirty="0"/>
-              <a:t> by mode of travel (</a:t>
-            </a:r>
-            <a:r>
-              <a:rPr lang="en-US" dirty="0">
-                <a:solidFill>
-                  <a:srgbClr val="FF0000"/>
-                </a:solidFill>
-              </a:rPr>
-              <a:t>red = plane</a:t>
-            </a:r>
-            <a:r>
-              <a:rPr lang="en-US" dirty="0"/>
-              <a:t> and </a:t>
-            </a:r>
-            <a:r>
-              <a:rPr lang="en-US" dirty="0">
-                <a:solidFill>
-                  <a:schemeClr val="accent5">
-                    <a:lumMod val="50000"/>
-                  </a:schemeClr>
-                </a:solidFill>
-              </a:rPr>
-              <a:t>train = blue</a:t>
-            </a:r>
-            <a:r>
-              <a:rPr lang="en-US" dirty="0"/>
-              <a:t>) </a:t>
-            </a:r>
-          </a:p>
-          <a:p>
-            <a:r>
-              <a:rPr lang="en-US" dirty="0"/>
-              <a:t>Note the fifth variable: distance (km) between each Origin &amp; Destination</a:t>
-            </a:r>
-          </a:p>
-          <a:p>
-            <a:r>
-              <a:rPr lang="en-US" dirty="0"/>
-              <a:t>Note the legend</a:t>
-            </a:r>
-          </a:p>
-        </p:txBody>
-      </p:sp>
-      <p:pic>
-        <p:nvPicPr>
-          <p:cNvPr id="4" name="Picture 3">
-            <a:extLst>
-              <a:ext uri="{FF2B5EF4-FFF2-40B4-BE49-F238E27FC236}">
-                <a16:creationId xmlns:a16="http://schemas.microsoft.com/office/drawing/2014/main" id="{B16C7AF9-AF33-4854-B423-BF755ECE8C7C}"/>
-              </a:ext>
-            </a:extLst>
-          </p:cNvPr>
-          <p:cNvPicPr>
-            <a:picLocks noChangeAspect="1"/>
-          </p:cNvPicPr>
+              <a:t>/Suyin will </a:t>
+            </a:r>
+            <a:r>
+              <a:rPr lang="en-US" dirty="0" err="1"/>
+              <a:t>populatte</a:t>
+            </a:r>
+            <a:endParaRPr lang="en-US" dirty="0"/>
+          </a:p>
+        </p:txBody>
+      </p:sp>
+      <p:sp>
+        <p:nvSpPr>
+          <p:cNvPr id="9" name="Title 4">
+            <a:extLst>
+              <a:ext uri="{FF2B5EF4-FFF2-40B4-BE49-F238E27FC236}">
+                <a16:creationId xmlns:a16="http://schemas.microsoft.com/office/drawing/2014/main" id="{082676B8-3B5A-4447-B946-EF3F4441F2D6}"/>
+              </a:ext>
+            </a:extLst>
+          </p:cNvPr>
+          <p:cNvSpPr txBox="1">
+            <a:spLocks/>
+          </p:cNvSpPr>
           <p:nvPr/>
-        </p:nvPicPr>
-        <p:blipFill>
-          <a:blip r:embed="rId4"/>
-          <a:stretch>
-            <a:fillRect/>
-          </a:stretch>
-        </p:blipFill>
+        </p:nvSpPr>
         <p:spPr>
           <a:xfrm>
-            <a:off x="838200" y="308838"/>
-            <a:ext cx="4970170" cy="6240324"/>
+            <a:off x="6353176" y="531812"/>
+            <a:ext cx="4833938" cy="1025525"/>
           </a:xfrm>
-          <a:prstGeom prst="rect">
+          <a:prstGeom prst="plaque">
             <a:avLst/>
           </a:prstGeom>
+          <a:noFill/>
+          <a:ln w="38100">
+            <a:solidFill>
+              <a:schemeClr val="tx1"/>
+            </a:solidFill>
+          </a:ln>
         </p:spPr>
-      </p:pic>
-    </p:spTree>
-    <p:extLst>
-      <p:ext uri="{BB962C8B-B14F-4D97-AF65-F5344CB8AC3E}">
-        <p14:creationId xmlns:p14="http://schemas.microsoft.com/office/powerpoint/2010/main" val="2581448155"/>
-      </p:ext>
-    </p:extLst>
-  </p:cSld>
-  <p:clrMapOvr>
-    <a:overrideClrMapping bg1="lt1" tx1="dk1" bg2="lt2" tx2="dk2" accent1="accent1" accent2="accent2" accent3="accent3" accent4="accent4" accent5="accent5" accent6="accent6" hlink="hlink" folHlink="folHlink"/>
-  </p:clrMapOvr>
-</p:sld>
-</file>
-
-<file path=ppt/slides/slide4.xml><?xml version="1.0" encoding="utf-8"?>
-<p:sld xmlns:a="http://schemas.openxmlformats.org/drawingml/2006/main" xmlns:r="http://schemas.openxmlformats.org/officeDocument/2006/relationships" xmlns:p="http://schemas.openxmlformats.org/presentationml/2006/main">
-  <p:cSld>
-    <p:bg>
-      <p:bgPr>
-        <a:blipFill dpi="0" rotWithShape="1">
-          <a:blip r:embed="rId3">
-            <a:alphaModFix amt="30000"/>
-            <a:lum/>
-          </a:blip>
-          <a:srcRect/>
-          <a:stretch>
-            <a:fillRect t="-11000" b="-11000"/>
-          </a:stretch>
-        </a:blipFill>
-        <a:effectLst/>
-      </p:bgPr>
-    </p:bg>
-    <p:spTree>
-      <p:nvGrpSpPr>
-        <p:cNvPr id="1" name=""/>
-        <p:cNvGrpSpPr/>
-        <p:nvPr/>
-      </p:nvGrpSpPr>
-      <p:grpSpPr>
-        <a:xfrm>
-          <a:off x="0" y="0"/>
-          <a:ext cx="0" cy="0"/>
-          <a:chOff x="0" y="0"/>
-          <a:chExt cx="0" cy="0"/>
-        </a:xfrm>
-      </p:grpSpPr>
-      <p:sp>
-        <p:nvSpPr>
-          <p:cNvPr id="5" name="Title 4">
-            <a:extLst>
-              <a:ext uri="{FF2B5EF4-FFF2-40B4-BE49-F238E27FC236}">
-                <a16:creationId xmlns:a16="http://schemas.microsoft.com/office/drawing/2014/main" id="{828C46BD-7B85-4610-878A-026E2645A48D}"/>
-              </a:ext>
-            </a:extLst>
-          </p:cNvPr>
-          <p:cNvSpPr>
-            <a:spLocks noGrp="1"/>
-          </p:cNvSpPr>
-          <p:nvPr>
-            <p:ph type="title"/>
-          </p:nvPr>
-        </p:nvSpPr>
-        <p:spPr>
-          <a:xfrm>
-            <a:off x="6172200" y="365125"/>
-            <a:ext cx="5181600" cy="1325563"/>
-          </a:xfrm>
-        </p:spPr>
-        <p:txBody>
-          <a:bodyPr/>
-          <a:lstStyle/>
-          <a:p>
-            <a:r>
-              <a:rPr lang="en-US" b="1" dirty="0"/>
-              <a:t>Weaknesses of this visualization?</a:t>
-            </a:r>
-          </a:p>
-        </p:txBody>
-      </p:sp>
-      <p:sp>
-        <p:nvSpPr>
-          <p:cNvPr id="6" name="Content Placeholder 5">
-            <a:extLst>
-              <a:ext uri="{FF2B5EF4-FFF2-40B4-BE49-F238E27FC236}">
-                <a16:creationId xmlns:a16="http://schemas.microsoft.com/office/drawing/2014/main" id="{61C264B5-B08F-4510-A247-AEFB264E9EF5}"/>
-              </a:ext>
-            </a:extLst>
-          </p:cNvPr>
-          <p:cNvSpPr>
-            <a:spLocks noGrp="1"/>
-          </p:cNvSpPr>
-          <p:nvPr>
-            <p:ph sz="half" idx="1"/>
-          </p:nvPr>
-        </p:nvSpPr>
-        <p:spPr/>
-        <p:txBody>
-          <a:bodyPr>
-            <a:normAutofit lnSpcReduction="10000"/>
+        <p:txBody>
+          <a:bodyPr vert="horz" lIns="91440" tIns="45720" rIns="91440" bIns="45720" rtlCol="0" anchor="ctr">
+            <a:normAutofit fontScale="97500"/>
           </a:bodyPr>
-          <a:lstStyle/>
-          <a:p>
-            <a:endParaRPr lang="en-US"/>
-          </a:p>
-        </p:txBody>
-      </p:sp>
-      <p:sp>
-        <p:nvSpPr>
-          <p:cNvPr id="7" name="Content Placeholder 6">
-            <a:extLst>
-              <a:ext uri="{FF2B5EF4-FFF2-40B4-BE49-F238E27FC236}">
-                <a16:creationId xmlns:a16="http://schemas.microsoft.com/office/drawing/2014/main" id="{CC3C6753-C444-49C8-A285-43788753341F}"/>
-              </a:ext>
-            </a:extLst>
-          </p:cNvPr>
-          <p:cNvSpPr>
-            <a:spLocks noGrp="1"/>
-          </p:cNvSpPr>
-          <p:nvPr>
-            <p:ph sz="half" idx="2"/>
-          </p:nvPr>
-        </p:nvSpPr>
-        <p:spPr>
-          <a:solidFill>
-            <a:srgbClr val="F1F3F5"/>
-          </a:solidFill>
-        </p:spPr>
-        <p:txBody>
-          <a:bodyPr anchor="ctr">
-            <a:normAutofit lnSpcReduction="10000"/>
-          </a:bodyPr>
-          <a:lstStyle/>
-          <a:p>
-            <a:r>
-              <a:rPr lang="en-US" dirty="0"/>
-              <a:t>When were these data collected?</a:t>
-            </a:r>
-          </a:p>
-          <a:p>
-            <a:r>
-              <a:rPr lang="en-US" dirty="0"/>
-              <a:t>Not clear how the facets are sorted (if they’re sorted at all)</a:t>
-            </a:r>
-          </a:p>
-          <a:p>
-            <a:r>
-              <a:rPr lang="en-US" dirty="0"/>
-              <a:t>Not clear where the data for the distance (km) represents, unknown source</a:t>
-            </a:r>
-          </a:p>
-          <a:p>
-            <a:r>
-              <a:rPr lang="en-US" dirty="0"/>
-              <a:t>Should we care more about absolute differences in cost (as this graph shows), or relative differences?</a:t>
-            </a:r>
-          </a:p>
-        </p:txBody>
-      </p:sp>
-      <p:pic>
-        <p:nvPicPr>
-          <p:cNvPr id="4" name="Picture 3">
-            <a:extLst>
-              <a:ext uri="{FF2B5EF4-FFF2-40B4-BE49-F238E27FC236}">
-                <a16:creationId xmlns:a16="http://schemas.microsoft.com/office/drawing/2014/main" id="{B16C7AF9-AF33-4854-B423-BF755ECE8C7C}"/>
-              </a:ext>
-            </a:extLst>
-          </p:cNvPr>
-          <p:cNvPicPr>
-            <a:picLocks noChangeAspect="1"/>
-          </p:cNvPicPr>
-          <p:nvPr/>
-        </p:nvPicPr>
-        <p:blipFill>
-          <a:blip r:embed="rId4"/>
-          <a:stretch>
-            <a:fillRect/>
-          </a:stretch>
-        </p:blipFill>
-        <p:spPr>
-          <a:xfrm>
-            <a:off x="838200" y="308838"/>
-            <a:ext cx="4970170" cy="6240324"/>
-          </a:xfrm>
-          <a:prstGeom prst="rect">
-            <a:avLst/>
-          </a:prstGeom>
-        </p:spPr>
-      </p:pic>
-    </p:spTree>
-    <p:extLst>
-      <p:ext uri="{BB962C8B-B14F-4D97-AF65-F5344CB8AC3E}">
-        <p14:creationId xmlns:p14="http://schemas.microsoft.com/office/powerpoint/2010/main" val="2136486388"/>
-      </p:ext>
-    </p:extLst>
-  </p:cSld>
-  <p:clrMapOvr>
-    <a:overrideClrMapping bg1="lt1" tx1="dk1" bg2="lt2" tx2="dk2" accent1="accent1" accent2="accent2" accent3="accent3" accent4="accent4" accent5="accent5" accent6="accent6" hlink="hlink" folHlink="folHlink"/>
-  </p:clrMapOvr>
-</p:sld>
-</file>
-
-<file path=ppt/slides/slide5.xml><?xml version="1.0" encoding="utf-8"?>
-<p:sld xmlns:a="http://schemas.openxmlformats.org/drawingml/2006/main" xmlns:r="http://schemas.openxmlformats.org/officeDocument/2006/relationships" xmlns:p="http://schemas.openxmlformats.org/presentationml/2006/main">
-  <p:cSld>
-    <p:bg>
-      <p:bgPr>
-        <a:blipFill dpi="0" rotWithShape="1">
-          <a:blip r:embed="rId3">
-            <a:alphaModFix amt="30000"/>
-            <a:lum/>
-          </a:blip>
-          <a:srcRect/>
-          <a:stretch>
-            <a:fillRect t="-11000" b="-11000"/>
-          </a:stretch>
-        </a:blipFill>
-        <a:effectLst/>
-      </p:bgPr>
-    </p:bg>
-    <p:spTree>
-      <p:nvGrpSpPr>
-        <p:cNvPr id="1" name=""/>
-        <p:cNvGrpSpPr/>
-        <p:nvPr/>
-      </p:nvGrpSpPr>
-      <p:grpSpPr>
-        <a:xfrm>
-          <a:off x="0" y="0"/>
-          <a:ext cx="0" cy="0"/>
-          <a:chOff x="0" y="0"/>
-          <a:chExt cx="0" cy="0"/>
-        </a:xfrm>
-      </p:grpSpPr>
-      <p:sp>
-        <p:nvSpPr>
-          <p:cNvPr id="2" name="Title 1">
-            <a:extLst>
-              <a:ext uri="{FF2B5EF4-FFF2-40B4-BE49-F238E27FC236}">
-                <a16:creationId xmlns:a16="http://schemas.microsoft.com/office/drawing/2014/main" id="{F342C771-8A79-4EDD-B850-CD0D4E135C1D}"/>
-              </a:ext>
-            </a:extLst>
-          </p:cNvPr>
-          <p:cNvSpPr>
-            <a:spLocks noGrp="1"/>
-          </p:cNvSpPr>
-          <p:nvPr>
-            <p:ph type="title"/>
-          </p:nvPr>
-        </p:nvSpPr>
-        <p:spPr/>
-        <p:txBody>
-          <a:bodyPr/>
-          <a:lstStyle/>
-          <a:p>
-            <a:r>
-              <a:rPr lang="en-US" b="1" dirty="0"/>
-              <a:t>Recreating the Original Visualization</a:t>
-            </a:r>
-          </a:p>
-        </p:txBody>
-      </p:sp>
-      <p:sp>
-        <p:nvSpPr>
-          <p:cNvPr id="3" name="Content Placeholder 2">
-            <a:extLst>
-              <a:ext uri="{FF2B5EF4-FFF2-40B4-BE49-F238E27FC236}">
-                <a16:creationId xmlns:a16="http://schemas.microsoft.com/office/drawing/2014/main" id="{6E5D2DBC-9BC9-4FBB-8EC1-73B6689261A5}"/>
-              </a:ext>
-            </a:extLst>
-          </p:cNvPr>
-          <p:cNvSpPr>
-            <a:spLocks noGrp="1"/>
-          </p:cNvSpPr>
-          <p:nvPr>
-            <p:ph sz="half" idx="1"/>
-          </p:nvPr>
-        </p:nvSpPr>
-        <p:spPr/>
-        <p:txBody>
-          <a:bodyPr/>
-          <a:lstStyle/>
-          <a:p>
-            <a:endParaRPr lang="en-US"/>
-          </a:p>
-        </p:txBody>
-      </p:sp>
-      <p:sp>
-        <p:nvSpPr>
-          <p:cNvPr id="4" name="Content Placeholder 3">
-            <a:extLst>
-              <a:ext uri="{FF2B5EF4-FFF2-40B4-BE49-F238E27FC236}">
-                <a16:creationId xmlns:a16="http://schemas.microsoft.com/office/drawing/2014/main" id="{B3FBE695-2FD2-4F04-8E67-45E759F25084}"/>
-              </a:ext>
-            </a:extLst>
-          </p:cNvPr>
-          <p:cNvSpPr>
-            <a:spLocks noGrp="1"/>
-          </p:cNvSpPr>
-          <p:nvPr>
-            <p:ph sz="half" idx="2"/>
-          </p:nvPr>
-        </p:nvSpPr>
-        <p:spPr/>
-        <p:txBody>
-          <a:bodyPr/>
-          <a:lstStyle/>
-          <a:p>
-            <a:endParaRPr lang="en-US"/>
+          <a:lstStyle>
+            <a:lvl1pPr algn="l" defTabSz="914400" rtl="0" eaLnBrk="1" latinLnBrk="0" hangingPunct="1">
+              <a:lnSpc>
+                <a:spcPct val="90000"/>
+              </a:lnSpc>
+              <a:spcBef>
+                <a:spcPct val="0"/>
+              </a:spcBef>
+              <a:buNone/>
+              <a:defRPr sz="4400" kern="1200">
+                <a:solidFill>
+                  <a:schemeClr val="tx1"/>
+                </a:solidFill>
+                <a:latin typeface="+mj-lt"/>
+                <a:ea typeface="+mj-ea"/>
+                <a:cs typeface="+mj-cs"/>
+              </a:defRPr>
+            </a:lvl1pPr>
+          </a:lstStyle>
+          <a:p>
+            <a:pPr algn="ctr"/>
+            <a:endParaRPr lang="en-US" sz="4000" dirty="0">
+              <a:latin typeface="Britannic Bold" panose="020B0903060703020204" pitchFamily="34" charset="0"/>
+            </a:endParaRPr>
           </a:p>
         </p:txBody>
       </p:sp>
@@ -4517,21 +5696,6 @@
 <file path=ppt/slides/slide6.xml><?xml version="1.0" encoding="utf-8"?>
 <p:sld xmlns:a="http://schemas.openxmlformats.org/drawingml/2006/main" xmlns:r="http://schemas.openxmlformats.org/officeDocument/2006/relationships" xmlns:p="http://schemas.openxmlformats.org/presentationml/2006/main">
   <p:cSld>
-    <p:bg>
-      <p:bgPr>
-        <a:blipFill dpi="0" rotWithShape="1">
-          <a:blip r:embed="rId3">
-            <a:alphaModFix amt="30000"/>
-            <a:lum/>
-          </a:blip>
-          <a:srcRect/>
-          <a:stretch>
-            <a:fillRect t="-11000" b="-11000"/>
-          </a:stretch>
-        </a:blipFill>
-        <a:effectLst/>
-      </p:bgPr>
-    </p:bg>
     <p:spTree>
       <p:nvGrpSpPr>
         <p:cNvPr id="1" name=""/>
@@ -4548,18 +5712,18 @@
       </p:grpSpPr>
       <p:sp>
         <p:nvSpPr>
-          <p:cNvPr id="2" name="Title 1">
-            <a:extLst>
-              <a:ext uri="{FF2B5EF4-FFF2-40B4-BE49-F238E27FC236}">
-                <a16:creationId xmlns:a16="http://schemas.microsoft.com/office/drawing/2014/main" id="{11ACE9FC-7DAF-4A81-907A-EAE862A0C923}"/>
-              </a:ext>
-            </a:extLst>
-          </p:cNvPr>
-          <p:cNvSpPr>
-            <a:spLocks noGrp="1"/>
-          </p:cNvSpPr>
-          <p:nvPr>
-            <p:ph type="title"/>
+          <p:cNvPr id="4" name="Content Placeholder 3">
+            <a:extLst>
+              <a:ext uri="{FF2B5EF4-FFF2-40B4-BE49-F238E27FC236}">
+                <a16:creationId xmlns:a16="http://schemas.microsoft.com/office/drawing/2014/main" id="{9BDD583C-8F2E-4079-BE7C-37D15C1B2287}"/>
+              </a:ext>
+            </a:extLst>
+          </p:cNvPr>
+          <p:cNvSpPr>
+            <a:spLocks noGrp="1"/>
+          </p:cNvSpPr>
+          <p:nvPr>
+            <p:ph sz="half" idx="2"/>
           </p:nvPr>
         </p:nvSpPr>
         <p:spPr/>
@@ -4567,8 +5731,67 @@
           <a:bodyPr/>
           <a:lstStyle/>
           <a:p>
-            <a:r>
-              <a:rPr lang="en-US" b="1" dirty="0"/>
+            <a:endParaRPr lang="en-US" dirty="0"/>
+          </a:p>
+        </p:txBody>
+      </p:sp>
+      <p:sp>
+        <p:nvSpPr>
+          <p:cNvPr id="5" name="Title 4">
+            <a:extLst>
+              <a:ext uri="{FF2B5EF4-FFF2-40B4-BE49-F238E27FC236}">
+                <a16:creationId xmlns:a16="http://schemas.microsoft.com/office/drawing/2014/main" id="{AAC46C7F-D9D0-40DA-8FA8-BEF42BF51131}"/>
+              </a:ext>
+            </a:extLst>
+          </p:cNvPr>
+          <p:cNvSpPr txBox="1">
+            <a:spLocks/>
+          </p:cNvSpPr>
+          <p:nvPr/>
+        </p:nvSpPr>
+        <p:spPr>
+          <a:xfrm>
+            <a:off x="6179345" y="381792"/>
+            <a:ext cx="5181599" cy="1325563"/>
+          </a:xfrm>
+          <a:prstGeom prst="plaque">
+            <a:avLst/>
+          </a:prstGeom>
+          <a:solidFill>
+            <a:schemeClr val="bg1">
+              <a:alpha val="82000"/>
+            </a:schemeClr>
+          </a:solidFill>
+        </p:spPr>
+        <p:txBody>
+          <a:bodyPr vert="horz" lIns="91440" tIns="45720" rIns="91440" bIns="45720" rtlCol="0" anchor="ctr">
+            <a:normAutofit fontScale="90000" lnSpcReduction="10000"/>
+          </a:bodyPr>
+          <a:lstStyle>
+            <a:lvl1pPr algn="l" defTabSz="914400" rtl="0" eaLnBrk="1" latinLnBrk="0" hangingPunct="1">
+              <a:lnSpc>
+                <a:spcPct val="90000"/>
+              </a:lnSpc>
+              <a:spcBef>
+                <a:spcPct val="0"/>
+              </a:spcBef>
+              <a:buNone/>
+              <a:defRPr sz="4400" kern="1200">
+                <a:solidFill>
+                  <a:schemeClr val="tx1"/>
+                </a:solidFill>
+                <a:latin typeface="+mj-lt"/>
+                <a:ea typeface="+mj-ea"/>
+                <a:cs typeface="+mj-cs"/>
+              </a:defRPr>
+            </a:lvl1pPr>
+          </a:lstStyle>
+          <a:p>
+            <a:pPr algn="ctr"/>
+            <a:r>
+              <a:rPr lang="en-US" sz="4000" dirty="0">
+                <a:latin typeface="Britannic Bold" panose="020B0903060703020204" pitchFamily="34" charset="0"/>
+              </a:rPr>
               <a:t>Improving the Original Visualization</a:t>
             </a:r>
           </a:p>
@@ -4576,51 +5799,61 @@
       </p:sp>
       <p:sp>
         <p:nvSpPr>
-          <p:cNvPr id="3" name="Content Placeholder 2">
-            <a:extLst>
-              <a:ext uri="{FF2B5EF4-FFF2-40B4-BE49-F238E27FC236}">
-                <a16:creationId xmlns:a16="http://schemas.microsoft.com/office/drawing/2014/main" id="{DDA52849-0140-4570-A1F0-CB0B00611132}"/>
-              </a:ext>
-            </a:extLst>
-          </p:cNvPr>
-          <p:cNvSpPr>
-            <a:spLocks noGrp="1"/>
-          </p:cNvSpPr>
-          <p:nvPr>
-            <p:ph sz="half" idx="1"/>
-          </p:nvPr>
-        </p:nvSpPr>
-        <p:spPr/>
-        <p:txBody>
-          <a:bodyPr/>
-          <a:lstStyle/>
-          <a:p>
-            <a:endParaRPr lang="en-US" dirty="0"/>
-          </a:p>
-        </p:txBody>
-      </p:sp>
-      <p:sp>
-        <p:nvSpPr>
-          <p:cNvPr id="4" name="Content Placeholder 3">
-            <a:extLst>
-              <a:ext uri="{FF2B5EF4-FFF2-40B4-BE49-F238E27FC236}">
-                <a16:creationId xmlns:a16="http://schemas.microsoft.com/office/drawing/2014/main" id="{9BDD583C-8F2E-4079-BE7C-37D15C1B2287}"/>
-              </a:ext>
-            </a:extLst>
-          </p:cNvPr>
-          <p:cNvSpPr>
-            <a:spLocks noGrp="1"/>
-          </p:cNvSpPr>
-          <p:nvPr>
-            <p:ph sz="half" idx="2"/>
-          </p:nvPr>
-        </p:nvSpPr>
-        <p:spPr/>
-        <p:txBody>
-          <a:bodyPr/>
-          <a:lstStyle/>
-          <a:p>
-            <a:endParaRPr lang="en-US"/>
+          <p:cNvPr id="6" name="Title 4">
+            <a:extLst>
+              <a:ext uri="{FF2B5EF4-FFF2-40B4-BE49-F238E27FC236}">
+                <a16:creationId xmlns:a16="http://schemas.microsoft.com/office/drawing/2014/main" id="{049DE2AB-8270-4542-85BD-374D21E04272}"/>
+              </a:ext>
+            </a:extLst>
+          </p:cNvPr>
+          <p:cNvSpPr txBox="1">
+            <a:spLocks/>
+          </p:cNvSpPr>
+          <p:nvPr/>
+        </p:nvSpPr>
+        <p:spPr>
+          <a:xfrm>
+            <a:off x="6353176" y="531812"/>
+            <a:ext cx="4833938" cy="1025525"/>
+          </a:xfrm>
+          <a:prstGeom prst="plaque">
+            <a:avLst/>
+          </a:prstGeom>
+          <a:noFill/>
+          <a:ln w="38100">
+            <a:solidFill>
+              <a:schemeClr val="tx1"/>
+            </a:solidFill>
+          </a:ln>
+        </p:spPr>
+        <p:txBody>
+          <a:bodyPr vert="horz" lIns="91440" tIns="45720" rIns="91440" bIns="45720" rtlCol="0" anchor="ctr">
+            <a:normAutofit fontScale="97500"/>
+          </a:bodyPr>
+          <a:lstStyle>
+            <a:lvl1pPr algn="l" defTabSz="914400" rtl="0" eaLnBrk="1" latinLnBrk="0" hangingPunct="1">
+              <a:lnSpc>
+                <a:spcPct val="90000"/>
+              </a:lnSpc>
+              <a:spcBef>
+                <a:spcPct val="0"/>
+              </a:spcBef>
+              <a:buNone/>
+              <a:defRPr sz="4400" kern="1200">
+                <a:solidFill>
+                  <a:schemeClr val="tx1"/>
+                </a:solidFill>
+                <a:latin typeface="+mj-lt"/>
+                <a:ea typeface="+mj-ea"/>
+                <a:cs typeface="+mj-cs"/>
+              </a:defRPr>
+            </a:lvl1pPr>
+          </a:lstStyle>
+          <a:p>
+            <a:pPr algn="ctr"/>
+            <a:endParaRPr lang="en-US" sz="4000" dirty="0">
+              <a:latin typeface="Britannic Bold" panose="020B0903060703020204" pitchFamily="34" charset="0"/>
+            </a:endParaRPr>
           </a:p>
         </p:txBody>
       </p:sp>
@@ -4640,21 +5873,6 @@
 <file path=ppt/slides/slide7.xml><?xml version="1.0" encoding="utf-8"?>
 <p:sld xmlns:a="http://schemas.openxmlformats.org/drawingml/2006/main" xmlns:r="http://schemas.openxmlformats.org/officeDocument/2006/relationships" xmlns:p="http://schemas.openxmlformats.org/presentationml/2006/main">
   <p:cSld>
-    <p:bg>
-      <p:bgPr>
-        <a:blipFill dpi="0" rotWithShape="1">
-          <a:blip r:embed="rId3">
-            <a:alphaModFix amt="30000"/>
-            <a:lum/>
-          </a:blip>
-          <a:srcRect/>
-          <a:stretch>
-            <a:fillRect t="-11000" b="-11000"/>
-          </a:stretch>
-        </a:blipFill>
-        <a:effectLst/>
-      </p:bgPr>
-    </p:bg>
     <p:spTree>
       <p:nvGrpSpPr>
         <p:cNvPr id="1" name=""/>
@@ -4671,44 +5889,181 @@
       </p:grpSpPr>
       <p:sp>
         <p:nvSpPr>
+          <p:cNvPr id="4" name="Content Placeholder 3">
+            <a:extLst>
+              <a:ext uri="{FF2B5EF4-FFF2-40B4-BE49-F238E27FC236}">
+                <a16:creationId xmlns:a16="http://schemas.microsoft.com/office/drawing/2014/main" id="{9BDD583C-8F2E-4079-BE7C-37D15C1B2287}"/>
+              </a:ext>
+            </a:extLst>
+          </p:cNvPr>
+          <p:cNvSpPr>
+            <a:spLocks noGrp="1"/>
+          </p:cNvSpPr>
+          <p:nvPr>
+            <p:ph sz="half" idx="2"/>
+          </p:nvPr>
+        </p:nvSpPr>
+        <p:spPr/>
+        <p:txBody>
+          <a:bodyPr/>
+          <a:lstStyle/>
+          <a:p>
+            <a:endParaRPr lang="en-US"/>
+          </a:p>
+        </p:txBody>
+      </p:sp>
+      <p:sp>
+        <p:nvSpPr>
           <p:cNvPr id="5" name="Title 4">
             <a:extLst>
               <a:ext uri="{FF2B5EF4-FFF2-40B4-BE49-F238E27FC236}">
-                <a16:creationId xmlns:a16="http://schemas.microsoft.com/office/drawing/2014/main" id="{828C46BD-7B85-4610-878A-026E2645A48D}"/>
-              </a:ext>
-            </a:extLst>
-          </p:cNvPr>
-          <p:cNvSpPr>
-            <a:spLocks noGrp="1"/>
-          </p:cNvSpPr>
-          <p:nvPr>
-            <p:ph type="title"/>
-          </p:nvPr>
+                <a16:creationId xmlns:a16="http://schemas.microsoft.com/office/drawing/2014/main" id="{AAC46C7F-D9D0-40DA-8FA8-BEF42BF51131}"/>
+              </a:ext>
+            </a:extLst>
+          </p:cNvPr>
+          <p:cNvSpPr txBox="1">
+            <a:spLocks/>
+          </p:cNvSpPr>
+          <p:nvPr/>
         </p:nvSpPr>
         <p:spPr>
           <a:xfrm>
-            <a:off x="6172200" y="365125"/>
-            <a:ext cx="5181600" cy="1325563"/>
+            <a:off x="6179345" y="381792"/>
+            <a:ext cx="5181599" cy="1325563"/>
           </a:xfrm>
+          <a:prstGeom prst="plaque">
+            <a:avLst/>
+          </a:prstGeom>
+          <a:solidFill>
+            <a:schemeClr val="bg1">
+              <a:alpha val="82000"/>
+            </a:schemeClr>
+          </a:solidFill>
         </p:spPr>
         <p:txBody>
-          <a:bodyPr/>
-          <a:lstStyle/>
-          <a:p>
-            <a:r>
-              <a:rPr lang="en-US" b="1" dirty="0"/>
-              <a:t>Original Visualization:</a:t>
-            </a:r>
-            <a:br>
-              <a:rPr lang="en-US" b="1" dirty="0"/>
-            </a:br>
-            <a:r>
-              <a:rPr lang="en-US" b="1" dirty="0"/>
-              <a:t>Time</a:t>
-            </a:r>
-          </a:p>
-        </p:txBody>
-      </p:sp>
+          <a:bodyPr vert="horz" lIns="91440" tIns="45720" rIns="91440" bIns="45720" rtlCol="0" anchor="ctr">
+            <a:normAutofit fontScale="90000" lnSpcReduction="10000"/>
+          </a:bodyPr>
+          <a:lstStyle>
+            <a:lvl1pPr algn="l" defTabSz="914400" rtl="0" eaLnBrk="1" latinLnBrk="0" hangingPunct="1">
+              <a:lnSpc>
+                <a:spcPct val="90000"/>
+              </a:lnSpc>
+              <a:spcBef>
+                <a:spcPct val="0"/>
+              </a:spcBef>
+              <a:buNone/>
+              <a:defRPr sz="4400" kern="1200">
+                <a:solidFill>
+                  <a:schemeClr val="tx1"/>
+                </a:solidFill>
+                <a:latin typeface="+mj-lt"/>
+                <a:ea typeface="+mj-ea"/>
+                <a:cs typeface="+mj-cs"/>
+              </a:defRPr>
+            </a:lvl1pPr>
+          </a:lstStyle>
+          <a:p>
+            <a:pPr algn="ctr"/>
+            <a:r>
+              <a:rPr lang="en-US" sz="4000" dirty="0">
+                <a:latin typeface="Britannic Bold" panose="020B0903060703020204" pitchFamily="34" charset="0"/>
+              </a:rPr>
+              <a:t>Indifferent between Mode of Travel</a:t>
+            </a:r>
+          </a:p>
+        </p:txBody>
+      </p:sp>
+      <p:sp>
+        <p:nvSpPr>
+          <p:cNvPr id="6" name="Title 4">
+            <a:extLst>
+              <a:ext uri="{FF2B5EF4-FFF2-40B4-BE49-F238E27FC236}">
+                <a16:creationId xmlns:a16="http://schemas.microsoft.com/office/drawing/2014/main" id="{049DE2AB-8270-4542-85BD-374D21E04272}"/>
+              </a:ext>
+            </a:extLst>
+          </p:cNvPr>
+          <p:cNvSpPr txBox="1">
+            <a:spLocks/>
+          </p:cNvSpPr>
+          <p:nvPr/>
+        </p:nvSpPr>
+        <p:spPr>
+          <a:xfrm>
+            <a:off x="6353176" y="531812"/>
+            <a:ext cx="4833938" cy="1025525"/>
+          </a:xfrm>
+          <a:prstGeom prst="plaque">
+            <a:avLst/>
+          </a:prstGeom>
+          <a:noFill/>
+          <a:ln w="38100">
+            <a:solidFill>
+              <a:schemeClr val="tx1"/>
+            </a:solidFill>
+          </a:ln>
+        </p:spPr>
+        <p:txBody>
+          <a:bodyPr vert="horz" lIns="91440" tIns="45720" rIns="91440" bIns="45720" rtlCol="0" anchor="ctr">
+            <a:normAutofit fontScale="97500"/>
+          </a:bodyPr>
+          <a:lstStyle>
+            <a:lvl1pPr algn="l" defTabSz="914400" rtl="0" eaLnBrk="1" latinLnBrk="0" hangingPunct="1">
+              <a:lnSpc>
+                <a:spcPct val="90000"/>
+              </a:lnSpc>
+              <a:spcBef>
+                <a:spcPct val="0"/>
+              </a:spcBef>
+              <a:buNone/>
+              <a:defRPr sz="4400" kern="1200">
+                <a:solidFill>
+                  <a:schemeClr val="tx1"/>
+                </a:solidFill>
+                <a:latin typeface="+mj-lt"/>
+                <a:ea typeface="+mj-ea"/>
+                <a:cs typeface="+mj-cs"/>
+              </a:defRPr>
+            </a:lvl1pPr>
+          </a:lstStyle>
+          <a:p>
+            <a:pPr algn="ctr"/>
+            <a:endParaRPr lang="en-US" sz="4000" dirty="0">
+              <a:latin typeface="Britannic Bold" panose="020B0903060703020204" pitchFamily="34" charset="0"/>
+            </a:endParaRPr>
+          </a:p>
+        </p:txBody>
+      </p:sp>
+    </p:spTree>
+    <p:extLst>
+      <p:ext uri="{BB962C8B-B14F-4D97-AF65-F5344CB8AC3E}">
+        <p14:creationId xmlns:p14="http://schemas.microsoft.com/office/powerpoint/2010/main" val="2203888556"/>
+      </p:ext>
+    </p:extLst>
+  </p:cSld>
+  <p:clrMapOvr>
+    <a:masterClrMapping/>
+  </p:clrMapOvr>
+</p:sld>
+</file>
+
+<file path=ppt/slides/slide8.xml><?xml version="1.0" encoding="utf-8"?>
+<p:sld xmlns:a="http://schemas.openxmlformats.org/drawingml/2006/main" xmlns:r="http://schemas.openxmlformats.org/officeDocument/2006/relationships" xmlns:p="http://schemas.openxmlformats.org/presentationml/2006/main">
+  <p:cSld>
+    <p:spTree>
+      <p:nvGrpSpPr>
+        <p:cNvPr id="1" name=""/>
+        <p:cNvGrpSpPr/>
+        <p:nvPr/>
+      </p:nvGrpSpPr>
+      <p:grpSpPr>
+        <a:xfrm>
+          <a:off x="0" y="0"/>
+          <a:ext cx="0" cy="0"/>
+          <a:chOff x="0" y="0"/>
+          <a:chExt cx="0" cy="0"/>
+        </a:xfrm>
+      </p:grpSpPr>
       <p:pic>
         <p:nvPicPr>
           <p:cNvPr id="3" name="Content Placeholder 2">
@@ -4726,7 +6081,7 @@
           </p:nvPr>
         </p:nvPicPr>
         <p:blipFill>
-          <a:blip r:embed="rId4">
+          <a:blip r:embed="rId3">
             <a:extLst>
               <a:ext uri="{28A0092B-C50C-407E-A947-70E740481C1C}">
                 <a14:useLocalDpi xmlns:a14="http://schemas.microsoft.com/office/drawing/2010/main" val="0"/>
@@ -4835,6 +6190,128 @@
           </a:p>
         </p:txBody>
       </p:sp>
+      <p:sp>
+        <p:nvSpPr>
+          <p:cNvPr id="9" name="Title 4">
+            <a:extLst>
+              <a:ext uri="{FF2B5EF4-FFF2-40B4-BE49-F238E27FC236}">
+                <a16:creationId xmlns:a16="http://schemas.microsoft.com/office/drawing/2014/main" id="{2110FBB1-54FB-4874-88AF-893AD273E47B}"/>
+              </a:ext>
+            </a:extLst>
+          </p:cNvPr>
+          <p:cNvSpPr txBox="1">
+            <a:spLocks/>
+          </p:cNvSpPr>
+          <p:nvPr/>
+        </p:nvSpPr>
+        <p:spPr>
+          <a:xfrm>
+            <a:off x="6179345" y="381792"/>
+            <a:ext cx="5181599" cy="1325563"/>
+          </a:xfrm>
+          <a:prstGeom prst="plaque">
+            <a:avLst/>
+          </a:prstGeom>
+          <a:solidFill>
+            <a:schemeClr val="bg1">
+              <a:alpha val="82000"/>
+            </a:schemeClr>
+          </a:solidFill>
+        </p:spPr>
+        <p:txBody>
+          <a:bodyPr vert="horz" lIns="91440" tIns="45720" rIns="91440" bIns="45720" rtlCol="0" anchor="ctr">
+            <a:normAutofit fontScale="90000" lnSpcReduction="10000"/>
+          </a:bodyPr>
+          <a:lstStyle>
+            <a:lvl1pPr algn="l" defTabSz="914400" rtl="0" eaLnBrk="1" latinLnBrk="0" hangingPunct="1">
+              <a:lnSpc>
+                <a:spcPct val="90000"/>
+              </a:lnSpc>
+              <a:spcBef>
+                <a:spcPct val="0"/>
+              </a:spcBef>
+              <a:buNone/>
+              <a:defRPr sz="4400" kern="1200">
+                <a:solidFill>
+                  <a:schemeClr val="tx1"/>
+                </a:solidFill>
+                <a:latin typeface="+mj-lt"/>
+                <a:ea typeface="+mj-ea"/>
+                <a:cs typeface="+mj-cs"/>
+              </a:defRPr>
+            </a:lvl1pPr>
+          </a:lstStyle>
+          <a:p>
+            <a:pPr algn="ctr"/>
+            <a:r>
+              <a:rPr lang="en-US" sz="4000" dirty="0">
+                <a:latin typeface="Britannic Bold" panose="020B0903060703020204" pitchFamily="34" charset="0"/>
+              </a:rPr>
+              <a:t>Original Visualization: Time</a:t>
+            </a:r>
+          </a:p>
+        </p:txBody>
+      </p:sp>
+      <p:sp>
+        <p:nvSpPr>
+          <p:cNvPr id="10" name="Title 4">
+            <a:extLst>
+              <a:ext uri="{FF2B5EF4-FFF2-40B4-BE49-F238E27FC236}">
+                <a16:creationId xmlns:a16="http://schemas.microsoft.com/office/drawing/2014/main" id="{B443DCD7-6D94-4F39-8F79-8F9C81870C68}"/>
+              </a:ext>
+            </a:extLst>
+          </p:cNvPr>
+          <p:cNvSpPr txBox="1">
+            <a:spLocks/>
+          </p:cNvSpPr>
+          <p:nvPr/>
+        </p:nvSpPr>
+        <p:spPr>
+          <a:xfrm>
+            <a:off x="6353176" y="531812"/>
+            <a:ext cx="4833938" cy="1025525"/>
+          </a:xfrm>
+          <a:prstGeom prst="plaque">
+            <a:avLst/>
+          </a:prstGeom>
+          <a:noFill/>
+          <a:ln w="38100">
+            <a:solidFill>
+              <a:schemeClr val="tx1"/>
+            </a:solidFill>
+          </a:ln>
+        </p:spPr>
+        <p:txBody>
+          <a:bodyPr vert="horz" lIns="91440" tIns="45720" rIns="91440" bIns="45720" rtlCol="0" anchor="ctr">
+            <a:normAutofit fontScale="97500"/>
+          </a:bodyPr>
+          <a:lstStyle>
+            <a:lvl1pPr algn="l" defTabSz="914400" rtl="0" eaLnBrk="1" latinLnBrk="0" hangingPunct="1">
+              <a:lnSpc>
+                <a:spcPct val="90000"/>
+              </a:lnSpc>
+              <a:spcBef>
+                <a:spcPct val="0"/>
+              </a:spcBef>
+              <a:buNone/>
+              <a:defRPr sz="4400" kern="1200">
+                <a:solidFill>
+                  <a:schemeClr val="tx1"/>
+                </a:solidFill>
+                <a:latin typeface="+mj-lt"/>
+                <a:ea typeface="+mj-ea"/>
+                <a:cs typeface="+mj-cs"/>
+              </a:defRPr>
+            </a:lvl1pPr>
+          </a:lstStyle>
+          <a:p>
+            <a:pPr algn="ctr"/>
+            <a:endParaRPr lang="en-US" sz="4000" dirty="0">
+              <a:latin typeface="Britannic Bold" panose="020B0903060703020204" pitchFamily="34" charset="0"/>
+            </a:endParaRPr>
+          </a:p>
+        </p:txBody>
+      </p:sp>
     </p:spTree>
     <p:extLst>
       <p:ext uri="{BB962C8B-B14F-4D97-AF65-F5344CB8AC3E}">
@@ -4848,24 +6325,9 @@
 </p:sld>
 </file>
 
-<file path=ppt/slides/slide8.xml><?xml version="1.0" encoding="utf-8"?>
+<file path=ppt/slides/slide9.xml><?xml version="1.0" encoding="utf-8"?>
 <p:sld xmlns:a="http://schemas.openxmlformats.org/drawingml/2006/main" xmlns:r="http://schemas.openxmlformats.org/officeDocument/2006/relationships" xmlns:p="http://schemas.openxmlformats.org/presentationml/2006/main">
   <p:cSld>
-    <p:bg>
-      <p:bgPr>
-        <a:blipFill dpi="0" rotWithShape="1">
-          <a:blip r:embed="rId3">
-            <a:alphaModFix amt="30000"/>
-            <a:lum/>
-          </a:blip>
-          <a:srcRect/>
-          <a:stretch>
-            <a:fillRect t="-11000" b="-11000"/>
-          </a:stretch>
-        </a:blipFill>
-        <a:effectLst/>
-      </p:bgPr>
-    </p:bg>
     <p:spTree>
       <p:nvGrpSpPr>
         <p:cNvPr id="1" name=""/>
@@ -4882,66 +6344,6 @@
       </p:grpSpPr>
       <p:sp>
         <p:nvSpPr>
-          <p:cNvPr id="5" name="Title 4">
-            <a:extLst>
-              <a:ext uri="{FF2B5EF4-FFF2-40B4-BE49-F238E27FC236}">
-                <a16:creationId xmlns:a16="http://schemas.microsoft.com/office/drawing/2014/main" id="{828C46BD-7B85-4610-878A-026E2645A48D}"/>
-              </a:ext>
-            </a:extLst>
-          </p:cNvPr>
-          <p:cNvSpPr>
-            <a:spLocks noGrp="1"/>
-          </p:cNvSpPr>
-          <p:nvPr>
-            <p:ph type="title"/>
-          </p:nvPr>
-        </p:nvSpPr>
-        <p:spPr>
-          <a:xfrm>
-            <a:off x="6172200" y="365125"/>
-            <a:ext cx="5181600" cy="1325563"/>
-          </a:xfrm>
-        </p:spPr>
-        <p:txBody>
-          <a:bodyPr/>
-          <a:lstStyle/>
-          <a:p>
-            <a:r>
-              <a:rPr lang="en-US" b="1" dirty="0"/>
-              <a:t>Weaknesses of this visualization?</a:t>
-            </a:r>
-          </a:p>
-        </p:txBody>
-      </p:sp>
-      <p:sp>
-        <p:nvSpPr>
-          <p:cNvPr id="6" name="Content Placeholder 5">
-            <a:extLst>
-              <a:ext uri="{FF2B5EF4-FFF2-40B4-BE49-F238E27FC236}">
-                <a16:creationId xmlns:a16="http://schemas.microsoft.com/office/drawing/2014/main" id="{61C264B5-B08F-4510-A247-AEFB264E9EF5}"/>
-              </a:ext>
-            </a:extLst>
-          </p:cNvPr>
-          <p:cNvSpPr>
-            <a:spLocks noGrp="1"/>
-          </p:cNvSpPr>
-          <p:nvPr>
-            <p:ph sz="half" idx="1"/>
-          </p:nvPr>
-        </p:nvSpPr>
-        <p:spPr/>
-        <p:txBody>
-          <a:bodyPr>
-            <a:normAutofit lnSpcReduction="10000"/>
-          </a:bodyPr>
-          <a:lstStyle/>
-          <a:p>
-            <a:endParaRPr lang="en-US"/>
-          </a:p>
-        </p:txBody>
-      </p:sp>
-      <p:sp>
-        <p:nvSpPr>
           <p:cNvPr id="7" name="Content Placeholder 6">
             <a:extLst>
               <a:ext uri="{FF2B5EF4-FFF2-40B4-BE49-F238E27FC236}">
@@ -5007,7 +6409,7 @@
           <p:nvPr/>
         </p:nvPicPr>
         <p:blipFill>
-          <a:blip r:embed="rId4">
+          <a:blip r:embed="rId3">
             <a:extLst>
               <a:ext uri="{28A0092B-C50C-407E-A947-70E740481C1C}">
                 <a14:useLocalDpi xmlns:a14="http://schemas.microsoft.com/office/drawing/2010/main" val="0"/>
@@ -5028,246 +6430,132 @@
           </a:prstGeom>
         </p:spPr>
       </p:pic>
+      <p:sp>
+        <p:nvSpPr>
+          <p:cNvPr id="9" name="Title 4">
+            <a:extLst>
+              <a:ext uri="{FF2B5EF4-FFF2-40B4-BE49-F238E27FC236}">
+                <a16:creationId xmlns:a16="http://schemas.microsoft.com/office/drawing/2014/main" id="{16EDED69-D195-4C59-9347-234A7FDBC53E}"/>
+              </a:ext>
+            </a:extLst>
+          </p:cNvPr>
+          <p:cNvSpPr txBox="1">
+            <a:spLocks/>
+          </p:cNvSpPr>
+          <p:nvPr/>
+        </p:nvSpPr>
+        <p:spPr>
+          <a:xfrm>
+            <a:off x="6179345" y="381792"/>
+            <a:ext cx="5181599" cy="1325563"/>
+          </a:xfrm>
+          <a:prstGeom prst="plaque">
+            <a:avLst/>
+          </a:prstGeom>
+          <a:solidFill>
+            <a:schemeClr val="bg1">
+              <a:alpha val="82000"/>
+            </a:schemeClr>
+          </a:solidFill>
+        </p:spPr>
+        <p:txBody>
+          <a:bodyPr vert="horz" lIns="91440" tIns="45720" rIns="91440" bIns="45720" rtlCol="0" anchor="ctr">
+            <a:normAutofit fontScale="90000" lnSpcReduction="10000"/>
+          </a:bodyPr>
+          <a:lstStyle>
+            <a:lvl1pPr algn="l" defTabSz="914400" rtl="0" eaLnBrk="1" latinLnBrk="0" hangingPunct="1">
+              <a:lnSpc>
+                <a:spcPct val="90000"/>
+              </a:lnSpc>
+              <a:spcBef>
+                <a:spcPct val="0"/>
+              </a:spcBef>
+              <a:buNone/>
+              <a:defRPr sz="4400" kern="1200">
+                <a:solidFill>
+                  <a:schemeClr val="tx1"/>
+                </a:solidFill>
+                <a:latin typeface="+mj-lt"/>
+                <a:ea typeface="+mj-ea"/>
+                <a:cs typeface="+mj-cs"/>
+              </a:defRPr>
+            </a:lvl1pPr>
+          </a:lstStyle>
+          <a:p>
+            <a:pPr algn="ctr"/>
+            <a:r>
+              <a:rPr lang="en-US" sz="4000" dirty="0">
+                <a:latin typeface="Britannic Bold" panose="020B0903060703020204" pitchFamily="34" charset="0"/>
+              </a:rPr>
+              <a:t>Weaknesses of the visual?</a:t>
+            </a:r>
+          </a:p>
+        </p:txBody>
+      </p:sp>
+      <p:sp>
+        <p:nvSpPr>
+          <p:cNvPr id="10" name="Title 4">
+            <a:extLst>
+              <a:ext uri="{FF2B5EF4-FFF2-40B4-BE49-F238E27FC236}">
+                <a16:creationId xmlns:a16="http://schemas.microsoft.com/office/drawing/2014/main" id="{DF352485-0744-4634-AFB6-0E43C0FEA7A7}"/>
+              </a:ext>
+            </a:extLst>
+          </p:cNvPr>
+          <p:cNvSpPr txBox="1">
+            <a:spLocks/>
+          </p:cNvSpPr>
+          <p:nvPr/>
+        </p:nvSpPr>
+        <p:spPr>
+          <a:xfrm>
+            <a:off x="6353176" y="531812"/>
+            <a:ext cx="4833938" cy="1025525"/>
+          </a:xfrm>
+          <a:prstGeom prst="plaque">
+            <a:avLst/>
+          </a:prstGeom>
+          <a:noFill/>
+          <a:ln w="38100">
+            <a:solidFill>
+              <a:schemeClr val="tx1"/>
+            </a:solidFill>
+          </a:ln>
+        </p:spPr>
+        <p:txBody>
+          <a:bodyPr vert="horz" lIns="91440" tIns="45720" rIns="91440" bIns="45720" rtlCol="0" anchor="ctr">
+            <a:normAutofit fontScale="97500"/>
+          </a:bodyPr>
+          <a:lstStyle>
+            <a:lvl1pPr algn="l" defTabSz="914400" rtl="0" eaLnBrk="1" latinLnBrk="0" hangingPunct="1">
+              <a:lnSpc>
+                <a:spcPct val="90000"/>
+              </a:lnSpc>
+              <a:spcBef>
+                <a:spcPct val="0"/>
+              </a:spcBef>
+              <a:buNone/>
+              <a:defRPr sz="4400" kern="1200">
+                <a:solidFill>
+                  <a:schemeClr val="tx1"/>
+                </a:solidFill>
+                <a:latin typeface="+mj-lt"/>
+                <a:ea typeface="+mj-ea"/>
+                <a:cs typeface="+mj-cs"/>
+              </a:defRPr>
+            </a:lvl1pPr>
+          </a:lstStyle>
+          <a:p>
+            <a:pPr algn="ctr"/>
+            <a:endParaRPr lang="en-US" sz="4000" dirty="0">
+              <a:latin typeface="Britannic Bold" panose="020B0903060703020204" pitchFamily="34" charset="0"/>
+            </a:endParaRPr>
+          </a:p>
+        </p:txBody>
+      </p:sp>
     </p:spTree>
     <p:extLst>
       <p:ext uri="{BB962C8B-B14F-4D97-AF65-F5344CB8AC3E}">
         <p14:creationId xmlns:p14="http://schemas.microsoft.com/office/powerpoint/2010/main" val="1226828684"/>
-      </p:ext>
-    </p:extLst>
-  </p:cSld>
-  <p:clrMapOvr>
-    <a:overrideClrMapping bg1="lt1" tx1="dk1" bg2="lt2" tx2="dk2" accent1="accent1" accent2="accent2" accent3="accent3" accent4="accent4" accent5="accent5" accent6="accent6" hlink="hlink" folHlink="folHlink"/>
-  </p:clrMapOvr>
-</p:sld>
-</file>
-
-<file path=ppt/slides/slide9.xml><?xml version="1.0" encoding="utf-8"?>
-<p:sld xmlns:a="http://schemas.openxmlformats.org/drawingml/2006/main" xmlns:r="http://schemas.openxmlformats.org/officeDocument/2006/relationships" xmlns:p="http://schemas.openxmlformats.org/presentationml/2006/main">
-  <p:cSld>
-    <p:bg>
-      <p:bgPr>
-        <a:blipFill dpi="0" rotWithShape="1">
-          <a:blip r:embed="rId3">
-            <a:alphaModFix amt="30000"/>
-            <a:lum/>
-          </a:blip>
-          <a:srcRect/>
-          <a:stretch>
-            <a:fillRect t="-11000" b="-11000"/>
-          </a:stretch>
-        </a:blipFill>
-        <a:effectLst/>
-      </p:bgPr>
-    </p:bg>
-    <p:spTree>
-      <p:nvGrpSpPr>
-        <p:cNvPr id="1" name=""/>
-        <p:cNvGrpSpPr/>
-        <p:nvPr/>
-      </p:nvGrpSpPr>
-      <p:grpSpPr>
-        <a:xfrm>
-          <a:off x="0" y="0"/>
-          <a:ext cx="0" cy="0"/>
-          <a:chOff x="0" y="0"/>
-          <a:chExt cx="0" cy="0"/>
-        </a:xfrm>
-      </p:grpSpPr>
-      <p:sp>
-        <p:nvSpPr>
-          <p:cNvPr id="2" name="Title 1">
-            <a:extLst>
-              <a:ext uri="{FF2B5EF4-FFF2-40B4-BE49-F238E27FC236}">
-                <a16:creationId xmlns:a16="http://schemas.microsoft.com/office/drawing/2014/main" id="{F342C771-8A79-4EDD-B850-CD0D4E135C1D}"/>
-              </a:ext>
-            </a:extLst>
-          </p:cNvPr>
-          <p:cNvSpPr>
-            <a:spLocks noGrp="1"/>
-          </p:cNvSpPr>
-          <p:nvPr>
-            <p:ph type="title"/>
-          </p:nvPr>
-        </p:nvSpPr>
-        <p:spPr>
-          <a:xfrm>
-            <a:off x="654213" y="342105"/>
-            <a:ext cx="5334000" cy="1325563"/>
-          </a:xfrm>
-        </p:spPr>
-        <p:txBody>
-          <a:bodyPr/>
-          <a:lstStyle/>
-          <a:p>
-            <a:r>
-              <a:rPr lang="en-US" b="1" dirty="0"/>
-              <a:t>Recreating the Original Visualization</a:t>
-            </a:r>
-          </a:p>
-        </p:txBody>
-      </p:sp>
-      <p:sp>
-        <p:nvSpPr>
-          <p:cNvPr id="3" name="Content Placeholder 2">
-            <a:extLst>
-              <a:ext uri="{FF2B5EF4-FFF2-40B4-BE49-F238E27FC236}">
-                <a16:creationId xmlns:a16="http://schemas.microsoft.com/office/drawing/2014/main" id="{6E5D2DBC-9BC9-4FBB-8EC1-73B6689261A5}"/>
-              </a:ext>
-            </a:extLst>
-          </p:cNvPr>
-          <p:cNvSpPr>
-            <a:spLocks noGrp="1"/>
-          </p:cNvSpPr>
-          <p:nvPr>
-            <p:ph sz="half" idx="1"/>
-          </p:nvPr>
-        </p:nvSpPr>
-        <p:spPr>
-          <a:xfrm>
-            <a:off x="838200" y="1825625"/>
-            <a:ext cx="5150013" cy="4351338"/>
-          </a:xfrm>
-          <a:solidFill>
-            <a:srgbClr val="F2F3F5"/>
-          </a:solidFill>
-        </p:spPr>
-        <p:txBody>
-          <a:bodyPr/>
-          <a:lstStyle/>
-          <a:p>
-            <a:r>
-              <a:rPr lang="en-US" dirty="0"/>
-              <a:t>Required three </a:t>
-            </a:r>
-            <a:r>
-              <a:rPr lang="en-US" dirty="0" err="1"/>
-              <a:t>geoms</a:t>
-            </a:r>
-            <a:r>
-              <a:rPr lang="en-US" dirty="0"/>
-              <a:t> to plot:</a:t>
-            </a:r>
-          </a:p>
-          <a:p>
-            <a:pPr lvl="1"/>
-            <a:r>
-              <a:rPr lang="en-US" dirty="0"/>
-              <a:t>“Displayed time” </a:t>
-            </a:r>
-            <a:r>
-              <a:rPr lang="en-US" dirty="0" err="1"/>
-              <a:t>geom_point</a:t>
-            </a:r>
-            <a:endParaRPr lang="en-US" dirty="0"/>
-          </a:p>
-          <a:p>
-            <a:pPr lvl="1"/>
-            <a:r>
-              <a:rPr lang="en-US" dirty="0"/>
-              <a:t>“Actual time” </a:t>
-            </a:r>
-            <a:r>
-              <a:rPr lang="en-US" dirty="0" err="1"/>
-              <a:t>geom_point</a:t>
-            </a:r>
-            <a:endParaRPr lang="en-US" dirty="0"/>
-          </a:p>
-          <a:p>
-            <a:pPr lvl="1"/>
-            <a:r>
-              <a:rPr lang="en-US" dirty="0" err="1"/>
-              <a:t>geom_segment</a:t>
-            </a:r>
-            <a:endParaRPr lang="en-US" dirty="0"/>
-          </a:p>
-          <a:p>
-            <a:r>
-              <a:rPr lang="en-US" dirty="0" err="1"/>
-              <a:t>gganimate</a:t>
-            </a:r>
-            <a:r>
-              <a:rPr lang="en-US" dirty="0"/>
-              <a:t> (not yet available on CRAN). Requires a dedicated variable to map to each “frame” of the animation (only 2 here)</a:t>
-            </a:r>
-          </a:p>
-          <a:p>
-            <a:r>
-              <a:rPr lang="en-US" i="1" dirty="0"/>
-              <a:t>A lot </a:t>
-            </a:r>
-            <a:r>
-              <a:rPr lang="en-US" dirty="0"/>
-              <a:t>of data wrangling was required to prepare the dataset</a:t>
-            </a:r>
-            <a:endParaRPr lang="en-US" i="1" dirty="0"/>
-          </a:p>
-        </p:txBody>
-      </p:sp>
-      <p:sp>
-        <p:nvSpPr>
-          <p:cNvPr id="4" name="Content Placeholder 3">
-            <a:extLst>
-              <a:ext uri="{FF2B5EF4-FFF2-40B4-BE49-F238E27FC236}">
-                <a16:creationId xmlns:a16="http://schemas.microsoft.com/office/drawing/2014/main" id="{B3FBE695-2FD2-4F04-8E67-45E759F25084}"/>
-              </a:ext>
-            </a:extLst>
-          </p:cNvPr>
-          <p:cNvSpPr>
-            <a:spLocks noGrp="1"/>
-          </p:cNvSpPr>
-          <p:nvPr>
-            <p:ph sz="half" idx="2"/>
-          </p:nvPr>
-        </p:nvSpPr>
-        <p:spPr/>
-        <p:txBody>
-          <a:bodyPr/>
-          <a:lstStyle/>
-          <a:p>
-            <a:endParaRPr lang="en-US"/>
-          </a:p>
-        </p:txBody>
-      </p:sp>
-      <p:pic>
-        <p:nvPicPr>
-          <p:cNvPr id="6" name="Content Placeholder 8">
-            <a:extLst>
-              <a:ext uri="{FF2B5EF4-FFF2-40B4-BE49-F238E27FC236}">
-                <a16:creationId xmlns:a16="http://schemas.microsoft.com/office/drawing/2014/main" id="{84C5E007-CAF2-4FA7-BDCC-44A613DE3C81}"/>
-              </a:ext>
-            </a:extLst>
-          </p:cNvPr>
-          <p:cNvPicPr>
-            <a:picLocks noChangeAspect="1"/>
-          </p:cNvPicPr>
-          <p:nvPr/>
-        </p:nvPicPr>
-        <p:blipFill>
-          <a:blip r:embed="rId4">
-            <a:extLst>
-              <a:ext uri="{28A0092B-C50C-407E-A947-70E740481C1C}">
-                <a14:useLocalDpi xmlns:a14="http://schemas.microsoft.com/office/drawing/2010/main" val="0"/>
-              </a:ext>
-            </a:extLst>
-          </a:blip>
-          <a:stretch>
-            <a:fillRect/>
-          </a:stretch>
-        </p:blipFill>
-        <p:spPr>
-          <a:xfrm>
-            <a:off x="5872959" y="523080"/>
-            <a:ext cx="5780082" cy="5811840"/>
-          </a:xfrm>
-          <a:prstGeom prst="rect">
-            <a:avLst/>
-          </a:prstGeom>
-        </p:spPr>
-      </p:pic>
-    </p:spTree>
-    <p:extLst>
-      <p:ext uri="{BB962C8B-B14F-4D97-AF65-F5344CB8AC3E}">
-        <p14:creationId xmlns:p14="http://schemas.microsoft.com/office/powerpoint/2010/main" val="2257586544"/>
       </p:ext>
     </p:extLst>
   </p:cSld>

</xml_diff>

<commit_message>
some additions to ppt slides
</commit_message>
<xml_diff>
--- a/Trains vs Planes.pptx
+++ b/Trains vs Planes.pptx
@@ -6,7 +6,7 @@
   </p:sldMasterIdLst>
   <p:sldIdLst>
     <p:sldId id="256" r:id="rId2"/>
-    <p:sldId id="270" r:id="rId3"/>
+    <p:sldId id="272" r:id="rId3"/>
     <p:sldId id="257" r:id="rId4"/>
     <p:sldId id="258" r:id="rId5"/>
     <p:sldId id="259" r:id="rId6"/>
@@ -14,10 +14,12 @@
     <p:sldId id="271" r:id="rId8"/>
     <p:sldId id="263" r:id="rId9"/>
     <p:sldId id="264" r:id="rId10"/>
-    <p:sldId id="268" r:id="rId11"/>
-    <p:sldId id="266" r:id="rId12"/>
-    <p:sldId id="261" r:id="rId13"/>
-    <p:sldId id="262" r:id="rId14"/>
+    <p:sldId id="273" r:id="rId11"/>
+    <p:sldId id="268" r:id="rId12"/>
+    <p:sldId id="274" r:id="rId13"/>
+    <p:sldId id="266" r:id="rId14"/>
+    <p:sldId id="261" r:id="rId15"/>
+    <p:sldId id="262" r:id="rId16"/>
   </p:sldIdLst>
   <p:sldSz cx="12192000" cy="6858000"/>
   <p:notesSz cx="6858000" cy="9144000"/>
@@ -3709,10 +3711,35 @@
       </p:grpSpPr>
       <p:sp>
         <p:nvSpPr>
+          <p:cNvPr id="2" name="Title 1">
+            <a:extLst>
+              <a:ext uri="{FF2B5EF4-FFF2-40B4-BE49-F238E27FC236}">
+                <a16:creationId xmlns:a16="http://schemas.microsoft.com/office/drawing/2014/main" id="{0A2B360F-3AA5-46E0-8D77-F494DEACB4BE}"/>
+              </a:ext>
+            </a:extLst>
+          </p:cNvPr>
+          <p:cNvSpPr>
+            <a:spLocks noGrp="1"/>
+          </p:cNvSpPr>
+          <p:nvPr>
+            <p:ph type="title"/>
+          </p:nvPr>
+        </p:nvSpPr>
+        <p:spPr/>
+        <p:txBody>
+          <a:bodyPr/>
+          <a:lstStyle/>
+          <a:p>
+            <a:endParaRPr lang="en-US" b="1" dirty="0"/>
+          </a:p>
+        </p:txBody>
+      </p:sp>
+      <p:sp>
+        <p:nvSpPr>
           <p:cNvPr id="3" name="Content Placeholder 2">
             <a:extLst>
               <a:ext uri="{FF2B5EF4-FFF2-40B4-BE49-F238E27FC236}">
-                <a16:creationId xmlns:a16="http://schemas.microsoft.com/office/drawing/2014/main" id="{6E5D2DBC-9BC9-4FBB-8EC1-73B6689261A5}"/>
+                <a16:creationId xmlns:a16="http://schemas.microsoft.com/office/drawing/2014/main" id="{BEF00A0B-ABA4-4706-9F23-0CB2CD2CC617}"/>
               </a:ext>
             </a:extLst>
           </p:cNvPr>
@@ -3725,20 +3752,19 @@
         </p:nvSpPr>
         <p:spPr>
           <a:xfrm>
-            <a:off x="838200" y="1825625"/>
-            <a:ext cx="5150013" cy="4351338"/>
+            <a:off x="838199" y="1825625"/>
+            <a:ext cx="10515599" cy="4351338"/>
           </a:xfrm>
-          <a:solidFill>
-            <a:srgbClr val="F2F3F5"/>
-          </a:solidFill>
         </p:spPr>
         <p:txBody>
-          <a:bodyPr/>
+          <a:bodyPr>
+            <a:normAutofit/>
+          </a:bodyPr>
           <a:lstStyle/>
           <a:p>
             <a:r>
               <a:rPr lang="en-US" dirty="0"/>
-              <a:t>Required three </a:t>
+              <a:t>Because I layered multiple </a:t>
             </a:r>
             <a:r>
               <a:rPr lang="en-US" dirty="0" err="1"/>
@@ -3746,95 +3772,75 @@
             </a:r>
             <a:r>
               <a:rPr lang="en-US" dirty="0"/>
-              <a:t> to plot:</a:t>
+              <a:t> to plot the points &amp; lines, I needed 2 uniquely formatted datasets</a:t>
             </a:r>
           </a:p>
           <a:p>
             <a:pPr lvl="1"/>
             <a:r>
+              <a:rPr lang="en-US" dirty="0" err="1"/>
+              <a:t>Geom_segment</a:t>
+            </a:r>
+            <a:r>
               <a:rPr lang="en-US" dirty="0"/>
-              <a:t>“Displayed time” </a:t>
+              <a:t> needs only endpoints defined: use a </a:t>
             </a:r>
             <a:r>
               <a:rPr lang="en-US" dirty="0" err="1"/>
-              <a:t>geom_point</a:t>
-            </a:r>
-            <a:endParaRPr lang="en-US" dirty="0"/>
+              <a:t>group_by</a:t>
+            </a:r>
+            <a:r>
+              <a:rPr lang="en-US" dirty="0"/>
+              <a:t> on route only and summarize w/ min() &amp; max()</a:t>
+            </a:r>
           </a:p>
           <a:p>
             <a:pPr lvl="1"/>
             <a:r>
+              <a:rPr lang="en-US" dirty="0" err="1"/>
+              <a:t>Geom_point</a:t>
+            </a:r>
+            <a:r>
               <a:rPr lang="en-US" dirty="0"/>
-              <a:t>“Actual time” </a:t>
+              <a:t> needs coordinates defined, and also mode (for color aesthetic): use a </a:t>
             </a:r>
             <a:r>
               <a:rPr lang="en-US" dirty="0" err="1"/>
-              <a:t>geom_point</a:t>
-            </a:r>
-            <a:endParaRPr lang="en-US" dirty="0"/>
-          </a:p>
-          <a:p>
-            <a:pPr lvl="1"/>
-            <a:r>
-              <a:rPr lang="en-US" dirty="0" err="1"/>
-              <a:t>geom_segment</a:t>
-            </a:r>
-            <a:endParaRPr lang="en-US" dirty="0"/>
-          </a:p>
-          <a:p>
+              <a:t>group_by</a:t>
+            </a:r>
+            <a:r>
+              <a:rPr lang="en-US" dirty="0"/>
+              <a:t> on route and mode, summarize with mean()</a:t>
+            </a:r>
+          </a:p>
+          <a:p>
+            <a:r>
+              <a:rPr lang="en-US" dirty="0"/>
+              <a:t>Time data is extremely tricky to format &amp; process… spent a lot of sweat and tears only to realize there was an easier way!</a:t>
+            </a:r>
+          </a:p>
+          <a:p>
+            <a:r>
+              <a:rPr lang="en-US" dirty="0"/>
+              <a:t> Produced the 2 frames of the .gif separately before using </a:t>
+            </a:r>
             <a:r>
               <a:rPr lang="en-US" dirty="0" err="1"/>
               <a:t>gganimate</a:t>
             </a:r>
             <a:r>
               <a:rPr lang="en-US" dirty="0"/>
-              <a:t> (not yet available on CRAN). Requires a dedicated variable to map to each “frame” of the animation (only 2 here)</a:t>
-            </a:r>
-          </a:p>
-          <a:p>
-            <a:r>
-              <a:rPr lang="en-US" i="1" dirty="0"/>
-              <a:t>A lot </a:t>
-            </a:r>
-            <a:r>
-              <a:rPr lang="en-US" dirty="0"/>
-              <a:t>of data wrangling was required to prepare the dataset</a:t>
-            </a:r>
-            <a:endParaRPr lang="en-US" i="1" dirty="0"/>
-          </a:p>
-        </p:txBody>
-      </p:sp>
-      <p:sp>
-        <p:nvSpPr>
-          <p:cNvPr id="4" name="Content Placeholder 3">
-            <a:extLst>
-              <a:ext uri="{FF2B5EF4-FFF2-40B4-BE49-F238E27FC236}">
-                <a16:creationId xmlns:a16="http://schemas.microsoft.com/office/drawing/2014/main" id="{B3FBE695-2FD2-4F04-8E67-45E759F25084}"/>
-              </a:ext>
-            </a:extLst>
-          </p:cNvPr>
-          <p:cNvSpPr>
-            <a:spLocks noGrp="1"/>
-          </p:cNvSpPr>
-          <p:nvPr>
-            <p:ph sz="half" idx="2"/>
-          </p:nvPr>
-        </p:nvSpPr>
-        <p:spPr/>
-        <p:txBody>
-          <a:bodyPr/>
-          <a:lstStyle/>
-          <a:p>
-            <a:endParaRPr lang="en-US"/>
+              <a:t> to combine them</a:t>
+            </a:r>
           </a:p>
         </p:txBody>
       </p:sp>
       <p:pic>
         <p:nvPicPr>
-          <p:cNvPr id="6" name="Content Placeholder 8">
-            <a:extLst>
-              <a:ext uri="{FF2B5EF4-FFF2-40B4-BE49-F238E27FC236}">
-                <a16:creationId xmlns:a16="http://schemas.microsoft.com/office/drawing/2014/main" id="{84C5E007-CAF2-4FA7-BDCC-44A613DE3C81}"/>
+          <p:cNvPr id="5" name="Picture 4">
+            <a:extLst>
+              <a:ext uri="{FF2B5EF4-FFF2-40B4-BE49-F238E27FC236}">
+                <a16:creationId xmlns:a16="http://schemas.microsoft.com/office/drawing/2014/main" id="{C7BF514A-A273-4647-8B01-697BA369EC95}"/>
               </a:ext>
             </a:extLst>
           </p:cNvPr>
@@ -3844,21 +3850,15 @@
           <p:nvPr/>
         </p:nvPicPr>
         <p:blipFill>
-          <a:blip r:embed="rId3">
-            <a:extLst>
-              <a:ext uri="{28A0092B-C50C-407E-A947-70E740481C1C}">
-                <a14:useLocalDpi xmlns:a14="http://schemas.microsoft.com/office/drawing/2010/main" val="0"/>
-              </a:ext>
-            </a:extLst>
-          </a:blip>
+          <a:blip r:embed="rId2"/>
           <a:stretch>
             <a:fillRect/>
           </a:stretch>
         </p:blipFill>
         <p:spPr>
           <a:xfrm>
-            <a:off x="5872959" y="523080"/>
-            <a:ext cx="5780082" cy="5811840"/>
+            <a:off x="1033279" y="6342855"/>
+            <a:ext cx="10135296" cy="159360"/>
           </a:xfrm>
           <a:prstGeom prst="rect">
             <a:avLst/>
@@ -3867,10 +3867,10 @@
       </p:pic>
       <p:sp>
         <p:nvSpPr>
-          <p:cNvPr id="10" name="Title 4">
-            <a:extLst>
-              <a:ext uri="{FF2B5EF4-FFF2-40B4-BE49-F238E27FC236}">
-                <a16:creationId xmlns:a16="http://schemas.microsoft.com/office/drawing/2014/main" id="{CEFC904E-F77F-45B0-81CC-0876651A7258}"/>
+          <p:cNvPr id="6" name="Title 4">
+            <a:extLst>
+              <a:ext uri="{FF2B5EF4-FFF2-40B4-BE49-F238E27FC236}">
+                <a16:creationId xmlns:a16="http://schemas.microsoft.com/office/drawing/2014/main" id="{5B7E412F-839E-4554-BDF5-010F622FD162}"/>
               </a:ext>
             </a:extLst>
           </p:cNvPr>
@@ -3881,7 +3881,7 @@
         </p:nvSpPr>
         <p:spPr>
           <a:xfrm>
-            <a:off x="327185" y="342105"/>
+            <a:off x="3173386" y="365125"/>
             <a:ext cx="5181599" cy="1325563"/>
           </a:xfrm>
           <a:prstGeom prst="plaque">
@@ -3919,20 +3919,23 @@
           <a:p>
             <a:pPr algn="ctr"/>
             <a:r>
-              <a:rPr lang="en-US" sz="4000" dirty="0">
+              <a:rPr lang="en-US" sz="4000" b="1" dirty="0">
                 <a:latin typeface="Britannic Bold" panose="020B0903060703020204" pitchFamily="34" charset="0"/>
               </a:rPr>
-              <a:t>Recreate Original Visualization</a:t>
-            </a:r>
-          </a:p>
-        </p:txBody>
-      </p:sp>
-      <p:sp>
-        <p:nvSpPr>
-          <p:cNvPr id="11" name="Title 4">
-            <a:extLst>
-              <a:ext uri="{FF2B5EF4-FFF2-40B4-BE49-F238E27FC236}">
-                <a16:creationId xmlns:a16="http://schemas.microsoft.com/office/drawing/2014/main" id="{27A4F897-9371-4FF5-80D6-BACA8BD10996}"/>
+              <a:t>Data Processing: Time Cost Visualization</a:t>
+            </a:r>
+            <a:endParaRPr lang="en-US" sz="4000" dirty="0">
+              <a:latin typeface="Britannic Bold" panose="020B0903060703020204" pitchFamily="34" charset="0"/>
+            </a:endParaRPr>
+          </a:p>
+        </p:txBody>
+      </p:sp>
+      <p:sp>
+        <p:nvSpPr>
+          <p:cNvPr id="7" name="Title 4">
+            <a:extLst>
+              <a:ext uri="{FF2B5EF4-FFF2-40B4-BE49-F238E27FC236}">
+                <a16:creationId xmlns:a16="http://schemas.microsoft.com/office/drawing/2014/main" id="{274D0B14-536A-4F16-99A3-8FB182921FD8}"/>
               </a:ext>
             </a:extLst>
           </p:cNvPr>
@@ -3943,7 +3946,7 @@
         </p:nvSpPr>
         <p:spPr>
           <a:xfrm>
-            <a:off x="501016" y="492125"/>
+            <a:off x="3347217" y="515145"/>
             <a:ext cx="4833938" cy="1025525"/>
           </a:xfrm>
           <a:prstGeom prst="plaque">
@@ -3987,16 +3990,148 @@
           </a:p>
         </p:txBody>
       </p:sp>
+      <p:pic>
+        <p:nvPicPr>
+          <p:cNvPr id="4" name="Picture 3">
+            <a:extLst>
+              <a:ext uri="{FF2B5EF4-FFF2-40B4-BE49-F238E27FC236}">
+                <a16:creationId xmlns:a16="http://schemas.microsoft.com/office/drawing/2014/main" id="{5ACFB039-F4EE-403A-B7E1-5E631DA6FDC0}"/>
+              </a:ext>
+            </a:extLst>
+          </p:cNvPr>
+          <p:cNvPicPr>
+            <a:picLocks noChangeAspect="1"/>
+          </p:cNvPicPr>
+          <p:nvPr/>
+        </p:nvPicPr>
+        <p:blipFill>
+          <a:blip r:embed="rId3"/>
+          <a:stretch>
+            <a:fillRect/>
+          </a:stretch>
+        </p:blipFill>
+        <p:spPr>
+          <a:xfrm>
+            <a:off x="1028352" y="6058722"/>
+            <a:ext cx="8448675" cy="152400"/>
+          </a:xfrm>
+          <a:prstGeom prst="rect">
+            <a:avLst/>
+          </a:prstGeom>
+        </p:spPr>
+      </p:pic>
     </p:spTree>
     <p:extLst>
       <p:ext uri="{BB962C8B-B14F-4D97-AF65-F5344CB8AC3E}">
-        <p14:creationId xmlns:p14="http://schemas.microsoft.com/office/powerpoint/2010/main" val="2257586544"/>
+        <p14:creationId xmlns:p14="http://schemas.microsoft.com/office/powerpoint/2010/main" val="3032651732"/>
       </p:ext>
     </p:extLst>
   </p:cSld>
   <p:clrMapOvr>
-    <a:overrideClrMapping bg1="lt1" tx1="dk1" bg2="lt2" tx2="dk2" accent1="accent1" accent2="accent2" accent3="accent3" accent4="accent4" accent5="accent5" accent6="accent6" hlink="hlink" folHlink="folHlink"/>
+    <a:masterClrMapping/>
   </p:clrMapOvr>
+  <p:timing>
+    <p:tnLst>
+      <p:par>
+        <p:cTn id="1" dur="indefinite" restart="never" nodeType="tmRoot">
+          <p:childTnLst>
+            <p:seq concurrent="1" nextAc="seek">
+              <p:cTn id="2" dur="indefinite" nodeType="mainSeq">
+                <p:childTnLst>
+                  <p:par>
+                    <p:cTn id="3" fill="hold">
+                      <p:stCondLst>
+                        <p:cond delay="indefinite"/>
+                      </p:stCondLst>
+                      <p:childTnLst>
+                        <p:par>
+                          <p:cTn id="4" fill="hold">
+                            <p:stCondLst>
+                              <p:cond delay="0"/>
+                            </p:stCondLst>
+                            <p:childTnLst>
+                              <p:par>
+                                <p:cTn id="5" presetID="1" presetClass="entr" presetSubtype="0" fill="hold" nodeType="clickEffect">
+                                  <p:stCondLst>
+                                    <p:cond delay="0"/>
+                                  </p:stCondLst>
+                                  <p:childTnLst>
+                                    <p:set>
+                                      <p:cBhvr>
+                                        <p:cTn id="6" dur="1" fill="hold">
+                                          <p:stCondLst>
+                                            <p:cond delay="0"/>
+                                          </p:stCondLst>
+                                        </p:cTn>
+                                        <p:tgtEl>
+                                          <p:spTgt spid="5"/>
+                                        </p:tgtEl>
+                                        <p:attrNameLst>
+                                          <p:attrName>style.visibility</p:attrName>
+                                        </p:attrNameLst>
+                                      </p:cBhvr>
+                                      <p:to>
+                                        <p:strVal val="visible"/>
+                                      </p:to>
+                                    </p:set>
+                                  </p:childTnLst>
+                                </p:cTn>
+                              </p:par>
+                              <p:par>
+                                <p:cTn id="7" presetID="1" presetClass="entr" presetSubtype="0" fill="hold" nodeType="withEffect">
+                                  <p:stCondLst>
+                                    <p:cond delay="0"/>
+                                  </p:stCondLst>
+                                  <p:childTnLst>
+                                    <p:set>
+                                      <p:cBhvr>
+                                        <p:cTn id="8" dur="1" fill="hold">
+                                          <p:stCondLst>
+                                            <p:cond delay="0"/>
+                                          </p:stCondLst>
+                                        </p:cTn>
+                                        <p:tgtEl>
+                                          <p:spTgt spid="4"/>
+                                        </p:tgtEl>
+                                        <p:attrNameLst>
+                                          <p:attrName>style.visibility</p:attrName>
+                                        </p:attrNameLst>
+                                      </p:cBhvr>
+                                      <p:to>
+                                        <p:strVal val="visible"/>
+                                      </p:to>
+                                    </p:set>
+                                  </p:childTnLst>
+                                </p:cTn>
+                              </p:par>
+                            </p:childTnLst>
+                          </p:cTn>
+                        </p:par>
+                      </p:childTnLst>
+                    </p:cTn>
+                  </p:par>
+                </p:childTnLst>
+              </p:cTn>
+              <p:prevCondLst>
+                <p:cond evt="onPrev" delay="0">
+                  <p:tgtEl>
+                    <p:sldTgt/>
+                  </p:tgtEl>
+                </p:cond>
+              </p:prevCondLst>
+              <p:nextCondLst>
+                <p:cond evt="onNext" delay="0">
+                  <p:tgtEl>
+                    <p:sldTgt/>
+                  </p:tgtEl>
+                </p:cond>
+              </p:nextCondLst>
+            </p:seq>
+          </p:childTnLst>
+        </p:cTn>
+      </p:par>
+    </p:tnLst>
+  </p:timing>
 </p:sld>
 </file>
 
@@ -4022,7 +4157,7 @@
           <p:cNvPr id="3" name="Content Placeholder 2">
             <a:extLst>
               <a:ext uri="{FF2B5EF4-FFF2-40B4-BE49-F238E27FC236}">
-                <a16:creationId xmlns:a16="http://schemas.microsoft.com/office/drawing/2014/main" id="{DDA52849-0140-4570-A1F0-CB0B00611132}"/>
+                <a16:creationId xmlns:a16="http://schemas.microsoft.com/office/drawing/2014/main" id="{6E5D2DBC-9BC9-4FBB-8EC1-73B6689261A5}"/>
               </a:ext>
             </a:extLst>
           </p:cNvPr>
@@ -4034,45 +4169,123 @@
           </p:nvPr>
         </p:nvSpPr>
         <p:spPr>
+          <a:xfrm>
+            <a:off x="838200" y="1825625"/>
+            <a:ext cx="5150013" cy="4351338"/>
+          </a:xfrm>
           <a:solidFill>
             <a:srgbClr val="F2F3F5"/>
           </a:solidFill>
         </p:spPr>
         <p:txBody>
-          <a:bodyPr/>
+          <a:bodyPr>
+            <a:normAutofit fontScale="92500" lnSpcReduction="10000"/>
+          </a:bodyPr>
           <a:lstStyle/>
           <a:p>
             <a:r>
               <a:rPr lang="en-US" dirty="0"/>
-              <a:t>Let’s face it… the animation makes it harder to understand the data, not easier</a:t>
-            </a:r>
-          </a:p>
-          <a:p>
+              <a:t>Required three </a:t>
+            </a:r>
+            <a:r>
+              <a:rPr lang="en-US" dirty="0" err="1"/>
+              <a:t>geoms</a:t>
+            </a:r>
             <a:r>
               <a:rPr lang="en-US" dirty="0"/>
-              <a:t>The assumed delayed applied to all plane trips may not be reasonable, or universally applicable – there are ways of conveying the spread of data</a:t>
-            </a:r>
-          </a:p>
-          <a:p>
+              <a:t> to plot:</a:t>
+            </a:r>
+          </a:p>
+          <a:p>
+            <a:pPr lvl="1"/>
+            <a:r>
+              <a:rPr lang="en-US" dirty="0"/>
+              <a:t>“Displayed time” </a:t>
+            </a:r>
+            <a:r>
+              <a:rPr lang="en-US" dirty="0" err="1"/>
+              <a:t>geom_point</a:t>
+            </a:r>
             <a:endParaRPr lang="en-US" dirty="0"/>
           </a:p>
-        </p:txBody>
-      </p:sp>
-      <p:pic>
-        <p:nvPicPr>
-          <p:cNvPr id="6" name="Content Placeholder 5">
-            <a:extLst>
-              <a:ext uri="{FF2B5EF4-FFF2-40B4-BE49-F238E27FC236}">
-                <a16:creationId xmlns:a16="http://schemas.microsoft.com/office/drawing/2014/main" id="{64CAB0A1-B04C-4AF1-8C61-062543C6F698}"/>
-              </a:ext>
-            </a:extLst>
-          </p:cNvPr>
-          <p:cNvPicPr>
-            <a:picLocks noGrp="1" noChangeAspect="1"/>
-          </p:cNvPicPr>
+          <a:p>
+            <a:pPr lvl="1"/>
+            <a:r>
+              <a:rPr lang="en-US" dirty="0"/>
+              <a:t>“Actual time” </a:t>
+            </a:r>
+            <a:r>
+              <a:rPr lang="en-US" dirty="0" err="1"/>
+              <a:t>geom_point</a:t>
+            </a:r>
+            <a:endParaRPr lang="en-US" dirty="0"/>
+          </a:p>
+          <a:p>
+            <a:pPr lvl="1"/>
+            <a:r>
+              <a:rPr lang="en-US" dirty="0" err="1"/>
+              <a:t>geom_segment</a:t>
+            </a:r>
+            <a:endParaRPr lang="en-US" dirty="0"/>
+          </a:p>
+          <a:p>
+            <a:r>
+              <a:rPr lang="en-US" dirty="0" err="1"/>
+              <a:t>gganimate</a:t>
+            </a:r>
+            <a:r>
+              <a:rPr lang="en-US" dirty="0"/>
+              <a:t> (not yet available on CRAN). Requires a dedicated variable to map to each “frame” of the animation (only 2 here)</a:t>
+            </a:r>
+          </a:p>
+          <a:p>
+            <a:r>
+              <a:rPr lang="en-US" dirty="0"/>
+              <a:t>Adding a frame variable while maintaining the existing data structure was not trivial (next slide)</a:t>
+            </a:r>
+          </a:p>
+        </p:txBody>
+      </p:sp>
+      <p:sp>
+        <p:nvSpPr>
+          <p:cNvPr id="4" name="Content Placeholder 3">
+            <a:extLst>
+              <a:ext uri="{FF2B5EF4-FFF2-40B4-BE49-F238E27FC236}">
+                <a16:creationId xmlns:a16="http://schemas.microsoft.com/office/drawing/2014/main" id="{B3FBE695-2FD2-4F04-8E67-45E759F25084}"/>
+              </a:ext>
+            </a:extLst>
+          </p:cNvPr>
+          <p:cNvSpPr>
+            <a:spLocks noGrp="1"/>
+          </p:cNvSpPr>
           <p:nvPr>
             <p:ph sz="half" idx="2"/>
           </p:nvPr>
+        </p:nvSpPr>
+        <p:spPr/>
+        <p:txBody>
+          <a:bodyPr>
+            <a:normAutofit fontScale="92500" lnSpcReduction="10000"/>
+          </a:bodyPr>
+          <a:lstStyle/>
+          <a:p>
+            <a:endParaRPr lang="en-US"/>
+          </a:p>
+        </p:txBody>
+      </p:sp>
+      <p:pic>
+        <p:nvPicPr>
+          <p:cNvPr id="6" name="Content Placeholder 8">
+            <a:extLst>
+              <a:ext uri="{FF2B5EF4-FFF2-40B4-BE49-F238E27FC236}">
+                <a16:creationId xmlns:a16="http://schemas.microsoft.com/office/drawing/2014/main" id="{84C5E007-CAF2-4FA7-BDCC-44A613DE3C81}"/>
+              </a:ext>
+            </a:extLst>
+          </p:cNvPr>
+          <p:cNvPicPr>
+            <a:picLocks noChangeAspect="1"/>
+          </p:cNvPicPr>
+          <p:nvPr/>
         </p:nvPicPr>
         <p:blipFill>
           <a:blip r:embed="rId3">
@@ -4088,17 +4301,20 @@
         </p:blipFill>
         <p:spPr>
           <a:xfrm>
-            <a:off x="6096000" y="521208"/>
-            <a:ext cx="5815584" cy="5815584"/>
+            <a:off x="5872959" y="523080"/>
+            <a:ext cx="5780082" cy="5811840"/>
           </a:xfrm>
+          <a:prstGeom prst="rect">
+            <a:avLst/>
+          </a:prstGeom>
         </p:spPr>
       </p:pic>
       <p:sp>
         <p:nvSpPr>
-          <p:cNvPr id="9" name="Title 4">
-            <a:extLst>
-              <a:ext uri="{FF2B5EF4-FFF2-40B4-BE49-F238E27FC236}">
-                <a16:creationId xmlns:a16="http://schemas.microsoft.com/office/drawing/2014/main" id="{1C70DD14-7D63-40CF-9E22-07E093649B64}"/>
+          <p:cNvPr id="10" name="Title 4">
+            <a:extLst>
+              <a:ext uri="{FF2B5EF4-FFF2-40B4-BE49-F238E27FC236}">
+                <a16:creationId xmlns:a16="http://schemas.microsoft.com/office/drawing/2014/main" id="{CEFC904E-F77F-45B0-81CC-0876651A7258}"/>
               </a:ext>
             </a:extLst>
           </p:cNvPr>
@@ -4109,7 +4325,7 @@
         </p:nvSpPr>
         <p:spPr>
           <a:xfrm>
-            <a:off x="838200" y="395860"/>
+            <a:off x="327185" y="342105"/>
             <a:ext cx="5181599" cy="1325563"/>
           </a:xfrm>
           <a:prstGeom prst="plaque">
@@ -4150,17 +4366,17 @@
               <a:rPr lang="en-US" sz="4000" dirty="0">
                 <a:latin typeface="Britannic Bold" panose="020B0903060703020204" pitchFamily="34" charset="0"/>
               </a:rPr>
-              <a:t>Improving the Original Visualization</a:t>
-            </a:r>
-          </a:p>
-        </p:txBody>
-      </p:sp>
-      <p:sp>
-        <p:nvSpPr>
-          <p:cNvPr id="10" name="Title 4">
-            <a:extLst>
-              <a:ext uri="{FF2B5EF4-FFF2-40B4-BE49-F238E27FC236}">
-                <a16:creationId xmlns:a16="http://schemas.microsoft.com/office/drawing/2014/main" id="{134F17A5-8BB0-4C0A-B66A-AE9E73A63E10}"/>
+              <a:t>Recreate Original Visualization</a:t>
+            </a:r>
+          </a:p>
+        </p:txBody>
+      </p:sp>
+      <p:sp>
+        <p:nvSpPr>
+          <p:cNvPr id="11" name="Title 4">
+            <a:extLst>
+              <a:ext uri="{FF2B5EF4-FFF2-40B4-BE49-F238E27FC236}">
+                <a16:creationId xmlns:a16="http://schemas.microsoft.com/office/drawing/2014/main" id="{27A4F897-9371-4FF5-80D6-BACA8BD10996}"/>
               </a:ext>
             </a:extLst>
           </p:cNvPr>
@@ -4171,7 +4387,7 @@
         </p:nvSpPr>
         <p:spPr>
           <a:xfrm>
-            <a:off x="1012031" y="545880"/>
+            <a:off x="501016" y="492125"/>
             <a:ext cx="4833938" cy="1025525"/>
           </a:xfrm>
           <a:prstGeom prst="plaque">
@@ -4218,7 +4434,7 @@
     </p:spTree>
     <p:extLst>
       <p:ext uri="{BB962C8B-B14F-4D97-AF65-F5344CB8AC3E}">
-        <p14:creationId xmlns:p14="http://schemas.microsoft.com/office/powerpoint/2010/main" val="2675873568"/>
+        <p14:creationId xmlns:p14="http://schemas.microsoft.com/office/powerpoint/2010/main" val="2257586544"/>
       </p:ext>
     </p:extLst>
   </p:cSld>
@@ -4247,10 +4463,35 @@
       </p:grpSpPr>
       <p:sp>
         <p:nvSpPr>
+          <p:cNvPr id="2" name="Title 1">
+            <a:extLst>
+              <a:ext uri="{FF2B5EF4-FFF2-40B4-BE49-F238E27FC236}">
+                <a16:creationId xmlns:a16="http://schemas.microsoft.com/office/drawing/2014/main" id="{0A2B360F-3AA5-46E0-8D77-F494DEACB4BE}"/>
+              </a:ext>
+            </a:extLst>
+          </p:cNvPr>
+          <p:cNvSpPr>
+            <a:spLocks noGrp="1"/>
+          </p:cNvSpPr>
+          <p:nvPr>
+            <p:ph type="title"/>
+          </p:nvPr>
+        </p:nvSpPr>
+        <p:spPr/>
+        <p:txBody>
+          <a:bodyPr/>
+          <a:lstStyle/>
+          <a:p>
+            <a:endParaRPr lang="en-US" b="1" dirty="0"/>
+          </a:p>
+        </p:txBody>
+      </p:sp>
+      <p:sp>
+        <p:nvSpPr>
           <p:cNvPr id="3" name="Content Placeholder 2">
             <a:extLst>
               <a:ext uri="{FF2B5EF4-FFF2-40B4-BE49-F238E27FC236}">
-                <a16:creationId xmlns:a16="http://schemas.microsoft.com/office/drawing/2014/main" id="{FECAB945-8F13-4CDA-80D9-2B7B6066653A}"/>
+                <a16:creationId xmlns:a16="http://schemas.microsoft.com/office/drawing/2014/main" id="{BEF00A0B-ABA4-4706-9F23-0CB2CD2CC617}"/>
               </a:ext>
             </a:extLst>
           </p:cNvPr>
@@ -4261,60 +4502,302 @@
             <p:ph sz="half" idx="1"/>
           </p:nvPr>
         </p:nvSpPr>
-        <p:spPr/>
-        <p:txBody>
-          <a:bodyPr/>
+        <p:spPr>
+          <a:xfrm>
+            <a:off x="838199" y="1825625"/>
+            <a:ext cx="5257801" cy="4351338"/>
+          </a:xfrm>
+        </p:spPr>
+        <p:txBody>
+          <a:bodyPr>
+            <a:normAutofit fontScale="92500" lnSpcReduction="20000"/>
+          </a:bodyPr>
           <a:lstStyle/>
           <a:p>
             <a:r>
               <a:rPr lang="en-US" dirty="0"/>
-              <a:t>Recreating the visual – cost</a:t>
-            </a:r>
-          </a:p>
-          <a:p>
-            <a:pPr lvl="1"/>
+              <a:t>I created 2 separate datasets, as before: one to define the </a:t>
+            </a:r>
+            <a:r>
+              <a:rPr lang="en-US" dirty="0" err="1"/>
+              <a:t>geom_segment</a:t>
+            </a:r>
             <a:r>
               <a:rPr lang="en-US" dirty="0"/>
-              <a:t>Underlining planes vs. trains as the legend</a:t>
-            </a:r>
-          </a:p>
-          <a:p>
-            <a:pPr lvl="1"/>
+              <a:t> &amp; another for </a:t>
+            </a:r>
+            <a:r>
+              <a:rPr lang="en-US" dirty="0" err="1"/>
+              <a:t>geom_point</a:t>
+            </a:r>
             <a:endParaRPr lang="en-US" dirty="0"/>
           </a:p>
-        </p:txBody>
-      </p:sp>
-      <p:sp>
-        <p:nvSpPr>
-          <p:cNvPr id="4" name="Content Placeholder 3">
-            <a:extLst>
-              <a:ext uri="{FF2B5EF4-FFF2-40B4-BE49-F238E27FC236}">
-                <a16:creationId xmlns:a16="http://schemas.microsoft.com/office/drawing/2014/main" id="{1C173A96-D5B9-4DF6-ABB2-74F3288DBFFD}"/>
-              </a:ext>
-            </a:extLst>
-          </p:cNvPr>
-          <p:cNvSpPr>
-            <a:spLocks noGrp="1"/>
-          </p:cNvSpPr>
-          <p:nvPr>
-            <p:ph sz="half" idx="2"/>
-          </p:nvPr>
-        </p:nvSpPr>
-        <p:spPr/>
-        <p:txBody>
-          <a:bodyPr/>
-          <a:lstStyle/>
-          <a:p>
-            <a:endParaRPr lang="en-US"/>
-          </a:p>
-        </p:txBody>
-      </p:sp>
-      <p:sp>
-        <p:nvSpPr>
-          <p:cNvPr id="7" name="Title 4">
-            <a:extLst>
-              <a:ext uri="{FF2B5EF4-FFF2-40B4-BE49-F238E27FC236}">
-                <a16:creationId xmlns:a16="http://schemas.microsoft.com/office/drawing/2014/main" id="{3ACD32CA-430E-417A-82E1-BF06DF62E694}"/>
+          <a:p>
+            <a:r>
+              <a:rPr lang="en-US" dirty="0"/>
+              <a:t>But, I need to represent both the train vs plane data, while adding a new column for the 3 hour delay assumption (hint: the factor levels of delay represent the 2 frames of the animation)</a:t>
+            </a:r>
+          </a:p>
+          <a:p>
+            <a:r>
+              <a:rPr lang="en-US" dirty="0"/>
+              <a:t>Transpose the data so that each row in the dataset represented a Route-frame dyad (instead of Route-mode dyad)</a:t>
+            </a:r>
+          </a:p>
+        </p:txBody>
+      </p:sp>
+      <p:pic>
+        <p:nvPicPr>
+          <p:cNvPr id="4" name="Picture 3">
+            <a:extLst>
+              <a:ext uri="{FF2B5EF4-FFF2-40B4-BE49-F238E27FC236}">
+                <a16:creationId xmlns:a16="http://schemas.microsoft.com/office/drawing/2014/main" id="{6BA0FA3E-C56B-4165-971D-C3114EA063FD}"/>
+              </a:ext>
+            </a:extLst>
+          </p:cNvPr>
+          <p:cNvPicPr>
+            <a:picLocks noChangeAspect="1"/>
+          </p:cNvPicPr>
+          <p:nvPr/>
+        </p:nvPicPr>
+        <p:blipFill>
+          <a:blip r:embed="rId2"/>
+          <a:stretch>
+            <a:fillRect/>
+          </a:stretch>
+        </p:blipFill>
+        <p:spPr>
+          <a:xfrm>
+            <a:off x="5867738" y="2961036"/>
+            <a:ext cx="6177905" cy="1226692"/>
+          </a:xfrm>
+          <a:prstGeom prst="rect">
+            <a:avLst/>
+          </a:prstGeom>
+        </p:spPr>
+      </p:pic>
+      <p:pic>
+        <p:nvPicPr>
+          <p:cNvPr id="5" name="Picture 4">
+            <a:extLst>
+              <a:ext uri="{FF2B5EF4-FFF2-40B4-BE49-F238E27FC236}">
+                <a16:creationId xmlns:a16="http://schemas.microsoft.com/office/drawing/2014/main" id="{6F2721DB-3E01-4327-BA75-872E05142E31}"/>
+              </a:ext>
+            </a:extLst>
+          </p:cNvPr>
+          <p:cNvPicPr>
+            <a:picLocks noChangeAspect="1"/>
+          </p:cNvPicPr>
+          <p:nvPr/>
+        </p:nvPicPr>
+        <p:blipFill>
+          <a:blip r:embed="rId3"/>
+          <a:stretch>
+            <a:fillRect/>
+          </a:stretch>
+        </p:blipFill>
+        <p:spPr>
+          <a:xfrm>
+            <a:off x="5867738" y="1794792"/>
+            <a:ext cx="6177905" cy="1015546"/>
+          </a:xfrm>
+          <a:prstGeom prst="rect">
+            <a:avLst/>
+          </a:prstGeom>
+        </p:spPr>
+      </p:pic>
+      <p:pic>
+        <p:nvPicPr>
+          <p:cNvPr id="6" name="Picture 5">
+            <a:extLst>
+              <a:ext uri="{FF2B5EF4-FFF2-40B4-BE49-F238E27FC236}">
+                <a16:creationId xmlns:a16="http://schemas.microsoft.com/office/drawing/2014/main" id="{95630840-3ED3-4906-A139-0C9266D2C257}"/>
+              </a:ext>
+            </a:extLst>
+          </p:cNvPr>
+          <p:cNvPicPr>
+            <a:picLocks noChangeAspect="1"/>
+          </p:cNvPicPr>
+          <p:nvPr/>
+        </p:nvPicPr>
+        <p:blipFill>
+          <a:blip r:embed="rId4"/>
+          <a:stretch>
+            <a:fillRect/>
+          </a:stretch>
+        </p:blipFill>
+        <p:spPr>
+          <a:xfrm>
+            <a:off x="5623703" y="4503640"/>
+            <a:ext cx="6421940" cy="1989235"/>
+          </a:xfrm>
+          <a:prstGeom prst="rect">
+            <a:avLst/>
+          </a:prstGeom>
+        </p:spPr>
+      </p:pic>
+      <p:pic>
+        <p:nvPicPr>
+          <p:cNvPr id="7" name="Picture 6">
+            <a:extLst>
+              <a:ext uri="{FF2B5EF4-FFF2-40B4-BE49-F238E27FC236}">
+                <a16:creationId xmlns:a16="http://schemas.microsoft.com/office/drawing/2014/main" id="{9E20FC9F-0258-4AC1-B261-6F9F9D5CCDA4}"/>
+              </a:ext>
+            </a:extLst>
+          </p:cNvPr>
+          <p:cNvPicPr>
+            <a:picLocks noChangeAspect="1"/>
+          </p:cNvPicPr>
+          <p:nvPr/>
+        </p:nvPicPr>
+        <p:blipFill>
+          <a:blip r:embed="rId5"/>
+          <a:stretch>
+            <a:fillRect/>
+          </a:stretch>
+        </p:blipFill>
+        <p:spPr>
+          <a:xfrm>
+            <a:off x="5536643" y="4935553"/>
+            <a:ext cx="6509000" cy="945477"/>
+          </a:xfrm>
+          <a:prstGeom prst="rect">
+            <a:avLst/>
+          </a:prstGeom>
+        </p:spPr>
+      </p:pic>
+      <p:pic>
+        <p:nvPicPr>
+          <p:cNvPr id="8" name="Picture 7">
+            <a:extLst>
+              <a:ext uri="{FF2B5EF4-FFF2-40B4-BE49-F238E27FC236}">
+                <a16:creationId xmlns:a16="http://schemas.microsoft.com/office/drawing/2014/main" id="{F8523907-91C0-4F4A-B5F6-45B08C3AD74C}"/>
+              </a:ext>
+            </a:extLst>
+          </p:cNvPr>
+          <p:cNvPicPr>
+            <a:picLocks noChangeAspect="1"/>
+          </p:cNvPicPr>
+          <p:nvPr/>
+        </p:nvPicPr>
+        <p:blipFill>
+          <a:blip r:embed="rId6"/>
+          <a:stretch>
+            <a:fillRect/>
+          </a:stretch>
+        </p:blipFill>
+        <p:spPr>
+          <a:xfrm>
+            <a:off x="5867738" y="3420487"/>
+            <a:ext cx="4686300" cy="200025"/>
+          </a:xfrm>
+          <a:prstGeom prst="rect">
+            <a:avLst/>
+          </a:prstGeom>
+        </p:spPr>
+      </p:pic>
+      <p:pic>
+        <p:nvPicPr>
+          <p:cNvPr id="9" name="Picture 8">
+            <a:extLst>
+              <a:ext uri="{FF2B5EF4-FFF2-40B4-BE49-F238E27FC236}">
+                <a16:creationId xmlns:a16="http://schemas.microsoft.com/office/drawing/2014/main" id="{077F3740-2293-4FF3-9898-8736514E93BD}"/>
+              </a:ext>
+            </a:extLst>
+          </p:cNvPr>
+          <p:cNvPicPr>
+            <a:picLocks noChangeAspect="1"/>
+          </p:cNvPicPr>
+          <p:nvPr/>
+        </p:nvPicPr>
+        <p:blipFill>
+          <a:blip r:embed="rId7"/>
+          <a:stretch>
+            <a:fillRect/>
+          </a:stretch>
+        </p:blipFill>
+        <p:spPr>
+          <a:xfrm>
+            <a:off x="5867737" y="3206016"/>
+            <a:ext cx="6177905" cy="789710"/>
+          </a:xfrm>
+          <a:prstGeom prst="rect">
+            <a:avLst/>
+          </a:prstGeom>
+        </p:spPr>
+      </p:pic>
+      <p:pic>
+        <p:nvPicPr>
+          <p:cNvPr id="10" name="Picture 9">
+            <a:extLst>
+              <a:ext uri="{FF2B5EF4-FFF2-40B4-BE49-F238E27FC236}">
+                <a16:creationId xmlns:a16="http://schemas.microsoft.com/office/drawing/2014/main" id="{3DFD8100-CBC9-4F48-9AE9-3AE135AADCE2}"/>
+              </a:ext>
+            </a:extLst>
+          </p:cNvPr>
+          <p:cNvPicPr>
+            <a:picLocks noChangeAspect="1"/>
+          </p:cNvPicPr>
+          <p:nvPr/>
+        </p:nvPicPr>
+        <p:blipFill>
+          <a:blip r:embed="rId8"/>
+          <a:stretch>
+            <a:fillRect/>
+          </a:stretch>
+        </p:blipFill>
+        <p:spPr>
+          <a:xfrm>
+            <a:off x="5653331" y="4429699"/>
+            <a:ext cx="6392311" cy="1451332"/>
+          </a:xfrm>
+          <a:prstGeom prst="rect">
+            <a:avLst/>
+          </a:prstGeom>
+        </p:spPr>
+      </p:pic>
+      <p:pic>
+        <p:nvPicPr>
+          <p:cNvPr id="12" name="Content Placeholder 8">
+            <a:extLst>
+              <a:ext uri="{FF2B5EF4-FFF2-40B4-BE49-F238E27FC236}">
+                <a16:creationId xmlns:a16="http://schemas.microsoft.com/office/drawing/2014/main" id="{2BE86CD8-A76C-494D-B195-A8150EB690D9}"/>
+              </a:ext>
+            </a:extLst>
+          </p:cNvPr>
+          <p:cNvPicPr>
+            <a:picLocks noChangeAspect="1"/>
+          </p:cNvPicPr>
+          <p:nvPr/>
+        </p:nvPicPr>
+        <p:blipFill>
+          <a:blip r:embed="rId9">
+            <a:extLst>
+              <a:ext uri="{28A0092B-C50C-407E-A947-70E740481C1C}">
+                <a14:useLocalDpi xmlns:a14="http://schemas.microsoft.com/office/drawing/2010/main" val="0"/>
+              </a:ext>
+            </a:extLst>
+          </a:blip>
+          <a:stretch>
+            <a:fillRect/>
+          </a:stretch>
+        </p:blipFill>
+        <p:spPr>
+          <a:xfrm>
+            <a:off x="-68346" y="668462"/>
+            <a:ext cx="5780082" cy="5811840"/>
+          </a:xfrm>
+          <a:prstGeom prst="rect">
+            <a:avLst/>
+          </a:prstGeom>
+        </p:spPr>
+      </p:pic>
+      <p:sp>
+        <p:nvSpPr>
+          <p:cNvPr id="13" name="Title 4">
+            <a:extLst>
+              <a:ext uri="{FF2B5EF4-FFF2-40B4-BE49-F238E27FC236}">
+                <a16:creationId xmlns:a16="http://schemas.microsoft.com/office/drawing/2014/main" id="{A405482A-B9E1-41D3-A29B-7EDD49D182B1}"/>
               </a:ext>
             </a:extLst>
           </p:cNvPr>
@@ -4325,7 +4808,7 @@
         </p:nvSpPr>
         <p:spPr>
           <a:xfrm>
-            <a:off x="990601" y="367725"/>
+            <a:off x="5941968" y="374263"/>
             <a:ext cx="5181599" cy="1325563"/>
           </a:xfrm>
           <a:prstGeom prst="plaque">
@@ -4336,6 +4819,81 @@
               <a:alpha val="82000"/>
             </a:schemeClr>
           </a:solidFill>
+        </p:spPr>
+        <p:txBody>
+          <a:bodyPr vert="horz" lIns="91440" tIns="45720" rIns="91440" bIns="45720" rtlCol="0" anchor="ctr">
+            <a:normAutofit fontScale="67500" lnSpcReduction="20000"/>
+          </a:bodyPr>
+          <a:lstStyle>
+            <a:lvl1pPr algn="l" defTabSz="914400" rtl="0" eaLnBrk="1" latinLnBrk="0" hangingPunct="1">
+              <a:lnSpc>
+                <a:spcPct val="90000"/>
+              </a:lnSpc>
+              <a:spcBef>
+                <a:spcPct val="0"/>
+              </a:spcBef>
+              <a:buNone/>
+              <a:defRPr sz="4400" kern="1200">
+                <a:solidFill>
+                  <a:schemeClr val="tx1"/>
+                </a:solidFill>
+                <a:latin typeface="+mj-lt"/>
+                <a:ea typeface="+mj-ea"/>
+                <a:cs typeface="+mj-cs"/>
+              </a:defRPr>
+            </a:lvl1pPr>
+          </a:lstStyle>
+          <a:p>
+            <a:pPr algn="ctr"/>
+            <a:r>
+              <a:rPr lang="en-US" sz="4000" b="1" dirty="0"/>
+              <a:t>Data Processing Part 2: </a:t>
+            </a:r>
+            <a:br>
+              <a:rPr lang="en-US" sz="4000" b="1" dirty="0"/>
+            </a:br>
+            <a:r>
+              <a:rPr lang="en-US" sz="4000" b="1" dirty="0"/>
+              <a:t>adding a frame variable for </a:t>
+            </a:r>
+            <a:r>
+              <a:rPr lang="en-US" sz="4000" b="1" dirty="0" err="1"/>
+              <a:t>gganimate</a:t>
+            </a:r>
+            <a:endParaRPr lang="en-US" sz="4000" dirty="0">
+              <a:latin typeface="Britannic Bold" panose="020B0903060703020204" pitchFamily="34" charset="0"/>
+            </a:endParaRPr>
+          </a:p>
+        </p:txBody>
+      </p:sp>
+      <p:sp>
+        <p:nvSpPr>
+          <p:cNvPr id="14" name="Title 4">
+            <a:extLst>
+              <a:ext uri="{FF2B5EF4-FFF2-40B4-BE49-F238E27FC236}">
+                <a16:creationId xmlns:a16="http://schemas.microsoft.com/office/drawing/2014/main" id="{1E6EC240-9D40-43E6-B82C-08421B50DD5B}"/>
+              </a:ext>
+            </a:extLst>
+          </p:cNvPr>
+          <p:cNvSpPr txBox="1">
+            <a:spLocks/>
+          </p:cNvSpPr>
+          <p:nvPr/>
+        </p:nvSpPr>
+        <p:spPr>
+          <a:xfrm>
+            <a:off x="6115799" y="524283"/>
+            <a:ext cx="4833938" cy="1025525"/>
+          </a:xfrm>
+          <a:prstGeom prst="plaque">
+            <a:avLst/>
+          </a:prstGeom>
+          <a:noFill/>
+          <a:ln w="38100">
+            <a:solidFill>
+              <a:schemeClr val="tx1"/>
+            </a:solidFill>
+          </a:ln>
         </p:spPr>
         <p:txBody>
           <a:bodyPr vert="horz" lIns="91440" tIns="45720" rIns="91440" bIns="45720" rtlCol="0" anchor="ctr">
@@ -4362,21 +4920,915 @@
           </a:lstStyle>
           <a:p>
             <a:pPr algn="ctr"/>
+            <a:endParaRPr lang="en-US" sz="4000" dirty="0">
+              <a:latin typeface="Britannic Bold" panose="020B0903060703020204" pitchFamily="34" charset="0"/>
+            </a:endParaRPr>
+          </a:p>
+        </p:txBody>
+      </p:sp>
+    </p:spTree>
+    <p:extLst>
+      <p:ext uri="{BB962C8B-B14F-4D97-AF65-F5344CB8AC3E}">
+        <p14:creationId xmlns:p14="http://schemas.microsoft.com/office/powerpoint/2010/main" val="29614517"/>
+      </p:ext>
+    </p:extLst>
+  </p:cSld>
+  <p:clrMapOvr>
+    <a:masterClrMapping/>
+  </p:clrMapOvr>
+  <p:timing>
+    <p:tnLst>
+      <p:par>
+        <p:cTn id="1" dur="indefinite" restart="never" nodeType="tmRoot">
+          <p:childTnLst>
+            <p:seq concurrent="1" nextAc="seek">
+              <p:cTn id="2" dur="indefinite" nodeType="mainSeq">
+                <p:childTnLst>
+                  <p:par>
+                    <p:cTn id="3" fill="hold">
+                      <p:stCondLst>
+                        <p:cond delay="indefinite"/>
+                      </p:stCondLst>
+                      <p:childTnLst>
+                        <p:par>
+                          <p:cTn id="4" fill="hold">
+                            <p:stCondLst>
+                              <p:cond delay="0"/>
+                            </p:stCondLst>
+                            <p:childTnLst>
+                              <p:par>
+                                <p:cTn id="5" presetID="1" presetClass="entr" presetSubtype="0" fill="hold" nodeType="clickEffect">
+                                  <p:stCondLst>
+                                    <p:cond delay="0"/>
+                                  </p:stCondLst>
+                                  <p:childTnLst>
+                                    <p:set>
+                                      <p:cBhvr>
+                                        <p:cTn id="6" dur="1" fill="hold">
+                                          <p:stCondLst>
+                                            <p:cond delay="0"/>
+                                          </p:stCondLst>
+                                        </p:cTn>
+                                        <p:tgtEl>
+                                          <p:spTgt spid="5"/>
+                                        </p:tgtEl>
+                                        <p:attrNameLst>
+                                          <p:attrName>style.visibility</p:attrName>
+                                        </p:attrNameLst>
+                                      </p:cBhvr>
+                                      <p:to>
+                                        <p:strVal val="visible"/>
+                                      </p:to>
+                                    </p:set>
+                                  </p:childTnLst>
+                                </p:cTn>
+                              </p:par>
+                              <p:par>
+                                <p:cTn id="7" presetID="1" presetClass="entr" presetSubtype="0" fill="hold" nodeType="withEffect">
+                                  <p:stCondLst>
+                                    <p:cond delay="0"/>
+                                  </p:stCondLst>
+                                  <p:childTnLst>
+                                    <p:set>
+                                      <p:cBhvr>
+                                        <p:cTn id="8" dur="1" fill="hold">
+                                          <p:stCondLst>
+                                            <p:cond delay="0"/>
+                                          </p:stCondLst>
+                                        </p:cTn>
+                                        <p:tgtEl>
+                                          <p:spTgt spid="4"/>
+                                        </p:tgtEl>
+                                        <p:attrNameLst>
+                                          <p:attrName>style.visibility</p:attrName>
+                                        </p:attrNameLst>
+                                      </p:cBhvr>
+                                      <p:to>
+                                        <p:strVal val="visible"/>
+                                      </p:to>
+                                    </p:set>
+                                  </p:childTnLst>
+                                </p:cTn>
+                              </p:par>
+                            </p:childTnLst>
+                          </p:cTn>
+                        </p:par>
+                      </p:childTnLst>
+                    </p:cTn>
+                  </p:par>
+                  <p:par>
+                    <p:cTn id="9" fill="hold">
+                      <p:stCondLst>
+                        <p:cond delay="indefinite"/>
+                      </p:stCondLst>
+                      <p:childTnLst>
+                        <p:par>
+                          <p:cTn id="10" fill="hold">
+                            <p:stCondLst>
+                              <p:cond delay="0"/>
+                            </p:stCondLst>
+                            <p:childTnLst>
+                              <p:par>
+                                <p:cTn id="11" presetID="10" presetClass="entr" presetSubtype="0" fill="hold" nodeType="clickEffect">
+                                  <p:stCondLst>
+                                    <p:cond delay="0"/>
+                                  </p:stCondLst>
+                                  <p:childTnLst>
+                                    <p:set>
+                                      <p:cBhvr>
+                                        <p:cTn id="12" dur="1" fill="hold">
+                                          <p:stCondLst>
+                                            <p:cond delay="0"/>
+                                          </p:stCondLst>
+                                        </p:cTn>
+                                        <p:tgtEl>
+                                          <p:spTgt spid="6"/>
+                                        </p:tgtEl>
+                                        <p:attrNameLst>
+                                          <p:attrName>style.visibility</p:attrName>
+                                        </p:attrNameLst>
+                                      </p:cBhvr>
+                                      <p:to>
+                                        <p:strVal val="visible"/>
+                                      </p:to>
+                                    </p:set>
+                                    <p:animEffect transition="in" filter="fade">
+                                      <p:cBhvr>
+                                        <p:cTn id="13" dur="500"/>
+                                        <p:tgtEl>
+                                          <p:spTgt spid="6"/>
+                                        </p:tgtEl>
+                                      </p:cBhvr>
+                                    </p:animEffect>
+                                  </p:childTnLst>
+                                </p:cTn>
+                              </p:par>
+                            </p:childTnLst>
+                          </p:cTn>
+                        </p:par>
+                      </p:childTnLst>
+                    </p:cTn>
+                  </p:par>
+                  <p:par>
+                    <p:cTn id="14" fill="hold">
+                      <p:stCondLst>
+                        <p:cond delay="indefinite"/>
+                      </p:stCondLst>
+                      <p:childTnLst>
+                        <p:par>
+                          <p:cTn id="15" fill="hold">
+                            <p:stCondLst>
+                              <p:cond delay="0"/>
+                            </p:stCondLst>
+                            <p:childTnLst>
+                              <p:par>
+                                <p:cTn id="16" presetID="1" presetClass="exit" presetSubtype="0" fill="hold" nodeType="clickEffect">
+                                  <p:stCondLst>
+                                    <p:cond delay="0"/>
+                                  </p:stCondLst>
+                                  <p:childTnLst>
+                                    <p:set>
+                                      <p:cBhvr>
+                                        <p:cTn id="17" dur="1" fill="hold">
+                                          <p:stCondLst>
+                                            <p:cond delay="0"/>
+                                          </p:stCondLst>
+                                        </p:cTn>
+                                        <p:tgtEl>
+                                          <p:spTgt spid="6"/>
+                                        </p:tgtEl>
+                                        <p:attrNameLst>
+                                          <p:attrName>style.visibility</p:attrName>
+                                        </p:attrNameLst>
+                                      </p:cBhvr>
+                                      <p:to>
+                                        <p:strVal val="hidden"/>
+                                      </p:to>
+                                    </p:set>
+                                  </p:childTnLst>
+                                </p:cTn>
+                              </p:par>
+                            </p:childTnLst>
+                          </p:cTn>
+                        </p:par>
+                      </p:childTnLst>
+                    </p:cTn>
+                  </p:par>
+                  <p:par>
+                    <p:cTn id="18" fill="hold">
+                      <p:stCondLst>
+                        <p:cond delay="indefinite"/>
+                      </p:stCondLst>
+                      <p:childTnLst>
+                        <p:par>
+                          <p:cTn id="19" fill="hold">
+                            <p:stCondLst>
+                              <p:cond delay="0"/>
+                            </p:stCondLst>
+                            <p:childTnLst>
+                              <p:par>
+                                <p:cTn id="20" presetID="1" presetClass="entr" presetSubtype="0" fill="hold" nodeType="clickEffect">
+                                  <p:stCondLst>
+                                    <p:cond delay="0"/>
+                                  </p:stCondLst>
+                                  <p:childTnLst>
+                                    <p:set>
+                                      <p:cBhvr>
+                                        <p:cTn id="21" dur="1" fill="hold">
+                                          <p:stCondLst>
+                                            <p:cond delay="0"/>
+                                          </p:stCondLst>
+                                        </p:cTn>
+                                        <p:tgtEl>
+                                          <p:spTgt spid="7"/>
+                                        </p:tgtEl>
+                                        <p:attrNameLst>
+                                          <p:attrName>style.visibility</p:attrName>
+                                        </p:attrNameLst>
+                                      </p:cBhvr>
+                                      <p:to>
+                                        <p:strVal val="visible"/>
+                                      </p:to>
+                                    </p:set>
+                                  </p:childTnLst>
+                                </p:cTn>
+                              </p:par>
+                            </p:childTnLst>
+                          </p:cTn>
+                        </p:par>
+                      </p:childTnLst>
+                    </p:cTn>
+                  </p:par>
+                  <p:par>
+                    <p:cTn id="22" fill="hold">
+                      <p:stCondLst>
+                        <p:cond delay="indefinite"/>
+                      </p:stCondLst>
+                      <p:childTnLst>
+                        <p:par>
+                          <p:cTn id="23" fill="hold">
+                            <p:stCondLst>
+                              <p:cond delay="0"/>
+                            </p:stCondLst>
+                            <p:childTnLst>
+                              <p:par>
+                                <p:cTn id="24" presetID="1" presetClass="exit" presetSubtype="0" fill="hold" nodeType="clickEffect">
+                                  <p:stCondLst>
+                                    <p:cond delay="0"/>
+                                  </p:stCondLst>
+                                  <p:childTnLst>
+                                    <p:set>
+                                      <p:cBhvr>
+                                        <p:cTn id="25" dur="1" fill="hold">
+                                          <p:stCondLst>
+                                            <p:cond delay="0"/>
+                                          </p:stCondLst>
+                                        </p:cTn>
+                                        <p:tgtEl>
+                                          <p:spTgt spid="5"/>
+                                        </p:tgtEl>
+                                        <p:attrNameLst>
+                                          <p:attrName>style.visibility</p:attrName>
+                                        </p:attrNameLst>
+                                      </p:cBhvr>
+                                      <p:to>
+                                        <p:strVal val="hidden"/>
+                                      </p:to>
+                                    </p:set>
+                                  </p:childTnLst>
+                                </p:cTn>
+                              </p:par>
+                              <p:par>
+                                <p:cTn id="26" presetID="1" presetClass="exit" presetSubtype="0" fill="hold" nodeType="withEffect">
+                                  <p:stCondLst>
+                                    <p:cond delay="0"/>
+                                  </p:stCondLst>
+                                  <p:childTnLst>
+                                    <p:set>
+                                      <p:cBhvr>
+                                        <p:cTn id="27" dur="1" fill="hold">
+                                          <p:stCondLst>
+                                            <p:cond delay="0"/>
+                                          </p:stCondLst>
+                                        </p:cTn>
+                                        <p:tgtEl>
+                                          <p:spTgt spid="4"/>
+                                        </p:tgtEl>
+                                        <p:attrNameLst>
+                                          <p:attrName>style.visibility</p:attrName>
+                                        </p:attrNameLst>
+                                      </p:cBhvr>
+                                      <p:to>
+                                        <p:strVal val="hidden"/>
+                                      </p:to>
+                                    </p:set>
+                                  </p:childTnLst>
+                                </p:cTn>
+                              </p:par>
+                            </p:childTnLst>
+                          </p:cTn>
+                        </p:par>
+                      </p:childTnLst>
+                    </p:cTn>
+                  </p:par>
+                  <p:par>
+                    <p:cTn id="28" fill="hold">
+                      <p:stCondLst>
+                        <p:cond delay="indefinite"/>
+                      </p:stCondLst>
+                      <p:childTnLst>
+                        <p:par>
+                          <p:cTn id="29" fill="hold">
+                            <p:stCondLst>
+                              <p:cond delay="0"/>
+                            </p:stCondLst>
+                            <p:childTnLst>
+                              <p:par>
+                                <p:cTn id="30" presetID="64" presetClass="path" presetSubtype="0" accel="50000" decel="50000" fill="hold" nodeType="clickEffect">
+                                  <p:stCondLst>
+                                    <p:cond delay="0"/>
+                                  </p:stCondLst>
+                                  <p:childTnLst>
+                                    <p:animMotion origin="layout" path="M -3.75E-6 2.59259E-6 L -3.75E-6 -0.45741 " pathEditMode="relative" rAng="0" ptsTypes="AA">
+                                      <p:cBhvr>
+                                        <p:cTn id="31" dur="2000" fill="hold"/>
+                                        <p:tgtEl>
+                                          <p:spTgt spid="7"/>
+                                        </p:tgtEl>
+                                        <p:attrNameLst>
+                                          <p:attrName>ppt_x</p:attrName>
+                                          <p:attrName>ppt_y</p:attrName>
+                                        </p:attrNameLst>
+                                      </p:cBhvr>
+                                      <p:rCtr x="0" y="-22870"/>
+                                    </p:animMotion>
+                                  </p:childTnLst>
+                                </p:cTn>
+                              </p:par>
+                            </p:childTnLst>
+                          </p:cTn>
+                        </p:par>
+                      </p:childTnLst>
+                    </p:cTn>
+                  </p:par>
+                  <p:par>
+                    <p:cTn id="32" fill="hold">
+                      <p:stCondLst>
+                        <p:cond delay="indefinite"/>
+                      </p:stCondLst>
+                      <p:childTnLst>
+                        <p:par>
+                          <p:cTn id="33" fill="hold">
+                            <p:stCondLst>
+                              <p:cond delay="0"/>
+                            </p:stCondLst>
+                            <p:childTnLst>
+                              <p:par>
+                                <p:cTn id="34" presetID="1" presetClass="entr" presetSubtype="0" fill="hold" nodeType="clickEffect">
+                                  <p:stCondLst>
+                                    <p:cond delay="0"/>
+                                  </p:stCondLst>
+                                  <p:childTnLst>
+                                    <p:set>
+                                      <p:cBhvr>
+                                        <p:cTn id="35" dur="1" fill="hold">
+                                          <p:stCondLst>
+                                            <p:cond delay="0"/>
+                                          </p:stCondLst>
+                                        </p:cTn>
+                                        <p:tgtEl>
+                                          <p:spTgt spid="8"/>
+                                        </p:tgtEl>
+                                        <p:attrNameLst>
+                                          <p:attrName>style.visibility</p:attrName>
+                                        </p:attrNameLst>
+                                      </p:cBhvr>
+                                      <p:to>
+                                        <p:strVal val="visible"/>
+                                      </p:to>
+                                    </p:set>
+                                  </p:childTnLst>
+                                </p:cTn>
+                              </p:par>
+                            </p:childTnLst>
+                          </p:cTn>
+                        </p:par>
+                      </p:childTnLst>
+                    </p:cTn>
+                  </p:par>
+                  <p:par>
+                    <p:cTn id="36" fill="hold">
+                      <p:stCondLst>
+                        <p:cond delay="indefinite"/>
+                      </p:stCondLst>
+                      <p:childTnLst>
+                        <p:par>
+                          <p:cTn id="37" fill="hold">
+                            <p:stCondLst>
+                              <p:cond delay="0"/>
+                            </p:stCondLst>
+                            <p:childTnLst>
+                              <p:par>
+                                <p:cTn id="38" presetID="1" presetClass="exit" presetSubtype="0" fill="hold" nodeType="clickEffect">
+                                  <p:stCondLst>
+                                    <p:cond delay="0"/>
+                                  </p:stCondLst>
+                                  <p:childTnLst>
+                                    <p:set>
+                                      <p:cBhvr>
+                                        <p:cTn id="39" dur="1" fill="hold">
+                                          <p:stCondLst>
+                                            <p:cond delay="0"/>
+                                          </p:stCondLst>
+                                        </p:cTn>
+                                        <p:tgtEl>
+                                          <p:spTgt spid="8"/>
+                                        </p:tgtEl>
+                                        <p:attrNameLst>
+                                          <p:attrName>style.visibility</p:attrName>
+                                        </p:attrNameLst>
+                                      </p:cBhvr>
+                                      <p:to>
+                                        <p:strVal val="hidden"/>
+                                      </p:to>
+                                    </p:set>
+                                  </p:childTnLst>
+                                </p:cTn>
+                              </p:par>
+                            </p:childTnLst>
+                          </p:cTn>
+                        </p:par>
+                      </p:childTnLst>
+                    </p:cTn>
+                  </p:par>
+                  <p:par>
+                    <p:cTn id="40" fill="hold">
+                      <p:stCondLst>
+                        <p:cond delay="indefinite"/>
+                      </p:stCondLst>
+                      <p:childTnLst>
+                        <p:par>
+                          <p:cTn id="41" fill="hold">
+                            <p:stCondLst>
+                              <p:cond delay="0"/>
+                            </p:stCondLst>
+                            <p:childTnLst>
+                              <p:par>
+                                <p:cTn id="42" presetID="1" presetClass="entr" presetSubtype="0" fill="hold" nodeType="clickEffect">
+                                  <p:stCondLst>
+                                    <p:cond delay="0"/>
+                                  </p:stCondLst>
+                                  <p:childTnLst>
+                                    <p:set>
+                                      <p:cBhvr>
+                                        <p:cTn id="43" dur="1" fill="hold">
+                                          <p:stCondLst>
+                                            <p:cond delay="0"/>
+                                          </p:stCondLst>
+                                        </p:cTn>
+                                        <p:tgtEl>
+                                          <p:spTgt spid="9"/>
+                                        </p:tgtEl>
+                                        <p:attrNameLst>
+                                          <p:attrName>style.visibility</p:attrName>
+                                        </p:attrNameLst>
+                                      </p:cBhvr>
+                                      <p:to>
+                                        <p:strVal val="visible"/>
+                                      </p:to>
+                                    </p:set>
+                                  </p:childTnLst>
+                                </p:cTn>
+                              </p:par>
+                            </p:childTnLst>
+                          </p:cTn>
+                        </p:par>
+                      </p:childTnLst>
+                    </p:cTn>
+                  </p:par>
+                  <p:par>
+                    <p:cTn id="44" fill="hold">
+                      <p:stCondLst>
+                        <p:cond delay="indefinite"/>
+                      </p:stCondLst>
+                      <p:childTnLst>
+                        <p:par>
+                          <p:cTn id="45" fill="hold">
+                            <p:stCondLst>
+                              <p:cond delay="0"/>
+                            </p:stCondLst>
+                            <p:childTnLst>
+                              <p:par>
+                                <p:cTn id="46" presetID="1" presetClass="entr" presetSubtype="0" fill="hold" nodeType="clickEffect">
+                                  <p:stCondLst>
+                                    <p:cond delay="0"/>
+                                  </p:stCondLst>
+                                  <p:childTnLst>
+                                    <p:set>
+                                      <p:cBhvr>
+                                        <p:cTn id="47" dur="1" fill="hold">
+                                          <p:stCondLst>
+                                            <p:cond delay="0"/>
+                                          </p:stCondLst>
+                                        </p:cTn>
+                                        <p:tgtEl>
+                                          <p:spTgt spid="10"/>
+                                        </p:tgtEl>
+                                        <p:attrNameLst>
+                                          <p:attrName>style.visibility</p:attrName>
+                                        </p:attrNameLst>
+                                      </p:cBhvr>
+                                      <p:to>
+                                        <p:strVal val="visible"/>
+                                      </p:to>
+                                    </p:set>
+                                  </p:childTnLst>
+                                </p:cTn>
+                              </p:par>
+                            </p:childTnLst>
+                          </p:cTn>
+                        </p:par>
+                      </p:childTnLst>
+                    </p:cTn>
+                  </p:par>
+                  <p:par>
+                    <p:cTn id="48" fill="hold">
+                      <p:stCondLst>
+                        <p:cond delay="indefinite"/>
+                      </p:stCondLst>
+                      <p:childTnLst>
+                        <p:par>
+                          <p:cTn id="49" fill="hold">
+                            <p:stCondLst>
+                              <p:cond delay="0"/>
+                            </p:stCondLst>
+                            <p:childTnLst>
+                              <p:par>
+                                <p:cTn id="50" presetID="1" presetClass="exit" presetSubtype="0" fill="hold" grpId="0" nodeType="clickEffect" nodePh="1">
+                                  <p:stCondLst>
+                                    <p:cond delay="0"/>
+                                  </p:stCondLst>
+                                  <p:endCondLst>
+                                    <p:cond evt="begin" delay="0">
+                                      <p:tn val="50"/>
+                                    </p:cond>
+                                  </p:endCondLst>
+                                  <p:childTnLst>
+                                    <p:set>
+                                      <p:cBhvr>
+                                        <p:cTn id="51" dur="1" fill="hold">
+                                          <p:stCondLst>
+                                            <p:cond delay="0"/>
+                                          </p:stCondLst>
+                                        </p:cTn>
+                                        <p:tgtEl>
+                                          <p:spTgt spid="2"/>
+                                        </p:tgtEl>
+                                        <p:attrNameLst>
+                                          <p:attrName>style.visibility</p:attrName>
+                                        </p:attrNameLst>
+                                      </p:cBhvr>
+                                      <p:to>
+                                        <p:strVal val="hidden"/>
+                                      </p:to>
+                                    </p:set>
+                                  </p:childTnLst>
+                                </p:cTn>
+                              </p:par>
+                              <p:par>
+                                <p:cTn id="52" presetID="1" presetClass="exit" presetSubtype="0" fill="hold" grpId="0" nodeType="withEffect">
+                                  <p:stCondLst>
+                                    <p:cond delay="0"/>
+                                  </p:stCondLst>
+                                  <p:childTnLst>
+                                    <p:set>
+                                      <p:cBhvr>
+                                        <p:cTn id="53" dur="1" fill="hold">
+                                          <p:stCondLst>
+                                            <p:cond delay="0"/>
+                                          </p:stCondLst>
+                                        </p:cTn>
+                                        <p:tgtEl>
+                                          <p:spTgt spid="3">
+                                            <p:txEl>
+                                              <p:pRg st="0" end="0"/>
+                                            </p:txEl>
+                                          </p:spTgt>
+                                        </p:tgtEl>
+                                        <p:attrNameLst>
+                                          <p:attrName>style.visibility</p:attrName>
+                                        </p:attrNameLst>
+                                      </p:cBhvr>
+                                      <p:to>
+                                        <p:strVal val="hidden"/>
+                                      </p:to>
+                                    </p:set>
+                                  </p:childTnLst>
+                                </p:cTn>
+                              </p:par>
+                              <p:par>
+                                <p:cTn id="54" presetID="1" presetClass="exit" presetSubtype="0" fill="hold" grpId="0" nodeType="withEffect">
+                                  <p:stCondLst>
+                                    <p:cond delay="0"/>
+                                  </p:stCondLst>
+                                  <p:childTnLst>
+                                    <p:set>
+                                      <p:cBhvr>
+                                        <p:cTn id="55" dur="1" fill="hold">
+                                          <p:stCondLst>
+                                            <p:cond delay="0"/>
+                                          </p:stCondLst>
+                                        </p:cTn>
+                                        <p:tgtEl>
+                                          <p:spTgt spid="3">
+                                            <p:txEl>
+                                              <p:pRg st="1" end="1"/>
+                                            </p:txEl>
+                                          </p:spTgt>
+                                        </p:tgtEl>
+                                        <p:attrNameLst>
+                                          <p:attrName>style.visibility</p:attrName>
+                                        </p:attrNameLst>
+                                      </p:cBhvr>
+                                      <p:to>
+                                        <p:strVal val="hidden"/>
+                                      </p:to>
+                                    </p:set>
+                                  </p:childTnLst>
+                                </p:cTn>
+                              </p:par>
+                              <p:par>
+                                <p:cTn id="56" presetID="1" presetClass="exit" presetSubtype="0" fill="hold" grpId="0" nodeType="withEffect">
+                                  <p:stCondLst>
+                                    <p:cond delay="0"/>
+                                  </p:stCondLst>
+                                  <p:childTnLst>
+                                    <p:set>
+                                      <p:cBhvr>
+                                        <p:cTn id="57" dur="1" fill="hold">
+                                          <p:stCondLst>
+                                            <p:cond delay="0"/>
+                                          </p:stCondLst>
+                                        </p:cTn>
+                                        <p:tgtEl>
+                                          <p:spTgt spid="3">
+                                            <p:txEl>
+                                              <p:pRg st="2" end="2"/>
+                                            </p:txEl>
+                                          </p:spTgt>
+                                        </p:tgtEl>
+                                        <p:attrNameLst>
+                                          <p:attrName>style.visibility</p:attrName>
+                                        </p:attrNameLst>
+                                      </p:cBhvr>
+                                      <p:to>
+                                        <p:strVal val="hidden"/>
+                                      </p:to>
+                                    </p:set>
+                                  </p:childTnLst>
+                                </p:cTn>
+                              </p:par>
+                            </p:childTnLst>
+                          </p:cTn>
+                        </p:par>
+                      </p:childTnLst>
+                    </p:cTn>
+                  </p:par>
+                  <p:par>
+                    <p:cTn id="58" fill="hold">
+                      <p:stCondLst>
+                        <p:cond delay="indefinite"/>
+                      </p:stCondLst>
+                      <p:childTnLst>
+                        <p:par>
+                          <p:cTn id="59" fill="hold">
+                            <p:stCondLst>
+                              <p:cond delay="0"/>
+                            </p:stCondLst>
+                            <p:childTnLst>
+                              <p:par>
+                                <p:cTn id="60" presetID="1" presetClass="entr" presetSubtype="0" fill="hold" nodeType="clickEffect">
+                                  <p:stCondLst>
+                                    <p:cond delay="0"/>
+                                  </p:stCondLst>
+                                  <p:childTnLst>
+                                    <p:set>
+                                      <p:cBhvr>
+                                        <p:cTn id="61" dur="1" fill="hold">
+                                          <p:stCondLst>
+                                            <p:cond delay="0"/>
+                                          </p:stCondLst>
+                                        </p:cTn>
+                                        <p:tgtEl>
+                                          <p:spTgt spid="12"/>
+                                        </p:tgtEl>
+                                        <p:attrNameLst>
+                                          <p:attrName>style.visibility</p:attrName>
+                                        </p:attrNameLst>
+                                      </p:cBhvr>
+                                      <p:to>
+                                        <p:strVal val="visible"/>
+                                      </p:to>
+                                    </p:set>
+                                  </p:childTnLst>
+                                </p:cTn>
+                              </p:par>
+                            </p:childTnLst>
+                          </p:cTn>
+                        </p:par>
+                      </p:childTnLst>
+                    </p:cTn>
+                  </p:par>
+                </p:childTnLst>
+              </p:cTn>
+              <p:prevCondLst>
+                <p:cond evt="onPrev" delay="0">
+                  <p:tgtEl>
+                    <p:sldTgt/>
+                  </p:tgtEl>
+                </p:cond>
+              </p:prevCondLst>
+              <p:nextCondLst>
+                <p:cond evt="onNext" delay="0">
+                  <p:tgtEl>
+                    <p:sldTgt/>
+                  </p:tgtEl>
+                </p:cond>
+              </p:nextCondLst>
+            </p:seq>
+          </p:childTnLst>
+        </p:cTn>
+      </p:par>
+    </p:tnLst>
+    <p:bldLst>
+      <p:bldP spid="2" grpId="0"/>
+      <p:bldP spid="3" grpId="0" build="allAtOnce"/>
+    </p:bldLst>
+  </p:timing>
+</p:sld>
+</file>
+
+<file path=ppt/slides/slide13.xml><?xml version="1.0" encoding="utf-8"?>
+<p:sld xmlns:a="http://schemas.openxmlformats.org/drawingml/2006/main" xmlns:r="http://schemas.openxmlformats.org/officeDocument/2006/relationships" xmlns:p="http://schemas.openxmlformats.org/presentationml/2006/main">
+  <p:cSld>
+    <p:spTree>
+      <p:nvGrpSpPr>
+        <p:cNvPr id="1" name=""/>
+        <p:cNvGrpSpPr/>
+        <p:nvPr/>
+      </p:nvGrpSpPr>
+      <p:grpSpPr>
+        <a:xfrm>
+          <a:off x="0" y="0"/>
+          <a:ext cx="0" cy="0"/>
+          <a:chOff x="0" y="0"/>
+          <a:chExt cx="0" cy="0"/>
+        </a:xfrm>
+      </p:grpSpPr>
+      <p:sp>
+        <p:nvSpPr>
+          <p:cNvPr id="3" name="Content Placeholder 2">
+            <a:extLst>
+              <a:ext uri="{FF2B5EF4-FFF2-40B4-BE49-F238E27FC236}">
+                <a16:creationId xmlns:a16="http://schemas.microsoft.com/office/drawing/2014/main" id="{DDA52849-0140-4570-A1F0-CB0B00611132}"/>
+              </a:ext>
+            </a:extLst>
+          </p:cNvPr>
+          <p:cNvSpPr>
+            <a:spLocks noGrp="1"/>
+          </p:cNvSpPr>
+          <p:nvPr>
+            <p:ph sz="half" idx="1"/>
+          </p:nvPr>
+        </p:nvSpPr>
+        <p:spPr>
+          <a:solidFill>
+            <a:srgbClr val="F2F3F5"/>
+          </a:solidFill>
+        </p:spPr>
+        <p:txBody>
+          <a:bodyPr/>
+          <a:lstStyle/>
+          <a:p>
+            <a:r>
+              <a:rPr lang="en-US" dirty="0"/>
+              <a:t>Let’s face it… the animation makes it harder to understand the data, not easier</a:t>
+            </a:r>
+          </a:p>
+          <a:p>
+            <a:r>
+              <a:rPr lang="en-US" dirty="0"/>
+              <a:t>The assumed delayed applied to all plane trips may not be reasonable, or universally applicable – there are ways of conveying the spread of data</a:t>
+            </a:r>
+          </a:p>
+          <a:p>
+            <a:endParaRPr lang="en-US" dirty="0"/>
+          </a:p>
+        </p:txBody>
+      </p:sp>
+      <p:pic>
+        <p:nvPicPr>
+          <p:cNvPr id="6" name="Content Placeholder 5">
+            <a:extLst>
+              <a:ext uri="{FF2B5EF4-FFF2-40B4-BE49-F238E27FC236}">
+                <a16:creationId xmlns:a16="http://schemas.microsoft.com/office/drawing/2014/main" id="{64CAB0A1-B04C-4AF1-8C61-062543C6F698}"/>
+              </a:ext>
+            </a:extLst>
+          </p:cNvPr>
+          <p:cNvPicPr>
+            <a:picLocks noGrp="1" noChangeAspect="1"/>
+          </p:cNvPicPr>
+          <p:nvPr>
+            <p:ph sz="half" idx="2"/>
+          </p:nvPr>
+        </p:nvPicPr>
+        <p:blipFill>
+          <a:blip r:embed="rId3">
+            <a:extLst>
+              <a:ext uri="{28A0092B-C50C-407E-A947-70E740481C1C}">
+                <a14:useLocalDpi xmlns:a14="http://schemas.microsoft.com/office/drawing/2010/main" val="0"/>
+              </a:ext>
+            </a:extLst>
+          </a:blip>
+          <a:stretch>
+            <a:fillRect/>
+          </a:stretch>
+        </p:blipFill>
+        <p:spPr>
+          <a:xfrm>
+            <a:off x="6096000" y="521208"/>
+            <a:ext cx="5815584" cy="5815584"/>
+          </a:xfrm>
+        </p:spPr>
+      </p:pic>
+      <p:sp>
+        <p:nvSpPr>
+          <p:cNvPr id="9" name="Title 4">
+            <a:extLst>
+              <a:ext uri="{FF2B5EF4-FFF2-40B4-BE49-F238E27FC236}">
+                <a16:creationId xmlns:a16="http://schemas.microsoft.com/office/drawing/2014/main" id="{1C70DD14-7D63-40CF-9E22-07E093649B64}"/>
+              </a:ext>
+            </a:extLst>
+          </p:cNvPr>
+          <p:cNvSpPr txBox="1">
+            <a:spLocks/>
+          </p:cNvSpPr>
+          <p:nvPr/>
+        </p:nvSpPr>
+        <p:spPr>
+          <a:xfrm>
+            <a:off x="838200" y="395860"/>
+            <a:ext cx="5181599" cy="1325563"/>
+          </a:xfrm>
+          <a:prstGeom prst="plaque">
+            <a:avLst/>
+          </a:prstGeom>
+          <a:solidFill>
+            <a:schemeClr val="bg1">
+              <a:alpha val="82000"/>
+            </a:schemeClr>
+          </a:solidFill>
+        </p:spPr>
+        <p:txBody>
+          <a:bodyPr vert="horz" lIns="91440" tIns="45720" rIns="91440" bIns="45720" rtlCol="0" anchor="ctr">
+            <a:normAutofit fontScale="90000" lnSpcReduction="10000"/>
+          </a:bodyPr>
+          <a:lstStyle>
+            <a:lvl1pPr algn="l" defTabSz="914400" rtl="0" eaLnBrk="1" latinLnBrk="0" hangingPunct="1">
+              <a:lnSpc>
+                <a:spcPct val="90000"/>
+              </a:lnSpc>
+              <a:spcBef>
+                <a:spcPct val="0"/>
+              </a:spcBef>
+              <a:buNone/>
+              <a:defRPr sz="4400" kern="1200">
+                <a:solidFill>
+                  <a:schemeClr val="tx1"/>
+                </a:solidFill>
+                <a:latin typeface="+mj-lt"/>
+                <a:ea typeface="+mj-ea"/>
+                <a:cs typeface="+mj-cs"/>
+              </a:defRPr>
+            </a:lvl1pPr>
+          </a:lstStyle>
+          <a:p>
+            <a:pPr algn="ctr"/>
             <a:r>
               <a:rPr lang="en-US" sz="4000" dirty="0">
                 <a:latin typeface="Britannic Bold" panose="020B0903060703020204" pitchFamily="34" charset="0"/>
               </a:rPr>
-              <a:t>Challenges</a:t>
-            </a:r>
-          </a:p>
-        </p:txBody>
-      </p:sp>
-      <p:sp>
-        <p:nvSpPr>
-          <p:cNvPr id="8" name="Title 4">
-            <a:extLst>
-              <a:ext uri="{FF2B5EF4-FFF2-40B4-BE49-F238E27FC236}">
-                <a16:creationId xmlns:a16="http://schemas.microsoft.com/office/drawing/2014/main" id="{045256A9-2839-492F-8E0A-DEC7FB8679F3}"/>
+              <a:t>Improving the Original Visualization</a:t>
+            </a:r>
+          </a:p>
+        </p:txBody>
+      </p:sp>
+      <p:sp>
+        <p:nvSpPr>
+          <p:cNvPr id="10" name="Title 4">
+            <a:extLst>
+              <a:ext uri="{FF2B5EF4-FFF2-40B4-BE49-F238E27FC236}">
+                <a16:creationId xmlns:a16="http://schemas.microsoft.com/office/drawing/2014/main" id="{134F17A5-8BB0-4C0A-B66A-AE9E73A63E10}"/>
               </a:ext>
             </a:extLst>
           </p:cNvPr>
@@ -4387,7 +5839,7 @@
         </p:nvSpPr>
         <p:spPr>
           <a:xfrm>
-            <a:off x="1164432" y="517745"/>
+            <a:off x="1012031" y="545880"/>
             <a:ext cx="4833938" cy="1025525"/>
           </a:xfrm>
           <a:prstGeom prst="plaque">
@@ -4434,7 +5886,7 @@
     </p:spTree>
     <p:extLst>
       <p:ext uri="{BB962C8B-B14F-4D97-AF65-F5344CB8AC3E}">
-        <p14:creationId xmlns:p14="http://schemas.microsoft.com/office/powerpoint/2010/main" val="3676238569"/>
+        <p14:creationId xmlns:p14="http://schemas.microsoft.com/office/powerpoint/2010/main" val="2675873568"/>
       </p:ext>
     </p:extLst>
   </p:cSld>
@@ -4444,7 +5896,7 @@
 </p:sld>
 </file>
 
-<file path=ppt/slides/slide13.xml><?xml version="1.0" encoding="utf-8"?>
+<file path=ppt/slides/slide14.xml><?xml version="1.0" encoding="utf-8"?>
 <p:sld xmlns:a="http://schemas.openxmlformats.org/drawingml/2006/main" xmlns:r="http://schemas.openxmlformats.org/officeDocument/2006/relationships" xmlns:p="http://schemas.openxmlformats.org/presentationml/2006/main">
   <p:cSld>
     <p:spTree>
@@ -4466,6 +5918,238 @@
           <p:cNvPr id="3" name="Content Placeholder 2">
             <a:extLst>
               <a:ext uri="{FF2B5EF4-FFF2-40B4-BE49-F238E27FC236}">
+                <a16:creationId xmlns:a16="http://schemas.microsoft.com/office/drawing/2014/main" id="{FECAB945-8F13-4CDA-80D9-2B7B6066653A}"/>
+              </a:ext>
+            </a:extLst>
+          </p:cNvPr>
+          <p:cNvSpPr>
+            <a:spLocks noGrp="1"/>
+          </p:cNvSpPr>
+          <p:nvPr>
+            <p:ph sz="half" idx="1"/>
+          </p:nvPr>
+        </p:nvSpPr>
+        <p:spPr/>
+        <p:txBody>
+          <a:bodyPr/>
+          <a:lstStyle/>
+          <a:p>
+            <a:r>
+              <a:rPr lang="en-US" dirty="0"/>
+              <a:t>Recreating the visual – cost</a:t>
+            </a:r>
+          </a:p>
+          <a:p>
+            <a:pPr lvl="1"/>
+            <a:r>
+              <a:rPr lang="en-US" dirty="0"/>
+              <a:t>Underlining planes vs. trains as the legend</a:t>
+            </a:r>
+          </a:p>
+          <a:p>
+            <a:r>
+              <a:rPr lang="en-US" dirty="0" err="1"/>
+              <a:t>gganimate</a:t>
+            </a:r>
+            <a:r>
+              <a:rPr lang="en-US" dirty="0"/>
+              <a:t> not necessarily the right tool for such a simple animation</a:t>
+            </a:r>
+          </a:p>
+          <a:p>
+            <a:r>
+              <a:rPr lang="en-US" dirty="0"/>
+              <a:t>Verification of data – difficult to add new data without an understanding of their own data gathering process</a:t>
+            </a:r>
+          </a:p>
+          <a:p>
+            <a:pPr lvl="1"/>
+            <a:endParaRPr lang="en-US" dirty="0"/>
+          </a:p>
+        </p:txBody>
+      </p:sp>
+      <p:sp>
+        <p:nvSpPr>
+          <p:cNvPr id="4" name="Content Placeholder 3">
+            <a:extLst>
+              <a:ext uri="{FF2B5EF4-FFF2-40B4-BE49-F238E27FC236}">
+                <a16:creationId xmlns:a16="http://schemas.microsoft.com/office/drawing/2014/main" id="{1C173A96-D5B9-4DF6-ABB2-74F3288DBFFD}"/>
+              </a:ext>
+            </a:extLst>
+          </p:cNvPr>
+          <p:cNvSpPr>
+            <a:spLocks noGrp="1"/>
+          </p:cNvSpPr>
+          <p:nvPr>
+            <p:ph sz="half" idx="2"/>
+          </p:nvPr>
+        </p:nvSpPr>
+        <p:spPr/>
+        <p:txBody>
+          <a:bodyPr/>
+          <a:lstStyle/>
+          <a:p>
+            <a:endParaRPr lang="en-US"/>
+          </a:p>
+        </p:txBody>
+      </p:sp>
+      <p:sp>
+        <p:nvSpPr>
+          <p:cNvPr id="7" name="Title 4">
+            <a:extLst>
+              <a:ext uri="{FF2B5EF4-FFF2-40B4-BE49-F238E27FC236}">
+                <a16:creationId xmlns:a16="http://schemas.microsoft.com/office/drawing/2014/main" id="{3ACD32CA-430E-417A-82E1-BF06DF62E694}"/>
+              </a:ext>
+            </a:extLst>
+          </p:cNvPr>
+          <p:cNvSpPr txBox="1">
+            <a:spLocks/>
+          </p:cNvSpPr>
+          <p:nvPr/>
+        </p:nvSpPr>
+        <p:spPr>
+          <a:xfrm>
+            <a:off x="990601" y="367725"/>
+            <a:ext cx="5181599" cy="1325563"/>
+          </a:xfrm>
+          <a:prstGeom prst="plaque">
+            <a:avLst/>
+          </a:prstGeom>
+          <a:solidFill>
+            <a:schemeClr val="bg1">
+              <a:alpha val="82000"/>
+            </a:schemeClr>
+          </a:solidFill>
+        </p:spPr>
+        <p:txBody>
+          <a:bodyPr vert="horz" lIns="91440" tIns="45720" rIns="91440" bIns="45720" rtlCol="0" anchor="ctr">
+            <a:normAutofit fontScale="97500"/>
+          </a:bodyPr>
+          <a:lstStyle>
+            <a:lvl1pPr algn="l" defTabSz="914400" rtl="0" eaLnBrk="1" latinLnBrk="0" hangingPunct="1">
+              <a:lnSpc>
+                <a:spcPct val="90000"/>
+              </a:lnSpc>
+              <a:spcBef>
+                <a:spcPct val="0"/>
+              </a:spcBef>
+              <a:buNone/>
+              <a:defRPr sz="4400" kern="1200">
+                <a:solidFill>
+                  <a:schemeClr val="tx1"/>
+                </a:solidFill>
+                <a:latin typeface="+mj-lt"/>
+                <a:ea typeface="+mj-ea"/>
+                <a:cs typeface="+mj-cs"/>
+              </a:defRPr>
+            </a:lvl1pPr>
+          </a:lstStyle>
+          <a:p>
+            <a:pPr algn="ctr"/>
+            <a:r>
+              <a:rPr lang="en-US" sz="4000" dirty="0">
+                <a:latin typeface="Britannic Bold" panose="020B0903060703020204" pitchFamily="34" charset="0"/>
+              </a:rPr>
+              <a:t>Challenges</a:t>
+            </a:r>
+          </a:p>
+        </p:txBody>
+      </p:sp>
+      <p:sp>
+        <p:nvSpPr>
+          <p:cNvPr id="8" name="Title 4">
+            <a:extLst>
+              <a:ext uri="{FF2B5EF4-FFF2-40B4-BE49-F238E27FC236}">
+                <a16:creationId xmlns:a16="http://schemas.microsoft.com/office/drawing/2014/main" id="{045256A9-2839-492F-8E0A-DEC7FB8679F3}"/>
+              </a:ext>
+            </a:extLst>
+          </p:cNvPr>
+          <p:cNvSpPr txBox="1">
+            <a:spLocks/>
+          </p:cNvSpPr>
+          <p:nvPr/>
+        </p:nvSpPr>
+        <p:spPr>
+          <a:xfrm>
+            <a:off x="1164432" y="517745"/>
+            <a:ext cx="4833938" cy="1025525"/>
+          </a:xfrm>
+          <a:prstGeom prst="plaque">
+            <a:avLst/>
+          </a:prstGeom>
+          <a:noFill/>
+          <a:ln w="38100">
+            <a:solidFill>
+              <a:schemeClr val="tx1"/>
+            </a:solidFill>
+          </a:ln>
+        </p:spPr>
+        <p:txBody>
+          <a:bodyPr vert="horz" lIns="91440" tIns="45720" rIns="91440" bIns="45720" rtlCol="0" anchor="ctr">
+            <a:normAutofit fontScale="97500"/>
+          </a:bodyPr>
+          <a:lstStyle>
+            <a:lvl1pPr algn="l" defTabSz="914400" rtl="0" eaLnBrk="1" latinLnBrk="0" hangingPunct="1">
+              <a:lnSpc>
+                <a:spcPct val="90000"/>
+              </a:lnSpc>
+              <a:spcBef>
+                <a:spcPct val="0"/>
+              </a:spcBef>
+              <a:buNone/>
+              <a:defRPr sz="4400" kern="1200">
+                <a:solidFill>
+                  <a:schemeClr val="tx1"/>
+                </a:solidFill>
+                <a:latin typeface="+mj-lt"/>
+                <a:ea typeface="+mj-ea"/>
+                <a:cs typeface="+mj-cs"/>
+              </a:defRPr>
+            </a:lvl1pPr>
+          </a:lstStyle>
+          <a:p>
+            <a:pPr algn="ctr"/>
+            <a:endParaRPr lang="en-US" sz="4000" dirty="0">
+              <a:latin typeface="Britannic Bold" panose="020B0903060703020204" pitchFamily="34" charset="0"/>
+            </a:endParaRPr>
+          </a:p>
+        </p:txBody>
+      </p:sp>
+    </p:spTree>
+    <p:extLst>
+      <p:ext uri="{BB962C8B-B14F-4D97-AF65-F5344CB8AC3E}">
+        <p14:creationId xmlns:p14="http://schemas.microsoft.com/office/powerpoint/2010/main" val="3676238569"/>
+      </p:ext>
+    </p:extLst>
+  </p:cSld>
+  <p:clrMapOvr>
+    <a:overrideClrMapping bg1="lt1" tx1="dk1" bg2="lt2" tx2="dk2" accent1="accent1" accent2="accent2" accent3="accent3" accent4="accent4" accent5="accent5" accent6="accent6" hlink="hlink" folHlink="folHlink"/>
+  </p:clrMapOvr>
+</p:sld>
+</file>
+
+<file path=ppt/slides/slide15.xml><?xml version="1.0" encoding="utf-8"?>
+<p:sld xmlns:a="http://schemas.openxmlformats.org/drawingml/2006/main" xmlns:r="http://schemas.openxmlformats.org/officeDocument/2006/relationships" xmlns:p="http://schemas.openxmlformats.org/presentationml/2006/main">
+  <p:cSld>
+    <p:spTree>
+      <p:nvGrpSpPr>
+        <p:cNvPr id="1" name=""/>
+        <p:cNvGrpSpPr/>
+        <p:nvPr/>
+      </p:nvGrpSpPr>
+      <p:grpSpPr>
+        <a:xfrm>
+          <a:off x="0" y="0"/>
+          <a:ext cx="0" cy="0"/>
+          <a:chOff x="0" y="0"/>
+          <a:chExt cx="0" cy="0"/>
+        </a:xfrm>
+      </p:grpSpPr>
+      <p:sp>
+        <p:nvSpPr>
+          <p:cNvPr id="3" name="Content Placeholder 2">
+            <a:extLst>
+              <a:ext uri="{FF2B5EF4-FFF2-40B4-BE49-F238E27FC236}">
                 <a16:creationId xmlns:a16="http://schemas.microsoft.com/office/drawing/2014/main" id="{4AAAB96C-DDD5-4720-A7C0-66D77E0282F8}"/>
               </a:ext>
             </a:extLst>
@@ -4491,6 +6175,17 @@
               <a:rPr lang="en-US" dirty="0"/>
               <a:t>Understanding how travel seasons impact the cost of tickets</a:t>
             </a:r>
+          </a:p>
+          <a:p>
+            <a:r>
+              <a:rPr lang="en-US" dirty="0"/>
+              <a:t>A set of analyses like this would be best suited for an interactive app – so that users can input their own assumptions, destinations, </a:t>
+            </a:r>
+            <a:r>
+              <a:rPr lang="en-US" dirty="0" err="1"/>
+              <a:t>etc</a:t>
+            </a:r>
+            <a:endParaRPr lang="en-US" dirty="0"/>
           </a:p>
           <a:p>
             <a:endParaRPr lang="en-US" dirty="0"/>
@@ -4741,6 +6436,31 @@
       </p:grpSpPr>
       <p:sp>
         <p:nvSpPr>
+          <p:cNvPr id="2" name="Title 1">
+            <a:extLst>
+              <a:ext uri="{FF2B5EF4-FFF2-40B4-BE49-F238E27FC236}">
+                <a16:creationId xmlns:a16="http://schemas.microsoft.com/office/drawing/2014/main" id="{AE91C00E-DA2D-478D-976F-161FABE354B1}"/>
+              </a:ext>
+            </a:extLst>
+          </p:cNvPr>
+          <p:cNvSpPr>
+            <a:spLocks noGrp="1"/>
+          </p:cNvSpPr>
+          <p:nvPr>
+            <p:ph type="title"/>
+          </p:nvPr>
+        </p:nvSpPr>
+        <p:spPr/>
+        <p:txBody>
+          <a:bodyPr/>
+          <a:lstStyle/>
+          <a:p>
+            <a:endParaRPr lang="en-US" b="1" dirty="0"/>
+          </a:p>
+        </p:txBody>
+      </p:sp>
+      <p:sp>
+        <p:nvSpPr>
           <p:cNvPr id="3" name="Content Placeholder 2">
             <a:extLst>
               <a:ext uri="{FF2B5EF4-FFF2-40B4-BE49-F238E27FC236}">
@@ -4755,12 +6475,79 @@
             <p:ph sz="half" idx="1"/>
           </p:nvPr>
         </p:nvSpPr>
-        <p:spPr/>
-        <p:txBody>
-          <a:bodyPr/>
+        <p:spPr>
+          <a:xfrm>
+            <a:off x="838200" y="1825625"/>
+            <a:ext cx="10355664" cy="4351338"/>
+          </a:xfrm>
+        </p:spPr>
+        <p:txBody>
+          <a:bodyPr>
+            <a:normAutofit/>
+          </a:bodyPr>
           <a:lstStyle/>
           <a:p>
+            <a:r>
+              <a:rPr lang="en-US" dirty="0"/>
+              <a:t>The visualizations came from </a:t>
+            </a:r>
+            <a:r>
+              <a:rPr lang="en-US" dirty="0">
+                <a:hlinkClick r:id="rId2"/>
+              </a:rPr>
+              <a:t>a DW article</a:t>
+            </a:r>
+            <a:r>
+              <a:rPr lang="en-US" dirty="0"/>
+              <a:t> dated August 29</a:t>
+            </a:r>
+            <a:r>
+              <a:rPr lang="en-US" baseline="30000" dirty="0"/>
+              <a:t>th</a:t>
+            </a:r>
+            <a:r>
+              <a:rPr lang="en-US" dirty="0"/>
+              <a:t>, 2018</a:t>
+            </a:r>
+          </a:p>
+          <a:p>
+            <a:pPr lvl="1"/>
+            <a:r>
+              <a:rPr lang="en-US" dirty="0"/>
+              <a:t>Data journalists Tom Wills &amp; Gianna-Carina </a:t>
+            </a:r>
+            <a:r>
+              <a:rPr lang="en-US" dirty="0" err="1"/>
+              <a:t>Grün</a:t>
+            </a:r>
             <a:endParaRPr lang="en-US" dirty="0"/>
+          </a:p>
+          <a:p>
+            <a:r>
+              <a:rPr lang="en-US" dirty="0"/>
+              <a:t>They built a simple model that aims to demonstrate the “true costs” travelling by combining monetary cost, time cost, &amp; environmental cost</a:t>
+            </a:r>
+          </a:p>
+          <a:p>
+            <a:pPr lvl="1"/>
+            <a:r>
+              <a:rPr lang="en-US" dirty="0"/>
+              <a:t>As such, the graphs visualize more than just a raw dataset – there is a whole set of underlying assumptions &amp; calculations</a:t>
+            </a:r>
+          </a:p>
+          <a:p>
+            <a:r>
+              <a:rPr lang="en-US" dirty="0"/>
+              <a:t>We decided to replicate </a:t>
+            </a:r>
+            <a:r>
+              <a:rPr lang="en-US" u="sng" dirty="0"/>
+              <a:t>2 visualizations</a:t>
+            </a:r>
+            <a:r>
+              <a:rPr lang="en-US" dirty="0"/>
+              <a:t> from their model: monetary cost &amp; time cost</a:t>
+            </a:r>
           </a:p>
         </p:txBody>
       </p:sp>
@@ -4782,19 +6569,111 @@
         </p:nvSpPr>
         <p:spPr/>
         <p:txBody>
-          <a:bodyPr/>
+          <a:bodyPr>
+            <a:normAutofit/>
+          </a:bodyPr>
           <a:lstStyle/>
           <a:p>
-            <a:endParaRPr lang="en-US"/>
-          </a:p>
-        </p:txBody>
-      </p:sp>
-      <p:sp>
-        <p:nvSpPr>
-          <p:cNvPr id="7" name="Title 4">
-            <a:extLst>
-              <a:ext uri="{FF2B5EF4-FFF2-40B4-BE49-F238E27FC236}">
-                <a16:creationId xmlns:a16="http://schemas.microsoft.com/office/drawing/2014/main" id="{AAB40256-E684-4D98-B88F-940265F96941}"/>
+            <a:endParaRPr lang="en-US" dirty="0"/>
+          </a:p>
+        </p:txBody>
+      </p:sp>
+      <p:pic>
+        <p:nvPicPr>
+          <p:cNvPr id="5" name="Picture 4">
+            <a:extLst>
+              <a:ext uri="{FF2B5EF4-FFF2-40B4-BE49-F238E27FC236}">
+                <a16:creationId xmlns:a16="http://schemas.microsoft.com/office/drawing/2014/main" id="{BB381DD2-46A9-4E37-9BD9-BA0F86204C80}"/>
+              </a:ext>
+            </a:extLst>
+          </p:cNvPr>
+          <p:cNvPicPr>
+            <a:picLocks noChangeAspect="1"/>
+          </p:cNvPicPr>
+          <p:nvPr/>
+        </p:nvPicPr>
+        <p:blipFill>
+          <a:blip r:embed="rId3"/>
+          <a:stretch>
+            <a:fillRect/>
+          </a:stretch>
+        </p:blipFill>
+        <p:spPr>
+          <a:xfrm>
+            <a:off x="838200" y="1800414"/>
+            <a:ext cx="5862637" cy="1032575"/>
+          </a:xfrm>
+          <a:prstGeom prst="rect">
+            <a:avLst/>
+          </a:prstGeom>
+        </p:spPr>
+      </p:pic>
+      <p:pic>
+        <p:nvPicPr>
+          <p:cNvPr id="6" name="Picture 5">
+            <a:extLst>
+              <a:ext uri="{FF2B5EF4-FFF2-40B4-BE49-F238E27FC236}">
+                <a16:creationId xmlns:a16="http://schemas.microsoft.com/office/drawing/2014/main" id="{DB3EB17F-8D74-412A-AF10-67503FD18189}"/>
+              </a:ext>
+            </a:extLst>
+          </p:cNvPr>
+          <p:cNvPicPr>
+            <a:picLocks noChangeAspect="1"/>
+          </p:cNvPicPr>
+          <p:nvPr/>
+        </p:nvPicPr>
+        <p:blipFill>
+          <a:blip r:embed="rId4"/>
+          <a:stretch>
+            <a:fillRect/>
+          </a:stretch>
+        </p:blipFill>
+        <p:spPr>
+          <a:xfrm>
+            <a:off x="3691729" y="2948427"/>
+            <a:ext cx="4152900" cy="1466850"/>
+          </a:xfrm>
+          <a:prstGeom prst="rect">
+            <a:avLst/>
+          </a:prstGeom>
+        </p:spPr>
+      </p:pic>
+      <p:pic>
+        <p:nvPicPr>
+          <p:cNvPr id="9" name="Picture 8">
+            <a:extLst>
+              <a:ext uri="{FF2B5EF4-FFF2-40B4-BE49-F238E27FC236}">
+                <a16:creationId xmlns:a16="http://schemas.microsoft.com/office/drawing/2014/main" id="{5FDFEA61-8463-4F6D-84F1-FB338F5FF454}"/>
+              </a:ext>
+            </a:extLst>
+          </p:cNvPr>
+          <p:cNvPicPr>
+            <a:picLocks noChangeAspect="1"/>
+          </p:cNvPicPr>
+          <p:nvPr/>
+        </p:nvPicPr>
+        <p:blipFill>
+          <a:blip r:embed="rId5"/>
+          <a:stretch>
+            <a:fillRect/>
+          </a:stretch>
+        </p:blipFill>
+        <p:spPr>
+          <a:xfrm>
+            <a:off x="2416052" y="4533168"/>
+            <a:ext cx="9610725" cy="2152650"/>
+          </a:xfrm>
+          <a:prstGeom prst="rect">
+            <a:avLst/>
+          </a:prstGeom>
+        </p:spPr>
+      </p:pic>
+      <p:sp>
+        <p:nvSpPr>
+          <p:cNvPr id="12" name="Title 4">
+            <a:extLst>
+              <a:ext uri="{FF2B5EF4-FFF2-40B4-BE49-F238E27FC236}">
+                <a16:creationId xmlns:a16="http://schemas.microsoft.com/office/drawing/2014/main" id="{BA8C6E62-90F1-4FAF-8566-0FFB1856A29C}"/>
               </a:ext>
             </a:extLst>
           </p:cNvPr>
@@ -4805,7 +6684,7 @@
         </p:nvSpPr>
         <p:spPr>
           <a:xfrm>
-            <a:off x="657224" y="353656"/>
+            <a:off x="3008538" y="365125"/>
             <a:ext cx="5181599" cy="1325563"/>
           </a:xfrm>
           <a:prstGeom prst="plaque">
@@ -4865,10 +6744,10 @@
       </p:sp>
       <p:sp>
         <p:nvSpPr>
-          <p:cNvPr id="8" name="Title 4">
-            <a:extLst>
-              <a:ext uri="{FF2B5EF4-FFF2-40B4-BE49-F238E27FC236}">
-                <a16:creationId xmlns:a16="http://schemas.microsoft.com/office/drawing/2014/main" id="{0FC5CE5A-1BAE-44E8-A50C-8D8942309B6B}"/>
+          <p:cNvPr id="13" name="Title 4">
+            <a:extLst>
+              <a:ext uri="{FF2B5EF4-FFF2-40B4-BE49-F238E27FC236}">
+                <a16:creationId xmlns:a16="http://schemas.microsoft.com/office/drawing/2014/main" id="{4044F291-FDFB-44DA-918E-B06A489F1860}"/>
               </a:ext>
             </a:extLst>
           </p:cNvPr>
@@ -4879,7 +6758,7 @@
         </p:nvSpPr>
         <p:spPr>
           <a:xfrm>
-            <a:off x="838200" y="503676"/>
+            <a:off x="3189514" y="515145"/>
             <a:ext cx="4833938" cy="1025525"/>
           </a:xfrm>
           <a:prstGeom prst="plaque">
@@ -4926,13 +6805,234 @@
     </p:spTree>
     <p:extLst>
       <p:ext uri="{BB962C8B-B14F-4D97-AF65-F5344CB8AC3E}">
-        <p14:creationId xmlns:p14="http://schemas.microsoft.com/office/powerpoint/2010/main" val="347150910"/>
+        <p14:creationId xmlns:p14="http://schemas.microsoft.com/office/powerpoint/2010/main" val="3305173553"/>
       </p:ext>
     </p:extLst>
   </p:cSld>
   <p:clrMapOvr>
-    <a:overrideClrMapping bg1="lt1" tx1="dk1" bg2="lt2" tx2="dk2" accent1="accent1" accent2="accent2" accent3="accent3" accent4="accent4" accent5="accent5" accent6="accent6" hlink="hlink" folHlink="folHlink"/>
+    <a:masterClrMapping/>
   </p:clrMapOvr>
+  <p:timing>
+    <p:tnLst>
+      <p:par>
+        <p:cTn id="1" dur="indefinite" restart="never" nodeType="tmRoot">
+          <p:childTnLst>
+            <p:seq concurrent="1" nextAc="seek">
+              <p:cTn id="2" dur="indefinite" nodeType="mainSeq">
+                <p:childTnLst>
+                  <p:par>
+                    <p:cTn id="3" fill="hold">
+                      <p:stCondLst>
+                        <p:cond delay="indefinite"/>
+                      </p:stCondLst>
+                      <p:childTnLst>
+                        <p:par>
+                          <p:cTn id="4" fill="hold">
+                            <p:stCondLst>
+                              <p:cond delay="0"/>
+                            </p:stCondLst>
+                            <p:childTnLst>
+                              <p:par>
+                                <p:cTn id="5" presetID="10" presetClass="exit" presetSubtype="0" fill="hold" grpId="0" nodeType="clickEffect">
+                                  <p:stCondLst>
+                                    <p:cond delay="0"/>
+                                  </p:stCondLst>
+                                  <p:childTnLst>
+                                    <p:animEffect transition="out" filter="fade">
+                                      <p:cBhvr>
+                                        <p:cTn id="6" dur="500"/>
+                                        <p:tgtEl>
+                                          <p:spTgt spid="3"/>
+                                        </p:tgtEl>
+                                      </p:cBhvr>
+                                    </p:animEffect>
+                                    <p:set>
+                                      <p:cBhvr>
+                                        <p:cTn id="7" dur="1" fill="hold">
+                                          <p:stCondLst>
+                                            <p:cond delay="499"/>
+                                          </p:stCondLst>
+                                        </p:cTn>
+                                        <p:tgtEl>
+                                          <p:spTgt spid="3"/>
+                                        </p:tgtEl>
+                                        <p:attrNameLst>
+                                          <p:attrName>style.visibility</p:attrName>
+                                        </p:attrNameLst>
+                                      </p:cBhvr>
+                                      <p:to>
+                                        <p:strVal val="hidden"/>
+                                      </p:to>
+                                    </p:set>
+                                  </p:childTnLst>
+                                </p:cTn>
+                              </p:par>
+                            </p:childTnLst>
+                          </p:cTn>
+                        </p:par>
+                      </p:childTnLst>
+                    </p:cTn>
+                  </p:par>
+                  <p:par>
+                    <p:cTn id="8" fill="hold">
+                      <p:stCondLst>
+                        <p:cond delay="indefinite"/>
+                      </p:stCondLst>
+                      <p:childTnLst>
+                        <p:par>
+                          <p:cTn id="9" fill="hold">
+                            <p:stCondLst>
+                              <p:cond delay="0"/>
+                            </p:stCondLst>
+                            <p:childTnLst>
+                              <p:par>
+                                <p:cTn id="10" presetID="1" presetClass="entr" presetSubtype="0" fill="hold" nodeType="clickEffect">
+                                  <p:stCondLst>
+                                    <p:cond delay="0"/>
+                                  </p:stCondLst>
+                                  <p:childTnLst>
+                                    <p:set>
+                                      <p:cBhvr>
+                                        <p:cTn id="11" dur="1" fill="hold">
+                                          <p:stCondLst>
+                                            <p:cond delay="0"/>
+                                          </p:stCondLst>
+                                        </p:cTn>
+                                        <p:tgtEl>
+                                          <p:spTgt spid="5"/>
+                                        </p:tgtEl>
+                                        <p:attrNameLst>
+                                          <p:attrName>style.visibility</p:attrName>
+                                        </p:attrNameLst>
+                                      </p:cBhvr>
+                                      <p:to>
+                                        <p:strVal val="visible"/>
+                                      </p:to>
+                                    </p:set>
+                                  </p:childTnLst>
+                                </p:cTn>
+                              </p:par>
+                            </p:childTnLst>
+                          </p:cTn>
+                        </p:par>
+                      </p:childTnLst>
+                    </p:cTn>
+                  </p:par>
+                  <p:par>
+                    <p:cTn id="12" fill="hold">
+                      <p:stCondLst>
+                        <p:cond delay="indefinite"/>
+                      </p:stCondLst>
+                      <p:childTnLst>
+                        <p:par>
+                          <p:cTn id="13" fill="hold">
+                            <p:stCondLst>
+                              <p:cond delay="0"/>
+                            </p:stCondLst>
+                            <p:childTnLst>
+                              <p:par>
+                                <p:cTn id="14" presetID="1" presetClass="entr" presetSubtype="0" fill="hold" nodeType="clickEffect">
+                                  <p:stCondLst>
+                                    <p:cond delay="0"/>
+                                  </p:stCondLst>
+                                  <p:childTnLst>
+                                    <p:set>
+                                      <p:cBhvr>
+                                        <p:cTn id="15" dur="1" fill="hold">
+                                          <p:stCondLst>
+                                            <p:cond delay="0"/>
+                                          </p:stCondLst>
+                                        </p:cTn>
+                                        <p:tgtEl>
+                                          <p:spTgt spid="6"/>
+                                        </p:tgtEl>
+                                        <p:attrNameLst>
+                                          <p:attrName>style.visibility</p:attrName>
+                                        </p:attrNameLst>
+                                      </p:cBhvr>
+                                      <p:to>
+                                        <p:strVal val="visible"/>
+                                      </p:to>
+                                    </p:set>
+                                  </p:childTnLst>
+                                </p:cTn>
+                              </p:par>
+                            </p:childTnLst>
+                          </p:cTn>
+                        </p:par>
+                      </p:childTnLst>
+                    </p:cTn>
+                  </p:par>
+                  <p:par>
+                    <p:cTn id="16" fill="hold">
+                      <p:stCondLst>
+                        <p:cond delay="indefinite"/>
+                      </p:stCondLst>
+                      <p:childTnLst>
+                        <p:par>
+                          <p:cTn id="17" fill="hold">
+                            <p:stCondLst>
+                              <p:cond delay="0"/>
+                            </p:stCondLst>
+                            <p:childTnLst>
+                              <p:par>
+                                <p:cTn id="18" presetID="1" presetClass="entr" presetSubtype="0" fill="hold" nodeType="clickEffect">
+                                  <p:stCondLst>
+                                    <p:cond delay="0"/>
+                                  </p:stCondLst>
+                                  <p:childTnLst>
+                                    <p:set>
+                                      <p:cBhvr>
+                                        <p:cTn id="19" dur="1" fill="hold">
+                                          <p:stCondLst>
+                                            <p:cond delay="0"/>
+                                          </p:stCondLst>
+                                        </p:cTn>
+                                        <p:tgtEl>
+                                          <p:spTgt spid="9"/>
+                                        </p:tgtEl>
+                                        <p:attrNameLst>
+                                          <p:attrName>style.visibility</p:attrName>
+                                        </p:attrNameLst>
+                                      </p:cBhvr>
+                                      <p:to>
+                                        <p:strVal val="visible"/>
+                                      </p:to>
+                                    </p:set>
+                                  </p:childTnLst>
+                                </p:cTn>
+                              </p:par>
+                            </p:childTnLst>
+                          </p:cTn>
+                        </p:par>
+                      </p:childTnLst>
+                    </p:cTn>
+                  </p:par>
+                </p:childTnLst>
+              </p:cTn>
+              <p:prevCondLst>
+                <p:cond evt="onPrev" delay="0">
+                  <p:tgtEl>
+                    <p:sldTgt/>
+                  </p:tgtEl>
+                </p:cond>
+              </p:prevCondLst>
+              <p:nextCondLst>
+                <p:cond evt="onNext" delay="0">
+                  <p:tgtEl>
+                    <p:sldTgt/>
+                  </p:tgtEl>
+                </p:cond>
+              </p:nextCondLst>
+            </p:seq>
+          </p:childTnLst>
+        </p:cTn>
+      </p:par>
+    </p:tnLst>
+    <p:bldLst>
+      <p:bldP spid="3" grpId="0" uiExpand="1"/>
+    </p:bldLst>
+  </p:timing>
 </p:sld>
 </file>
 
@@ -5045,36 +7145,6 @@
           </a:p>
         </p:txBody>
       </p:sp>
-      <p:pic>
-        <p:nvPicPr>
-          <p:cNvPr id="4" name="Picture 3">
-            <a:extLst>
-              <a:ext uri="{FF2B5EF4-FFF2-40B4-BE49-F238E27FC236}">
-                <a16:creationId xmlns:a16="http://schemas.microsoft.com/office/drawing/2014/main" id="{B16C7AF9-AF33-4854-B423-BF755ECE8C7C}"/>
-              </a:ext>
-            </a:extLst>
-          </p:cNvPr>
-          <p:cNvPicPr>
-            <a:picLocks noChangeAspect="1"/>
-          </p:cNvPicPr>
-          <p:nvPr/>
-        </p:nvPicPr>
-        <p:blipFill>
-          <a:blip r:embed="rId3"/>
-          <a:stretch>
-            <a:fillRect/>
-          </a:stretch>
-        </p:blipFill>
-        <p:spPr>
-          <a:xfrm>
-            <a:off x="838200" y="308838"/>
-            <a:ext cx="4970170" cy="6240324"/>
-          </a:xfrm>
-          <a:prstGeom prst="rect">
-            <a:avLst/>
-          </a:prstGeom>
-        </p:spPr>
-      </p:pic>
       <p:sp>
         <p:nvSpPr>
           <p:cNvPr id="12" name="Title 4">
@@ -5197,6 +7267,155 @@
           </a:p>
         </p:txBody>
       </p:sp>
+      <p:sp>
+        <p:nvSpPr>
+          <p:cNvPr id="8" name="TextBox 7">
+            <a:extLst>
+              <a:ext uri="{FF2B5EF4-FFF2-40B4-BE49-F238E27FC236}">
+                <a16:creationId xmlns:a16="http://schemas.microsoft.com/office/drawing/2014/main" id="{9B427B80-9294-4663-A114-1C78FB17F167}"/>
+              </a:ext>
+            </a:extLst>
+          </p:cNvPr>
+          <p:cNvSpPr txBox="1"/>
+          <p:nvPr/>
+        </p:nvSpPr>
+        <p:spPr>
+          <a:xfrm>
+            <a:off x="6172200" y="6176963"/>
+            <a:ext cx="5181600" cy="646331"/>
+          </a:xfrm>
+          <a:prstGeom prst="rect">
+            <a:avLst/>
+          </a:prstGeom>
+          <a:noFill/>
+        </p:spPr>
+        <p:txBody>
+          <a:bodyPr wrap="square" rtlCol="0">
+            <a:spAutoFit/>
+          </a:bodyPr>
+          <a:lstStyle/>
+          <a:p>
+            <a:r>
+              <a:rPr lang="en-US" sz="1200" dirty="0">
+                <a:solidFill>
+                  <a:schemeClr val="bg2">
+                    <a:lumMod val="25000"/>
+                  </a:schemeClr>
+                </a:solidFill>
+              </a:rPr>
+              <a:t>Wills, Tom &amp; Gianna-Carina </a:t>
+            </a:r>
+            <a:r>
+              <a:rPr lang="en-US" sz="1200" dirty="0" err="1">
+                <a:solidFill>
+                  <a:schemeClr val="bg2">
+                    <a:lumMod val="25000"/>
+                  </a:schemeClr>
+                </a:solidFill>
+              </a:rPr>
+              <a:t>Grün</a:t>
+            </a:r>
+            <a:r>
+              <a:rPr lang="en-US" sz="1200" dirty="0">
+                <a:solidFill>
+                  <a:schemeClr val="bg2">
+                    <a:lumMod val="25000"/>
+                  </a:schemeClr>
+                </a:solidFill>
+              </a:rPr>
+              <a:t>. “Trains vs. planes. What’s the real cost of travel?” </a:t>
+            </a:r>
+            <a:r>
+              <a:rPr lang="en-US" sz="1200" i="1" dirty="0">
+                <a:solidFill>
+                  <a:schemeClr val="bg2">
+                    <a:lumMod val="25000"/>
+                  </a:schemeClr>
+                </a:solidFill>
+              </a:rPr>
+              <a:t>Deutsche </a:t>
+            </a:r>
+            <a:r>
+              <a:rPr lang="en-US" sz="1200" i="1" dirty="0" err="1">
+                <a:solidFill>
+                  <a:schemeClr val="bg2">
+                    <a:lumMod val="25000"/>
+                  </a:schemeClr>
+                </a:solidFill>
+              </a:rPr>
+              <a:t>Welle</a:t>
+            </a:r>
+            <a:r>
+              <a:rPr lang="en-US" sz="1200" i="1" dirty="0">
+                <a:solidFill>
+                  <a:schemeClr val="bg2">
+                    <a:lumMod val="25000"/>
+                  </a:schemeClr>
+                </a:solidFill>
+              </a:rPr>
+              <a:t>. </a:t>
+            </a:r>
+            <a:r>
+              <a:rPr lang="en-US" sz="1200" i="1" dirty="0">
+                <a:solidFill>
+                  <a:schemeClr val="bg2">
+                    <a:lumMod val="25000"/>
+                  </a:schemeClr>
+                </a:solidFill>
+                <a:hlinkClick r:id="rId3"/>
+              </a:rPr>
+              <a:t>https://www.dw.com/en/trains-vs-planes-whats-the-real-cost-of-travel/a-45209552</a:t>
+            </a:r>
+            <a:r>
+              <a:rPr lang="en-US" sz="1200" i="1" dirty="0">
+                <a:solidFill>
+                  <a:schemeClr val="bg2">
+                    <a:lumMod val="25000"/>
+                  </a:schemeClr>
+                </a:solidFill>
+              </a:rPr>
+              <a:t>. (Accessed October 30, 2018.</a:t>
+            </a:r>
+            <a:endParaRPr lang="en-US" sz="1200" dirty="0">
+              <a:solidFill>
+                <a:schemeClr val="bg2">
+                  <a:lumMod val="25000"/>
+                </a:schemeClr>
+              </a:solidFill>
+            </a:endParaRPr>
+          </a:p>
+        </p:txBody>
+      </p:sp>
+      <p:pic>
+        <p:nvPicPr>
+          <p:cNvPr id="9" name="Picture 8">
+            <a:extLst>
+              <a:ext uri="{FF2B5EF4-FFF2-40B4-BE49-F238E27FC236}">
+                <a16:creationId xmlns:a16="http://schemas.microsoft.com/office/drawing/2014/main" id="{45F73811-0117-40AC-936B-88B269CA2600}"/>
+              </a:ext>
+            </a:extLst>
+          </p:cNvPr>
+          <p:cNvPicPr>
+            <a:picLocks noChangeAspect="1"/>
+          </p:cNvPicPr>
+          <p:nvPr/>
+        </p:nvPicPr>
+        <p:blipFill>
+          <a:blip r:embed="rId4"/>
+          <a:stretch>
+            <a:fillRect/>
+          </a:stretch>
+        </p:blipFill>
+        <p:spPr>
+          <a:xfrm>
+            <a:off x="355307" y="176107"/>
+            <a:ext cx="5181600" cy="6505786"/>
+          </a:xfrm>
+          <a:prstGeom prst="rect">
+            <a:avLst/>
+          </a:prstGeom>
+        </p:spPr>
+      </p:pic>
     </p:spTree>
     <p:extLst>
       <p:ext uri="{BB962C8B-B14F-4D97-AF65-F5344CB8AC3E}">
@@ -5411,6 +7630,125 @@
             <a:pPr algn="ctr"/>
             <a:endParaRPr lang="en-US" sz="4000" dirty="0">
               <a:latin typeface="Britannic Bold" panose="020B0903060703020204" pitchFamily="34" charset="0"/>
+            </a:endParaRPr>
+          </a:p>
+        </p:txBody>
+      </p:sp>
+      <p:sp>
+        <p:nvSpPr>
+          <p:cNvPr id="9" name="TextBox 8">
+            <a:extLst>
+              <a:ext uri="{FF2B5EF4-FFF2-40B4-BE49-F238E27FC236}">
+                <a16:creationId xmlns:a16="http://schemas.microsoft.com/office/drawing/2014/main" id="{19F5E72E-A908-46F2-A616-7652788F2AA9}"/>
+              </a:ext>
+            </a:extLst>
+          </p:cNvPr>
+          <p:cNvSpPr txBox="1"/>
+          <p:nvPr/>
+        </p:nvSpPr>
+        <p:spPr>
+          <a:xfrm>
+            <a:off x="6172200" y="6176963"/>
+            <a:ext cx="5181600" cy="646331"/>
+          </a:xfrm>
+          <a:prstGeom prst="rect">
+            <a:avLst/>
+          </a:prstGeom>
+          <a:noFill/>
+        </p:spPr>
+        <p:txBody>
+          <a:bodyPr wrap="square" rtlCol="0">
+            <a:spAutoFit/>
+          </a:bodyPr>
+          <a:lstStyle/>
+          <a:p>
+            <a:r>
+              <a:rPr lang="en-US" sz="1200" dirty="0">
+                <a:solidFill>
+                  <a:schemeClr val="bg2">
+                    <a:lumMod val="25000"/>
+                  </a:schemeClr>
+                </a:solidFill>
+              </a:rPr>
+              <a:t>Wills, Tom &amp; Gianna-Carina </a:t>
+            </a:r>
+            <a:r>
+              <a:rPr lang="en-US" sz="1200" dirty="0" err="1">
+                <a:solidFill>
+                  <a:schemeClr val="bg2">
+                    <a:lumMod val="25000"/>
+                  </a:schemeClr>
+                </a:solidFill>
+              </a:rPr>
+              <a:t>Grün</a:t>
+            </a:r>
+            <a:r>
+              <a:rPr lang="en-US" sz="1200" dirty="0">
+                <a:solidFill>
+                  <a:schemeClr val="bg2">
+                    <a:lumMod val="25000"/>
+                  </a:schemeClr>
+                </a:solidFill>
+              </a:rPr>
+              <a:t>. “Trains vs. planes. What’s the real cost of travel?” </a:t>
+            </a:r>
+            <a:r>
+              <a:rPr lang="en-US" sz="1200" i="1" dirty="0">
+                <a:solidFill>
+                  <a:schemeClr val="bg2">
+                    <a:lumMod val="25000"/>
+                  </a:schemeClr>
+                </a:solidFill>
+              </a:rPr>
+              <a:t>Deutsche </a:t>
+            </a:r>
+            <a:r>
+              <a:rPr lang="en-US" sz="1200" i="1" dirty="0" err="1">
+                <a:solidFill>
+                  <a:schemeClr val="bg2">
+                    <a:lumMod val="25000"/>
+                  </a:schemeClr>
+                </a:solidFill>
+              </a:rPr>
+              <a:t>Welle</a:t>
+            </a:r>
+            <a:r>
+              <a:rPr lang="en-US" sz="1200" i="1" dirty="0">
+                <a:solidFill>
+                  <a:schemeClr val="bg2">
+                    <a:lumMod val="25000"/>
+                  </a:schemeClr>
+                </a:solidFill>
+              </a:rPr>
+              <a:t>. </a:t>
+            </a:r>
+            <a:r>
+              <a:rPr lang="en-US" sz="1200" i="1" dirty="0">
+                <a:solidFill>
+                  <a:schemeClr val="bg2">
+                    <a:lumMod val="25000"/>
+                  </a:schemeClr>
+                </a:solidFill>
+                <a:hlinkClick r:id="rId4"/>
+              </a:rPr>
+              <a:t>https://www.dw.com/en/trains-vs-planes-whats-the-real-cost-of-travel/a-45209552</a:t>
+            </a:r>
+            <a:r>
+              <a:rPr lang="en-US" sz="1200" i="1" dirty="0">
+                <a:solidFill>
+                  <a:schemeClr val="bg2">
+                    <a:lumMod val="25000"/>
+                  </a:schemeClr>
+                </a:solidFill>
+              </a:rPr>
+              <a:t>. (Accessed October 30, 2018.</a:t>
+            </a:r>
+            <a:endParaRPr lang="en-US" sz="1200" dirty="0">
+              <a:solidFill>
+                <a:schemeClr val="bg2">
+                  <a:lumMod val="25000"/>
+                </a:schemeClr>
+              </a:solidFill>
             </a:endParaRPr>
           </a:p>
         </p:txBody>
@@ -6312,6 +8650,176 @@
           </a:p>
         </p:txBody>
       </p:sp>
+      <p:sp>
+        <p:nvSpPr>
+          <p:cNvPr id="8" name="TextBox 7">
+            <a:extLst>
+              <a:ext uri="{FF2B5EF4-FFF2-40B4-BE49-F238E27FC236}">
+                <a16:creationId xmlns:a16="http://schemas.microsoft.com/office/drawing/2014/main" id="{1A59BF4F-FA83-4E91-A6DB-A2F6FEDD0E8A}"/>
+              </a:ext>
+            </a:extLst>
+          </p:cNvPr>
+          <p:cNvSpPr txBox="1"/>
+          <p:nvPr/>
+        </p:nvSpPr>
+        <p:spPr>
+          <a:xfrm>
+            <a:off x="6172200" y="6176963"/>
+            <a:ext cx="5181600" cy="646331"/>
+          </a:xfrm>
+          <a:prstGeom prst="rect">
+            <a:avLst/>
+          </a:prstGeom>
+          <a:noFill/>
+        </p:spPr>
+        <p:txBody>
+          <a:bodyPr wrap="square" rtlCol="0">
+            <a:spAutoFit/>
+          </a:bodyPr>
+          <a:lstStyle/>
+          <a:p>
+            <a:r>
+              <a:rPr lang="en-US" sz="1200" dirty="0">
+                <a:solidFill>
+                  <a:schemeClr val="bg2">
+                    <a:lumMod val="25000"/>
+                  </a:schemeClr>
+                </a:solidFill>
+              </a:rPr>
+              <a:t>Wills, Tom &amp; Gianna-Carina </a:t>
+            </a:r>
+            <a:r>
+              <a:rPr lang="en-US" sz="1200" dirty="0" err="1">
+                <a:solidFill>
+                  <a:schemeClr val="bg2">
+                    <a:lumMod val="25000"/>
+                  </a:schemeClr>
+                </a:solidFill>
+              </a:rPr>
+              <a:t>Grün</a:t>
+            </a:r>
+            <a:r>
+              <a:rPr lang="en-US" sz="1200" dirty="0">
+                <a:solidFill>
+                  <a:schemeClr val="bg2">
+                    <a:lumMod val="25000"/>
+                  </a:schemeClr>
+                </a:solidFill>
+              </a:rPr>
+              <a:t>. “Trains vs. planes. What’s the real cost of travel?” </a:t>
+            </a:r>
+            <a:r>
+              <a:rPr lang="en-US" sz="1200" i="1" dirty="0">
+                <a:solidFill>
+                  <a:schemeClr val="bg2">
+                    <a:lumMod val="25000"/>
+                  </a:schemeClr>
+                </a:solidFill>
+              </a:rPr>
+              <a:t>Deutsche </a:t>
+            </a:r>
+            <a:r>
+              <a:rPr lang="en-US" sz="1200" i="1" dirty="0" err="1">
+                <a:solidFill>
+                  <a:schemeClr val="bg2">
+                    <a:lumMod val="25000"/>
+                  </a:schemeClr>
+                </a:solidFill>
+              </a:rPr>
+              <a:t>Welle</a:t>
+            </a:r>
+            <a:r>
+              <a:rPr lang="en-US" sz="1200" i="1" dirty="0">
+                <a:solidFill>
+                  <a:schemeClr val="bg2">
+                    <a:lumMod val="25000"/>
+                  </a:schemeClr>
+                </a:solidFill>
+              </a:rPr>
+              <a:t>. </a:t>
+            </a:r>
+            <a:r>
+              <a:rPr lang="en-US" sz="1200" i="1" dirty="0">
+                <a:solidFill>
+                  <a:schemeClr val="bg2">
+                    <a:lumMod val="25000"/>
+                  </a:schemeClr>
+                </a:solidFill>
+                <a:hlinkClick r:id="rId4"/>
+              </a:rPr>
+              <a:t>https://www.dw.com/en/trains-vs-planes-whats-the-real-cost-of-travel/a-45209552</a:t>
+            </a:r>
+            <a:r>
+              <a:rPr lang="en-US" sz="1200" i="1" dirty="0">
+                <a:solidFill>
+                  <a:schemeClr val="bg2">
+                    <a:lumMod val="25000"/>
+                  </a:schemeClr>
+                </a:solidFill>
+              </a:rPr>
+              <a:t>. (Accessed October 30, 2018.</a:t>
+            </a:r>
+            <a:endParaRPr lang="en-US" sz="1200" dirty="0">
+              <a:solidFill>
+                <a:schemeClr val="bg2">
+                  <a:lumMod val="25000"/>
+                </a:schemeClr>
+              </a:solidFill>
+            </a:endParaRPr>
+          </a:p>
+        </p:txBody>
+      </p:sp>
+      <p:sp>
+        <p:nvSpPr>
+          <p:cNvPr id="11" name="TextBox 10">
+            <a:extLst>
+              <a:ext uri="{FF2B5EF4-FFF2-40B4-BE49-F238E27FC236}">
+                <a16:creationId xmlns:a16="http://schemas.microsoft.com/office/drawing/2014/main" id="{53B258F0-6AA5-4B5C-BB06-BC7362C135A1}"/>
+              </a:ext>
+            </a:extLst>
+          </p:cNvPr>
+          <p:cNvSpPr txBox="1"/>
+          <p:nvPr/>
+        </p:nvSpPr>
+        <p:spPr>
+          <a:xfrm>
+            <a:off x="730120" y="6451041"/>
+            <a:ext cx="4887747" cy="276999"/>
+          </a:xfrm>
+          <a:prstGeom prst="rect">
+            <a:avLst/>
+          </a:prstGeom>
+          <a:noFill/>
+        </p:spPr>
+        <p:txBody>
+          <a:bodyPr wrap="square" rtlCol="0">
+            <a:spAutoFit/>
+          </a:bodyPr>
+          <a:lstStyle>
+            <a:defPPr>
+              <a:defRPr lang="en-US"/>
+            </a:defPPr>
+            <a:lvl1pPr>
+              <a:defRPr sz="1200">
+                <a:solidFill>
+                  <a:schemeClr val="bg2">
+                    <a:lumMod val="25000"/>
+                  </a:schemeClr>
+                </a:solidFill>
+              </a:defRPr>
+            </a:lvl1pPr>
+          </a:lstStyle>
+          <a:p>
+            <a:r>
+              <a:rPr lang="en-US" dirty="0">
+                <a:hlinkClick r:id="rId5"/>
+              </a:rPr>
+              <a:t>Reproductions also available here</a:t>
+            </a:r>
+            <a:endParaRPr lang="en-US" dirty="0"/>
+          </a:p>
+        </p:txBody>
+      </p:sp>
     </p:spTree>
     <p:extLst>
       <p:ext uri="{BB962C8B-B14F-4D97-AF65-F5344CB8AC3E}">
@@ -6548,6 +9056,125 @@
             <a:pPr algn="ctr"/>
             <a:endParaRPr lang="en-US" sz="4000" dirty="0">
               <a:latin typeface="Britannic Bold" panose="020B0903060703020204" pitchFamily="34" charset="0"/>
+            </a:endParaRPr>
+          </a:p>
+        </p:txBody>
+      </p:sp>
+      <p:sp>
+        <p:nvSpPr>
+          <p:cNvPr id="11" name="TextBox 10">
+            <a:extLst>
+              <a:ext uri="{FF2B5EF4-FFF2-40B4-BE49-F238E27FC236}">
+                <a16:creationId xmlns:a16="http://schemas.microsoft.com/office/drawing/2014/main" id="{D305C5F2-EE8A-4CAE-BEB9-E09384E83CB8}"/>
+              </a:ext>
+            </a:extLst>
+          </p:cNvPr>
+          <p:cNvSpPr txBox="1"/>
+          <p:nvPr/>
+        </p:nvSpPr>
+        <p:spPr>
+          <a:xfrm>
+            <a:off x="6172200" y="6176963"/>
+            <a:ext cx="5181600" cy="646331"/>
+          </a:xfrm>
+          <a:prstGeom prst="rect">
+            <a:avLst/>
+          </a:prstGeom>
+          <a:noFill/>
+        </p:spPr>
+        <p:txBody>
+          <a:bodyPr wrap="square" rtlCol="0">
+            <a:spAutoFit/>
+          </a:bodyPr>
+          <a:lstStyle/>
+          <a:p>
+            <a:r>
+              <a:rPr lang="en-US" sz="1200" dirty="0">
+                <a:solidFill>
+                  <a:schemeClr val="bg2">
+                    <a:lumMod val="25000"/>
+                  </a:schemeClr>
+                </a:solidFill>
+              </a:rPr>
+              <a:t>Wills, Tom &amp; Gianna-Carina </a:t>
+            </a:r>
+            <a:r>
+              <a:rPr lang="en-US" sz="1200" dirty="0" err="1">
+                <a:solidFill>
+                  <a:schemeClr val="bg2">
+                    <a:lumMod val="25000"/>
+                  </a:schemeClr>
+                </a:solidFill>
+              </a:rPr>
+              <a:t>Grün</a:t>
+            </a:r>
+            <a:r>
+              <a:rPr lang="en-US" sz="1200" dirty="0">
+                <a:solidFill>
+                  <a:schemeClr val="bg2">
+                    <a:lumMod val="25000"/>
+                  </a:schemeClr>
+                </a:solidFill>
+              </a:rPr>
+              <a:t>. “Trains vs. planes. What’s the real cost of travel?” </a:t>
+            </a:r>
+            <a:r>
+              <a:rPr lang="en-US" sz="1200" i="1" dirty="0">
+                <a:solidFill>
+                  <a:schemeClr val="bg2">
+                    <a:lumMod val="25000"/>
+                  </a:schemeClr>
+                </a:solidFill>
+              </a:rPr>
+              <a:t>Deutsche </a:t>
+            </a:r>
+            <a:r>
+              <a:rPr lang="en-US" sz="1200" i="1" dirty="0" err="1">
+                <a:solidFill>
+                  <a:schemeClr val="bg2">
+                    <a:lumMod val="25000"/>
+                  </a:schemeClr>
+                </a:solidFill>
+              </a:rPr>
+              <a:t>Welle</a:t>
+            </a:r>
+            <a:r>
+              <a:rPr lang="en-US" sz="1200" i="1" dirty="0">
+                <a:solidFill>
+                  <a:schemeClr val="bg2">
+                    <a:lumMod val="25000"/>
+                  </a:schemeClr>
+                </a:solidFill>
+              </a:rPr>
+              <a:t>. </a:t>
+            </a:r>
+            <a:r>
+              <a:rPr lang="en-US" sz="1200" i="1" dirty="0">
+                <a:solidFill>
+                  <a:schemeClr val="bg2">
+                    <a:lumMod val="25000"/>
+                  </a:schemeClr>
+                </a:solidFill>
+                <a:hlinkClick r:id="rId4"/>
+              </a:rPr>
+              <a:t>https://www.dw.com/en/trains-vs-planes-whats-the-real-cost-of-travel/a-45209552</a:t>
+            </a:r>
+            <a:r>
+              <a:rPr lang="en-US" sz="1200" i="1" dirty="0">
+                <a:solidFill>
+                  <a:schemeClr val="bg2">
+                    <a:lumMod val="25000"/>
+                  </a:schemeClr>
+                </a:solidFill>
+              </a:rPr>
+              <a:t>. (Accessed October 30, 2018.</a:t>
+            </a:r>
+            <a:endParaRPr lang="en-US" sz="1200" dirty="0">
+              <a:solidFill>
+                <a:schemeClr val="bg2">
+                  <a:lumMod val="25000"/>
+                </a:schemeClr>
+              </a:solidFill>
             </a:endParaRPr>
           </a:p>
         </p:txBody>
@@ -6989,49 +9616,6 @@
 </a:themeOverride>
 </file>
 
-<file path=ppt/theme/themeOverride12.xml><?xml version="1.0" encoding="utf-8"?>
-<a:themeOverride xmlns:a="http://schemas.openxmlformats.org/drawingml/2006/main">
-  <a:clrScheme name="Office">
-    <a:dk1>
-      <a:sysClr val="windowText" lastClr="000000"/>
-    </a:dk1>
-    <a:lt1>
-      <a:sysClr val="window" lastClr="FFFFFF"/>
-    </a:lt1>
-    <a:dk2>
-      <a:srgbClr val="44546A"/>
-    </a:dk2>
-    <a:lt2>
-      <a:srgbClr val="E7E6E6"/>
-    </a:lt2>
-    <a:accent1>
-      <a:srgbClr val="4472C4"/>
-    </a:accent1>
-    <a:accent2>
-      <a:srgbClr val="ED7D31"/>
-    </a:accent2>
-    <a:accent3>
-      <a:srgbClr val="A5A5A5"/>
-    </a:accent3>
-    <a:accent4>
-      <a:srgbClr val="FFC000"/>
-    </a:accent4>
-    <a:accent5>
-      <a:srgbClr val="5B9BD5"/>
-    </a:accent5>
-    <a:accent6>
-      <a:srgbClr val="70AD47"/>
-    </a:accent6>
-    <a:hlink>
-      <a:srgbClr val="0563C1"/>
-    </a:hlink>
-    <a:folHlink>
-      <a:srgbClr val="954F72"/>
-    </a:folHlink>
-  </a:clrScheme>
-</a:themeOverride>
-</file>
-
 <file path=ppt/theme/themeOverride2.xml><?xml version="1.0" encoding="utf-8"?>
 <a:themeOverride xmlns:a="http://schemas.openxmlformats.org/drawingml/2006/main">
   <a:clrScheme name="Office">

</xml_diff>